<commit_message>
Deploying to gh-pages from @ ManuelePasini/slides-markdown@fadf549296c9cd9a54881a383addb5a823575f0f 🚀
</commit_message>
<xml_diff>
--- a/digital_twins.pptx
+++ b/digital_twins.pptx
@@ -4597,6 +4597,68 @@
           </a:p>
         </p:txBody>
       </p:sp>
+      <p:pic>
+        <p:nvPicPr>
+          <p:cNvPr descr="https://github.com/ManuelePasini/slides-markdown/blob/master/slides/images/dt/dt_cons_arch.png?raw=true" id="0" name="Picture 1"/>
+          <p:cNvPicPr>
+            <a:picLocks noGrp="1" noChangeAspect="1"/>
+          </p:cNvPicPr>
+          <p:nvPr/>
+        </p:nvPicPr>
+        <p:blipFill>
+          <a:blip r:embed="rId2"/>
+          <a:stretch>
+            <a:fillRect/>
+          </a:stretch>
+        </p:blipFill>
+        <p:spPr bwMode="auto">
+          <a:xfrm>
+            <a:off x="2032000" y="1193800"/>
+            <a:ext cx="5092700" cy="2882900"/>
+          </a:xfrm>
+          <a:prstGeom prst="rect">
+            <a:avLst/>
+          </a:prstGeom>
+          <a:noFill/>
+          <a:ln w="9525">
+            <a:noFill/>
+            <a:headEnd/>
+            <a:tailEnd/>
+          </a:ln>
+        </p:spPr>
+      </p:pic>
+      <p:sp>
+        <p:nvSpPr>
+          <p:cNvPr id="1" name="TextBox 3"/>
+          <p:cNvSpPr txBox="1"/>
+          <p:nvPr/>
+        </p:nvSpPr>
+        <p:spPr>
+          <a:xfrm>
+            <a:off x="457200" y="4076700"/>
+            <a:ext cx="8229600" cy="508000"/>
+          </a:xfrm>
+          <a:prstGeom prst="rect">
+            <a:avLst/>
+          </a:prstGeom>
+          <a:noFill/>
+        </p:spPr>
+        <p:txBody>
+          <a:bodyPr/>
+          <a:lstStyle/>
+          <a:p>
+            <a:pPr lvl="0" indent="0" marL="0" algn="ctr">
+              <a:buNone/>
+            </a:pPr>
+            <a:r>
+              <a:rPr>
+                <a:hlinkClick r:id="rId3"/>
+              </a:rPr>
+              <a:t>Digital Twin Consortium Architecture</a:t>
+            </a:r>
+          </a:p>
+        </p:txBody>
+      </p:sp>
     </p:spTree>
   </p:cSld>
 </p:sld>
@@ -5600,6 +5662,13 @@
             <a:r>
               <a:rPr/>
               <a:t>AWS IoT Twin Maker</a:t>
+            </a:r>
+          </a:p>
+          <a:p>
+            <a:pPr lvl="0"/>
+            <a:r>
+              <a:rPr/>
+              <a:t>Digital Twin Consortium</a:t>
             </a:r>
           </a:p>
         </p:txBody>

</xml_diff>

<commit_message>
Deploying to gh-pages from @ ManuelePasini/slides-markdown@b30301fa5f1d426922d2eaf138bf840dbfe107be 🚀
</commit_message>
<xml_diff>
--- a/digital_twins.pptx
+++ b/digital_twins.pptx
@@ -5076,7 +5076,7 @@
             </a:pPr>
             <a:r>
               <a:rPr/>
-              <a:t>DT in academia - #1</a:t>
+              <a:t>DT in literature - #1</a:t>
             </a:r>
           </a:p>
         </p:txBody>
@@ -5384,7 +5384,7 @@
             </a:pPr>
             <a:r>
               <a:rPr/>
-              <a:t>DT in academia - #2</a:t>
+              <a:t>DT in literature - #2</a:t>
             </a:r>
           </a:p>
         </p:txBody>

</xml_diff>

<commit_message>
Deploying to gh-pages from @ ManuelePasini/slides-markdown@773786ecbf40fa8aa0e9d32ecfb56b9cd594845f 🚀
</commit_message>
<xml_diff>
--- a/digital_twins.pptx
+++ b/digital_twins.pptx
@@ -5030,6 +5030,66 @@
             <a:r>
               <a:rPr/>
               <a:t>Watering Digital Twin</a:t>
+            </a:r>
+          </a:p>
+        </p:txBody>
+      </p:sp>
+      <p:pic>
+        <p:nvPicPr>
+          <p:cNvPr descr="https://github.com/ManuelePasini/slides-markdown/blob/master/slides/images/dt/gantt.svg?raw=true" id="0" name="Picture 1"/>
+          <p:cNvPicPr>
+            <a:picLocks noGrp="1" noChangeAspect="1"/>
+          </p:cNvPicPr>
+          <p:nvPr/>
+        </p:nvPicPr>
+        <p:blipFill>
+          <a:blip r:embed="rId2"/>
+          <a:stretch>
+            <a:fillRect/>
+          </a:stretch>
+        </p:blipFill>
+        <p:spPr bwMode="auto">
+          <a:xfrm>
+            <a:off x="1689100" y="1193800"/>
+            <a:ext cx="5765800" cy="2882900"/>
+          </a:xfrm>
+          <a:prstGeom prst="rect">
+            <a:avLst/>
+          </a:prstGeom>
+          <a:noFill/>
+          <a:ln w="9525">
+            <a:noFill/>
+            <a:headEnd/>
+            <a:tailEnd/>
+          </a:ln>
+        </p:spPr>
+      </p:pic>
+      <p:sp>
+        <p:nvSpPr>
+          <p:cNvPr id="1" name="TextBox 3"/>
+          <p:cNvSpPr txBox="1"/>
+          <p:nvPr/>
+        </p:nvSpPr>
+        <p:spPr>
+          <a:xfrm>
+            <a:off x="457200" y="4076700"/>
+            <a:ext cx="8229600" cy="508000"/>
+          </a:xfrm>
+          <a:prstGeom prst="rect">
+            <a:avLst/>
+          </a:prstGeom>
+          <a:noFill/>
+        </p:spPr>
+        <p:txBody>
+          <a:bodyPr/>
+          <a:lstStyle/>
+          <a:p>
+            <a:pPr lvl="0" indent="0" marL="0" algn="ctr">
+              <a:buNone/>
+            </a:pPr>
+            <a:r>
+              <a:rPr/>
+              <a:t>P.h.D. Proposal timeline</a:t>
             </a:r>
           </a:p>
         </p:txBody>

</xml_diff>

<commit_message>
Deploying to gh-pages from @ ManuelePasini/slides-markdown@b829b64487072e288c054bbc2787781eedd0938e 🚀
</commit_message>
<xml_diff>
--- a/digital_twins.pptx
+++ b/digital_twins.pptx
@@ -4592,7 +4592,7 @@
             <a:pPr lvl="0"/>
             <a:r>
               <a:rPr/>
-              <a:t>e.g. Digital Twin Data (Fei Tao)</a:t>
+              <a:t>e.g. Digital Twin Consortium</a:t>
             </a:r>
           </a:p>
         </p:txBody>
@@ -4969,7 +4969,7 @@
             <a:spLocks noGrp="1"/>
           </p:cNvSpPr>
           <p:nvPr>
-            <p:ph idx="1"/>
+            <p:ph idx="1" sz="half"/>
           </p:nvPr>
         </p:nvSpPr>
         <p:spPr/>
@@ -4987,7 +4987,7 @@
             <a:pPr lvl="1"/>
             <a:r>
               <a:rPr/>
-              <a:t>Historicizing data</a:t>
+              <a:t>Focus on historical data</a:t>
             </a:r>
           </a:p>
           <a:p>
@@ -5008,14 +5008,14 @@
             <a:pPr lvl="1"/>
             <a:r>
               <a:rPr/>
-              <a:t>Meta-Models for historicized data (domain driven?)</a:t>
+              <a:t>Meta-Models for historicized data in a DT (domain driven?)</a:t>
             </a:r>
           </a:p>
           <a:p>
             <a:pPr lvl="1"/>
             <a:r>
               <a:rPr/>
-              <a:t>Standardazing a wider concept (e.g. Web of Digital Twins)</a:t>
+              <a:t>Standardazing a wider concept (e.g. interoperability between different DT)</a:t>
             </a:r>
           </a:p>
           <a:p>
@@ -5050,8 +5050,8 @@
         </p:blipFill>
         <p:spPr bwMode="auto">
           <a:xfrm>
-            <a:off x="1689100" y="1193800"/>
-            <a:ext cx="5765800" cy="2882900"/>
+            <a:off x="4648200" y="1625600"/>
+            <a:ext cx="4038600" cy="2019300"/>
           </a:xfrm>
           <a:prstGeom prst="rect">
             <a:avLst/>
@@ -5072,8 +5072,8 @@
         </p:nvSpPr>
         <p:spPr>
           <a:xfrm>
-            <a:off x="457200" y="4076700"/>
-            <a:ext cx="8229600" cy="508000"/>
+            <a:off x="4648200" y="4076700"/>
+            <a:ext cx="4038600" cy="508000"/>
           </a:xfrm>
           <a:prstGeom prst="rect">
             <a:avLst/>

</xml_diff>

<commit_message>
Deploying to gh-pages from @ ManuelePasini/slides-markdown@bde87e3665ba0596d3739fefe6e9c06ca2d38a98 🚀
</commit_message>
<xml_diff>
--- a/digital_twins.pptx
+++ b/digital_twins.pptx
@@ -5176,6 +5176,13 @@
               <a:t>Mostly non IT papers</a:t>
             </a:r>
           </a:p>
+          <a:p>
+            <a:pPr lvl="0"/>
+            <a:r>
+              <a:rPr/>
+              <a:t>Not really twins…</a:t>
+            </a:r>
+          </a:p>
         </p:txBody>
       </p:sp>
       <p:pic>
@@ -5474,13 +5481,6 @@
             <a:pPr lvl="0"/>
             <a:r>
               <a:rPr/>
-              <a:t>Presented as an “evolution” of CPS…</a:t>
-            </a:r>
-          </a:p>
-          <a:p>
-            <a:pPr lvl="0"/>
-            <a:r>
-              <a:rPr/>
               <a:t>Still mostly application oriented, focused on visualization (e.g. Unity3D)</a:t>
             </a:r>
           </a:p>
@@ -5496,6 +5496,13 @@
             <a:r>
               <a:rPr/>
               <a:t>… Still left unconsidered in research papers.</a:t>
+            </a:r>
+          </a:p>
+          <a:p>
+            <a:pPr lvl="0"/>
+            <a:r>
+              <a:rPr/>
+              <a:t>However, some standard models are emerging…</a:t>
             </a:r>
           </a:p>
           <a:p>

</xml_diff>

<commit_message>
Deploying to gh-pages from @ ManuelePasini/slides-markdown@f06812f1a157b8a44814ad5c71c08a094facad4d 🚀
</commit_message>
<xml_diff>
--- a/digital_twins.pptx
+++ b/digital_twins.pptx
@@ -3785,8 +3785,8 @@
         </p:blipFill>
         <p:spPr bwMode="auto">
           <a:xfrm>
-            <a:off x="469900" y="1193800"/>
-            <a:ext cx="8204200" cy="2882900"/>
+            <a:off x="508000" y="1193800"/>
+            <a:ext cx="8128000" cy="2882900"/>
           </a:xfrm>
           <a:prstGeom prst="rect">
             <a:avLst/>
@@ -5495,7 +5495,7 @@
             <a:pPr lvl="0"/>
             <a:r>
               <a:rPr/>
-              <a:t>… Still left unconsidered in research papers.</a:t>
+              <a:t>… Still left unconsidered in most research papers.</a:t>
             </a:r>
           </a:p>
           <a:p>
@@ -5812,7 +5812,7 @@
             <a:pPr lvl="0"/>
             <a:r>
               <a:rPr/>
-              <a:t>Digital Twin Definition Language (DTDL)</a:t>
+              <a:t>Digital Twin Definition Language (DTDL) - JSON-LD/NGSI-LD</a:t>
             </a:r>
           </a:p>
           <a:p>

</xml_diff>

<commit_message>
Deploying to gh-pages from @ ManuelePasini/slides-markdown@e4bff0dc50e94085007081e64a98aa134aaffa04 🚀
</commit_message>
<xml_diff>
--- a/digital_twins.pptx
+++ b/digital_twins.pptx
@@ -3901,34 +3901,6 @@
             <a:pPr lvl="0"/>
             <a:r>
               <a:rPr/>
-              <a:t>“id” now must be an URN (or an URI HTTP)</a:t>
-            </a:r>
-          </a:p>
-          <a:p>
-            <a:pPr lvl="0"/>
-            <a:r>
-              <a:rPr/>
-              <a:t>The entity must have a “type” attribute which represent the class of the entity</a:t>
-            </a:r>
-          </a:p>
-          <a:p>
-            <a:pPr lvl="0"/>
-            <a:r>
-              <a:rPr/>
-              <a:t>The class must then be defined in the @context</a:t>
-            </a:r>
-          </a:p>
-          <a:p>
-            <a:pPr lvl="0"/>
-            <a:r>
-              <a:rPr/>
-              <a:t>@context implicitly includes the core @context of NGSI-LD:</a:t>
-            </a:r>
-          </a:p>
-          <a:p>
-            <a:pPr lvl="0"/>
-            <a:r>
-              <a:rPr/>
               <a:t>Defines a </a:t>
             </a:r>
             <a:r>
@@ -3950,6 +3922,34 @@
             <a:r>
               <a:rPr/>
               <a:t>) for property graphs</a:t>
+            </a:r>
+          </a:p>
+          <a:p>
+            <a:pPr lvl="0"/>
+            <a:r>
+              <a:rPr/>
+              <a:t>“id” now must be an URN (or an URI HTTP)</a:t>
+            </a:r>
+          </a:p>
+          <a:p>
+            <a:pPr lvl="0"/>
+            <a:r>
+              <a:rPr/>
+              <a:t>The entity must have a “type” attribute which represent the class of the entity</a:t>
+            </a:r>
+          </a:p>
+          <a:p>
+            <a:pPr lvl="0"/>
+            <a:r>
+              <a:rPr/>
+              <a:t>The class must then be defined in the @context</a:t>
+            </a:r>
+          </a:p>
+          <a:p>
+            <a:pPr lvl="0"/>
+            <a:r>
+              <a:rPr/>
+              <a:t>@context implicitly includes the core @context of NGSI-LD:</a:t>
             </a:r>
           </a:p>
         </p:txBody>
@@ -5812,7 +5812,7 @@
             <a:pPr lvl="0"/>
             <a:r>
               <a:rPr/>
-              <a:t>Digital Twin Definition Language (DTDL) - JSON-LD/NGSI-LD</a:t>
+              <a:t>Digital Twin Definition Language (DTDL) - JSON-LD/NGSI-LDgi</a:t>
             </a:r>
           </a:p>
           <a:p>

</xml_diff>

<commit_message>
Deploying to gh-pages from @ ManuelePasini/slides-markdown@7651f1fe7a7c87fef47e548a79dac12a2d109b2f 🚀
</commit_message>
<xml_diff>
--- a/digital_twins.pptx
+++ b/digital_twins.pptx
@@ -4777,7 +4777,7 @@
       </p:grpSpPr>
       <p:pic>
         <p:nvPicPr>
-          <p:cNvPr descr="https://github.com/ManuelePasini/slides-markdown/blob/master/slides/images/dt/dt_lifecycle.png?raw=true" id="0" name="Picture 1"/>
+          <p:cNvPr descr="https://github.com/ManuelePasini/slides-markdown/blob/master/slides/images/dt/dt_data.png?raw=true" id="0" name="Picture 1"/>
           <p:cNvPicPr>
             <a:picLocks noGrp="1" noChangeAspect="1"/>
           </p:cNvPicPr>
@@ -4791,7 +4791,77 @@
         </p:blipFill>
         <p:spPr bwMode="auto">
           <a:xfrm>
-            <a:off x="457200" y="1549400"/>
+            <a:off x="457200" y="1358900"/>
+            <a:ext cx="4038600" cy="2552700"/>
+          </a:xfrm>
+          <a:prstGeom prst="rect">
+            <a:avLst/>
+          </a:prstGeom>
+          <a:noFill/>
+          <a:ln w="9525">
+            <a:noFill/>
+            <a:headEnd/>
+            <a:tailEnd/>
+          </a:ln>
+        </p:spPr>
+      </p:pic>
+      <p:sp>
+        <p:nvSpPr>
+          <p:cNvPr id="1" name="TextBox 3"/>
+          <p:cNvSpPr txBox="1"/>
+          <p:nvPr/>
+        </p:nvSpPr>
+        <p:spPr>
+          <a:xfrm>
+            <a:off x="457200" y="4076700"/>
+            <a:ext cx="4038600" cy="508000"/>
+          </a:xfrm>
+          <a:prstGeom prst="rect">
+            <a:avLst/>
+          </a:prstGeom>
+          <a:noFill/>
+        </p:spPr>
+        <p:txBody>
+          <a:bodyPr/>
+          <a:lstStyle/>
+          <a:p>
+            <a:pPr lvl="0" indent="0" marL="0" algn="ctr">
+              <a:buNone/>
+            </a:pPr>
+            <a:r>
+              <a:rPr/>
+              <a:t>Digital Twin Data (</a:t>
+            </a:r>
+            <a:r>
+              <a:rPr>
+                <a:hlinkClick r:id="rId3"/>
+              </a:rPr>
+              <a:t>Fei, Tao 2023</a:t>
+            </a:r>
+            <a:r>
+              <a:rPr/>
+              <a:t>)</a:t>
+            </a:r>
+          </a:p>
+        </p:txBody>
+      </p:sp>
+      <p:pic>
+        <p:nvPicPr>
+          <p:cNvPr descr="https://github.com/ManuelePasini/slides-markdown/blob/master/slides/images/dt/dt_lifecycle.png?raw=true" id="0" name="Picture 1"/>
+          <p:cNvPicPr>
+            <a:picLocks noGrp="1" noChangeAspect="1"/>
+          </p:cNvPicPr>
+          <p:nvPr/>
+        </p:nvPicPr>
+        <p:blipFill>
+          <a:blip r:embed="rId4"/>
+          <a:stretch>
+            <a:fillRect/>
+          </a:stretch>
+        </p:blipFill>
+        <p:spPr bwMode="auto">
+          <a:xfrm>
+            <a:off x="4648200" y="1549400"/>
             <a:ext cx="4038600" cy="2159000"/>
           </a:xfrm>
           <a:prstGeom prst="rect">
@@ -4813,76 +4883,6 @@
         </p:nvSpPr>
         <p:spPr>
           <a:xfrm>
-            <a:off x="457200" y="4076700"/>
-            <a:ext cx="4038600" cy="508000"/>
-          </a:xfrm>
-          <a:prstGeom prst="rect">
-            <a:avLst/>
-          </a:prstGeom>
-          <a:noFill/>
-        </p:spPr>
-        <p:txBody>
-          <a:bodyPr/>
-          <a:lstStyle/>
-          <a:p>
-            <a:pPr lvl="0" indent="0" marL="0" algn="ctr">
-              <a:buNone/>
-            </a:pPr>
-            <a:r>
-              <a:rPr/>
-              <a:t>Data Methodology (</a:t>
-            </a:r>
-            <a:r>
-              <a:rPr>
-                <a:hlinkClick r:id="rId3"/>
-              </a:rPr>
-              <a:t>Fei, Tao 2023</a:t>
-            </a:r>
-            <a:r>
-              <a:rPr/>
-              <a:t>)</a:t>
-            </a:r>
-          </a:p>
-        </p:txBody>
-      </p:sp>
-      <p:pic>
-        <p:nvPicPr>
-          <p:cNvPr descr="https://github.com/ManuelePasini/slides-markdown/blob/master/slides/images/dt/dt_data.png?raw=true" id="0" name="Picture 1"/>
-          <p:cNvPicPr>
-            <a:picLocks noGrp="1" noChangeAspect="1"/>
-          </p:cNvPicPr>
-          <p:nvPr/>
-        </p:nvPicPr>
-        <p:blipFill>
-          <a:blip r:embed="rId4"/>
-          <a:stretch>
-            <a:fillRect/>
-          </a:stretch>
-        </p:blipFill>
-        <p:spPr bwMode="auto">
-          <a:xfrm>
-            <a:off x="4648200" y="1358900"/>
-            <a:ext cx="4038600" cy="2552700"/>
-          </a:xfrm>
-          <a:prstGeom prst="rect">
-            <a:avLst/>
-          </a:prstGeom>
-          <a:noFill/>
-          <a:ln w="9525">
-            <a:noFill/>
-            <a:headEnd/>
-            <a:tailEnd/>
-          </a:ln>
-        </p:spPr>
-      </p:pic>
-      <p:sp>
-        <p:nvSpPr>
-          <p:cNvPr id="1" name="TextBox 3"/>
-          <p:cNvSpPr txBox="1"/>
-          <p:nvPr/>
-        </p:nvSpPr>
-        <p:spPr>
-          <a:xfrm>
             <a:off x="4648200" y="4076700"/>
             <a:ext cx="4038600" cy="508000"/>
           </a:xfrm>
@@ -4900,7 +4900,7 @@
             </a:pPr>
             <a:r>
               <a:rPr/>
-              <a:t>Digital Twin Data (</a:t>
+              <a:t>Data Methodology (</a:t>
             </a:r>
             <a:r>
               <a:rPr>

</xml_diff>

<commit_message>
Deploying to gh-pages from @ ManuelePasini/slides-markdown@dbaa34d229d8e13809467ce73aafb794c664708c 🚀
</commit_message>
<xml_diff>
--- a/digital_twins.pptx
+++ b/digital_twins.pptx
@@ -28,6 +28,8 @@
     <p:sldId id="276" r:id="rId22"/>
     <p:sldId id="277" r:id="rId23"/>
     <p:sldId id="278" r:id="rId24"/>
+    <p:sldId id="279" r:id="rId25"/>
+    <p:sldId id="280" r:id="rId26"/>
   </p:sldIdLst>
   <p:sldSz cx="9144000" cy="5143500" type="screen16x9"/>
   <p:notesSz cx="6858000" cy="9144000"/>
@@ -5090,6 +5092,446 @@
             <a:r>
               <a:rPr/>
               <a:t>P.h.D. Proposal timeline</a:t>
+            </a:r>
+          </a:p>
+        </p:txBody>
+      </p:sp>
+    </p:spTree>
+  </p:cSld>
+</p:sld>
+</file>
+
+<file path=ppt/slides/slide24.xml><?xml version="1.0" encoding="utf-8"?>
+<p:sld xmlns:a="http://schemas.openxmlformats.org/drawingml/2006/main" xmlns:r="http://schemas.openxmlformats.org/officeDocument/2006/relationships" xmlns:p="http://schemas.openxmlformats.org/presentationml/2006/main">
+  <p:cSld>
+    <p:spTree>
+      <p:nvGrpSpPr>
+        <p:cNvPr id="1" name=""/>
+        <p:cNvGrpSpPr/>
+        <p:nvPr/>
+      </p:nvGrpSpPr>
+      <p:grpSpPr>
+        <a:xfrm>
+          <a:off x="0" y="0"/>
+          <a:ext cx="0" cy="0"/>
+          <a:chOff x="0" y="0"/>
+          <a:chExt cx="0" cy="0"/>
+        </a:xfrm>
+      </p:grpSpPr>
+      <p:sp>
+        <p:nvSpPr>
+          <p:cNvPr id="2" name="Title 1"/>
+          <p:cNvSpPr>
+            <a:spLocks noGrp="1"/>
+          </p:cNvSpPr>
+          <p:nvPr>
+            <p:ph type="title"/>
+          </p:nvPr>
+        </p:nvSpPr>
+        <p:spPr/>
+        <p:txBody>
+          <a:bodyPr/>
+          <a:lstStyle/>
+          <a:p>
+            <a:pPr lvl="0" indent="0" marL="0">
+              <a:buNone/>
+            </a:pPr>
+            <a:r>
+              <a:rPr/>
+              <a:t>Carbonaro 17/09</a:t>
+            </a:r>
+          </a:p>
+        </p:txBody>
+      </p:sp>
+      <p:sp>
+        <p:nvSpPr>
+          <p:cNvPr id="3" name="Content Placeholder 2"/>
+          <p:cNvSpPr>
+            <a:spLocks noGrp="1"/>
+          </p:cNvSpPr>
+          <p:nvPr>
+            <p:ph idx="1"/>
+          </p:nvPr>
+        </p:nvSpPr>
+        <p:spPr/>
+        <p:txBody>
+          <a:bodyPr/>
+          <a:lstStyle/>
+          <a:p>
+            <a:pPr lvl="0"/>
+            <a:r>
+              <a:rPr/>
+              <a:t>Loro usano property-knowledge graph</a:t>
+            </a:r>
+          </a:p>
+          <a:p>
+            <a:pPr lvl="0"/>
+            <a:r>
+              <a:rPr/>
+              <a:t>Open word assumption: solo in AND …</a:t>
+            </a:r>
+          </a:p>
+          <a:p>
+            <a:pPr lvl="0"/>
+            <a:r>
+              <a:rPr/>
+              <a:t>CONSTRUCT (è quello che utilizzo per le “implementedBy”)</a:t>
+            </a:r>
+          </a:p>
+          <a:p>
+            <a:pPr lvl="0"/>
+            <a:r>
+              <a:rPr/>
+              <a:t>Hanno necessità di separare ciò che è corrente e ciò che è passato.</a:t>
+            </a:r>
+          </a:p>
+          <a:p>
+            <a:pPr lvl="0"/>
+            <a:r>
+              <a:rPr/>
+              <a:t>SWRL + SPARQL</a:t>
+            </a:r>
+          </a:p>
+          <a:p>
+            <a:pPr lvl="0"/>
+            <a:r>
+              <a:rPr/>
+              <a:t>Utilizzano GraphDB (hanno provato)</a:t>
+            </a:r>
+          </a:p>
+          <a:p>
+            <a:pPr lvl="0"/>
+            <a:r>
+              <a:rPr/>
+              <a:t>Dov’è il confine tra ciò che è nuovo e ciò che è passato? Tradeoff tra quanto velocemente cambiano le cose? Un sensore che cambia ogni 10ms non posso storicizzare.</a:t>
+            </a:r>
+          </a:p>
+        </p:txBody>
+      </p:sp>
+    </p:spTree>
+  </p:cSld>
+</p:sld>
+</file>
+
+<file path=ppt/slides/slide25.xml><?xml version="1.0" encoding="utf-8"?>
+<p:sld xmlns:a="http://schemas.openxmlformats.org/drawingml/2006/main" xmlns:r="http://schemas.openxmlformats.org/officeDocument/2006/relationships" xmlns:p="http://schemas.openxmlformats.org/presentationml/2006/main">
+  <p:cSld>
+    <p:spTree>
+      <p:nvGrpSpPr>
+        <p:cNvPr id="1" name=""/>
+        <p:cNvGrpSpPr/>
+        <p:nvPr/>
+      </p:nvGrpSpPr>
+      <p:grpSpPr>
+        <a:xfrm>
+          <a:off x="0" y="0"/>
+          <a:ext cx="0" cy="0"/>
+          <a:chOff x="0" y="0"/>
+          <a:chExt cx="0" cy="0"/>
+        </a:xfrm>
+      </p:grpSpPr>
+      <p:sp>
+        <p:nvSpPr>
+          <p:cNvPr id="2" name="Title 1"/>
+          <p:cNvSpPr>
+            <a:spLocks noGrp="1"/>
+          </p:cNvSpPr>
+          <p:nvPr>
+            <p:ph type="title"/>
+          </p:nvPr>
+        </p:nvSpPr>
+        <p:spPr/>
+        <p:txBody>
+          <a:bodyPr/>
+          <a:lstStyle/>
+          <a:p>
+            <a:pPr lvl="0" indent="0" marL="0">
+              <a:buNone/>
+            </a:pPr>
+            <a:r>
+              <a:rPr/>
+              <a:t>Queries</a:t>
+            </a:r>
+          </a:p>
+        </p:txBody>
+      </p:sp>
+      <p:sp>
+        <p:nvSpPr>
+          <p:cNvPr id="3" name="Content Placeholder 2"/>
+          <p:cNvSpPr>
+            <a:spLocks noGrp="1"/>
+          </p:cNvSpPr>
+          <p:nvPr>
+            <p:ph idx="1"/>
+          </p:nvPr>
+        </p:nvSpPr>
+        <p:spPr/>
+        <p:txBody>
+          <a:bodyPr/>
+          <a:lstStyle/>
+          <a:p>
+            <a:pPr lvl="0" indent="0" marL="0">
+              <a:spcBef>
+                <a:spcPts val="3000"/>
+              </a:spcBef>
+              <a:buNone/>
+            </a:pPr>
+            <a:r>
+              <a:rPr b="1"/>
+              <a:t>Sensoriali</a:t>
+            </a:r>
+          </a:p>
+          <a:p>
+            <a:pPr lvl="0"/>
+            <a:r>
+              <a:rPr/>
+              <a:t>Dati tutti gli agenti di un certo tipo in un certo environment, trovare tutte le misurazioni dal timestamp X al timestamp Y.</a:t>
+            </a:r>
+          </a:p>
+          <a:p>
+            <a:pPr lvl="0"/>
+            <a:r>
+              <a:rPr/>
+              <a:t>Dato un environment, trovare le rilevazioni di tutti i device dal timestamp X al timestamp Y</a:t>
+            </a:r>
+          </a:p>
+          <a:p>
+            <a:pPr lvl="0"/>
+            <a:r>
+              <a:rPr/>
+              <a:t>Dato un environment, dammi tutti i measurement dei device di un certo tipo che superano una data soglia.</a:t>
+            </a:r>
+          </a:p>
+          <a:p>
+            <a:pPr lvl="0"/>
+            <a:r>
+              <a:rPr/>
+              <a:t>Dato un poligono, trovare tutti gli agent che hanno fatto task all’interno del poligono</a:t>
+            </a:r>
+          </a:p>
+          <a:p>
+            <a:pPr lvl="0" indent="0" marL="0">
+              <a:spcBef>
+                <a:spcPts val="3000"/>
+              </a:spcBef>
+              <a:buNone/>
+            </a:pPr>
+            <a:r>
+              <a:rPr b="1"/>
+              <a:t>From </a:t>
+            </a:r>
+            <a:r>
+              <a:rPr b="1">
+                <a:hlinkClick r:id="rId2"/>
+              </a:rPr>
+              <a:t>IoTAbench</a:t>
+            </a:r>
+          </a:p>
+          <a:p>
+            <a:pPr lvl="0"/>
+            <a:r>
+              <a:rPr/>
+              <a:t>Total readings: counts the total number of readings (i.e., rows) for the given time period.</a:t>
+            </a:r>
+          </a:p>
+          <a:p>
+            <a:pPr lvl="0"/>
+            <a:r>
+              <a:rPr/>
+              <a:t>Create a sorted list of the aggregate consumption in each ten minute interval in the given time period. -&gt; Create a sorted list of the average measurement (?) in each hour interval in the given time period.</a:t>
+            </a:r>
+          </a:p>
+          <a:p>
+            <a:pPr lvl="0"/>
+            <a:r>
+              <a:rPr/>
+              <a:t>Top consumers: create a list of the distinct consumers, sorted by their total (monthly) consumption. -&gt; Top agent: create a list of the distinct agents, sorted by their total (monthly) measurements.</a:t>
+            </a:r>
+          </a:p>
+          <a:p>
+            <a:pPr lvl="0"/>
+            <a:r>
+              <a:rPr/>
+              <a:t>Time of Usage Billing: calculate the monthly bill for each consumer based on the time of usage. -&gt; Time of Task: calculate the monthly time spent doing tasks for each agent.</a:t>
+            </a:r>
+          </a:p>
+          <a:p>
+            <a:pPr lvl="0" indent="0" marL="0">
+              <a:spcBef>
+                <a:spcPts val="3000"/>
+              </a:spcBef>
+              <a:buNone/>
+            </a:pPr>
+            <a:r>
+              <a:rPr b="1"/>
+              <a:t>Data architectures</a:t>
+            </a:r>
+          </a:p>
+          <a:p>
+            <a:pPr lvl="0" indent="-342900" marL="342900">
+              <a:buAutoNum type="arabicPeriod"/>
+            </a:pPr>
+            <a:r>
+              <a:rPr/>
+              <a:t>Metamodello Agritech (PostgreSQL ?)</a:t>
+            </a:r>
+          </a:p>
+          <a:p>
+            <a:pPr lvl="0" indent="-342900" marL="342900">
+              <a:buAutoNum type="arabicPeriod"/>
+            </a:pPr>
+            <a:r>
+              <a:rPr/>
+              <a:t>Wide-Column (?)</a:t>
+            </a:r>
+          </a:p>
+          <a:p>
+            <a:pPr lvl="0" indent="-342900" marL="342900">
+              <a:buAutoNum type="arabicPeriod"/>
+            </a:pPr>
+            <a:r>
+              <a:rPr/>
+              <a:t>Grafo + Relazionale (PostgreSQL + Apache AGE)</a:t>
+            </a:r>
+          </a:p>
+          <a:p>
+            <a:pPr lvl="0" indent="-342900" marL="342900">
+              <a:buAutoNum type="arabicPeriod"/>
+            </a:pPr>
+            <a:r>
+              <a:rPr/>
+              <a:t>Graph + Time Series (GraphDB + (ClickHouse || InfluxDB))</a:t>
+            </a:r>
+          </a:p>
+          <a:p>
+            <a:pPr lvl="0" indent="0" marL="0">
+              <a:spcBef>
+                <a:spcPts val="3000"/>
+              </a:spcBef>
+              <a:buNone/>
+            </a:pPr>
+            <a:r>
+              <a:rPr b="1"/>
+              <a:t>Scaletta</a:t>
+            </a:r>
+          </a:p>
+          <a:p>
+            <a:pPr lvl="0"/>
+            <a:r>
+              <a:rPr/>
+              <a:t>Come funziona modellazione dati nel GIS?</a:t>
+            </a:r>
+          </a:p>
+          <a:p>
+            <a:pPr lvl="0" indent="0" marL="0">
+              <a:spcBef>
+                <a:spcPts val="3000"/>
+              </a:spcBef>
+              <a:buNone/>
+            </a:pPr>
+            <a:r>
+              <a:rPr b="1"/>
+              <a:t>PostGIS</a:t>
+            </a:r>
+          </a:p>
+          <a:p>
+            <a:pPr lvl="0" indent="0" marL="0">
+              <a:spcBef>
+                <a:spcPts val="3000"/>
+              </a:spcBef>
+              <a:buNone/>
+            </a:pPr>
+            <a:r>
+              <a:rPr b="1"/>
+              <a:t>Spatial Functions</a:t>
+            </a:r>
+          </a:p>
+          <a:p>
+            <a:pPr lvl="0"/>
+            <a:r>
+              <a:rPr/>
+              <a:t>Routing. With pgRouting and road data you can find optimal routes and do different network analytics;</a:t>
+            </a:r>
+          </a:p>
+          <a:p>
+            <a:pPr lvl="0"/>
+            <a:r>
+              <a:rPr/>
+              <a:t>Polygon skeletonization. This function enables you to build the medial axis of a polygon on the fly;</a:t>
+            </a:r>
+          </a:p>
+          <a:p>
+            <a:pPr lvl="0"/>
+            <a:r>
+              <a:rPr/>
+              <a:t>Geometry subdivision. Dividing your geometries for further processing can significantly speed up your processes;</a:t>
+            </a:r>
+          </a:p>
+          <a:p>
+            <a:pPr lvl="0"/>
+            <a:r>
+              <a:rPr/>
+              <a:t>Clustering. Find clusters and patterns from your data. With the AI hype at peak, the k-means might be even more interesting for some than before…</a:t>
+            </a:r>
+          </a:p>
+        </p:txBody>
+      </p:sp>
+      <p:pic>
+        <p:nvPicPr>
+          <p:cNvPr descr="https://github.com/ManuelePasini/slides-markdown/blob/master/slides/images/dt/postgis/geometry_hierarchy.png?raw=true" id="0" name="Picture 1"/>
+          <p:cNvPicPr>
+            <a:picLocks noGrp="1" noChangeAspect="1"/>
+          </p:cNvPicPr>
+          <p:nvPr/>
+        </p:nvPicPr>
+        <p:blipFill>
+          <a:blip r:embed="rId3"/>
+          <a:stretch>
+            <a:fillRect/>
+          </a:stretch>
+        </p:blipFill>
+        <p:spPr bwMode="auto">
+          <a:xfrm>
+            <a:off x="457200" y="1244600"/>
+            <a:ext cx="8229600" cy="2794000"/>
+          </a:xfrm>
+          <a:prstGeom prst="rect">
+            <a:avLst/>
+          </a:prstGeom>
+          <a:noFill/>
+          <a:ln w="9525">
+            <a:noFill/>
+            <a:headEnd/>
+            <a:tailEnd/>
+          </a:ln>
+        </p:spPr>
+      </p:pic>
+      <p:sp>
+        <p:nvSpPr>
+          <p:cNvPr id="1" name="TextBox 3"/>
+          <p:cNvSpPr txBox="1"/>
+          <p:nvPr/>
+        </p:nvSpPr>
+        <p:spPr>
+          <a:xfrm>
+            <a:off x="457200" y="4076700"/>
+            <a:ext cx="8229600" cy="508000"/>
+          </a:xfrm>
+          <a:prstGeom prst="rect">
+            <a:avLst/>
+          </a:prstGeom>
+          <a:noFill/>
+        </p:spPr>
+        <p:txBody>
+          <a:bodyPr/>
+          <a:lstStyle/>
+          <a:p>
+            <a:pPr lvl="0" indent="0" marL="0" algn="ctr">
+              <a:buNone/>
+            </a:pPr>
+            <a:r>
+              <a:rPr/>
+              <a:t>PostGIS Geometry Hierarchy</a:t>
             </a:r>
           </a:p>
         </p:txBody>

</xml_diff>

<commit_message>
Deploying to gh-pages from @ ManuelePasini/slides-markdown@2a388559b197ee9742f82d3c655457f780617dd5 🚀
</commit_message>
<xml_diff>
--- a/digital_twins.pptx
+++ b/digital_twins.pptx
@@ -5391,7 +5391,7 @@
             </a:pPr>
             <a:r>
               <a:rPr/>
-              <a:t>Grafo + Relazionale (PostgreSQL + Apache AGE)</a:t>
+              <a:t>Grafo + Relazionale (PostgreSQL + PostGIS + Apache AGE)</a:t>
             </a:r>
           </a:p>
           <a:p>
@@ -5401,6 +5401,15 @@
             <a:r>
               <a:rPr/>
               <a:t>Graph + Time Series (GraphDB + (ClickHouse || InfluxDB))</a:t>
+            </a:r>
+          </a:p>
+          <a:p>
+            <a:pPr lvl="0" indent="-342900" marL="342900">
+              <a:buAutoNum type="arabicPeriod"/>
+            </a:pPr>
+            <a:r>
+              <a:rPr/>
+              <a:t>AeonG (?)</a:t>
             </a:r>
           </a:p>
           <a:p>
@@ -5532,6 +5541,167 @@
             <a:r>
               <a:rPr/>
               <a:t>PostGIS Geometry Hierarchy</a:t>
+            </a:r>
+          </a:p>
+        </p:txBody>
+      </p:sp>
+      <p:sp>
+        <p:nvSpPr>
+          <p:cNvPr id="3" name="Content Placeholder 2"/>
+          <p:cNvSpPr>
+            <a:spLocks noGrp="1"/>
+          </p:cNvSpPr>
+          <p:nvPr>
+            <p:ph idx="1"/>
+          </p:nvPr>
+        </p:nvSpPr>
+        <p:spPr/>
+        <p:txBody>
+          <a:bodyPr/>
+          <a:lstStyle/>
+          <a:p>
+            <a:pPr lvl="0" indent="0" marL="0">
+              <a:spcBef>
+                <a:spcPts val="3000"/>
+              </a:spcBef>
+              <a:buNone/>
+            </a:pPr>
+            <a:r>
+              <a:rPr b="1"/>
+              <a:t>Indexing</a:t>
+            </a:r>
+          </a:p>
+          <a:p>
+            <a:pPr lvl="0"/>
+            <a:r>
+              <a:rPr/>
+              <a:t>Indexes have to perform quickly in order to be useful. So instead of providing exact results, as B-trees do, spatial indexes provide approximate results. The question “what lines are inside this polygon?” will be instead interpreted by a spatial index as “what lines have bounding boxes that are contained inside this polygon’s bounding box?”</a:t>
+            </a:r>
+          </a:p>
+          <a:p>
+            <a:pPr lvl="0"/>
+            <a:r>
+              <a:rPr/>
+              <a:t>The most common implementations are the </a:t>
+            </a:r>
+            <a:r>
+              <a:rPr>
+                <a:hlinkClick r:id="rId4"/>
+              </a:rPr>
+              <a:t>R-Tree</a:t>
+            </a:r>
+            <a:r>
+              <a:rPr/>
+              <a:t> and Quadtree (used in PostGIS), but there are also grid-based indexes and GeoHash indexes implemented in other spatial databases.</a:t>
+            </a:r>
+          </a:p>
+        </p:txBody>
+      </p:sp>
+      <p:pic>
+        <p:nvPicPr>
+          <p:cNvPr descr="https://github.com/ManuelePasini/slides-markdown/blob/master/slides/images/dt/postgis/bbox.png?raw=true" id="0" name="Picture 1"/>
+          <p:cNvPicPr>
+            <a:picLocks noGrp="1" noChangeAspect="1"/>
+          </p:cNvPicPr>
+          <p:nvPr/>
+        </p:nvPicPr>
+        <p:blipFill>
+          <a:blip r:embed="rId5"/>
+          <a:stretch>
+            <a:fillRect/>
+          </a:stretch>
+        </p:blipFill>
+        <p:spPr bwMode="auto">
+          <a:xfrm>
+            <a:off x="457200" y="1600200"/>
+            <a:ext cx="8229600" cy="2057400"/>
+          </a:xfrm>
+          <a:prstGeom prst="rect">
+            <a:avLst/>
+          </a:prstGeom>
+          <a:noFill/>
+          <a:ln w="9525">
+            <a:noFill/>
+            <a:headEnd/>
+            <a:tailEnd/>
+          </a:ln>
+        </p:spPr>
+      </p:pic>
+      <p:sp>
+        <p:nvSpPr>
+          <p:cNvPr id="1" name="TextBox 3"/>
+          <p:cNvSpPr txBox="1"/>
+          <p:nvPr/>
+        </p:nvSpPr>
+        <p:spPr>
+          <a:xfrm>
+            <a:off x="457200" y="4076700"/>
+            <a:ext cx="8229600" cy="508000"/>
+          </a:xfrm>
+          <a:prstGeom prst="rect">
+            <a:avLst/>
+          </a:prstGeom>
+          <a:noFill/>
+        </p:spPr>
+        <p:txBody>
+          <a:bodyPr/>
+          <a:lstStyle/>
+          <a:p>
+            <a:pPr lvl="0" indent="0" marL="0" algn="ctr">
+              <a:buNone/>
+            </a:pPr>
+            <a:r>
+              <a:rPr/>
+              <a:t>BBox Example</a:t>
+            </a:r>
+          </a:p>
+        </p:txBody>
+      </p:sp>
+      <p:sp>
+        <p:nvSpPr>
+          <p:cNvPr id="3" name="Content Placeholder 2"/>
+          <p:cNvSpPr>
+            <a:spLocks noGrp="1"/>
+          </p:cNvSpPr>
+          <p:nvPr>
+            <p:ph idx="1"/>
+          </p:nvPr>
+        </p:nvSpPr>
+        <p:spPr/>
+        <p:txBody>
+          <a:bodyPr/>
+          <a:lstStyle/>
+          <a:p>
+            <a:pPr lvl="0"/>
+            <a:r>
+              <a:rPr/>
+              <a:t>The way the database efficiently answers the question “what lines intersect the yellow star” is to first answer the question “what boxes intersect the yellow box” using the index (which is very fast) and then do an exact calculation of “what lines intersect the yellow star” only for those features returned by the first test.</a:t>
+            </a:r>
+          </a:p>
+          <a:p>
+            <a:pPr lvl="0" indent="0" marL="0">
+              <a:spcBef>
+                <a:spcPts val="3000"/>
+              </a:spcBef>
+              <a:buNone/>
+            </a:pPr>
+            <a:r>
+              <a:rPr b="1"/>
+              <a:t>Apache AGE</a:t>
+            </a:r>
+          </a:p>
+          <a:p>
+            <a:pPr lvl="0"/>
+            <a:r>
+              <a:rPr/>
+              <a:t>Extends PostgreSQL with graph semantics</a:t>
+            </a:r>
+          </a:p>
+          <a:p>
+            <a:pPr lvl="0"/>
+            <a:r>
+              <a:rPr/>
+              <a:t>Wrapper upon PostgreSQL relational storage Apachce AGE under the hood architecture</a:t>
             </a:r>
           </a:p>
         </p:txBody>

</xml_diff>

<commit_message>
Deploying to gh-pages from @ ManuelePasini/slides-markdown@20a2e48ac44b2ca40c3d3357781a8d6e9f5bea00 🚀
</commit_message>
<xml_diff>
--- a/digital_twins.pptx
+++ b/digital_twins.pptx
@@ -5421,25 +5421,6 @@
             </a:pPr>
             <a:r>
               <a:rPr b="1"/>
-              <a:t>Scaletta</a:t>
-            </a:r>
-          </a:p>
-          <a:p>
-            <a:pPr lvl="0"/>
-            <a:r>
-              <a:rPr/>
-              <a:t>Come funziona modellazione dati nel GIS?</a:t>
-            </a:r>
-          </a:p>
-          <a:p>
-            <a:pPr lvl="0" indent="0" marL="0">
-              <a:spcBef>
-                <a:spcPts val="3000"/>
-              </a:spcBef>
-              <a:buNone/>
-            </a:pPr>
-            <a:r>
-              <a:rPr b="1"/>
               <a:t>PostGIS</a:t>
             </a:r>
           </a:p>
@@ -5701,7 +5682,81 @@
             <a:pPr lvl="0"/>
             <a:r>
               <a:rPr/>
-              <a:t>Wrapper upon PostgreSQL relational storage Apachce AGE under the hood architecture</a:t>
+              <a:t>No graph data model!</a:t>
+            </a:r>
+          </a:p>
+          <a:p>
+            <a:pPr lvl="0"/>
+            <a:r>
+              <a:rPr/>
+              <a:t>Wrapper upon PostgreSQL relational storage</a:t>
+            </a:r>
+          </a:p>
+          <a:p>
+            <a:pPr lvl="0"/>
+            <a:r>
+              <a:rPr/>
+              <a:t>A table for each node/vertex</a:t>
+            </a:r>
+          </a:p>
+        </p:txBody>
+      </p:sp>
+      <p:pic>
+        <p:nvPicPr>
+          <p:cNvPr descr="https://github.com/ManuelePasini/slides-markdown/blob/master/slides/images/dt/apache_age/architecture.png?raw=true" id="0" name="Picture 1"/>
+          <p:cNvPicPr>
+            <a:picLocks noGrp="1" noChangeAspect="1"/>
+          </p:cNvPicPr>
+          <p:nvPr/>
+        </p:nvPicPr>
+        <p:blipFill>
+          <a:blip r:embed="rId6"/>
+          <a:stretch>
+            <a:fillRect/>
+          </a:stretch>
+        </p:blipFill>
+        <p:spPr bwMode="auto">
+          <a:xfrm>
+            <a:off x="1866900" y="1193800"/>
+            <a:ext cx="5410200" cy="2882900"/>
+          </a:xfrm>
+          <a:prstGeom prst="rect">
+            <a:avLst/>
+          </a:prstGeom>
+          <a:noFill/>
+          <a:ln w="9525">
+            <a:noFill/>
+            <a:headEnd/>
+            <a:tailEnd/>
+          </a:ln>
+        </p:spPr>
+      </p:pic>
+      <p:sp>
+        <p:nvSpPr>
+          <p:cNvPr id="1" name="TextBox 3"/>
+          <p:cNvSpPr txBox="1"/>
+          <p:nvPr/>
+        </p:nvSpPr>
+        <p:spPr>
+          <a:xfrm>
+            <a:off x="457200" y="4076700"/>
+            <a:ext cx="8229600" cy="508000"/>
+          </a:xfrm>
+          <a:prstGeom prst="rect">
+            <a:avLst/>
+          </a:prstGeom>
+          <a:noFill/>
+        </p:spPr>
+        <p:txBody>
+          <a:bodyPr/>
+          <a:lstStyle/>
+          <a:p>
+            <a:pPr lvl="0" indent="0" marL="0" algn="ctr">
+              <a:buNone/>
+            </a:pPr>
+            <a:r>
+              <a:rPr/>
+              <a:t>Apachce AGE under the hood architecture</a:t>
             </a:r>
           </a:p>
         </p:txBody>

</xml_diff>

<commit_message>
Deploying to gh-pages from @ ManuelePasini/slides-markdown@204e027eb058e23e7b8fe58a211cf7b0f7c3fd25 🚀
</commit_message>
<xml_diff>
--- a/digital_twins.pptx
+++ b/digital_twins.pptx
@@ -30,6 +30,7 @@
     <p:sldId id="278" r:id="rId24"/>
     <p:sldId id="279" r:id="rId25"/>
     <p:sldId id="280" r:id="rId26"/>
+    <p:sldId id="281" r:id="rId27"/>
   </p:sldIdLst>
   <p:sldSz cx="9144000" cy="5143500" type="screen16x9"/>
   <p:notesSz cx="6858000" cy="9144000"/>
@@ -5206,6 +5207,149 @@
               <a:t>Dov’è il confine tra ciò che è nuovo e ciò che è passato? Tradeoff tra quanto velocemente cambiano le cose? Un sensore che cambia ogni 10ms non posso storicizzare.</a:t>
             </a:r>
           </a:p>
+          <a:p>
+            <a:pPr lvl="0" indent="0" marL="0">
+              <a:spcBef>
+                <a:spcPts val="3000"/>
+              </a:spcBef>
+              <a:buNone/>
+            </a:pPr>
+            <a:r>
+              <a:rPr b="1"/>
+              <a:t>Workload</a:t>
+            </a:r>
+          </a:p>
+          <a:p>
+            <a:pPr lvl="0"/>
+            <a:r>
+              <a:rPr/>
+              <a:t>Dati tutti gli agenti di un certo tipo in un certo environment, trovare tutte le misurazioni dal timestamp X al timestamp Y.</a:t>
+            </a:r>
+          </a:p>
+          <a:p>
+            <a:pPr lvl="0"/>
+            <a:r>
+              <a:rPr/>
+              <a:t>Dato un environment, trovare le rilevazioni di tutti i device dal timestamp X al timestamp Y</a:t>
+            </a:r>
+          </a:p>
+          <a:p>
+            <a:pPr lvl="0"/>
+            <a:r>
+              <a:rPr/>
+              <a:t>Dato un environment, dammi tutti i measurement dei device di un certo tipo che superano una data soglia.</a:t>
+            </a:r>
+          </a:p>
+          <a:p>
+            <a:pPr lvl="0"/>
+            <a:r>
+              <a:rPr/>
+              <a:t>Dato un poligono, trovare tutti gli agent che hanno fatto task all’interno del poligono</a:t>
+            </a:r>
+          </a:p>
+          <a:p>
+            <a:pPr lvl="0" indent="0" marL="0">
+              <a:spcBef>
+                <a:spcPts val="3000"/>
+              </a:spcBef>
+              <a:buNone/>
+            </a:pPr>
+            <a:r>
+              <a:rPr b="1"/>
+              <a:t>From </a:t>
+            </a:r>
+            <a:r>
+              <a:rPr b="1">
+                <a:hlinkClick r:id="rId2"/>
+              </a:rPr>
+              <a:t>IoTAbench</a:t>
+            </a:r>
+          </a:p>
+          <a:p>
+            <a:pPr lvl="0"/>
+            <a:r>
+              <a:rPr/>
+              <a:t>Total readings: counts the total number of readings (i.e., rows) for the given time period.</a:t>
+            </a:r>
+          </a:p>
+          <a:p>
+            <a:pPr lvl="0"/>
+            <a:r>
+              <a:rPr/>
+              <a:t>Create a sorted list of the aggregate consumption in each ten minute interval in the given time period. -&gt; Create a sorted list of the average measurement (?) in each hour interval in the given time period.</a:t>
+            </a:r>
+          </a:p>
+          <a:p>
+            <a:pPr lvl="0"/>
+            <a:r>
+              <a:rPr/>
+              <a:t>Top consumers: create a list of the distinct consumers, sorted by their total (monthly) consumption. -&gt; Top agent: create a list of the distinct agents, sorted by their total (monthly) measurements.</a:t>
+            </a:r>
+          </a:p>
+          <a:p>
+            <a:pPr lvl="0"/>
+            <a:r>
+              <a:rPr/>
+              <a:t>Time of Usage Billing: calculate the monthly bill for each consumer based on the time of usage. -&gt; Time of Task: calculate the monthly time spent doing tasks for each agent.</a:t>
+            </a:r>
+          </a:p>
+          <a:p>
+            <a:pPr lvl="0" indent="0" marL="0">
+              <a:spcBef>
+                <a:spcPts val="3000"/>
+              </a:spcBef>
+              <a:buNone/>
+            </a:pPr>
+            <a:r>
+              <a:rPr b="1"/>
+              <a:t>Data architectures</a:t>
+            </a:r>
+          </a:p>
+          <a:p>
+            <a:pPr lvl="0" indent="-342900" marL="342900">
+              <a:buAutoNum type="arabicPeriod"/>
+            </a:pPr>
+            <a:r>
+              <a:rPr/>
+              <a:t>Metamodello Agritech (PostgreSQL ?)</a:t>
+            </a:r>
+          </a:p>
+          <a:p>
+            <a:pPr lvl="0" indent="-342900" marL="342900">
+              <a:buAutoNum type="arabicPeriod"/>
+            </a:pPr>
+            <a:r>
+              <a:rPr/>
+              <a:t>Wide-Column (?)</a:t>
+            </a:r>
+          </a:p>
+          <a:p>
+            <a:pPr lvl="0" indent="-342900" marL="342900">
+              <a:buAutoNum type="arabicPeriod"/>
+            </a:pPr>
+            <a:r>
+              <a:rPr/>
+              <a:t>Grafo + Relazionale (PostgreSQL + PostGIS + Apache AGE)</a:t>
+            </a:r>
+          </a:p>
+          <a:p>
+            <a:pPr lvl="0" indent="-342900" marL="342900">
+              <a:buAutoNum type="arabicPeriod"/>
+            </a:pPr>
+            <a:r>
+              <a:rPr/>
+              <a:t>Graph + Time Series (GraphDB + (ClickHouse || InfluxDB))</a:t>
+            </a:r>
+          </a:p>
+          <a:p>
+            <a:pPr lvl="0" indent="-342900" marL="342900">
+              <a:buAutoNum type="arabicPeriod"/>
+            </a:pPr>
+            <a:r>
+              <a:rPr/>
+              <a:t>AeonG (?)</a:t>
+            </a:r>
+          </a:p>
         </p:txBody>
       </p:sp>
     </p:spTree>
@@ -5250,7 +5394,7 @@
             </a:pPr>
             <a:r>
               <a:rPr/>
-              <a:t>Queries</a:t>
+              <a:t>PostGIS</a:t>
             </a:r>
           </a:p>
         </p:txBody>
@@ -5269,161 +5413,6 @@
         <p:txBody>
           <a:bodyPr/>
           <a:lstStyle/>
-          <a:p>
-            <a:pPr lvl="0" indent="0" marL="0">
-              <a:spcBef>
-                <a:spcPts val="3000"/>
-              </a:spcBef>
-              <a:buNone/>
-            </a:pPr>
-            <a:r>
-              <a:rPr b="1"/>
-              <a:t>Sensoriali</a:t>
-            </a:r>
-          </a:p>
-          <a:p>
-            <a:pPr lvl="0"/>
-            <a:r>
-              <a:rPr/>
-              <a:t>Dati tutti gli agenti di un certo tipo in un certo environment, trovare tutte le misurazioni dal timestamp X al timestamp Y.</a:t>
-            </a:r>
-          </a:p>
-          <a:p>
-            <a:pPr lvl="0"/>
-            <a:r>
-              <a:rPr/>
-              <a:t>Dato un environment, trovare le rilevazioni di tutti i device dal timestamp X al timestamp Y</a:t>
-            </a:r>
-          </a:p>
-          <a:p>
-            <a:pPr lvl="0"/>
-            <a:r>
-              <a:rPr/>
-              <a:t>Dato un environment, dammi tutti i measurement dei device di un certo tipo che superano una data soglia.</a:t>
-            </a:r>
-          </a:p>
-          <a:p>
-            <a:pPr lvl="0"/>
-            <a:r>
-              <a:rPr/>
-              <a:t>Dato un poligono, trovare tutti gli agent che hanno fatto task all’interno del poligono</a:t>
-            </a:r>
-          </a:p>
-          <a:p>
-            <a:pPr lvl="0" indent="0" marL="0">
-              <a:spcBef>
-                <a:spcPts val="3000"/>
-              </a:spcBef>
-              <a:buNone/>
-            </a:pPr>
-            <a:r>
-              <a:rPr b="1"/>
-              <a:t>From </a:t>
-            </a:r>
-            <a:r>
-              <a:rPr b="1">
-                <a:hlinkClick r:id="rId2"/>
-              </a:rPr>
-              <a:t>IoTAbench</a:t>
-            </a:r>
-          </a:p>
-          <a:p>
-            <a:pPr lvl="0"/>
-            <a:r>
-              <a:rPr/>
-              <a:t>Total readings: counts the total number of readings (i.e., rows) for the given time period.</a:t>
-            </a:r>
-          </a:p>
-          <a:p>
-            <a:pPr lvl="0"/>
-            <a:r>
-              <a:rPr/>
-              <a:t>Create a sorted list of the aggregate consumption in each ten minute interval in the given time period. -&gt; Create a sorted list of the average measurement (?) in each hour interval in the given time period.</a:t>
-            </a:r>
-          </a:p>
-          <a:p>
-            <a:pPr lvl="0"/>
-            <a:r>
-              <a:rPr/>
-              <a:t>Top consumers: create a list of the distinct consumers, sorted by their total (monthly) consumption. -&gt; Top agent: create a list of the distinct agents, sorted by their total (monthly) measurements.</a:t>
-            </a:r>
-          </a:p>
-          <a:p>
-            <a:pPr lvl="0"/>
-            <a:r>
-              <a:rPr/>
-              <a:t>Time of Usage Billing: calculate the monthly bill for each consumer based on the time of usage. -&gt; Time of Task: calculate the monthly time spent doing tasks for each agent.</a:t>
-            </a:r>
-          </a:p>
-          <a:p>
-            <a:pPr lvl="0" indent="0" marL="0">
-              <a:spcBef>
-                <a:spcPts val="3000"/>
-              </a:spcBef>
-              <a:buNone/>
-            </a:pPr>
-            <a:r>
-              <a:rPr b="1"/>
-              <a:t>Data architectures</a:t>
-            </a:r>
-          </a:p>
-          <a:p>
-            <a:pPr lvl="0" indent="-342900" marL="342900">
-              <a:buAutoNum type="arabicPeriod"/>
-            </a:pPr>
-            <a:r>
-              <a:rPr/>
-              <a:t>Metamodello Agritech (PostgreSQL ?)</a:t>
-            </a:r>
-          </a:p>
-          <a:p>
-            <a:pPr lvl="0" indent="-342900" marL="342900">
-              <a:buAutoNum type="arabicPeriod"/>
-            </a:pPr>
-            <a:r>
-              <a:rPr/>
-              <a:t>Wide-Column (?)</a:t>
-            </a:r>
-          </a:p>
-          <a:p>
-            <a:pPr lvl="0" indent="-342900" marL="342900">
-              <a:buAutoNum type="arabicPeriod"/>
-            </a:pPr>
-            <a:r>
-              <a:rPr/>
-              <a:t>Grafo + Relazionale (PostgreSQL + PostGIS + Apache AGE)</a:t>
-            </a:r>
-          </a:p>
-          <a:p>
-            <a:pPr lvl="0" indent="-342900" marL="342900">
-              <a:buAutoNum type="arabicPeriod"/>
-            </a:pPr>
-            <a:r>
-              <a:rPr/>
-              <a:t>Graph + Time Series (GraphDB + (ClickHouse || InfluxDB))</a:t>
-            </a:r>
-          </a:p>
-          <a:p>
-            <a:pPr lvl="0" indent="-342900" marL="342900">
-              <a:buAutoNum type="arabicPeriod"/>
-            </a:pPr>
-            <a:r>
-              <a:rPr/>
-              <a:t>AeonG (?)</a:t>
-            </a:r>
-          </a:p>
-          <a:p>
-            <a:pPr lvl="0" indent="0" marL="0">
-              <a:spcBef>
-                <a:spcPts val="3000"/>
-              </a:spcBef>
-              <a:buNone/>
-            </a:pPr>
-            <a:r>
-              <a:rPr b="1"/>
-              <a:t>PostGIS</a:t>
-            </a:r>
-          </a:p>
           <a:p>
             <a:pPr lvl="0" indent="0" marL="0">
               <a:spcBef>
@@ -5475,7 +5464,7 @@
           <p:nvPr/>
         </p:nvPicPr>
         <p:blipFill>
-          <a:blip r:embed="rId3"/>
+          <a:blip r:embed="rId2"/>
           <a:stretch>
             <a:fillRect/>
           </a:stretch>
@@ -5567,7 +5556,7 @@
             </a:r>
             <a:r>
               <a:rPr>
-                <a:hlinkClick r:id="rId4"/>
+                <a:hlinkClick r:id="rId3"/>
               </a:rPr>
               <a:t>R-Tree</a:t>
             </a:r>
@@ -5587,7 +5576,7 @@
           <p:nvPr/>
         </p:nvPicPr>
         <p:blipFill>
-          <a:blip r:embed="rId5"/>
+          <a:blip r:embed="rId4"/>
           <a:stretch>
             <a:fillRect/>
           </a:stretch>
@@ -5659,18 +5648,69 @@
               <a:t>The way the database efficiently answers the question “what lines intersect the yellow star” is to first answer the question “what boxes intersect the yellow box” using the index (which is very fast) and then do an exact calculation of “what lines intersect the yellow star” only for those features returned by the first test.</a:t>
             </a:r>
           </a:p>
+        </p:txBody>
+      </p:sp>
+    </p:spTree>
+  </p:cSld>
+</p:sld>
+</file>
+
+<file path=ppt/slides/slide26.xml><?xml version="1.0" encoding="utf-8"?>
+<p:sld xmlns:a="http://schemas.openxmlformats.org/drawingml/2006/main" xmlns:r="http://schemas.openxmlformats.org/officeDocument/2006/relationships" xmlns:p="http://schemas.openxmlformats.org/presentationml/2006/main">
+  <p:cSld>
+    <p:spTree>
+      <p:nvGrpSpPr>
+        <p:cNvPr id="1" name=""/>
+        <p:cNvGrpSpPr/>
+        <p:nvPr/>
+      </p:nvGrpSpPr>
+      <p:grpSpPr>
+        <a:xfrm>
+          <a:off x="0" y="0"/>
+          <a:ext cx="0" cy="0"/>
+          <a:chOff x="0" y="0"/>
+          <a:chExt cx="0" cy="0"/>
+        </a:xfrm>
+      </p:grpSpPr>
+      <p:sp>
+        <p:nvSpPr>
+          <p:cNvPr id="2" name="Title 1"/>
+          <p:cNvSpPr>
+            <a:spLocks noGrp="1"/>
+          </p:cNvSpPr>
+          <p:nvPr>
+            <p:ph type="title"/>
+          </p:nvPr>
+        </p:nvSpPr>
+        <p:spPr/>
+        <p:txBody>
+          <a:bodyPr/>
+          <a:lstStyle/>
           <a:p>
             <a:pPr lvl="0" indent="0" marL="0">
-              <a:spcBef>
-                <a:spcPts val="3000"/>
-              </a:spcBef>
               <a:buNone/>
             </a:pPr>
             <a:r>
-              <a:rPr b="1"/>
+              <a:rPr/>
               <a:t>Apache AGE</a:t>
             </a:r>
           </a:p>
+        </p:txBody>
+      </p:sp>
+      <p:sp>
+        <p:nvSpPr>
+          <p:cNvPr id="3" name="Content Placeholder 2"/>
+          <p:cNvSpPr>
+            <a:spLocks noGrp="1"/>
+          </p:cNvSpPr>
+          <p:nvPr>
+            <p:ph idx="1"/>
+          </p:nvPr>
+        </p:nvSpPr>
+        <p:spPr/>
+        <p:txBody>
+          <a:bodyPr/>
+          <a:lstStyle/>
           <a:p>
             <a:pPr lvl="0"/>
             <a:r>
@@ -5710,7 +5750,7 @@
           <p:nvPr/>
         </p:nvPicPr>
         <p:blipFill>
-          <a:blip r:embed="rId6"/>
+          <a:blip r:embed="rId2"/>
           <a:stretch>
             <a:fillRect/>
           </a:stretch>

</xml_diff>

<commit_message>
Deploying to gh-pages from @ ManuelePasini/slides-markdown@dd84bf3a7eed2ff27cbc7e9f7b04a1f92e3d407e 🚀
</commit_message>
<xml_diff>
--- a/digital_twins.pptx
+++ b/digital_twins.pptx
@@ -31,6 +31,7 @@
     <p:sldId id="279" r:id="rId25"/>
     <p:sldId id="280" r:id="rId26"/>
     <p:sldId id="281" r:id="rId27"/>
+    <p:sldId id="282" r:id="rId28"/>
   </p:sldIdLst>
   <p:sldSz cx="9144000" cy="5143500" type="screen16x9"/>
   <p:notesSz cx="6858000" cy="9144000"/>
@@ -5207,149 +5208,6 @@
               <a:t>Dov’è il confine tra ciò che è nuovo e ciò che è passato? Tradeoff tra quanto velocemente cambiano le cose? Un sensore che cambia ogni 10ms non posso storicizzare.</a:t>
             </a:r>
           </a:p>
-          <a:p>
-            <a:pPr lvl="0" indent="0" marL="0">
-              <a:spcBef>
-                <a:spcPts val="3000"/>
-              </a:spcBef>
-              <a:buNone/>
-            </a:pPr>
-            <a:r>
-              <a:rPr b="1"/>
-              <a:t>Workload</a:t>
-            </a:r>
-          </a:p>
-          <a:p>
-            <a:pPr lvl="0"/>
-            <a:r>
-              <a:rPr/>
-              <a:t>Dati tutti gli agenti di un certo tipo in un certo environment, trovare tutte le misurazioni dal timestamp X al timestamp Y.</a:t>
-            </a:r>
-          </a:p>
-          <a:p>
-            <a:pPr lvl="0"/>
-            <a:r>
-              <a:rPr/>
-              <a:t>Dato un environment, trovare le rilevazioni di tutti i device dal timestamp X al timestamp Y</a:t>
-            </a:r>
-          </a:p>
-          <a:p>
-            <a:pPr lvl="0"/>
-            <a:r>
-              <a:rPr/>
-              <a:t>Dato un environment, dammi tutti i measurement dei device di un certo tipo che superano una data soglia.</a:t>
-            </a:r>
-          </a:p>
-          <a:p>
-            <a:pPr lvl="0"/>
-            <a:r>
-              <a:rPr/>
-              <a:t>Dato un poligono, trovare tutti gli agent che hanno fatto task all’interno del poligono</a:t>
-            </a:r>
-          </a:p>
-          <a:p>
-            <a:pPr lvl="0" indent="0" marL="0">
-              <a:spcBef>
-                <a:spcPts val="3000"/>
-              </a:spcBef>
-              <a:buNone/>
-            </a:pPr>
-            <a:r>
-              <a:rPr b="1"/>
-              <a:t>From </a:t>
-            </a:r>
-            <a:r>
-              <a:rPr b="1">
-                <a:hlinkClick r:id="rId2"/>
-              </a:rPr>
-              <a:t>IoTAbench</a:t>
-            </a:r>
-          </a:p>
-          <a:p>
-            <a:pPr lvl="0"/>
-            <a:r>
-              <a:rPr/>
-              <a:t>Total readings: counts the total number of readings (i.e., rows) for the given time period.</a:t>
-            </a:r>
-          </a:p>
-          <a:p>
-            <a:pPr lvl="0"/>
-            <a:r>
-              <a:rPr/>
-              <a:t>Create a sorted list of the aggregate consumption in each ten minute interval in the given time period. -&gt; Create a sorted list of the average measurement (?) in each hour interval in the given time period.</a:t>
-            </a:r>
-          </a:p>
-          <a:p>
-            <a:pPr lvl="0"/>
-            <a:r>
-              <a:rPr/>
-              <a:t>Top consumers: create a list of the distinct consumers, sorted by their total (monthly) consumption. -&gt; Top agent: create a list of the distinct agents, sorted by their total (monthly) measurements.</a:t>
-            </a:r>
-          </a:p>
-          <a:p>
-            <a:pPr lvl="0"/>
-            <a:r>
-              <a:rPr/>
-              <a:t>Time of Usage Billing: calculate the monthly bill for each consumer based on the time of usage. -&gt; Time of Task: calculate the monthly time spent doing tasks for each agent.</a:t>
-            </a:r>
-          </a:p>
-          <a:p>
-            <a:pPr lvl="0" indent="0" marL="0">
-              <a:spcBef>
-                <a:spcPts val="3000"/>
-              </a:spcBef>
-              <a:buNone/>
-            </a:pPr>
-            <a:r>
-              <a:rPr b="1"/>
-              <a:t>Data architectures</a:t>
-            </a:r>
-          </a:p>
-          <a:p>
-            <a:pPr lvl="0" indent="-342900" marL="342900">
-              <a:buAutoNum type="arabicPeriod"/>
-            </a:pPr>
-            <a:r>
-              <a:rPr/>
-              <a:t>Metamodello Agritech (PostgreSQL ?)</a:t>
-            </a:r>
-          </a:p>
-          <a:p>
-            <a:pPr lvl="0" indent="-342900" marL="342900">
-              <a:buAutoNum type="arabicPeriod"/>
-            </a:pPr>
-            <a:r>
-              <a:rPr/>
-              <a:t>Wide-Column (?)</a:t>
-            </a:r>
-          </a:p>
-          <a:p>
-            <a:pPr lvl="0" indent="-342900" marL="342900">
-              <a:buAutoNum type="arabicPeriod"/>
-            </a:pPr>
-            <a:r>
-              <a:rPr/>
-              <a:t>Grafo + Relazionale (PostgreSQL + PostGIS + Apache AGE)</a:t>
-            </a:r>
-          </a:p>
-          <a:p>
-            <a:pPr lvl="0" indent="-342900" marL="342900">
-              <a:buAutoNum type="arabicPeriod"/>
-            </a:pPr>
-            <a:r>
-              <a:rPr/>
-              <a:t>Graph + Time Series (GraphDB + (ClickHouse || InfluxDB))</a:t>
-            </a:r>
-          </a:p>
-          <a:p>
-            <a:pPr lvl="0" indent="-342900" marL="342900">
-              <a:buAutoNum type="arabicPeriod"/>
-            </a:pPr>
-            <a:r>
-              <a:rPr/>
-              <a:t>AeonG (?)</a:t>
-            </a:r>
-          </a:p>
         </p:txBody>
       </p:sp>
     </p:spTree>
@@ -5358,6 +5216,741 @@
 </file>
 
 <file path=ppt/slides/slide25.xml><?xml version="1.0" encoding="utf-8"?>
+<p:sld xmlns:a="http://schemas.openxmlformats.org/drawingml/2006/main" xmlns:r="http://schemas.openxmlformats.org/officeDocument/2006/relationships" xmlns:p="http://schemas.openxmlformats.org/presentationml/2006/main">
+  <p:cSld>
+    <p:spTree>
+      <p:nvGrpSpPr>
+        <p:cNvPr id="1" name=""/>
+        <p:cNvGrpSpPr/>
+        <p:nvPr/>
+      </p:nvGrpSpPr>
+      <p:grpSpPr>
+        <a:xfrm>
+          <a:off x="0" y="0"/>
+          <a:ext cx="0" cy="0"/>
+          <a:chOff x="0" y="0"/>
+          <a:chExt cx="0" cy="0"/>
+        </a:xfrm>
+      </p:grpSpPr>
+      <p:sp>
+        <p:nvSpPr>
+          <p:cNvPr id="2" name="Title 1"/>
+          <p:cNvSpPr>
+            <a:spLocks noGrp="1"/>
+          </p:cNvSpPr>
+          <p:nvPr>
+            <p:ph type="title"/>
+          </p:nvPr>
+        </p:nvSpPr>
+        <p:spPr/>
+        <p:txBody>
+          <a:bodyPr/>
+          <a:lstStyle/>
+          <a:p>
+            <a:pPr lvl="0" indent="0" marL="0">
+              <a:buNone/>
+            </a:pPr>
+            <a:r>
+              <a:rPr/>
+              <a:t>Benchmark workload</a:t>
+            </a:r>
+          </a:p>
+        </p:txBody>
+      </p:sp>
+      <mc:AlternateContent xmlns:mc="http://schemas.openxmlformats.org/markup-compatibility/2006">
+        <mc:Choice xmlns:a14="http://schemas.microsoft.com/office/drawing/2010/main" Requires="a14">
+          <p:sp>
+            <p:nvSpPr>
+              <p:cNvPr id="3" name="Content Placeholder 2"/>
+              <p:cNvSpPr>
+                <a:spLocks noGrp="1"/>
+              </p:cNvSpPr>
+              <p:nvPr>
+                <p:ph idx="1"/>
+              </p:nvPr>
+            </p:nvSpPr>
+            <p:spPr/>
+            <p:txBody>
+              <a:bodyPr/>
+              <a:lstStyle/>
+              <a:p>
+                <a:pPr lvl="0" indent="0" marL="0">
+                  <a:spcBef>
+                    <a:spcPts val="3000"/>
+                  </a:spcBef>
+                  <a:buNone/>
+                </a:pPr>
+                <a:r>
+                  <a:rPr b="1"/>
+                  <a:t>From </a:t>
+                </a:r>
+                <a:r>
+                  <a:rPr b="1">
+                    <a:hlinkClick r:id="rId2"/>
+                  </a:rPr>
+                  <a:t>IoTAbench</a:t>
+                </a:r>
+              </a:p>
+              <a:p>
+                <a:pPr lvl="0"/>
+                <a:r>
+                  <a:rPr/>
+                  <a:t>Total readings: counts the total number of readings (i.e., rows) for the given time period.</a:t>
+                </a:r>
+              </a:p>
+              <a:p>
+                <a:pPr lvl="0"/>
+                <a:r>
+                  <a:rPr/>
+                  <a:t>Create a sorted list of the aggregate consumption in each ten minute interval in the given time period. -&gt; Create a sorted list of the average measurement (?) in each hour interval in the given time period.</a:t>
+                </a:r>
+              </a:p>
+              <a:p>
+                <a:pPr lvl="0"/>
+                <a:r>
+                  <a:rPr/>
+                  <a:t>Top consumers: create a list of the distinct consumers, sorted by their total (monthly) consumption. -&gt; Top agent: create a list of the distinct agents, sorted by their total (monthly) measurements.</a:t>
+                </a:r>
+              </a:p>
+              <a:p>
+                <a:pPr lvl="0"/>
+                <a:r>
+                  <a:rPr/>
+                  <a:t>Time of Usage Billing: calculate the monthly bill for each consumer based on the time of usage. -&gt; Time of Task: calculate the monthly time spent doing tasks for each agent.</a:t>
+                </a:r>
+              </a:p>
+              <a:p>
+                <a:pPr lvl="0" indent="0" marL="0">
+                  <a:spcBef>
+                    <a:spcPts val="3000"/>
+                  </a:spcBef>
+                  <a:buNone/>
+                </a:pPr>
+                <a:r>
+                  <a:rPr b="1"/>
+                  <a:t>From </a:t>
+                </a:r>
+                <a:r>
+                  <a:rPr b="1">
+                    <a:hlinkClick r:id="rId3"/>
+                  </a:rPr>
+                  <a:t>SmartBench</a:t>
+                </a:r>
+              </a:p>
+              <a:p>
+                <a:pPr lvl="0"/>
+                <a:r>
+                  <a:rPr/>
+                  <a:t>Coverage (s ∈ Sensors): returns the location of a given sensor s.</a:t>
+                </a:r>
+              </a:p>
+              <a:p>
+                <a:pPr lvl="0"/>
+                <a:r>
+                  <a:rPr/>
+                  <a:t>InverseCoverage(L, τ), where L is a list of locations, and τ is a sensor type: lists all sensors that can generate observations of a given type τ that can cover the locations specied in L.</a:t>
+                </a:r>
+              </a:p>
+              <a:p>
+                <a:pPr lvl="0"/>
+                <a:r>
+                  <a:rPr/>
+                  <a:t>Observations (S ∈ Sensors, </a:t>
+                </a:r>
+                <a14:m>
+                  <m:oMath xmlns:m="http://schemas.openxmlformats.org/officeDocument/2006/math">
+                    <m:sSub>
+                      <m:e>
+                        <m:r>
+                          <m:t>t</m:t>
+                        </m:r>
+                      </m:e>
+                      <m:sub>
+                        <m:r>
+                          <m:t>b</m:t>
+                        </m:r>
+                      </m:sub>
+                    </m:sSub>
+                  </m:oMath>
+                </a14:m>
+                <a:r>
+                  <a:rPr/>
+                  <a:t>, </a:t>
+                </a:r>
+                <a14:m>
+                  <m:oMath xmlns:m="http://schemas.openxmlformats.org/officeDocument/2006/math">
+                    <m:sSub>
+                      <m:e>
+                        <m:r>
+                          <m:t>t</m:t>
+                        </m:r>
+                      </m:e>
+                      <m:sub>
+                        <m:r>
+                          <m:t>e</m:t>
+                        </m:r>
+                      </m:sub>
+                    </m:sSub>
+                  </m:oMath>
+                </a14:m>
+                <a:r>
+                  <a:rPr/>
+                  <a:t>): selects observations from sensors in the list of sensors S during the time range [</a:t>
+                </a:r>
+                <a14:m>
+                  <m:oMath xmlns:m="http://schemas.openxmlformats.org/officeDocument/2006/math">
+                    <m:sSub>
+                      <m:e>
+                        <m:r>
+                          <m:t>t</m:t>
+                        </m:r>
+                      </m:e>
+                      <m:sub>
+                        <m:r>
+                          <m:t>b</m:t>
+                        </m:r>
+                      </m:sub>
+                    </m:sSub>
+                  </m:oMath>
+                </a14:m>
+                <a:r>
+                  <a:rPr/>
+                  <a:t>; </a:t>
+                </a:r>
+                <a14:m>
+                  <m:oMath xmlns:m="http://schemas.openxmlformats.org/officeDocument/2006/math">
+                    <m:sSub>
+                      <m:e>
+                        <m:r>
+                          <m:t>t</m:t>
+                        </m:r>
+                      </m:e>
+                      <m:sub>
+                        <m:r>
+                          <m:t>e</m:t>
+                        </m:r>
+                      </m:sub>
+                    </m:sSub>
+                  </m:oMath>
+                </a14:m>
+                <a:r>
+                  <a:rPr/>
+                  <a:t>].</a:t>
+                </a:r>
+              </a:p>
+              <a:p>
+                <a:pPr lvl="0"/>
+                <a:r>
+                  <a:rPr/>
+                  <a:t>C Observations (τ , cond, </a:t>
+                </a:r>
+                <a14:m>
+                  <m:oMath xmlns:m="http://schemas.openxmlformats.org/officeDocument/2006/math">
+                    <m:sSub>
+                      <m:e>
+                        <m:r>
+                          <m:t>t</m:t>
+                        </m:r>
+                      </m:e>
+                      <m:sub>
+                        <m:r>
+                          <m:t>b</m:t>
+                        </m:r>
+                      </m:sub>
+                    </m:sSub>
+                  </m:oMath>
+                </a14:m>
+                <a:r>
+                  <a:rPr/>
+                  <a:t>, </a:t>
+                </a:r>
+                <a14:m>
+                  <m:oMath xmlns:m="http://schemas.openxmlformats.org/officeDocument/2006/math">
+                    <m:sSub>
+                      <m:e>
+                        <m:r>
+                          <m:t>t</m:t>
+                        </m:r>
+                      </m:e>
+                      <m:sub>
+                        <m:r>
+                          <m:t>e</m:t>
+                        </m:r>
+                      </m:sub>
+                    </m:sSub>
+                  </m:oMath>
+                </a14:m>
+                <a:r>
+                  <a:rPr/>
+                  <a:t>): selects observations generated by sensors of given type τ in the time range [</a:t>
+                </a:r>
+                <a14:m>
+                  <m:oMath xmlns:m="http://schemas.openxmlformats.org/officeDocument/2006/math">
+                    <m:sSub>
+                      <m:e>
+                        <m:r>
+                          <m:t>t</m:t>
+                        </m:r>
+                      </m:e>
+                      <m:sub>
+                        <m:r>
+                          <m:t>b</m:t>
+                        </m:r>
+                      </m:sub>
+                    </m:sSub>
+                  </m:oMath>
+                </a14:m>
+                <a:r>
+                  <a:rPr/>
+                  <a:t>; </a:t>
+                </a:r>
+                <a14:m>
+                  <m:oMath xmlns:m="http://schemas.openxmlformats.org/officeDocument/2006/math">
+                    <m:sSub>
+                      <m:e>
+                        <m:r>
+                          <m:t>t</m:t>
+                        </m:r>
+                      </m:e>
+                      <m:sub>
+                        <m:r>
+                          <m:t>e</m:t>
+                        </m:r>
+                      </m:sub>
+                    </m:sSub>
+                  </m:oMath>
+                </a14:m>
+                <a:r>
+                  <a:rPr/>
+                  <a:t>] that satisfy the condition cond.</a:t>
+                </a:r>
+              </a:p>
+              <a:p>
+                <a:pPr lvl="0"/>
+                <a:r>
+                  <a:rPr/>
+                  <a:t>Statistics(S ⊆ Sensors, A, F, tb, te): retrieves statistics (e.g., average) based on functions specifed in F during the time range [</a:t>
+                </a:r>
+                <a14:m>
+                  <m:oMath xmlns:m="http://schemas.openxmlformats.org/officeDocument/2006/math">
+                    <m:sSub>
+                      <m:e>
+                        <m:r>
+                          <m:t>t</m:t>
+                        </m:r>
+                      </m:e>
+                      <m:sub>
+                        <m:r>
+                          <m:t>b</m:t>
+                        </m:r>
+                      </m:sub>
+                    </m:sSub>
+                  </m:oMath>
+                </a14:m>
+                <a:r>
+                  <a:rPr/>
+                  <a:t>; </a:t>
+                </a:r>
+                <a14:m>
+                  <m:oMath xmlns:m="http://schemas.openxmlformats.org/officeDocument/2006/math">
+                    <m:sSub>
+                      <m:e>
+                        <m:r>
+                          <m:t>t</m:t>
+                        </m:r>
+                      </m:e>
+                      <m:sub>
+                        <m:r>
+                          <m:t>e</m:t>
+                        </m:r>
+                      </m:sub>
+                    </m:sSub>
+                  </m:oMath>
+                </a14:m>
+                <a:r>
+                  <a:rPr/>
+                  <a:t>]. The statistics are generated by firstrst grouping the data by sensor, and further by the value of the attributes in the list A</a:t>
+                </a:r>
+              </a:p>
+              <a:p>
+                <a:pPr lvl="0"/>
+                <a:r>
+                  <a:rPr/>
+                  <a:t>Trajectories(</a:t>
+                </a:r>
+                <a14:m>
+                  <m:oMath xmlns:m="http://schemas.openxmlformats.org/officeDocument/2006/math">
+                    <m:sSub>
+                      <m:e>
+                        <m:r>
+                          <m:t>t</m:t>
+                        </m:r>
+                      </m:e>
+                      <m:sub>
+                        <m:r>
+                          <m:t>b</m:t>
+                        </m:r>
+                      </m:sub>
+                    </m:sSub>
+                  </m:oMath>
+                </a14:m>
+                <a:r>
+                  <a:rPr/>
+                  <a:t>, </a:t>
+                </a:r>
+                <a14:m>
+                  <m:oMath xmlns:m="http://schemas.openxmlformats.org/officeDocument/2006/math">
+                    <m:sSub>
+                      <m:e>
+                        <m:r>
+                          <m:t>t</m:t>
+                        </m:r>
+                      </m:e>
+                      <m:sub>
+                        <m:r>
+                          <m:t>e</m:t>
+                        </m:r>
+                      </m:sub>
+                    </m:sSub>
+                  </m:oMath>
+                </a14:m>
+                <a:r>
+                  <a:rPr/>
+                  <a:t>, </a:t>
+                </a:r>
+                <a14:m>
+                  <m:oMath xmlns:m="http://schemas.openxmlformats.org/officeDocument/2006/math">
+                    <m:sSub>
+                      <m:e>
+                        <m:r>
+                          <m:t>l</m:t>
+                        </m:r>
+                      </m:e>
+                      <m:sub>
+                        <m:r>
+                          <m:t>b</m:t>
+                        </m:r>
+                      </m:sub>
+                    </m:sSub>
+                  </m:oMath>
+                </a14:m>
+                <a:r>
+                  <a:rPr/>
+                  <a:t>, </a:t>
+                </a:r>
+                <a14:m>
+                  <m:oMath xmlns:m="http://schemas.openxmlformats.org/officeDocument/2006/math">
+                    <m:sSub>
+                      <m:e>
+                        <m:r>
+                          <m:t>l</m:t>
+                        </m:r>
+                      </m:e>
+                      <m:sub>
+                        <m:r>
+                          <m:t>e</m:t>
+                        </m:r>
+                      </m:sub>
+                    </m:sSub>
+                  </m:oMath>
+                </a14:m>
+                <a:r>
+                  <a:rPr/>
+                  <a:t>): retrieves the names of users who went from location </a:t>
+                </a:r>
+                <a14:m>
+                  <m:oMath xmlns:m="http://schemas.openxmlformats.org/officeDocument/2006/math">
+                    <m:sSub>
+                      <m:e>
+                        <m:r>
+                          <m:t>l</m:t>
+                        </m:r>
+                      </m:e>
+                      <m:sub>
+                        <m:r>
+                          <m:t>b</m:t>
+                        </m:r>
+                      </m:sub>
+                    </m:sSub>
+                  </m:oMath>
+                </a14:m>
+                <a:r>
+                  <a:rPr/>
+                  <a:t> to location </a:t>
+                </a:r>
+                <a14:m>
+                  <m:oMath xmlns:m="http://schemas.openxmlformats.org/officeDocument/2006/math">
+                    <m:sSub>
+                      <m:e>
+                        <m:r>
+                          <m:t>l</m:t>
+                        </m:r>
+                      </m:e>
+                      <m:sub>
+                        <m:r>
+                          <m:t>e</m:t>
+                        </m:r>
+                      </m:sub>
+                    </m:sSub>
+                  </m:oMath>
+                </a14:m>
+                <a:r>
+                  <a:rPr/>
+                  <a:t> during the time interval [</a:t>
+                </a:r>
+                <a14:m>
+                  <m:oMath xmlns:m="http://schemas.openxmlformats.org/officeDocument/2006/math">
+                    <m:sSub>
+                      <m:e>
+                        <m:r>
+                          <m:t>t</m:t>
+                        </m:r>
+                      </m:e>
+                      <m:sub>
+                        <m:r>
+                          <m:t>b</m:t>
+                        </m:r>
+                      </m:sub>
+                    </m:sSub>
+                  </m:oMath>
+                </a14:m>
+                <a:r>
+                  <a:rPr/>
+                  <a:t>; </a:t>
+                </a:r>
+                <a14:m>
+                  <m:oMath xmlns:m="http://schemas.openxmlformats.org/officeDocument/2006/math">
+                    <m:sSub>
+                      <m:e>
+                        <m:r>
+                          <m:t>t</m:t>
+                        </m:r>
+                      </m:e>
+                      <m:sub>
+                        <m:r>
+                          <m:t>e</m:t>
+                        </m:r>
+                      </m:sub>
+                    </m:sSub>
+                  </m:oMath>
+                </a14:m>
+                <a:r>
+                  <a:rPr/>
+                  <a:t>]</a:t>
+                </a:r>
+              </a:p>
+              <a:p>
+                <a:pPr lvl="0"/>
+                <a:r>
+                  <a:rPr/>
+                  <a:t>CoLocate(</a:t>
+                </a:r>
+                <a14:m>
+                  <m:oMath xmlns:m="http://schemas.openxmlformats.org/officeDocument/2006/math">
+                    <m:r>
+                      <m:t>u</m:t>
+                    </m:r>
+                  </m:oMath>
+                </a14:m>
+                <a:r>
+                  <a:rPr/>
+                  <a:t> ∈ Users, </a:t>
+                </a:r>
+                <a14:m>
+                  <m:oMath xmlns:m="http://schemas.openxmlformats.org/officeDocument/2006/math">
+                    <m:sSub>
+                      <m:e>
+                        <m:r>
+                          <m:t>t</m:t>
+                        </m:r>
+                      </m:e>
+                      <m:sub>
+                        <m:r>
+                          <m:t>b</m:t>
+                        </m:r>
+                      </m:sub>
+                    </m:sSub>
+                  </m:oMath>
+                </a14:m>
+                <a:r>
+                  <a:rPr/>
+                  <a:t>, </a:t>
+                </a:r>
+                <a14:m>
+                  <m:oMath xmlns:m="http://schemas.openxmlformats.org/officeDocument/2006/math">
+                    <m:sSub>
+                      <m:e>
+                        <m:r>
+                          <m:t>t</m:t>
+                        </m:r>
+                      </m:e>
+                      <m:sub>
+                        <m:r>
+                          <m:t>e</m:t>
+                        </m:r>
+                      </m:sub>
+                    </m:sSub>
+                  </m:oMath>
+                </a14:m>
+                <a:r>
+                  <a:rPr/>
+                  <a:t>): retrieves all users who were in the same Location as user </a:t>
+                </a:r>
+                <a14:m>
+                  <m:oMath xmlns:m="http://schemas.openxmlformats.org/officeDocument/2006/math">
+                    <m:r>
+                      <m:t>u</m:t>
+                    </m:r>
+                  </m:oMath>
+                </a14:m>
+                <a:r>
+                  <a:rPr/>
+                  <a:t> during the specifoed time period.</a:t>
+                </a:r>
+              </a:p>
+              <a:p>
+                <a:pPr lvl="0"/>
+                <a:r>
+                  <a:rPr/>
+                  <a:t>TimeSpent(</a:t>
+                </a:r>
+                <a14:m>
+                  <m:oMath xmlns:m="http://schemas.openxmlformats.org/officeDocument/2006/math">
+                    <m:r>
+                      <m:t>u</m:t>
+                    </m:r>
+                  </m:oMath>
+                </a14:m>
+                <a:r>
+                  <a:rPr/>
+                  <a:t> ∈ Users, η, tb, te): retrieves the average time spent per day by subject </a:t>
+                </a:r>
+                <a14:m>
+                  <m:oMath xmlns:m="http://schemas.openxmlformats.org/officeDocument/2006/math">
+                    <m:r>
+                      <m:t>u</m:t>
+                    </m:r>
+                  </m:oMath>
+                </a14:m>
+                <a:r>
+                  <a:rPr/>
+                  <a:t> in locations of type η,</a:t>
+                </a:r>
+              </a:p>
+              <a:p>
+                <a:pPr lvl="0"/>
+                <a:r>
+                  <a:rPr/>
+                  <a:t>Continuous Query(τ, α, β): retrieves, after every α seconds (hop size), the minimum, maximum, and average occupancy levels of locations of type τ in the last β seconds (window size).</a:t>
+                </a:r>
+              </a:p>
+              <a:p>
+                <a:pPr lvl="0" indent="0" marL="0">
+                  <a:spcBef>
+                    <a:spcPts val="3000"/>
+                  </a:spcBef>
+                  <a:buNone/>
+                </a:pPr>
+                <a:r>
+                  <a:rPr b="1"/>
+                  <a:t>Additional custom queries</a:t>
+                </a:r>
+              </a:p>
+              <a:p>
+                <a:pPr lvl="0"/>
+                <a:r>
+                  <a:rPr/>
+                  <a:t>Dati tutti gli agenti di un certo tipo in un certo environment, trovare tutte le misurazioni dal timestamp X al timestamp Y.</a:t>
+                </a:r>
+              </a:p>
+              <a:p>
+                <a:pPr lvl="0"/>
+                <a:r>
+                  <a:rPr/>
+                  <a:t>Dato un environment, trovare le rilevazioni di tutti i device dal timestamp X al timestamp Y</a:t>
+                </a:r>
+              </a:p>
+              <a:p>
+                <a:pPr lvl="0"/>
+                <a:r>
+                  <a:rPr/>
+                  <a:t>Dato un environment, dammi tutti i measurement dei device di un certo tipo che superano una data soglia.</a:t>
+                </a:r>
+              </a:p>
+              <a:p>
+                <a:pPr lvl="0"/>
+                <a:r>
+                  <a:rPr/>
+                  <a:t>Dato un poligono, trovare tutti gli agent che hanno fatto task all’interno del poligono</a:t>
+                </a:r>
+              </a:p>
+              <a:p>
+                <a:pPr lvl="0" indent="0" marL="0">
+                  <a:spcBef>
+                    <a:spcPts val="3000"/>
+                  </a:spcBef>
+                  <a:buNone/>
+                </a:pPr>
+                <a:r>
+                  <a:rPr b="1"/>
+                  <a:t>Data architectures</a:t>
+                </a:r>
+              </a:p>
+              <a:p>
+                <a:pPr lvl="0" indent="-342900" marL="342900">
+                  <a:buAutoNum type="arabicPeriod"/>
+                </a:pPr>
+                <a:r>
+                  <a:rPr/>
+                  <a:t>Metamodello Agritech (PostgreSQL ?)</a:t>
+                </a:r>
+              </a:p>
+              <a:p>
+                <a:pPr lvl="0" indent="-342900" marL="342900">
+                  <a:buAutoNum type="arabicPeriod"/>
+                </a:pPr>
+                <a:r>
+                  <a:rPr/>
+                  <a:t>Wide-Column (?)</a:t>
+                </a:r>
+              </a:p>
+              <a:p>
+                <a:pPr lvl="0" indent="-342900" marL="342900">
+                  <a:buAutoNum type="arabicPeriod"/>
+                </a:pPr>
+                <a:r>
+                  <a:rPr/>
+                  <a:t>Grafo + Relazionale (PostgreSQL + PostGIS + Apache AGE)</a:t>
+                </a:r>
+              </a:p>
+              <a:p>
+                <a:pPr lvl="0" indent="-342900" marL="342900">
+                  <a:buAutoNum type="arabicPeriod"/>
+                </a:pPr>
+                <a:r>
+                  <a:rPr/>
+                  <a:t>Graph + Time Series (GraphDB + (ClickHouse || InfluxDB))</a:t>
+                </a:r>
+              </a:p>
+              <a:p>
+                <a:pPr lvl="0" indent="-342900" marL="342900">
+                  <a:buAutoNum type="arabicPeriod"/>
+                </a:pPr>
+                <a:r>
+                  <a:rPr/>
+                  <a:t>AeonG (?)</a:t>
+                </a:r>
+              </a:p>
+            </p:txBody>
+          </p:sp>
+        </mc:Choice>
+      </mc:AlternateContent>
+    </p:spTree>
+  </p:cSld>
+</p:sld>
+</file>
+
+<file path=ppt/slides/slide26.xml><?xml version="1.0" encoding="utf-8"?>
 <p:sld xmlns:a="http://schemas.openxmlformats.org/drawingml/2006/main" xmlns:r="http://schemas.openxmlformats.org/officeDocument/2006/relationships" xmlns:p="http://schemas.openxmlformats.org/presentationml/2006/main">
   <p:cSld>
     <p:spTree>
@@ -5655,7 +6248,7 @@
 </p:sld>
 </file>
 
-<file path=ppt/slides/slide26.xml><?xml version="1.0" encoding="utf-8"?>
+<file path=ppt/slides/slide27.xml><?xml version="1.0" encoding="utf-8"?>
 <p:sld xmlns:a="http://schemas.openxmlformats.org/drawingml/2006/main" xmlns:r="http://schemas.openxmlformats.org/officeDocument/2006/relationships" xmlns:p="http://schemas.openxmlformats.org/presentationml/2006/main">
   <p:cSld>
     <p:spTree>
@@ -5797,6 +6390,36 @@
             <a:r>
               <a:rPr/>
               <a:t>Apachce AGE under the hood architecture</a:t>
+            </a:r>
+          </a:p>
+        </p:txBody>
+      </p:sp>
+      <p:sp>
+        <p:nvSpPr>
+          <p:cNvPr id="3" name="Content Placeholder 2"/>
+          <p:cNvSpPr>
+            <a:spLocks noGrp="1"/>
+          </p:cNvSpPr>
+          <p:nvPr>
+            <p:ph idx="1"/>
+          </p:nvPr>
+        </p:nvSpPr>
+        <p:spPr/>
+        <p:txBody>
+          <a:bodyPr/>
+          <a:lstStyle/>
+          <a:p>
+            <a:pPr lvl="0"/>
+            <a:r>
+              <a:rPr/>
+              <a:t>MobaXTerm</a:t>
+            </a:r>
+          </a:p>
+          <a:p>
+            <a:pPr lvl="0"/>
+            <a:r>
+              <a:rPr/>
+              <a:t>Acrobat Reader</a:t>
             </a:r>
           </a:p>
         </p:txBody>

</xml_diff>

<commit_message>
Deploying to gh-pages from @ ManuelePasini/slides-markdown@c77ecd91de660bb3adfe007361e0f57efb424d71 🚀
</commit_message>
<xml_diff>
--- a/digital_twins.pptx
+++ b/digital_twins.pptx
@@ -6409,17 +6409,151 @@
           <a:bodyPr/>
           <a:lstStyle/>
           <a:p>
-            <a:pPr lvl="0"/>
-            <a:r>
-              <a:rPr/>
-              <a:t>MobaXTerm</a:t>
-            </a:r>
-          </a:p>
-          <a:p>
-            <a:pPr lvl="0"/>
-            <a:r>
-              <a:rPr/>
-              <a:t>Acrobat Reader</a:t>
+            <a:pPr lvl="0" indent="0" marL="0">
+              <a:spcBef>
+                <a:spcPts val="3000"/>
+              </a:spcBef>
+              <a:buNone/>
+            </a:pPr>
+            <a:r>
+              <a:rPr b="1"/>
+              <a:t>Setup</a:t>
+            </a:r>
+          </a:p>
+          <a:p>
+            <a:pPr lvl="0" indent="0" marL="0">
+              <a:buNone/>
+            </a:pPr>
+            <a:r>
+              <a:rPr/>
+              <a:t>Create and load AGE extension</a:t>
+            </a:r>
+          </a:p>
+          <a:p>
+            <a:pPr lvl="0" indent="0">
+              <a:buNone/>
+            </a:pPr>
+            <a:r>
+              <a:rPr>
+                <a:latin typeface="Courier"/>
+              </a:rPr>
+              <a:t>CREATE EXTENSION IF NOT EXISTS age;
+LOAD 'age';</a:t>
+            </a:r>
+          </a:p>
+          <a:p>
+            <a:pPr lvl="0" indent="0" marL="0">
+              <a:buNone/>
+            </a:pPr>
+            <a:r>
+              <a:rPr/>
+              <a:t>Allow user access to such path</a:t>
+            </a:r>
+          </a:p>
+          <a:p>
+            <a:pPr lvl="0" indent="0">
+              <a:buNone/>
+            </a:pPr>
+            <a:r>
+              <a:rPr>
+                <a:latin typeface="Courier"/>
+              </a:rPr>
+              <a:t>SET search_path = ag_catalog, "$user", public;</a:t>
+            </a:r>
+          </a:p>
+          <a:p>
+            <a:pPr lvl="0" indent="0" marL="0">
+              <a:buNone/>
+            </a:pPr>
+            <a:r>
+              <a:rPr/>
+              <a:t>Create a node A</a:t>
+            </a:r>
+          </a:p>
+          <a:p>
+            <a:pPr lvl="0" indent="0">
+              <a:buNone/>
+            </a:pPr>
+            <a:r>
+              <a:rPr>
+                <a:latin typeface="Courier"/>
+              </a:rPr>
+              <a:t>SELECT * 
+FROM cypher('test_graph', $$
+    CREATE (:label {property:"Node A"})
+$$) as (v agtype);</a:t>
+            </a:r>
+          </a:p>
+          <a:p>
+            <a:pPr lvl="0" indent="0" marL="0">
+              <a:buNone/>
+            </a:pPr>
+            <a:r>
+              <a:rPr/>
+              <a:t>Create a node B</a:t>
+            </a:r>
+          </a:p>
+          <a:p>
+            <a:pPr lvl="0" indent="0">
+              <a:buNone/>
+            </a:pPr>
+            <a:r>
+              <a:rPr>
+                <a:latin typeface="Courier"/>
+              </a:rPr>
+              <a:t>SELECT * 
+FROM cypher('test_graph', $$
+    CREATE (:label {property:"Node B"})
+$$) as (v agtype);</a:t>
+            </a:r>
+          </a:p>
+          <a:p>
+            <a:pPr lvl="0" indent="0" marL="0">
+              <a:buNone/>
+            </a:pPr>
+            <a:r>
+              <a:rPr/>
+              <a:t>Create an edge between node A and node B</a:t>
+            </a:r>
+          </a:p>
+          <a:p>
+            <a:pPr lvl="0" indent="0">
+              <a:buNone/>
+            </a:pPr>
+            <a:r>
+              <a:rPr>
+                <a:latin typeface="Courier"/>
+              </a:rPr>
+              <a:t>SELECT * 
+FROM cypher('test_graph', $$
+    MATCH (a:label), (b:label)
+    WHERE a.property = 'Node A' AND b.property = 'Node B'
+    CREATE (a)-[e:RELTYPE {property:a.property + '&lt;-&gt;' + b.property}]-&gt;(b)
+    RETURN e
+$$) as (e agtype);</a:t>
+            </a:r>
+          </a:p>
+          <a:p>
+            <a:pPr lvl="0" indent="0" marL="0">
+              <a:buNone/>
+            </a:pPr>
+            <a:r>
+              <a:rPr/>
+              <a:t>Select those edges</a:t>
+            </a:r>
+          </a:p>
+          <a:p>
+            <a:pPr lvl="0" indent="0">
+              <a:buNone/>
+            </a:pPr>
+            <a:r>
+              <a:rPr>
+                <a:latin typeface="Courier"/>
+              </a:rPr>
+              <a:t>SELECT * from cypher('test_graph', $$
+        MATCH (V)-[R]-(V2)
+        RETURN V,R,V2
+$$) as (V agtype, R agtype, V2 agtype);</a:t>
             </a:r>
           </a:p>
         </p:txBody>

</xml_diff>

<commit_message>
Deploying to gh-pages from @ ManuelePasini/slides-markdown@6feeefcd27feb7e77dc3508fc41b4d04afcc7614 🚀
</commit_message>
<xml_diff>
--- a/digital_twins.pptx
+++ b/digital_twins.pptx
@@ -5282,6 +5282,64 @@
                 </a:pPr>
                 <a:r>
                   <a:rPr b="1"/>
+                  <a:t>Aspects</a:t>
+                </a:r>
+              </a:p>
+              <a:p>
+                <a:pPr lvl="0"/>
+                <a:r>
+                  <a:rPr b="1"/>
+                  <a:t>Dimensions</a:t>
+                </a:r>
+              </a:p>
+              <a:p>
+                <a:pPr lvl="1"/>
+                <a:r>
+                  <a:rPr/>
+                  <a:t>Spatial</a:t>
+                </a:r>
+              </a:p>
+              <a:p>
+                <a:pPr lvl="1"/>
+                <a:r>
+                  <a:rPr/>
+                  <a:t>Temporal</a:t>
+                </a:r>
+              </a:p>
+              <a:p>
+                <a:pPr lvl="0"/>
+                <a:r>
+                  <a:rPr b="1"/>
+                  <a:t>Workload</a:t>
+                </a:r>
+                <a:r>
+                  <a:rPr/>
+                  <a:t>:</a:t>
+                </a:r>
+              </a:p>
+              <a:p>
+                <a:pPr lvl="1"/>
+                <a:r>
+                  <a:rPr/>
+                  <a:t>Operational</a:t>
+                </a:r>
+              </a:p>
+              <a:p>
+                <a:pPr lvl="1"/>
+                <a:r>
+                  <a:rPr/>
+                  <a:t>Analytical</a:t>
+                </a:r>
+              </a:p>
+              <a:p>
+                <a:pPr lvl="0" indent="0" marL="0">
+                  <a:spcBef>
+                    <a:spcPts val="3000"/>
+                  </a:spcBef>
+                  <a:buNone/>
+                </a:pPr>
+                <a:r>
+                  <a:rPr b="1"/>
                   <a:t>From </a:t>
                 </a:r>
                 <a:r>
@@ -5882,6 +5940,822 @@
                 <a:r>
                   <a:rPr/>
                   <a:t>Dato un poligono, trovare tutti gli agent che hanno fatto task all’interno del poligono</a:t>
+                </a:r>
+              </a:p>
+              <a:p>
+                <a:pPr lvl="0" indent="0" marL="0">
+                  <a:spcBef>
+                    <a:spcPts val="3000"/>
+                  </a:spcBef>
+                  <a:buNone/>
+                </a:pPr>
+                <a:r>
+                  <a:rPr b="1"/>
+                  <a:t>Final queries v.0.1 (without custom)</a:t>
+                </a:r>
+              </a:p>
+              <a:p>
+                <a:pPr lvl="0" indent="0" marL="0">
+                  <a:buNone/>
+                </a:pPr>
+                <a:r>
+                  <a:rPr b="1"/>
+                  <a:t>Q1</a:t>
+                </a:r>
+                <a:r>
+                  <a:rPr/>
+                  <a:t> Total measurements (</a:t>
+                </a:r>
+                <a14:m>
+                  <m:oMath xmlns:m="http://schemas.openxmlformats.org/officeDocument/2006/math">
+                    <m:sSub>
+                      <m:e>
+                        <m:r>
+                          <m:t>t</m:t>
+                        </m:r>
+                      </m:e>
+                      <m:sub>
+                        <m:r>
+                          <m:t>b</m:t>
+                        </m:r>
+                      </m:sub>
+                    </m:sSub>
+                  </m:oMath>
+                </a14:m>
+                <a:r>
+                  <a:rPr/>
+                  <a:t>, </a:t>
+                </a:r>
+                <a14:m>
+                  <m:oMath xmlns:m="http://schemas.openxmlformats.org/officeDocument/2006/math">
+                    <m:sSub>
+                      <m:e>
+                        <m:r>
+                          <m:t>t</m:t>
+                        </m:r>
+                      </m:e>
+                      <m:sub>
+                        <m:r>
+                          <m:t>e</m:t>
+                        </m:r>
+                      </m:sub>
+                    </m:sSub>
+                  </m:oMath>
+                </a14:m>
+                <a:r>
+                  <a:rPr/>
+                  <a:t>): counts the total number of measurements for each device during the period [</a:t>
+                </a:r>
+                <a14:m>
+                  <m:oMath xmlns:m="http://schemas.openxmlformats.org/officeDocument/2006/math">
+                    <m:sSub>
+                      <m:e>
+                        <m:r>
+                          <m:t>t</m:t>
+                        </m:r>
+                      </m:e>
+                      <m:sub>
+                        <m:r>
+                          <m:t>b</m:t>
+                        </m:r>
+                      </m:sub>
+                    </m:sSub>
+                  </m:oMath>
+                </a14:m>
+                <a:r>
+                  <a:rPr/>
+                  <a:t>; </a:t>
+                </a:r>
+                <a14:m>
+                  <m:oMath xmlns:m="http://schemas.openxmlformats.org/officeDocument/2006/math">
+                    <m:sSub>
+                      <m:e>
+                        <m:r>
+                          <m:t>t</m:t>
+                        </m:r>
+                      </m:e>
+                      <m:sub>
+                        <m:r>
+                          <m:t>e</m:t>
+                        </m:r>
+                      </m:sub>
+                    </m:sSub>
+                  </m:oMath>
+                </a14:m>
+                <a:r>
+                  <a:rPr/>
+                  <a:t>].</a:t>
+                </a:r>
+              </a:p>
+              <a:p>
+                <a:pPr lvl="0" indent="0" marL="0">
+                  <a:buNone/>
+                </a:pPr>
+                <a:r>
+                  <a:rPr b="1"/>
+                  <a:t>Q2</a:t>
+                </a:r>
+                <a:r>
+                  <a:rPr/>
+                  <a:t> Average hourly measurements (η, [</a:t>
+                </a:r>
+                <a14:m>
+                  <m:oMath xmlns:m="http://schemas.openxmlformats.org/officeDocument/2006/math">
+                    <m:sSub>
+                      <m:e>
+                        <m:r>
+                          <m:t>t</m:t>
+                        </m:r>
+                      </m:e>
+                      <m:sub>
+                        <m:r>
+                          <m:t>b</m:t>
+                        </m:r>
+                      </m:sub>
+                    </m:sSub>
+                  </m:oMath>
+                </a14:m>
+                <a:r>
+                  <a:rPr/>
+                  <a:t>; </a:t>
+                </a:r>
+                <a14:m>
+                  <m:oMath xmlns:m="http://schemas.openxmlformats.org/officeDocument/2006/math">
+                    <m:sSub>
+                      <m:e>
+                        <m:r>
+                          <m:t>t</m:t>
+                        </m:r>
+                      </m:e>
+                      <m:sub>
+                        <m:r>
+                          <m:t>e</m:t>
+                        </m:r>
+                      </m:sub>
+                    </m:sSub>
+                  </m:oMath>
+                </a14:m>
+                <a:r>
+                  <a:rPr/>
+                  <a:t>]): Create a sorted list of the average measurement of type η in each hour interval in the given period [</a:t>
+                </a:r>
+                <a14:m>
+                  <m:oMath xmlns:m="http://schemas.openxmlformats.org/officeDocument/2006/math">
+                    <m:sSub>
+                      <m:e>
+                        <m:r>
+                          <m:t>t</m:t>
+                        </m:r>
+                      </m:e>
+                      <m:sub>
+                        <m:r>
+                          <m:t>b</m:t>
+                        </m:r>
+                      </m:sub>
+                    </m:sSub>
+                  </m:oMath>
+                </a14:m>
+                <a:r>
+                  <a:rPr/>
+                  <a:t>; </a:t>
+                </a:r>
+                <a14:m>
+                  <m:oMath xmlns:m="http://schemas.openxmlformats.org/officeDocument/2006/math">
+                    <m:sSub>
+                      <m:e>
+                        <m:r>
+                          <m:t>t</m:t>
+                        </m:r>
+                      </m:e>
+                      <m:sub>
+                        <m:r>
+                          <m:t>e</m:t>
+                        </m:r>
+                      </m:sub>
+                    </m:sSub>
+                  </m:oMath>
+                </a14:m>
+                <a:r>
+                  <a:rPr/>
+                  <a:t>].</a:t>
+                </a:r>
+              </a:p>
+              <a:p>
+                <a:pPr lvl="0" indent="0" marL="0">
+                  <a:buNone/>
+                </a:pPr>
+                <a:r>
+                  <a:rPr b="1"/>
+                  <a:t>Q3</a:t>
+                </a:r>
+                <a:r>
+                  <a:rPr/>
+                  <a:t> Monthly measurements(</a:t>
+                </a:r>
+                <a14:m>
+                  <m:oMath xmlns:m="http://schemas.openxmlformats.org/officeDocument/2006/math">
+                    <m:r>
+                      <m:t>A</m:t>
+                    </m:r>
+                  </m:oMath>
+                </a14:m>
+                <a:r>
+                  <a:rPr/>
+                  <a:t>): Create a list of the distinct agents </a:t>
+                </a:r>
+                <a14:m>
+                  <m:oMath xmlns:m="http://schemas.openxmlformats.org/officeDocument/2006/math">
+                    <m:r>
+                      <m:t>a</m:t>
+                    </m:r>
+                  </m:oMath>
+                </a14:m>
+                <a:r>
+                  <a:rPr/>
+                  <a:t> ∈ </a:t>
+                </a:r>
+                <a14:m>
+                  <m:oMath xmlns:m="http://schemas.openxmlformats.org/officeDocument/2006/math">
+                    <m:r>
+                      <m:t>A</m:t>
+                    </m:r>
+                  </m:oMath>
+                </a14:m>
+                <a:r>
+                  <a:rPr/>
+                  <a:t>, sorted by their total (monthly) measurements.</a:t>
+                </a:r>
+              </a:p>
+              <a:p>
+                <a:pPr lvl="0" indent="0" marL="0">
+                  <a:buNone/>
+                </a:pPr>
+                <a:r>
+                  <a:rPr b="1"/>
+                  <a:t>Q4</a:t>
+                </a:r>
+                <a:r>
+                  <a:rPr/>
+                  <a:t> Latest known agents location (</a:t>
+                </a:r>
+                <a14:m>
+                  <m:oMath xmlns:m="http://schemas.openxmlformats.org/officeDocument/2006/math">
+                    <m:r>
+                      <m:t>A</m:t>
+                    </m:r>
+                  </m:oMath>
+                </a14:m>
+                <a:r>
+                  <a:rPr/>
+                  <a:t>): Return the latest location for each agent </a:t>
+                </a:r>
+                <a14:m>
+                  <m:oMath xmlns:m="http://schemas.openxmlformats.org/officeDocument/2006/math">
+                    <m:r>
+                      <m:t>a</m:t>
+                    </m:r>
+                  </m:oMath>
+                </a14:m>
+                <a:r>
+                  <a:rPr/>
+                  <a:t> ∈ </a:t>
+                </a:r>
+                <a14:m>
+                  <m:oMath xmlns:m="http://schemas.openxmlformats.org/officeDocument/2006/math">
+                    <m:r>
+                      <m:t>A</m:t>
+                    </m:r>
+                  </m:oMath>
+                </a14:m>
+                <a:r>
+                  <a:rPr/>
+                  <a:t>.</a:t>
+                </a:r>
+              </a:p>
+              <a:p>
+                <a:pPr lvl="0"/>
+                <a:r>
+                  <a:rPr b="1"/>
+                  <a:t>Q4.1</a:t>
+                </a:r>
+                <a:r>
+                  <a:rPr/>
+                  <a:t> Latest time in environment (</a:t>
+                </a:r>
+                <a14:m>
+                  <m:oMath xmlns:m="http://schemas.openxmlformats.org/officeDocument/2006/math">
+                    <m:r>
+                      <m:t>A</m:t>
+                    </m:r>
+                  </m:oMath>
+                </a14:m>
+                <a:r>
+                  <a:rPr/>
+                  <a:t>, </a:t>
+                </a:r>
+                <a14:m>
+                  <m:oMath xmlns:m="http://schemas.openxmlformats.org/officeDocument/2006/math">
+                    <m:r>
+                      <m:t>l</m:t>
+                    </m:r>
+                  </m:oMath>
+                </a14:m>
+                <a:r>
+                  <a:rPr/>
+                  <a:t>): Return the latest time for which agents </a:t>
+                </a:r>
+                <a14:m>
+                  <m:oMath xmlns:m="http://schemas.openxmlformats.org/officeDocument/2006/math">
+                    <m:r>
+                      <m:t>a</m:t>
+                    </m:r>
+                  </m:oMath>
+                </a14:m>
+                <a:r>
+                  <a:rPr/>
+                  <a:t> ∈ </a:t>
+                </a:r>
+                <a14:m>
+                  <m:oMath xmlns:m="http://schemas.openxmlformats.org/officeDocument/2006/math">
+                    <m:r>
+                      <m:t>A</m:t>
+                    </m:r>
+                  </m:oMath>
+                </a14:m>
+                <a:r>
+                  <a:rPr/>
+                  <a:t> were in an environment </a:t>
+                </a:r>
+                <a14:m>
+                  <m:oMath xmlns:m="http://schemas.openxmlformats.org/officeDocument/2006/math">
+                    <m:r>
+                      <m:t>l</m:t>
+                    </m:r>
+                  </m:oMath>
+                </a14:m>
+                <a:r>
+                  <a:rPr/>
+                  <a:t>.</a:t>
+                </a:r>
+              </a:p>
+              <a:p>
+                <a:pPr lvl="0"/>
+                <a:r>
+                  <a:rPr b="1"/>
+                  <a:t>Q4.2</a:t>
+                </a:r>
+                <a:r>
+                  <a:rPr/>
+                  <a:t> Latest measurement in environment(</a:t>
+                </a:r>
+                <a14:m>
+                  <m:oMath xmlns:m="http://schemas.openxmlformats.org/officeDocument/2006/math">
+                    <m:r>
+                      <m:t>A</m:t>
+                    </m:r>
+                  </m:oMath>
+                </a14:m>
+                <a:r>
+                  <a:rPr/>
+                  <a:t>, </a:t>
+                </a:r>
+                <a14:m>
+                  <m:oMath xmlns:m="http://schemas.openxmlformats.org/officeDocument/2006/math">
+                    <m:r>
+                      <m:t>l</m:t>
+                    </m:r>
+                  </m:oMath>
+                </a14:m>
+                <a:r>
+                  <a:rPr/>
+                  <a:t>): Return the latest measurement for each agent that performed measurements in a given environment </a:t>
+                </a:r>
+                <a14:m>
+                  <m:oMath xmlns:m="http://schemas.openxmlformats.org/officeDocument/2006/math">
+                    <m:r>
+                      <m:t>l</m:t>
+                    </m:r>
+                  </m:oMath>
+                </a14:m>
+                <a:r>
+                  <a:rPr/>
+                  <a:t>.</a:t>
+                </a:r>
+              </a:p>
+              <a:p>
+                <a:pPr lvl="0" indent="0" marL="0">
+                  <a:buNone/>
+                </a:pPr>
+                <a:r>
+                  <a:rPr b="1"/>
+                  <a:t>Q5</a:t>
+                </a:r>
+                <a:r>
+                  <a:rPr/>
+                  <a:t> InverseCoverage(</a:t>
+                </a:r>
+                <a14:m>
+                  <m:oMath xmlns:m="http://schemas.openxmlformats.org/officeDocument/2006/math">
+                    <m:r>
+                      <m:t>L</m:t>
+                    </m:r>
+                  </m:oMath>
+                </a14:m>
+                <a:r>
+                  <a:rPr/>
+                  <a:t>, τ) lists all agents that can generate measurements of a given type τ in the polygon specified in </a:t>
+                </a:r>
+                <a14:m>
+                  <m:oMath xmlns:m="http://schemas.openxmlformats.org/officeDocument/2006/math">
+                    <m:r>
+                      <m:t>L</m:t>
+                    </m:r>
+                  </m:oMath>
+                </a14:m>
+                <a:r>
+                  <a:rPr/>
+                  <a:t>.</a:t>
+                </a:r>
+              </a:p>
+              <a:p>
+                <a:pPr lvl="0" indent="0" marL="0">
+                  <a:buNone/>
+                </a:pPr>
+                <a:r>
+                  <a:rPr b="1"/>
+                  <a:t>Q6</a:t>
+                </a:r>
+                <a:r>
+                  <a:rPr/>
+                  <a:t> Observations (τ , </a:t>
+                </a:r>
+                <a14:m>
+                  <m:oMath xmlns:m="http://schemas.openxmlformats.org/officeDocument/2006/math">
+                    <m:r>
+                      <m:t>c</m:t>
+                    </m:r>
+                    <m:r>
+                      <m:t>o</m:t>
+                    </m:r>
+                    <m:r>
+                      <m:t>n</m:t>
+                    </m:r>
+                    <m:r>
+                      <m:t>d</m:t>
+                    </m:r>
+                  </m:oMath>
+                </a14:m>
+                <a:r>
+                  <a:rPr/>
+                  <a:t>, </a:t>
+                </a:r>
+                <a14:m>
+                  <m:oMath xmlns:m="http://schemas.openxmlformats.org/officeDocument/2006/math">
+                    <m:sSub>
+                      <m:e>
+                        <m:r>
+                          <m:t>t</m:t>
+                        </m:r>
+                      </m:e>
+                      <m:sub>
+                        <m:r>
+                          <m:t>b</m:t>
+                        </m:r>
+                      </m:sub>
+                    </m:sSub>
+                  </m:oMath>
+                </a14:m>
+                <a:r>
+                  <a:rPr/>
+                  <a:t>, </a:t>
+                </a:r>
+                <a14:m>
+                  <m:oMath xmlns:m="http://schemas.openxmlformats.org/officeDocument/2006/math">
+                    <m:sSub>
+                      <m:e>
+                        <m:r>
+                          <m:t>t</m:t>
+                        </m:r>
+                      </m:e>
+                      <m:sub>
+                        <m:r>
+                          <m:t>e</m:t>
+                        </m:r>
+                      </m:sub>
+                    </m:sSub>
+                  </m:oMath>
+                </a14:m>
+                <a:r>
+                  <a:rPr/>
+                  <a:t>): selects measurements generated by agents of given type τ in the time range [</a:t>
+                </a:r>
+                <a14:m>
+                  <m:oMath xmlns:m="http://schemas.openxmlformats.org/officeDocument/2006/math">
+                    <m:sSub>
+                      <m:e>
+                        <m:r>
+                          <m:t>t</m:t>
+                        </m:r>
+                      </m:e>
+                      <m:sub>
+                        <m:r>
+                          <m:t>b</m:t>
+                        </m:r>
+                      </m:sub>
+                    </m:sSub>
+                  </m:oMath>
+                </a14:m>
+                <a:r>
+                  <a:rPr/>
+                  <a:t>; </a:t>
+                </a:r>
+                <a14:m>
+                  <m:oMath xmlns:m="http://schemas.openxmlformats.org/officeDocument/2006/math">
+                    <m:sSub>
+                      <m:e>
+                        <m:r>
+                          <m:t>t</m:t>
+                        </m:r>
+                      </m:e>
+                      <m:sub>
+                        <m:r>
+                          <m:t>e</m:t>
+                        </m:r>
+                      </m:sub>
+                    </m:sSub>
+                  </m:oMath>
+                </a14:m>
+                <a:r>
+                  <a:rPr/>
+                  <a:t>] that satisfy the condition </a:t>
+                </a:r>
+                <a14:m>
+                  <m:oMath xmlns:m="http://schemas.openxmlformats.org/officeDocument/2006/math">
+                    <m:r>
+                      <m:t>c</m:t>
+                    </m:r>
+                    <m:r>
+                      <m:t>o</m:t>
+                    </m:r>
+                    <m:r>
+                      <m:t>n</m:t>
+                    </m:r>
+                    <m:r>
+                      <m:t>d</m:t>
+                    </m:r>
+                  </m:oMath>
+                </a14:m>
+                <a:r>
+                  <a:rPr/>
+                  <a:t>.</a:t>
+                </a:r>
+              </a:p>
+              <a:p>
+                <a:pPr lvl="0" indent="0" marL="0">
+                  <a:buNone/>
+                </a:pPr>
+                <a:r>
+                  <a:rPr b="1"/>
+                  <a:t>Q7</a:t>
+                </a:r>
+                <a:r>
+                  <a:rPr/>
+                  <a:t> Trajectories(</a:t>
+                </a:r>
+                <a14:m>
+                  <m:oMath xmlns:m="http://schemas.openxmlformats.org/officeDocument/2006/math">
+                    <m:sSub>
+                      <m:e>
+                        <m:r>
+                          <m:t>t</m:t>
+                        </m:r>
+                      </m:e>
+                      <m:sub>
+                        <m:r>
+                          <m:t>b</m:t>
+                        </m:r>
+                      </m:sub>
+                    </m:sSub>
+                  </m:oMath>
+                </a14:m>
+                <a:r>
+                  <a:rPr/>
+                  <a:t>, </a:t>
+                </a:r>
+                <a14:m>
+                  <m:oMath xmlns:m="http://schemas.openxmlformats.org/officeDocument/2006/math">
+                    <m:sSub>
+                      <m:e>
+                        <m:r>
+                          <m:t>t</m:t>
+                        </m:r>
+                      </m:e>
+                      <m:sub>
+                        <m:r>
+                          <m:t>e</m:t>
+                        </m:r>
+                      </m:sub>
+                    </m:sSub>
+                  </m:oMath>
+                </a14:m>
+                <a:r>
+                  <a:rPr/>
+                  <a:t>, </a:t>
+                </a:r>
+                <a14:m>
+                  <m:oMath xmlns:m="http://schemas.openxmlformats.org/officeDocument/2006/math">
+                    <m:sSub>
+                      <m:e>
+                        <m:r>
+                          <m:t>l</m:t>
+                        </m:r>
+                      </m:e>
+                      <m:sub>
+                        <m:r>
+                          <m:t>b</m:t>
+                        </m:r>
+                      </m:sub>
+                    </m:sSub>
+                  </m:oMath>
+                </a14:m>
+                <a:r>
+                  <a:rPr/>
+                  <a:t>, </a:t>
+                </a:r>
+                <a14:m>
+                  <m:oMath xmlns:m="http://schemas.openxmlformats.org/officeDocument/2006/math">
+                    <m:sSub>
+                      <m:e>
+                        <m:r>
+                          <m:t>l</m:t>
+                        </m:r>
+                      </m:e>
+                      <m:sub>
+                        <m:r>
+                          <m:t>e</m:t>
+                        </m:r>
+                      </m:sub>
+                    </m:sSub>
+                  </m:oMath>
+                </a14:m>
+                <a:r>
+                  <a:rPr/>
+                  <a:t>): retrieves the names of agents who went from location </a:t>
+                </a:r>
+                <a14:m>
+                  <m:oMath xmlns:m="http://schemas.openxmlformats.org/officeDocument/2006/math">
+                    <m:sSub>
+                      <m:e>
+                        <m:r>
+                          <m:t>l</m:t>
+                        </m:r>
+                      </m:e>
+                      <m:sub>
+                        <m:r>
+                          <m:t>b</m:t>
+                        </m:r>
+                      </m:sub>
+                    </m:sSub>
+                  </m:oMath>
+                </a14:m>
+                <a:r>
+                  <a:rPr/>
+                  <a:t> to location </a:t>
+                </a:r>
+                <a14:m>
+                  <m:oMath xmlns:m="http://schemas.openxmlformats.org/officeDocument/2006/math">
+                    <m:sSub>
+                      <m:e>
+                        <m:r>
+                          <m:t>l</m:t>
+                        </m:r>
+                      </m:e>
+                      <m:sub>
+                        <m:r>
+                          <m:t>e</m:t>
+                        </m:r>
+                      </m:sub>
+                    </m:sSub>
+                  </m:oMath>
+                </a14:m>
+                <a:r>
+                  <a:rPr/>
+                  <a:t> during the time interval [</a:t>
+                </a:r>
+                <a14:m>
+                  <m:oMath xmlns:m="http://schemas.openxmlformats.org/officeDocument/2006/math">
+                    <m:sSub>
+                      <m:e>
+                        <m:r>
+                          <m:t>t</m:t>
+                        </m:r>
+                      </m:e>
+                      <m:sub>
+                        <m:r>
+                          <m:t>b</m:t>
+                        </m:r>
+                      </m:sub>
+                    </m:sSub>
+                  </m:oMath>
+                </a14:m>
+                <a:r>
+                  <a:rPr/>
+                  <a:t>; </a:t>
+                </a:r>
+                <a14:m>
+                  <m:oMath xmlns:m="http://schemas.openxmlformats.org/officeDocument/2006/math">
+                    <m:sSub>
+                      <m:e>
+                        <m:r>
+                          <m:t>t</m:t>
+                        </m:r>
+                      </m:e>
+                      <m:sub>
+                        <m:r>
+                          <m:t>e</m:t>
+                        </m:r>
+                      </m:sub>
+                    </m:sSub>
+                  </m:oMath>
+                </a14:m>
+                <a:r>
+                  <a:rPr/>
+                  <a:t>]</a:t>
+                </a:r>
+              </a:p>
+              <a:p>
+                <a:pPr lvl="0" indent="0" marL="0">
+                  <a:buNone/>
+                </a:pPr>
+                <a:r>
+                  <a:rPr b="1"/>
+                  <a:t>Q8</a:t>
+                </a:r>
+                <a:r>
+                  <a:rPr/>
+                  <a:t> CoLocate(</a:t>
+                </a:r>
+                <a14:m>
+                  <m:oMath xmlns:m="http://schemas.openxmlformats.org/officeDocument/2006/math">
+                    <m:r>
+                      <m:t>a</m:t>
+                    </m:r>
+                  </m:oMath>
+                </a14:m>
+                <a:r>
+                  <a:rPr/>
+                  <a:t> ∈ A, </a:t>
+                </a:r>
+                <a14:m>
+                  <m:oMath xmlns:m="http://schemas.openxmlformats.org/officeDocument/2006/math">
+                    <m:sSub>
+                      <m:e>
+                        <m:r>
+                          <m:t>t</m:t>
+                        </m:r>
+                      </m:e>
+                      <m:sub>
+                        <m:r>
+                          <m:t>b</m:t>
+                        </m:r>
+                      </m:sub>
+                    </m:sSub>
+                  </m:oMath>
+                </a14:m>
+                <a:r>
+                  <a:rPr/>
+                  <a:t>, </a:t>
+                </a:r>
+                <a14:m>
+                  <m:oMath xmlns:m="http://schemas.openxmlformats.org/officeDocument/2006/math">
+                    <m:sSub>
+                      <m:e>
+                        <m:r>
+                          <m:t>t</m:t>
+                        </m:r>
+                      </m:e>
+                      <m:sub>
+                        <m:r>
+                          <m:t>e</m:t>
+                        </m:r>
+                      </m:sub>
+                    </m:sSub>
+                  </m:oMath>
+                </a14:m>
+                <a:r>
+                  <a:rPr/>
+                  <a:t>): retrieves all agents who were in the same environment as agent </a:t>
+                </a:r>
+                <a14:m>
+                  <m:oMath xmlns:m="http://schemas.openxmlformats.org/officeDocument/2006/math">
+                    <m:r>
+                      <m:t>a</m:t>
+                    </m:r>
+                  </m:oMath>
+                </a14:m>
+                <a:r>
+                  <a:rPr/>
+                  <a:t> during the specifoed time period.</a:t>
                 </a:r>
               </a:p>
               <a:p>

</xml_diff>

<commit_message>
Deploying to gh-pages from @ ManuelePasini/slides-markdown@52e6c90fd7e2296e56b2be7ff747218016be2d3d 🚀
</commit_message>
<xml_diff>
--- a/digital_twins.pptx
+++ b/digital_twins.pptx
@@ -32,6 +32,8 @@
     <p:sldId id="280" r:id="rId26"/>
     <p:sldId id="281" r:id="rId27"/>
     <p:sldId id="282" r:id="rId28"/>
+    <p:sldId id="283" r:id="rId29"/>
+    <p:sldId id="284" r:id="rId30"/>
   </p:sldIdLst>
   <p:sldSz cx="9144000" cy="5143500" type="screen16x9"/>
   <p:notesSz cx="6858000" cy="9144000"/>
@@ -5951,9 +5953,51 @@
                 </a:pPr>
                 <a:r>
                   <a:rPr b="1"/>
-                  <a:t>Final queries v.0.1 (without custom)</a:t>
+                  <a:t>Final queries v.0.1</a:t>
                 </a:r>
               </a:p>
+            </p:txBody>
+          </p:sp>
+        </mc:Choice>
+      </mc:AlternateContent>
+    </p:spTree>
+  </p:cSld>
+</p:sld>
+</file>
+
+<file path=ppt/slides/slide26.xml><?xml version="1.0" encoding="utf-8"?>
+<p:sld xmlns:a="http://schemas.openxmlformats.org/drawingml/2006/main" xmlns:r="http://schemas.openxmlformats.org/officeDocument/2006/relationships" xmlns:p="http://schemas.openxmlformats.org/presentationml/2006/main">
+  <p:cSld>
+    <p:spTree>
+      <p:nvGrpSpPr>
+        <p:cNvPr id="1" name=""/>
+        <p:cNvGrpSpPr/>
+        <p:nvPr/>
+      </p:nvGrpSpPr>
+      <p:grpSpPr>
+        <a:xfrm>
+          <a:off x="0" y="0"/>
+          <a:ext cx="0" cy="0"/>
+          <a:chOff x="0" y="0"/>
+          <a:chExt cx="0" cy="0"/>
+        </a:xfrm>
+      </p:grpSpPr>
+      <mc:AlternateContent xmlns:mc="http://schemas.openxmlformats.org/markup-compatibility/2006">
+        <mc:Choice xmlns:a14="http://schemas.microsoft.com/office/drawing/2010/main" Requires="a14">
+          <p:sp>
+            <p:nvSpPr>
+              <p:cNvPr id="3" name="Content Placeholder 2"/>
+              <p:cNvSpPr>
+                <a:spLocks noGrp="1"/>
+              </p:cNvSpPr>
+              <p:nvPr>
+                <p:ph idx="1" sz="half"/>
+              </p:nvPr>
+            </p:nvSpPr>
+            <p:spPr/>
+            <p:txBody>
+              <a:bodyPr/>
+              <a:lstStyle/>
               <a:p>
                 <a:pPr lvl="0" indent="0" marL="0">
                   <a:buNone/>
@@ -6233,157 +6277,12 @@
                 </a:r>
               </a:p>
               <a:p>
-                <a:pPr lvl="0"/>
-                <a:r>
-                  <a:rPr b="1"/>
-                  <a:t>Q4.1</a:t>
-                </a:r>
-                <a:r>
-                  <a:rPr/>
-                  <a:t> Latest time in environment (</a:t>
-                </a:r>
-                <a14:m>
-                  <m:oMath xmlns:m="http://schemas.openxmlformats.org/officeDocument/2006/math">
-                    <m:r>
-                      <m:t>A</m:t>
-                    </m:r>
-                  </m:oMath>
-                </a14:m>
-                <a:r>
-                  <a:rPr/>
-                  <a:t>, </a:t>
-                </a:r>
-                <a14:m>
-                  <m:oMath xmlns:m="http://schemas.openxmlformats.org/officeDocument/2006/math">
-                    <m:r>
-                      <m:t>l</m:t>
-                    </m:r>
-                  </m:oMath>
-                </a14:m>
-                <a:r>
-                  <a:rPr/>
-                  <a:t>): Return the latest time for which agents </a:t>
-                </a:r>
-                <a14:m>
-                  <m:oMath xmlns:m="http://schemas.openxmlformats.org/officeDocument/2006/math">
-                    <m:r>
-                      <m:t>a</m:t>
-                    </m:r>
-                  </m:oMath>
-                </a14:m>
-                <a:r>
-                  <a:rPr/>
-                  <a:t> ∈ </a:t>
-                </a:r>
-                <a14:m>
-                  <m:oMath xmlns:m="http://schemas.openxmlformats.org/officeDocument/2006/math">
-                    <m:r>
-                      <m:t>A</m:t>
-                    </m:r>
-                  </m:oMath>
-                </a14:m>
-                <a:r>
-                  <a:rPr/>
-                  <a:t> were in an environment </a:t>
-                </a:r>
-                <a14:m>
-                  <m:oMath xmlns:m="http://schemas.openxmlformats.org/officeDocument/2006/math">
-                    <m:r>
-                      <m:t>l</m:t>
-                    </m:r>
-                  </m:oMath>
-                </a14:m>
-                <a:r>
-                  <a:rPr/>
-                  <a:t>.</a:t>
-                </a:r>
-              </a:p>
-              <a:p>
-                <a:pPr lvl="0"/>
-                <a:r>
-                  <a:rPr b="1"/>
-                  <a:t>Q4.2</a:t>
-                </a:r>
-                <a:r>
-                  <a:rPr/>
-                  <a:t> Latest measurement in environment(</a:t>
-                </a:r>
-                <a14:m>
-                  <m:oMath xmlns:m="http://schemas.openxmlformats.org/officeDocument/2006/math">
-                    <m:r>
-                      <m:t>A</m:t>
-                    </m:r>
-                  </m:oMath>
-                </a14:m>
-                <a:r>
-                  <a:rPr/>
-                  <a:t>, </a:t>
-                </a:r>
-                <a14:m>
-                  <m:oMath xmlns:m="http://schemas.openxmlformats.org/officeDocument/2006/math">
-                    <m:r>
-                      <m:t>l</m:t>
-                    </m:r>
-                  </m:oMath>
-                </a14:m>
-                <a:r>
-                  <a:rPr/>
-                  <a:t>): Return the latest measurement for each agent that performed measurements in a given environment </a:t>
-                </a:r>
-                <a14:m>
-                  <m:oMath xmlns:m="http://schemas.openxmlformats.org/officeDocument/2006/math">
-                    <m:r>
-                      <m:t>l</m:t>
-                    </m:r>
-                  </m:oMath>
-                </a14:m>
-                <a:r>
-                  <a:rPr/>
-                  <a:t>.</a:t>
-                </a:r>
-              </a:p>
-              <a:p>
                 <a:pPr lvl="0" indent="0" marL="0">
                   <a:buNone/>
                 </a:pPr>
                 <a:r>
                   <a:rPr b="1"/>
                   <a:t>Q5</a:t>
-                </a:r>
-                <a:r>
-                  <a:rPr/>
-                  <a:t> InverseCoverage(</a:t>
-                </a:r>
-                <a14:m>
-                  <m:oMath xmlns:m="http://schemas.openxmlformats.org/officeDocument/2006/math">
-                    <m:r>
-                      <m:t>L</m:t>
-                    </m:r>
-                  </m:oMath>
-                </a14:m>
-                <a:r>
-                  <a:rPr/>
-                  <a:t>, τ) lists all agents that can generate measurements of a given type τ in the polygon specified in </a:t>
-                </a:r>
-                <a14:m>
-                  <m:oMath xmlns:m="http://schemas.openxmlformats.org/officeDocument/2006/math">
-                    <m:r>
-                      <m:t>L</m:t>
-                    </m:r>
-                  </m:oMath>
-                </a14:m>
-                <a:r>
-                  <a:rPr/>
-                  <a:t>.</a:t>
-                </a:r>
-              </a:p>
-              <a:p>
-                <a:pPr lvl="0" indent="0" marL="0">
-                  <a:buNone/>
-                </a:pPr>
-                <a:r>
-                  <a:rPr b="1"/>
-                  <a:t>Q6</a:t>
                 </a:r>
                 <a:r>
                   <a:rPr/>
@@ -6516,7 +6415,211 @@
                 </a:pPr>
                 <a:r>
                   <a:rPr b="1"/>
+                  <a:t>Q6</a:t>
+                </a:r>
+                <a:r>
+                  <a:rPr/>
+                  <a:t> InverseCoverage(</a:t>
+                </a:r>
+                <a14:m>
+                  <m:oMath xmlns:m="http://schemas.openxmlformats.org/officeDocument/2006/math">
+                    <m:r>
+                      <m:t>A</m:t>
+                    </m:r>
+                  </m:oMath>
+                </a14:m>
+                <a:r>
+                  <a:rPr/>
+                  <a:t>, </a:t>
+                </a:r>
+                <a14:m>
+                  <m:oMath xmlns:m="http://schemas.openxmlformats.org/officeDocument/2006/math">
+                    <m:r>
+                      <m:t>L</m:t>
+                    </m:r>
+                  </m:oMath>
+                </a14:m>
+                <a:r>
+                  <a:rPr/>
+                  <a:t>, η) lists all agents </a:t>
+                </a:r>
+                <a14:m>
+                  <m:oMath xmlns:m="http://schemas.openxmlformats.org/officeDocument/2006/math">
+                    <m:r>
+                      <m:t>a</m:t>
+                    </m:r>
+                  </m:oMath>
+                </a14:m>
+                <a:r>
+                  <a:rPr/>
+                  <a:t> ∈ </a:t>
+                </a:r>
+                <a14:m>
+                  <m:oMath xmlns:m="http://schemas.openxmlformats.org/officeDocument/2006/math">
+                    <m:r>
+                      <m:t>A</m:t>
+                    </m:r>
+                  </m:oMath>
+                </a14:m>
+                <a:r>
+                  <a:rPr/>
+                  <a:t> that generated measurements of a given type η in the polygon specified by the set of points </a:t>
+                </a:r>
+                <a14:m>
+                  <m:oMath xmlns:m="http://schemas.openxmlformats.org/officeDocument/2006/math">
+                    <m:r>
+                      <m:t>L</m:t>
+                    </m:r>
+                  </m:oMath>
+                </a14:m>
+                <a:r>
+                  <a:rPr/>
+                  <a:t>.</a:t>
+                </a:r>
+              </a:p>
+              <a:p>
+                <a:pPr lvl="0" indent="0" marL="0">
+                  <a:buNone/>
+                </a:pPr>
+                <a:r>
+                  <a:rPr b="1"/>
                   <a:t>Q7</a:t>
+                </a:r>
+                <a:r>
+                  <a:rPr/>
+                  <a:t> Time in environment (</a:t>
+                </a:r>
+                <a14:m>
+                  <m:oMath xmlns:m="http://schemas.openxmlformats.org/officeDocument/2006/math">
+                    <m:r>
+                      <m:t>A</m:t>
+                    </m:r>
+                  </m:oMath>
+                </a14:m>
+                <a:r>
+                  <a:rPr/>
+                  <a:t>, </a:t>
+                </a:r>
+                <a14:m>
+                  <m:oMath xmlns:m="http://schemas.openxmlformats.org/officeDocument/2006/math">
+                    <m:r>
+                      <m:t>l</m:t>
+                    </m:r>
+                  </m:oMath>
+                </a14:m>
+                <a:r>
+                  <a:rPr/>
+                  <a:t>): Return the times for which agents </a:t>
+                </a:r>
+                <a14:m>
+                  <m:oMath xmlns:m="http://schemas.openxmlformats.org/officeDocument/2006/math">
+                    <m:r>
+                      <m:t>a</m:t>
+                    </m:r>
+                  </m:oMath>
+                </a14:m>
+                <a:r>
+                  <a:rPr/>
+                  <a:t> ∈ </a:t>
+                </a:r>
+                <a14:m>
+                  <m:oMath xmlns:m="http://schemas.openxmlformats.org/officeDocument/2006/math">
+                    <m:r>
+                      <m:t>A</m:t>
+                    </m:r>
+                  </m:oMath>
+                </a14:m>
+                <a:r>
+                  <a:rPr/>
+                  <a:t> were in an environment </a:t>
+                </a:r>
+                <a14:m>
+                  <m:oMath xmlns:m="http://schemas.openxmlformats.org/officeDocument/2006/math">
+                    <m:r>
+                      <m:t>l</m:t>
+                    </m:r>
+                  </m:oMath>
+                </a14:m>
+                <a:r>
+                  <a:rPr/>
+                  <a:t>.</a:t>
+                </a:r>
+              </a:p>
+              <a:p>
+                <a:pPr lvl="0" indent="0" marL="0">
+                  <a:buNone/>
+                </a:pPr>
+                <a:r>
+                  <a:rPr b="1"/>
+                  <a:t>Q8</a:t>
+                </a:r>
+                <a:r>
+                  <a:rPr/>
+                  <a:t> Latest measurement in environment(</a:t>
+                </a:r>
+                <a14:m>
+                  <m:oMath xmlns:m="http://schemas.openxmlformats.org/officeDocument/2006/math">
+                    <m:r>
+                      <m:t>A</m:t>
+                    </m:r>
+                  </m:oMath>
+                </a14:m>
+                <a:r>
+                  <a:rPr/>
+                  <a:t>, </a:t>
+                </a:r>
+                <a14:m>
+                  <m:oMath xmlns:m="http://schemas.openxmlformats.org/officeDocument/2006/math">
+                    <m:r>
+                      <m:t>l</m:t>
+                    </m:r>
+                  </m:oMath>
+                </a14:m>
+                <a:r>
+                  <a:rPr/>
+                  <a:t>): Return the latest measurement for each agent </a:t>
+                </a:r>
+                <a14:m>
+                  <m:oMath xmlns:m="http://schemas.openxmlformats.org/officeDocument/2006/math">
+                    <m:r>
+                      <m:t>a</m:t>
+                    </m:r>
+                  </m:oMath>
+                </a14:m>
+                <a:r>
+                  <a:rPr/>
+                  <a:t> ∈ </a:t>
+                </a:r>
+                <a14:m>
+                  <m:oMath xmlns:m="http://schemas.openxmlformats.org/officeDocument/2006/math">
+                    <m:r>
+                      <m:t>A</m:t>
+                    </m:r>
+                  </m:oMath>
+                </a14:m>
+                <a:r>
+                  <a:rPr/>
+                  <a:t> that performed measurements in a given environment </a:t>
+                </a:r>
+                <a14:m>
+                  <m:oMath xmlns:m="http://schemas.openxmlformats.org/officeDocument/2006/math">
+                    <m:r>
+                      <m:t>l</m:t>
+                    </m:r>
+                  </m:oMath>
+                </a14:m>
+                <a:r>
+                  <a:rPr/>
+                  <a:t>.</a:t>
+                </a:r>
+              </a:p>
+              <a:p>
+                <a:pPr lvl="0" indent="0" marL="0">
+                  <a:buNone/>
+                </a:pPr>
+                <a:r>
+                  <a:rPr b="1"/>
+                  <a:t>Q9</a:t>
                 </a:r>
                 <a:r>
                   <a:rPr/>
@@ -6689,7 +6792,7 @@
                 </a:pPr>
                 <a:r>
                   <a:rPr b="1"/>
-                  <a:t>Q8</a:t>
+                  <a:t>Q10</a:t>
                 </a:r>
                 <a:r>
                   <a:rPr/>
@@ -6755,76 +6858,174 @@
                 </a14:m>
                 <a:r>
                   <a:rPr/>
-                  <a:t> during the specifoed time period.</a:t>
-                </a:r>
-              </a:p>
-              <a:p>
-                <a:pPr lvl="0" indent="0" marL="0">
-                  <a:spcBef>
-                    <a:spcPts val="3000"/>
-                  </a:spcBef>
-                  <a:buNone/>
-                </a:pPr>
-                <a:r>
-                  <a:rPr b="1"/>
-                  <a:t>Data architectures</a:t>
-                </a:r>
-              </a:p>
-              <a:p>
-                <a:pPr lvl="0" indent="-342900" marL="342900">
-                  <a:buAutoNum type="arabicPeriod"/>
-                </a:pPr>
-                <a:r>
-                  <a:rPr/>
-                  <a:t>Metamodello Agritech (PostgreSQL ?)</a:t>
-                </a:r>
-              </a:p>
-              <a:p>
-                <a:pPr lvl="0" indent="-342900" marL="342900">
-                  <a:buAutoNum type="arabicPeriod"/>
-                </a:pPr>
-                <a:r>
-                  <a:rPr/>
-                  <a:t>Wide-Column (?)</a:t>
-                </a:r>
-              </a:p>
-              <a:p>
-                <a:pPr lvl="0" indent="-342900" marL="342900">
-                  <a:buAutoNum type="arabicPeriod"/>
-                </a:pPr>
-                <a:r>
-                  <a:rPr/>
-                  <a:t>Grafo + Relazionale (PostgreSQL + PostGIS + Apache AGE)</a:t>
-                </a:r>
-              </a:p>
-              <a:p>
-                <a:pPr lvl="0" indent="-342900" marL="342900">
-                  <a:buAutoNum type="arabicPeriod"/>
-                </a:pPr>
-                <a:r>
-                  <a:rPr/>
-                  <a:t>Graph + Time Series (GraphDB + (ClickHouse || InfluxDB))</a:t>
-                </a:r>
-              </a:p>
-              <a:p>
-                <a:pPr lvl="0" indent="-342900" marL="342900">
-                  <a:buAutoNum type="arabicPeriod"/>
-                </a:pPr>
-                <a:r>
-                  <a:rPr/>
-                  <a:t>AeonG (?)</a:t>
+                  <a:t> during the specified time period.</a:t>
                 </a:r>
               </a:p>
             </p:txBody>
           </p:sp>
         </mc:Choice>
       </mc:AlternateContent>
+      <p:pic>
+        <p:nvPicPr>
+          <p:cNvPr descr="https://github.com/ManuelePasini/slides-markdown/blob/master/slides/images/dt/workload.png?raw=true" id="0" name="Picture 1"/>
+          <p:cNvPicPr>
+            <a:picLocks noGrp="1" noChangeAspect="1"/>
+          </p:cNvPicPr>
+          <p:nvPr/>
+        </p:nvPicPr>
+        <p:blipFill>
+          <a:blip r:embed="rId2"/>
+          <a:stretch>
+            <a:fillRect/>
+          </a:stretch>
+        </p:blipFill>
+        <p:spPr bwMode="auto">
+          <a:xfrm>
+            <a:off x="4648200" y="1244600"/>
+            <a:ext cx="4038600" cy="2781300"/>
+          </a:xfrm>
+          <a:prstGeom prst="rect">
+            <a:avLst/>
+          </a:prstGeom>
+          <a:noFill/>
+          <a:ln w="9525">
+            <a:noFill/>
+            <a:headEnd/>
+            <a:tailEnd/>
+          </a:ln>
+        </p:spPr>
+      </p:pic>
+      <p:sp>
+        <p:nvSpPr>
+          <p:cNvPr id="1" name="TextBox 3"/>
+          <p:cNvSpPr txBox="1"/>
+          <p:nvPr/>
+        </p:nvSpPr>
+        <p:spPr>
+          <a:xfrm>
+            <a:off x="4648200" y="4076700"/>
+            <a:ext cx="4038600" cy="508000"/>
+          </a:xfrm>
+          <a:prstGeom prst="rect">
+            <a:avLst/>
+          </a:prstGeom>
+          <a:noFill/>
+        </p:spPr>
+        <p:txBody>
+          <a:bodyPr/>
+          <a:lstStyle/>
+          <a:p>
+            <a:pPr lvl="0" indent="0" marL="0" algn="ctr">
+              <a:buNone/>
+            </a:pPr>
+            <a:r>
+              <a:rPr/>
+              <a:t>Workload overview</a:t>
+            </a:r>
+          </a:p>
+        </p:txBody>
+      </p:sp>
     </p:spTree>
   </p:cSld>
 </p:sld>
 </file>
 
-<file path=ppt/slides/slide26.xml><?xml version="1.0" encoding="utf-8"?>
+<file path=ppt/slides/slide27.xml><?xml version="1.0" encoding="utf-8"?>
+<p:sld xmlns:a="http://schemas.openxmlformats.org/drawingml/2006/main" xmlns:r="http://schemas.openxmlformats.org/officeDocument/2006/relationships" xmlns:p="http://schemas.openxmlformats.org/presentationml/2006/main">
+  <p:cSld>
+    <p:spTree>
+      <p:nvGrpSpPr>
+        <p:cNvPr id="1" name=""/>
+        <p:cNvGrpSpPr/>
+        <p:nvPr/>
+      </p:nvGrpSpPr>
+      <p:grpSpPr>
+        <a:xfrm>
+          <a:off x="0" y="0"/>
+          <a:ext cx="0" cy="0"/>
+          <a:chOff x="0" y="0"/>
+          <a:chExt cx="0" cy="0"/>
+        </a:xfrm>
+      </p:grpSpPr>
+      <p:sp>
+        <p:nvSpPr>
+          <p:cNvPr id="3" name="Content Placeholder 2"/>
+          <p:cNvSpPr>
+            <a:spLocks noGrp="1"/>
+          </p:cNvSpPr>
+          <p:nvPr>
+            <p:ph idx="1"/>
+          </p:nvPr>
+        </p:nvSpPr>
+        <p:spPr/>
+        <p:txBody>
+          <a:bodyPr/>
+          <a:lstStyle/>
+          <a:p>
+            <a:pPr lvl="0" indent="0" marL="0">
+              <a:spcBef>
+                <a:spcPts val="3000"/>
+              </a:spcBef>
+              <a:buNone/>
+            </a:pPr>
+            <a:r>
+              <a:rPr b="1"/>
+              <a:t>Data architectures</a:t>
+            </a:r>
+          </a:p>
+          <a:p>
+            <a:pPr lvl="0" indent="-342900" marL="342900">
+              <a:buAutoNum type="arabicPeriod"/>
+            </a:pPr>
+            <a:r>
+              <a:rPr/>
+              <a:t>Metamodello Agritech (PostgreSQL ?)</a:t>
+            </a:r>
+          </a:p>
+          <a:p>
+            <a:pPr lvl="0" indent="-342900" marL="342900">
+              <a:buAutoNum type="arabicPeriod"/>
+            </a:pPr>
+            <a:r>
+              <a:rPr/>
+              <a:t>Wide-Column (?)</a:t>
+            </a:r>
+          </a:p>
+          <a:p>
+            <a:pPr lvl="0" indent="-342900" marL="342900">
+              <a:buAutoNum type="arabicPeriod"/>
+            </a:pPr>
+            <a:r>
+              <a:rPr/>
+              <a:t>Grafo + Relazionale (PostgreSQL + PostGIS + Apache AGE)</a:t>
+            </a:r>
+          </a:p>
+          <a:p>
+            <a:pPr lvl="0" indent="-342900" marL="342900">
+              <a:buAutoNum type="arabicPeriod"/>
+            </a:pPr>
+            <a:r>
+              <a:rPr/>
+              <a:t>Graph + Time Series (GraphDB + (ClickHouse || InfluxDB))</a:t>
+            </a:r>
+          </a:p>
+          <a:p>
+            <a:pPr lvl="0" indent="-342900" marL="342900">
+              <a:buAutoNum type="arabicPeriod"/>
+            </a:pPr>
+            <a:r>
+              <a:rPr/>
+              <a:t>AeonG (?)</a:t>
+            </a:r>
+          </a:p>
+        </p:txBody>
+      </p:sp>
+    </p:spTree>
+  </p:cSld>
+</p:sld>
+</file>
+
+<file path=ppt/slides/slide28.xml><?xml version="1.0" encoding="utf-8"?>
 <p:sld xmlns:a="http://schemas.openxmlformats.org/drawingml/2006/main" xmlns:r="http://schemas.openxmlformats.org/officeDocument/2006/relationships" xmlns:p="http://schemas.openxmlformats.org/presentationml/2006/main">
   <p:cSld>
     <p:spTree>
@@ -7122,7 +7323,7 @@
 </p:sld>
 </file>
 
-<file path=ppt/slides/slide27.xml><?xml version="1.0" encoding="utf-8"?>
+<file path=ppt/slides/slide29.xml><?xml version="1.0" encoding="utf-8"?>
 <p:sld xmlns:a="http://schemas.openxmlformats.org/drawingml/2006/main" xmlns:r="http://schemas.openxmlformats.org/officeDocument/2006/relationships" xmlns:p="http://schemas.openxmlformats.org/presentationml/2006/main">
   <p:cSld>
     <p:spTree>

</xml_diff>

<commit_message>
Deploying to gh-pages from @ ManuelePasini/slides-markdown@fc62f869ff2207e9fbcfef763d52f9bb31690783 🚀
</commit_message>
<xml_diff>
--- a/digital_twins.pptx
+++ b/digital_twins.pptx
@@ -34,6 +34,8 @@
     <p:sldId id="282" r:id="rId28"/>
     <p:sldId id="283" r:id="rId29"/>
     <p:sldId id="284" r:id="rId30"/>
+    <p:sldId id="285" r:id="rId31"/>
+    <p:sldId id="286" r:id="rId32"/>
   </p:sldIdLst>
   <p:sldSz cx="9144000" cy="5143500" type="screen16x9"/>
   <p:notesSz cx="6858000" cy="9144000"/>
@@ -5259,707 +5261,144 @@
           </a:p>
         </p:txBody>
       </p:sp>
-      <mc:AlternateContent xmlns:mc="http://schemas.openxmlformats.org/markup-compatibility/2006">
-        <mc:Choice xmlns:a14="http://schemas.microsoft.com/office/drawing/2010/main" Requires="a14">
-          <p:sp>
-            <p:nvSpPr>
-              <p:cNvPr id="3" name="Content Placeholder 2"/>
-              <p:cNvSpPr>
-                <a:spLocks noGrp="1"/>
-              </p:cNvSpPr>
-              <p:nvPr>
-                <p:ph idx="1"/>
-              </p:nvPr>
-            </p:nvSpPr>
-            <p:spPr/>
-            <p:txBody>
-              <a:bodyPr/>
-              <a:lstStyle/>
-              <a:p>
-                <a:pPr lvl="0" indent="0" marL="0">
-                  <a:spcBef>
-                    <a:spcPts val="3000"/>
-                  </a:spcBef>
-                  <a:buNone/>
-                </a:pPr>
-                <a:r>
-                  <a:rPr b="1"/>
-                  <a:t>Aspects</a:t>
-                </a:r>
-              </a:p>
-              <a:p>
-                <a:pPr lvl="0"/>
-                <a:r>
-                  <a:rPr b="1"/>
-                  <a:t>Dimensions</a:t>
-                </a:r>
-              </a:p>
-              <a:p>
-                <a:pPr lvl="1"/>
-                <a:r>
-                  <a:rPr/>
-                  <a:t>Spatial</a:t>
-                </a:r>
-              </a:p>
-              <a:p>
-                <a:pPr lvl="1"/>
-                <a:r>
-                  <a:rPr/>
-                  <a:t>Temporal</a:t>
-                </a:r>
-              </a:p>
-              <a:p>
-                <a:pPr lvl="0"/>
-                <a:r>
-                  <a:rPr b="1"/>
-                  <a:t>Workload</a:t>
-                </a:r>
-                <a:r>
-                  <a:rPr/>
-                  <a:t>:</a:t>
-                </a:r>
-              </a:p>
-              <a:p>
-                <a:pPr lvl="1"/>
-                <a:r>
-                  <a:rPr/>
-                  <a:t>Operational</a:t>
-                </a:r>
-              </a:p>
-              <a:p>
-                <a:pPr lvl="1"/>
-                <a:r>
-                  <a:rPr/>
-                  <a:t>Analytical</a:t>
-                </a:r>
-              </a:p>
-              <a:p>
-                <a:pPr lvl="0" indent="0" marL="0">
-                  <a:spcBef>
-                    <a:spcPts val="3000"/>
-                  </a:spcBef>
-                  <a:buNone/>
-                </a:pPr>
-                <a:r>
-                  <a:rPr b="1"/>
-                  <a:t>From </a:t>
-                </a:r>
-                <a:r>
-                  <a:rPr b="1">
-                    <a:hlinkClick r:id="rId2"/>
-                  </a:rPr>
-                  <a:t>IoTAbench</a:t>
-                </a:r>
-              </a:p>
-              <a:p>
-                <a:pPr lvl="0"/>
-                <a:r>
-                  <a:rPr/>
-                  <a:t>Total readings: counts the total number of readings (i.e., rows) for the given time period.</a:t>
-                </a:r>
-              </a:p>
-              <a:p>
-                <a:pPr lvl="0"/>
-                <a:r>
-                  <a:rPr/>
-                  <a:t>Create a sorted list of the aggregate consumption in each ten minute interval in the given time period. -&gt; Create a sorted list of the average measurement (?) in each hour interval in the given time period.</a:t>
-                </a:r>
-              </a:p>
-              <a:p>
-                <a:pPr lvl="0"/>
-                <a:r>
-                  <a:rPr/>
-                  <a:t>Top consumers: create a list of the distinct consumers, sorted by their total (monthly) consumption. -&gt; Top agent: create a list of the distinct agents, sorted by their total (monthly) measurements.</a:t>
-                </a:r>
-              </a:p>
-              <a:p>
-                <a:pPr lvl="0"/>
-                <a:r>
-                  <a:rPr/>
-                  <a:t>Time of Usage Billing: calculate the monthly bill for each consumer based on the time of usage. -&gt; Time of Task: calculate the monthly time spent doing tasks for each agent.</a:t>
-                </a:r>
-              </a:p>
-              <a:p>
-                <a:pPr lvl="0" indent="0" marL="0">
-                  <a:spcBef>
-                    <a:spcPts val="3000"/>
-                  </a:spcBef>
-                  <a:buNone/>
-                </a:pPr>
-                <a:r>
-                  <a:rPr b="1"/>
-                  <a:t>From </a:t>
-                </a:r>
-                <a:r>
-                  <a:rPr b="1">
-                    <a:hlinkClick r:id="rId3"/>
-                  </a:rPr>
-                  <a:t>SmartBench</a:t>
-                </a:r>
-              </a:p>
-              <a:p>
-                <a:pPr lvl="0"/>
-                <a:r>
-                  <a:rPr/>
-                  <a:t>Coverage (s ∈ Sensors): returns the location of a given sensor s.</a:t>
-                </a:r>
-              </a:p>
-              <a:p>
-                <a:pPr lvl="0"/>
-                <a:r>
-                  <a:rPr/>
-                  <a:t>InverseCoverage(L, τ), where L is a list of locations, and τ is a sensor type: lists all sensors that can generate observations of a given type τ that can cover the locations specied in L.</a:t>
-                </a:r>
-              </a:p>
-              <a:p>
-                <a:pPr lvl="0"/>
-                <a:r>
-                  <a:rPr/>
-                  <a:t>Observations (S ∈ Sensors, </a:t>
-                </a:r>
-                <a14:m>
-                  <m:oMath xmlns:m="http://schemas.openxmlformats.org/officeDocument/2006/math">
-                    <m:sSub>
-                      <m:e>
-                        <m:r>
-                          <m:t>t</m:t>
-                        </m:r>
-                      </m:e>
-                      <m:sub>
-                        <m:r>
-                          <m:t>b</m:t>
-                        </m:r>
-                      </m:sub>
-                    </m:sSub>
-                  </m:oMath>
-                </a14:m>
-                <a:r>
-                  <a:rPr/>
-                  <a:t>, </a:t>
-                </a:r>
-                <a14:m>
-                  <m:oMath xmlns:m="http://schemas.openxmlformats.org/officeDocument/2006/math">
-                    <m:sSub>
-                      <m:e>
-                        <m:r>
-                          <m:t>t</m:t>
-                        </m:r>
-                      </m:e>
-                      <m:sub>
-                        <m:r>
-                          <m:t>e</m:t>
-                        </m:r>
-                      </m:sub>
-                    </m:sSub>
-                  </m:oMath>
-                </a14:m>
-                <a:r>
-                  <a:rPr/>
-                  <a:t>): selects observations from sensors in the list of sensors S during the time range [</a:t>
-                </a:r>
-                <a14:m>
-                  <m:oMath xmlns:m="http://schemas.openxmlformats.org/officeDocument/2006/math">
-                    <m:sSub>
-                      <m:e>
-                        <m:r>
-                          <m:t>t</m:t>
-                        </m:r>
-                      </m:e>
-                      <m:sub>
-                        <m:r>
-                          <m:t>b</m:t>
-                        </m:r>
-                      </m:sub>
-                    </m:sSub>
-                  </m:oMath>
-                </a14:m>
-                <a:r>
-                  <a:rPr/>
-                  <a:t>; </a:t>
-                </a:r>
-                <a14:m>
-                  <m:oMath xmlns:m="http://schemas.openxmlformats.org/officeDocument/2006/math">
-                    <m:sSub>
-                      <m:e>
-                        <m:r>
-                          <m:t>t</m:t>
-                        </m:r>
-                      </m:e>
-                      <m:sub>
-                        <m:r>
-                          <m:t>e</m:t>
-                        </m:r>
-                      </m:sub>
-                    </m:sSub>
-                  </m:oMath>
-                </a14:m>
-                <a:r>
-                  <a:rPr/>
-                  <a:t>].</a:t>
-                </a:r>
-              </a:p>
-              <a:p>
-                <a:pPr lvl="0"/>
-                <a:r>
-                  <a:rPr/>
-                  <a:t>C Observations (τ , cond, </a:t>
-                </a:r>
-                <a14:m>
-                  <m:oMath xmlns:m="http://schemas.openxmlformats.org/officeDocument/2006/math">
-                    <m:sSub>
-                      <m:e>
-                        <m:r>
-                          <m:t>t</m:t>
-                        </m:r>
-                      </m:e>
-                      <m:sub>
-                        <m:r>
-                          <m:t>b</m:t>
-                        </m:r>
-                      </m:sub>
-                    </m:sSub>
-                  </m:oMath>
-                </a14:m>
-                <a:r>
-                  <a:rPr/>
-                  <a:t>, </a:t>
-                </a:r>
-                <a14:m>
-                  <m:oMath xmlns:m="http://schemas.openxmlformats.org/officeDocument/2006/math">
-                    <m:sSub>
-                      <m:e>
-                        <m:r>
-                          <m:t>t</m:t>
-                        </m:r>
-                      </m:e>
-                      <m:sub>
-                        <m:r>
-                          <m:t>e</m:t>
-                        </m:r>
-                      </m:sub>
-                    </m:sSub>
-                  </m:oMath>
-                </a14:m>
-                <a:r>
-                  <a:rPr/>
-                  <a:t>): selects observations generated by sensors of given type τ in the time range [</a:t>
-                </a:r>
-                <a14:m>
-                  <m:oMath xmlns:m="http://schemas.openxmlformats.org/officeDocument/2006/math">
-                    <m:sSub>
-                      <m:e>
-                        <m:r>
-                          <m:t>t</m:t>
-                        </m:r>
-                      </m:e>
-                      <m:sub>
-                        <m:r>
-                          <m:t>b</m:t>
-                        </m:r>
-                      </m:sub>
-                    </m:sSub>
-                  </m:oMath>
-                </a14:m>
-                <a:r>
-                  <a:rPr/>
-                  <a:t>; </a:t>
-                </a:r>
-                <a14:m>
-                  <m:oMath xmlns:m="http://schemas.openxmlformats.org/officeDocument/2006/math">
-                    <m:sSub>
-                      <m:e>
-                        <m:r>
-                          <m:t>t</m:t>
-                        </m:r>
-                      </m:e>
-                      <m:sub>
-                        <m:r>
-                          <m:t>e</m:t>
-                        </m:r>
-                      </m:sub>
-                    </m:sSub>
-                  </m:oMath>
-                </a14:m>
-                <a:r>
-                  <a:rPr/>
-                  <a:t>] that satisfy the condition cond.</a:t>
-                </a:r>
-              </a:p>
-              <a:p>
-                <a:pPr lvl="0"/>
-                <a:r>
-                  <a:rPr/>
-                  <a:t>Statistics(S ⊆ Sensors, A, F, tb, te): retrieves statistics (e.g., average) based on functions specifed in F during the time range [</a:t>
-                </a:r>
-                <a14:m>
-                  <m:oMath xmlns:m="http://schemas.openxmlformats.org/officeDocument/2006/math">
-                    <m:sSub>
-                      <m:e>
-                        <m:r>
-                          <m:t>t</m:t>
-                        </m:r>
-                      </m:e>
-                      <m:sub>
-                        <m:r>
-                          <m:t>b</m:t>
-                        </m:r>
-                      </m:sub>
-                    </m:sSub>
-                  </m:oMath>
-                </a14:m>
-                <a:r>
-                  <a:rPr/>
-                  <a:t>; </a:t>
-                </a:r>
-                <a14:m>
-                  <m:oMath xmlns:m="http://schemas.openxmlformats.org/officeDocument/2006/math">
-                    <m:sSub>
-                      <m:e>
-                        <m:r>
-                          <m:t>t</m:t>
-                        </m:r>
-                      </m:e>
-                      <m:sub>
-                        <m:r>
-                          <m:t>e</m:t>
-                        </m:r>
-                      </m:sub>
-                    </m:sSub>
-                  </m:oMath>
-                </a14:m>
-                <a:r>
-                  <a:rPr/>
-                  <a:t>]. The statistics are generated by firstrst grouping the data by sensor, and further by the value of the attributes in the list A</a:t>
-                </a:r>
-              </a:p>
-              <a:p>
-                <a:pPr lvl="0"/>
-                <a:r>
-                  <a:rPr/>
-                  <a:t>Trajectories(</a:t>
-                </a:r>
-                <a14:m>
-                  <m:oMath xmlns:m="http://schemas.openxmlformats.org/officeDocument/2006/math">
-                    <m:sSub>
-                      <m:e>
-                        <m:r>
-                          <m:t>t</m:t>
-                        </m:r>
-                      </m:e>
-                      <m:sub>
-                        <m:r>
-                          <m:t>b</m:t>
-                        </m:r>
-                      </m:sub>
-                    </m:sSub>
-                  </m:oMath>
-                </a14:m>
-                <a:r>
-                  <a:rPr/>
-                  <a:t>, </a:t>
-                </a:r>
-                <a14:m>
-                  <m:oMath xmlns:m="http://schemas.openxmlformats.org/officeDocument/2006/math">
-                    <m:sSub>
-                      <m:e>
-                        <m:r>
-                          <m:t>t</m:t>
-                        </m:r>
-                      </m:e>
-                      <m:sub>
-                        <m:r>
-                          <m:t>e</m:t>
-                        </m:r>
-                      </m:sub>
-                    </m:sSub>
-                  </m:oMath>
-                </a14:m>
-                <a:r>
-                  <a:rPr/>
-                  <a:t>, </a:t>
-                </a:r>
-                <a14:m>
-                  <m:oMath xmlns:m="http://schemas.openxmlformats.org/officeDocument/2006/math">
-                    <m:sSub>
-                      <m:e>
-                        <m:r>
-                          <m:t>l</m:t>
-                        </m:r>
-                      </m:e>
-                      <m:sub>
-                        <m:r>
-                          <m:t>b</m:t>
-                        </m:r>
-                      </m:sub>
-                    </m:sSub>
-                  </m:oMath>
-                </a14:m>
-                <a:r>
-                  <a:rPr/>
-                  <a:t>, </a:t>
-                </a:r>
-                <a14:m>
-                  <m:oMath xmlns:m="http://schemas.openxmlformats.org/officeDocument/2006/math">
-                    <m:sSub>
-                      <m:e>
-                        <m:r>
-                          <m:t>l</m:t>
-                        </m:r>
-                      </m:e>
-                      <m:sub>
-                        <m:r>
-                          <m:t>e</m:t>
-                        </m:r>
-                      </m:sub>
-                    </m:sSub>
-                  </m:oMath>
-                </a14:m>
-                <a:r>
-                  <a:rPr/>
-                  <a:t>): retrieves the names of users who went from location </a:t>
-                </a:r>
-                <a14:m>
-                  <m:oMath xmlns:m="http://schemas.openxmlformats.org/officeDocument/2006/math">
-                    <m:sSub>
-                      <m:e>
-                        <m:r>
-                          <m:t>l</m:t>
-                        </m:r>
-                      </m:e>
-                      <m:sub>
-                        <m:r>
-                          <m:t>b</m:t>
-                        </m:r>
-                      </m:sub>
-                    </m:sSub>
-                  </m:oMath>
-                </a14:m>
-                <a:r>
-                  <a:rPr/>
-                  <a:t> to location </a:t>
-                </a:r>
-                <a14:m>
-                  <m:oMath xmlns:m="http://schemas.openxmlformats.org/officeDocument/2006/math">
-                    <m:sSub>
-                      <m:e>
-                        <m:r>
-                          <m:t>l</m:t>
-                        </m:r>
-                      </m:e>
-                      <m:sub>
-                        <m:r>
-                          <m:t>e</m:t>
-                        </m:r>
-                      </m:sub>
-                    </m:sSub>
-                  </m:oMath>
-                </a14:m>
-                <a:r>
-                  <a:rPr/>
-                  <a:t> during the time interval [</a:t>
-                </a:r>
-                <a14:m>
-                  <m:oMath xmlns:m="http://schemas.openxmlformats.org/officeDocument/2006/math">
-                    <m:sSub>
-                      <m:e>
-                        <m:r>
-                          <m:t>t</m:t>
-                        </m:r>
-                      </m:e>
-                      <m:sub>
-                        <m:r>
-                          <m:t>b</m:t>
-                        </m:r>
-                      </m:sub>
-                    </m:sSub>
-                  </m:oMath>
-                </a14:m>
-                <a:r>
-                  <a:rPr/>
-                  <a:t>; </a:t>
-                </a:r>
-                <a14:m>
-                  <m:oMath xmlns:m="http://schemas.openxmlformats.org/officeDocument/2006/math">
-                    <m:sSub>
-                      <m:e>
-                        <m:r>
-                          <m:t>t</m:t>
-                        </m:r>
-                      </m:e>
-                      <m:sub>
-                        <m:r>
-                          <m:t>e</m:t>
-                        </m:r>
-                      </m:sub>
-                    </m:sSub>
-                  </m:oMath>
-                </a14:m>
-                <a:r>
-                  <a:rPr/>
-                  <a:t>]</a:t>
-                </a:r>
-              </a:p>
-              <a:p>
-                <a:pPr lvl="0"/>
-                <a:r>
-                  <a:rPr/>
-                  <a:t>CoLocate(</a:t>
-                </a:r>
-                <a14:m>
-                  <m:oMath xmlns:m="http://schemas.openxmlformats.org/officeDocument/2006/math">
-                    <m:r>
-                      <m:t>u</m:t>
-                    </m:r>
-                  </m:oMath>
-                </a14:m>
-                <a:r>
-                  <a:rPr/>
-                  <a:t> ∈ Users, </a:t>
-                </a:r>
-                <a14:m>
-                  <m:oMath xmlns:m="http://schemas.openxmlformats.org/officeDocument/2006/math">
-                    <m:sSub>
-                      <m:e>
-                        <m:r>
-                          <m:t>t</m:t>
-                        </m:r>
-                      </m:e>
-                      <m:sub>
-                        <m:r>
-                          <m:t>b</m:t>
-                        </m:r>
-                      </m:sub>
-                    </m:sSub>
-                  </m:oMath>
-                </a14:m>
-                <a:r>
-                  <a:rPr/>
-                  <a:t>, </a:t>
-                </a:r>
-                <a14:m>
-                  <m:oMath xmlns:m="http://schemas.openxmlformats.org/officeDocument/2006/math">
-                    <m:sSub>
-                      <m:e>
-                        <m:r>
-                          <m:t>t</m:t>
-                        </m:r>
-                      </m:e>
-                      <m:sub>
-                        <m:r>
-                          <m:t>e</m:t>
-                        </m:r>
-                      </m:sub>
-                    </m:sSub>
-                  </m:oMath>
-                </a14:m>
-                <a:r>
-                  <a:rPr/>
-                  <a:t>): retrieves all users who were in the same Location as user </a:t>
-                </a:r>
-                <a14:m>
-                  <m:oMath xmlns:m="http://schemas.openxmlformats.org/officeDocument/2006/math">
-                    <m:r>
-                      <m:t>u</m:t>
-                    </m:r>
-                  </m:oMath>
-                </a14:m>
-                <a:r>
-                  <a:rPr/>
-                  <a:t> during the specifoed time period.</a:t>
-                </a:r>
-              </a:p>
-              <a:p>
-                <a:pPr lvl="0"/>
-                <a:r>
-                  <a:rPr/>
-                  <a:t>TimeSpent(</a:t>
-                </a:r>
-                <a14:m>
-                  <m:oMath xmlns:m="http://schemas.openxmlformats.org/officeDocument/2006/math">
-                    <m:r>
-                      <m:t>u</m:t>
-                    </m:r>
-                  </m:oMath>
-                </a14:m>
-                <a:r>
-                  <a:rPr/>
-                  <a:t> ∈ Users, η, tb, te): retrieves the average time spent per day by subject </a:t>
-                </a:r>
-                <a14:m>
-                  <m:oMath xmlns:m="http://schemas.openxmlformats.org/officeDocument/2006/math">
-                    <m:r>
-                      <m:t>u</m:t>
-                    </m:r>
-                  </m:oMath>
-                </a14:m>
-                <a:r>
-                  <a:rPr/>
-                  <a:t> in locations of type η,</a:t>
-                </a:r>
-              </a:p>
-              <a:p>
-                <a:pPr lvl="0"/>
-                <a:r>
-                  <a:rPr/>
-                  <a:t>Continuous Query(τ, α, β): retrieves, after every α seconds (hop size), the minimum, maximum, and average occupancy levels of locations of type τ in the last β seconds (window size).</a:t>
-                </a:r>
-              </a:p>
-              <a:p>
-                <a:pPr lvl="0" indent="0" marL="0">
-                  <a:spcBef>
-                    <a:spcPts val="3000"/>
-                  </a:spcBef>
-                  <a:buNone/>
-                </a:pPr>
-                <a:r>
-                  <a:rPr b="1"/>
-                  <a:t>Additional custom queries</a:t>
-                </a:r>
-              </a:p>
-              <a:p>
-                <a:pPr lvl="0"/>
-                <a:r>
-                  <a:rPr/>
-                  <a:t>Dati tutti gli agenti di un certo tipo in un certo environment, trovare tutte le misurazioni dal timestamp X al timestamp Y.</a:t>
-                </a:r>
-              </a:p>
-              <a:p>
-                <a:pPr lvl="0"/>
-                <a:r>
-                  <a:rPr/>
-                  <a:t>Dato un environment, trovare le rilevazioni di tutti i device dal timestamp X al timestamp Y</a:t>
-                </a:r>
-              </a:p>
-              <a:p>
-                <a:pPr lvl="0"/>
-                <a:r>
-                  <a:rPr/>
-                  <a:t>Dato un environment, dammi tutti i measurement dei device di un certo tipo che superano una data soglia.</a:t>
-                </a:r>
-              </a:p>
-              <a:p>
-                <a:pPr lvl="0"/>
-                <a:r>
-                  <a:rPr/>
-                  <a:t>Dato un poligono, trovare tutti gli agent che hanno fatto task all’interno del poligono</a:t>
-                </a:r>
-              </a:p>
-              <a:p>
-                <a:pPr lvl="0" indent="0" marL="0">
-                  <a:spcBef>
-                    <a:spcPts val="3000"/>
-                  </a:spcBef>
-                  <a:buNone/>
-                </a:pPr>
-                <a:r>
-                  <a:rPr b="1"/>
-                  <a:t>Final queries v.0.1</a:t>
-                </a:r>
-              </a:p>
-            </p:txBody>
-          </p:sp>
-        </mc:Choice>
-      </mc:AlternateContent>
+      <p:sp>
+        <p:nvSpPr>
+          <p:cNvPr id="3" name="Content Placeholder 2"/>
+          <p:cNvSpPr>
+            <a:spLocks noGrp="1"/>
+          </p:cNvSpPr>
+          <p:nvPr>
+            <p:ph idx="1"/>
+          </p:nvPr>
+        </p:nvSpPr>
+        <p:spPr/>
+        <p:txBody>
+          <a:bodyPr/>
+          <a:lstStyle/>
+          <a:p>
+            <a:pPr lvl="0" indent="0" marL="0">
+              <a:spcBef>
+                <a:spcPts val="3000"/>
+              </a:spcBef>
+              <a:buNone/>
+            </a:pPr>
+            <a:r>
+              <a:rPr b="1"/>
+              <a:t>Aspects</a:t>
+            </a:r>
+          </a:p>
+          <a:p>
+            <a:pPr lvl="0"/>
+            <a:r>
+              <a:rPr b="1"/>
+              <a:t>Dimensions</a:t>
+            </a:r>
+          </a:p>
+          <a:p>
+            <a:pPr lvl="1"/>
+            <a:r>
+              <a:rPr/>
+              <a:t>Spatial</a:t>
+            </a:r>
+          </a:p>
+          <a:p>
+            <a:pPr lvl="1"/>
+            <a:r>
+              <a:rPr/>
+              <a:t>Temporal</a:t>
+            </a:r>
+          </a:p>
+          <a:p>
+            <a:pPr lvl="0"/>
+            <a:r>
+              <a:rPr b="1"/>
+              <a:t>Workload</a:t>
+            </a:r>
+            <a:r>
+              <a:rPr/>
+              <a:t>:</a:t>
+            </a:r>
+          </a:p>
+          <a:p>
+            <a:pPr lvl="1"/>
+            <a:r>
+              <a:rPr/>
+              <a:t>Operational</a:t>
+            </a:r>
+          </a:p>
+          <a:p>
+            <a:pPr lvl="1"/>
+            <a:r>
+              <a:rPr/>
+              <a:t>Analytical</a:t>
+            </a:r>
+          </a:p>
+          <a:p>
+            <a:pPr lvl="0" indent="0" marL="0">
+              <a:spcBef>
+                <a:spcPts val="3000"/>
+              </a:spcBef>
+              <a:buNone/>
+            </a:pPr>
+            <a:r>
+              <a:rPr b="1"/>
+              <a:t>From </a:t>
+            </a:r>
+            <a:r>
+              <a:rPr b="1">
+                <a:hlinkClick r:id="rId2"/>
+              </a:rPr>
+              <a:t>IoTAbench</a:t>
+            </a:r>
+          </a:p>
+          <a:p>
+            <a:pPr lvl="0"/>
+            <a:r>
+              <a:rPr/>
+              <a:t>Total readings: counts the total number of readings (i.e., rows) for the given time period.</a:t>
+            </a:r>
+          </a:p>
+          <a:p>
+            <a:pPr lvl="0"/>
+            <a:r>
+              <a:rPr/>
+              <a:t>Create a sorted list of the aggregate consumption in each ten minute interval in the given time period. -&gt; Create a sorted list of the average measurement (?) in each hour interval in the given time period.</a:t>
+            </a:r>
+          </a:p>
+          <a:p>
+            <a:pPr lvl="0"/>
+            <a:r>
+              <a:rPr/>
+              <a:t>Top consumers: create a list of the distinct consumers, sorted by their total (monthly) consumption. -&gt; Top agent: create a list of the distinct agents, sorted by their total (monthly) measurements.</a:t>
+            </a:r>
+          </a:p>
+          <a:p>
+            <a:pPr lvl="0"/>
+            <a:r>
+              <a:rPr/>
+              <a:t>Time of Usage Billing: calculate the monthly bill for each consumer based on the time of usage. -&gt; Time of Task: calculate the monthly time spent doing tasks for each agent.</a:t>
+            </a:r>
+          </a:p>
+          <a:p>
+            <a:pPr lvl="0" indent="0" marL="0">
+              <a:spcBef>
+                <a:spcPts val="3000"/>
+              </a:spcBef>
+              <a:buNone/>
+            </a:pPr>
+            <a:r>
+              <a:rPr b="1"/>
+              <a:t>From </a:t>
+            </a:r>
+            <a:r>
+              <a:rPr b="1">
+                <a:hlinkClick r:id="rId3"/>
+              </a:rPr>
+              <a:t>SmartBench, VLDB</a:t>
+            </a:r>
+          </a:p>
+        </p:txBody>
+      </p:sp>
     </p:spTree>
   </p:cSld>
 </p:sld>
@@ -5999,6 +5438,688 @@
               <a:bodyPr/>
               <a:lstStyle/>
               <a:p>
+                <a:pPr lvl="0"/>
+                <a:r>
+                  <a:rPr/>
+                  <a:t>Coverage (s ∈ Sensors): returns the location of a given sensor s.</a:t>
+                </a:r>
+              </a:p>
+              <a:p>
+                <a:pPr lvl="0"/>
+                <a:r>
+                  <a:rPr/>
+                  <a:t>InverseCoverage(L, τ), where L is a list of locations, and τ is a sensor type: lists all sensors that can generate observations of a given type τ that can cover the locations specied in L.</a:t>
+                </a:r>
+              </a:p>
+              <a:p>
+                <a:pPr lvl="0"/>
+                <a:r>
+                  <a:rPr/>
+                  <a:t>Observations (S ∈ Sensors, </a:t>
+                </a:r>
+                <a14:m>
+                  <m:oMath xmlns:m="http://schemas.openxmlformats.org/officeDocument/2006/math">
+                    <m:sSub>
+                      <m:e>
+                        <m:r>
+                          <m:t>t</m:t>
+                        </m:r>
+                      </m:e>
+                      <m:sub>
+                        <m:r>
+                          <m:t>b</m:t>
+                        </m:r>
+                      </m:sub>
+                    </m:sSub>
+                  </m:oMath>
+                </a14:m>
+                <a:r>
+                  <a:rPr/>
+                  <a:t>, </a:t>
+                </a:r>
+                <a14:m>
+                  <m:oMath xmlns:m="http://schemas.openxmlformats.org/officeDocument/2006/math">
+                    <m:sSub>
+                      <m:e>
+                        <m:r>
+                          <m:t>t</m:t>
+                        </m:r>
+                      </m:e>
+                      <m:sub>
+                        <m:r>
+                          <m:t>e</m:t>
+                        </m:r>
+                      </m:sub>
+                    </m:sSub>
+                  </m:oMath>
+                </a14:m>
+                <a:r>
+                  <a:rPr/>
+                  <a:t>): selects observations from sensors in the list of sensors S during the time range [</a:t>
+                </a:r>
+                <a14:m>
+                  <m:oMath xmlns:m="http://schemas.openxmlformats.org/officeDocument/2006/math">
+                    <m:sSub>
+                      <m:e>
+                        <m:r>
+                          <m:t>t</m:t>
+                        </m:r>
+                      </m:e>
+                      <m:sub>
+                        <m:r>
+                          <m:t>b</m:t>
+                        </m:r>
+                      </m:sub>
+                    </m:sSub>
+                  </m:oMath>
+                </a14:m>
+                <a:r>
+                  <a:rPr/>
+                  <a:t>; </a:t>
+                </a:r>
+                <a14:m>
+                  <m:oMath xmlns:m="http://schemas.openxmlformats.org/officeDocument/2006/math">
+                    <m:sSub>
+                      <m:e>
+                        <m:r>
+                          <m:t>t</m:t>
+                        </m:r>
+                      </m:e>
+                      <m:sub>
+                        <m:r>
+                          <m:t>e</m:t>
+                        </m:r>
+                      </m:sub>
+                    </m:sSub>
+                  </m:oMath>
+                </a14:m>
+                <a:r>
+                  <a:rPr/>
+                  <a:t>].</a:t>
+                </a:r>
+              </a:p>
+              <a:p>
+                <a:pPr lvl="0"/>
+                <a:r>
+                  <a:rPr/>
+                  <a:t>C Observations (τ , cond, </a:t>
+                </a:r>
+                <a14:m>
+                  <m:oMath xmlns:m="http://schemas.openxmlformats.org/officeDocument/2006/math">
+                    <m:sSub>
+                      <m:e>
+                        <m:r>
+                          <m:t>t</m:t>
+                        </m:r>
+                      </m:e>
+                      <m:sub>
+                        <m:r>
+                          <m:t>b</m:t>
+                        </m:r>
+                      </m:sub>
+                    </m:sSub>
+                  </m:oMath>
+                </a14:m>
+                <a:r>
+                  <a:rPr/>
+                  <a:t>, </a:t>
+                </a:r>
+                <a14:m>
+                  <m:oMath xmlns:m="http://schemas.openxmlformats.org/officeDocument/2006/math">
+                    <m:sSub>
+                      <m:e>
+                        <m:r>
+                          <m:t>t</m:t>
+                        </m:r>
+                      </m:e>
+                      <m:sub>
+                        <m:r>
+                          <m:t>e</m:t>
+                        </m:r>
+                      </m:sub>
+                    </m:sSub>
+                  </m:oMath>
+                </a14:m>
+                <a:r>
+                  <a:rPr/>
+                  <a:t>): selects observations generated by sensors of given type τ in the time range [</a:t>
+                </a:r>
+                <a14:m>
+                  <m:oMath xmlns:m="http://schemas.openxmlformats.org/officeDocument/2006/math">
+                    <m:sSub>
+                      <m:e>
+                        <m:r>
+                          <m:t>t</m:t>
+                        </m:r>
+                      </m:e>
+                      <m:sub>
+                        <m:r>
+                          <m:t>b</m:t>
+                        </m:r>
+                      </m:sub>
+                    </m:sSub>
+                  </m:oMath>
+                </a14:m>
+                <a:r>
+                  <a:rPr/>
+                  <a:t>; </a:t>
+                </a:r>
+                <a14:m>
+                  <m:oMath xmlns:m="http://schemas.openxmlformats.org/officeDocument/2006/math">
+                    <m:sSub>
+                      <m:e>
+                        <m:r>
+                          <m:t>t</m:t>
+                        </m:r>
+                      </m:e>
+                      <m:sub>
+                        <m:r>
+                          <m:t>e</m:t>
+                        </m:r>
+                      </m:sub>
+                    </m:sSub>
+                  </m:oMath>
+                </a14:m>
+                <a:r>
+                  <a:rPr/>
+                  <a:t>] that satisfy the condition cond.</a:t>
+                </a:r>
+              </a:p>
+              <a:p>
+                <a:pPr lvl="0"/>
+                <a:r>
+                  <a:rPr/>
+                  <a:t>Statistics(S ⊆ Sensors, A, F, tb, te): retrieves statistics (e.g., average) based on functions specifed in F during the time range [</a:t>
+                </a:r>
+                <a14:m>
+                  <m:oMath xmlns:m="http://schemas.openxmlformats.org/officeDocument/2006/math">
+                    <m:sSub>
+                      <m:e>
+                        <m:r>
+                          <m:t>t</m:t>
+                        </m:r>
+                      </m:e>
+                      <m:sub>
+                        <m:r>
+                          <m:t>b</m:t>
+                        </m:r>
+                      </m:sub>
+                    </m:sSub>
+                  </m:oMath>
+                </a14:m>
+                <a:r>
+                  <a:rPr/>
+                  <a:t>; </a:t>
+                </a:r>
+                <a14:m>
+                  <m:oMath xmlns:m="http://schemas.openxmlformats.org/officeDocument/2006/math">
+                    <m:sSub>
+                      <m:e>
+                        <m:r>
+                          <m:t>t</m:t>
+                        </m:r>
+                      </m:e>
+                      <m:sub>
+                        <m:r>
+                          <m:t>e</m:t>
+                        </m:r>
+                      </m:sub>
+                    </m:sSub>
+                  </m:oMath>
+                </a14:m>
+                <a:r>
+                  <a:rPr/>
+                  <a:t>]. The statistics are generated by firstrst grouping the data by sensor, and further by the value of the attributes in the list A</a:t>
+                </a:r>
+              </a:p>
+              <a:p>
+                <a:pPr lvl="0"/>
+                <a:r>
+                  <a:rPr/>
+                  <a:t>Trajectories(</a:t>
+                </a:r>
+                <a14:m>
+                  <m:oMath xmlns:m="http://schemas.openxmlformats.org/officeDocument/2006/math">
+                    <m:sSub>
+                      <m:e>
+                        <m:r>
+                          <m:t>t</m:t>
+                        </m:r>
+                      </m:e>
+                      <m:sub>
+                        <m:r>
+                          <m:t>b</m:t>
+                        </m:r>
+                      </m:sub>
+                    </m:sSub>
+                  </m:oMath>
+                </a14:m>
+                <a:r>
+                  <a:rPr/>
+                  <a:t>, </a:t>
+                </a:r>
+                <a14:m>
+                  <m:oMath xmlns:m="http://schemas.openxmlformats.org/officeDocument/2006/math">
+                    <m:sSub>
+                      <m:e>
+                        <m:r>
+                          <m:t>t</m:t>
+                        </m:r>
+                      </m:e>
+                      <m:sub>
+                        <m:r>
+                          <m:t>e</m:t>
+                        </m:r>
+                      </m:sub>
+                    </m:sSub>
+                  </m:oMath>
+                </a14:m>
+                <a:r>
+                  <a:rPr/>
+                  <a:t>, </a:t>
+                </a:r>
+                <a14:m>
+                  <m:oMath xmlns:m="http://schemas.openxmlformats.org/officeDocument/2006/math">
+                    <m:sSub>
+                      <m:e>
+                        <m:r>
+                          <m:t>l</m:t>
+                        </m:r>
+                      </m:e>
+                      <m:sub>
+                        <m:r>
+                          <m:t>b</m:t>
+                        </m:r>
+                      </m:sub>
+                    </m:sSub>
+                  </m:oMath>
+                </a14:m>
+                <a:r>
+                  <a:rPr/>
+                  <a:t>, </a:t>
+                </a:r>
+                <a14:m>
+                  <m:oMath xmlns:m="http://schemas.openxmlformats.org/officeDocument/2006/math">
+                    <m:sSub>
+                      <m:e>
+                        <m:r>
+                          <m:t>l</m:t>
+                        </m:r>
+                      </m:e>
+                      <m:sub>
+                        <m:r>
+                          <m:t>e</m:t>
+                        </m:r>
+                      </m:sub>
+                    </m:sSub>
+                  </m:oMath>
+                </a14:m>
+                <a:r>
+                  <a:rPr/>
+                  <a:t>): retrieves the names of users who went from location </a:t>
+                </a:r>
+                <a14:m>
+                  <m:oMath xmlns:m="http://schemas.openxmlformats.org/officeDocument/2006/math">
+                    <m:sSub>
+                      <m:e>
+                        <m:r>
+                          <m:t>l</m:t>
+                        </m:r>
+                      </m:e>
+                      <m:sub>
+                        <m:r>
+                          <m:t>b</m:t>
+                        </m:r>
+                      </m:sub>
+                    </m:sSub>
+                  </m:oMath>
+                </a14:m>
+                <a:r>
+                  <a:rPr/>
+                  <a:t> to location </a:t>
+                </a:r>
+                <a14:m>
+                  <m:oMath xmlns:m="http://schemas.openxmlformats.org/officeDocument/2006/math">
+                    <m:sSub>
+                      <m:e>
+                        <m:r>
+                          <m:t>l</m:t>
+                        </m:r>
+                      </m:e>
+                      <m:sub>
+                        <m:r>
+                          <m:t>e</m:t>
+                        </m:r>
+                      </m:sub>
+                    </m:sSub>
+                  </m:oMath>
+                </a14:m>
+                <a:r>
+                  <a:rPr/>
+                  <a:t> during the time interval [</a:t>
+                </a:r>
+                <a14:m>
+                  <m:oMath xmlns:m="http://schemas.openxmlformats.org/officeDocument/2006/math">
+                    <m:sSub>
+                      <m:e>
+                        <m:r>
+                          <m:t>t</m:t>
+                        </m:r>
+                      </m:e>
+                      <m:sub>
+                        <m:r>
+                          <m:t>b</m:t>
+                        </m:r>
+                      </m:sub>
+                    </m:sSub>
+                  </m:oMath>
+                </a14:m>
+                <a:r>
+                  <a:rPr/>
+                  <a:t>; </a:t>
+                </a:r>
+                <a14:m>
+                  <m:oMath xmlns:m="http://schemas.openxmlformats.org/officeDocument/2006/math">
+                    <m:sSub>
+                      <m:e>
+                        <m:r>
+                          <m:t>t</m:t>
+                        </m:r>
+                      </m:e>
+                      <m:sub>
+                        <m:r>
+                          <m:t>e</m:t>
+                        </m:r>
+                      </m:sub>
+                    </m:sSub>
+                  </m:oMath>
+                </a14:m>
+                <a:r>
+                  <a:rPr/>
+                  <a:t>]</a:t>
+                </a:r>
+              </a:p>
+              <a:p>
+                <a:pPr lvl="0"/>
+                <a:r>
+                  <a:rPr/>
+                  <a:t>CoLocate(</a:t>
+                </a:r>
+                <a14:m>
+                  <m:oMath xmlns:m="http://schemas.openxmlformats.org/officeDocument/2006/math">
+                    <m:r>
+                      <m:t>u</m:t>
+                    </m:r>
+                  </m:oMath>
+                </a14:m>
+                <a:r>
+                  <a:rPr/>
+                  <a:t> ∈ Users, </a:t>
+                </a:r>
+                <a14:m>
+                  <m:oMath xmlns:m="http://schemas.openxmlformats.org/officeDocument/2006/math">
+                    <m:sSub>
+                      <m:e>
+                        <m:r>
+                          <m:t>t</m:t>
+                        </m:r>
+                      </m:e>
+                      <m:sub>
+                        <m:r>
+                          <m:t>b</m:t>
+                        </m:r>
+                      </m:sub>
+                    </m:sSub>
+                  </m:oMath>
+                </a14:m>
+                <a:r>
+                  <a:rPr/>
+                  <a:t>, </a:t>
+                </a:r>
+                <a14:m>
+                  <m:oMath xmlns:m="http://schemas.openxmlformats.org/officeDocument/2006/math">
+                    <m:sSub>
+                      <m:e>
+                        <m:r>
+                          <m:t>t</m:t>
+                        </m:r>
+                      </m:e>
+                      <m:sub>
+                        <m:r>
+                          <m:t>e</m:t>
+                        </m:r>
+                      </m:sub>
+                    </m:sSub>
+                  </m:oMath>
+                </a14:m>
+                <a:r>
+                  <a:rPr/>
+                  <a:t>): retrieves all users who were in the same Location as user </a:t>
+                </a:r>
+                <a14:m>
+                  <m:oMath xmlns:m="http://schemas.openxmlformats.org/officeDocument/2006/math">
+                    <m:r>
+                      <m:t>u</m:t>
+                    </m:r>
+                  </m:oMath>
+                </a14:m>
+                <a:r>
+                  <a:rPr/>
+                  <a:t> during the specifoed time period.</a:t>
+                </a:r>
+              </a:p>
+              <a:p>
+                <a:pPr lvl="0"/>
+                <a:r>
+                  <a:rPr/>
+                  <a:t>TimeSpent(</a:t>
+                </a:r>
+                <a14:m>
+                  <m:oMath xmlns:m="http://schemas.openxmlformats.org/officeDocument/2006/math">
+                    <m:r>
+                      <m:t>u</m:t>
+                    </m:r>
+                  </m:oMath>
+                </a14:m>
+                <a:r>
+                  <a:rPr/>
+                  <a:t> ∈ Users, η, tb, te): retrieves the average time spent per day by subject </a:t>
+                </a:r>
+                <a14:m>
+                  <m:oMath xmlns:m="http://schemas.openxmlformats.org/officeDocument/2006/math">
+                    <m:r>
+                      <m:t>u</m:t>
+                    </m:r>
+                  </m:oMath>
+                </a14:m>
+                <a:r>
+                  <a:rPr/>
+                  <a:t> in locations of type η,</a:t>
+                </a:r>
+              </a:p>
+              <a:p>
+                <a:pPr lvl="0"/>
+                <a:r>
+                  <a:rPr/>
+                  <a:t>Continuous Query(τ, α, β): retrieves, after every α seconds (hop size), the minimum, maximum, and average occupancy levels of locations of type τ in the last β seconds (window size).</a:t>
+                </a:r>
+              </a:p>
+            </p:txBody>
+          </p:sp>
+        </mc:Choice>
+      </mc:AlternateContent>
+      <p:sp>
+        <p:nvSpPr>
+          <p:cNvPr id="4" name="Content Placeholder 3"/>
+          <p:cNvSpPr>
+            <a:spLocks noGrp="1"/>
+          </p:cNvSpPr>
+          <p:nvPr>
+            <p:ph idx="2" sz="half"/>
+          </p:nvPr>
+        </p:nvSpPr>
+        <p:spPr/>
+        <p:txBody>
+          <a:bodyPr/>
+          <a:lstStyle/>
+          <a:p>
+            <a:pPr lvl="0" indent="0" marL="1270000">
+              <a:buNone/>
+            </a:pPr>
+            <a:r>
+              <a:rPr sz="2000" b="1"/>
+              <a:t>Optimal blueprint</a:t>
+            </a:r>
+          </a:p>
+          <a:p>
+            <a:pPr lvl="0" indent="0" marL="1270000">
+              <a:buNone/>
+            </a:pPr>
+            <a:r>
+              <a:rPr sz="2000"/>
+              <a:t>SmartBench data model</a:t>
+            </a:r>
+          </a:p>
+          <a:p>
+            <a:pPr lvl="0" indent="0" marL="1270000">
+              <a:buNone/>
+            </a:pPr>
+            <a:r>
+              <a:rPr sz="2000"/>
+              <a:t>SmartBench data model</a:t>
+            </a:r>
+          </a:p>
+        </p:txBody>
+      </p:sp>
+    </p:spTree>
+  </p:cSld>
+</p:sld>
+</file>
+
+<file path=ppt/slides/slide27.xml><?xml version="1.0" encoding="utf-8"?>
+<p:sld xmlns:a="http://schemas.openxmlformats.org/drawingml/2006/main" xmlns:r="http://schemas.openxmlformats.org/officeDocument/2006/relationships" xmlns:p="http://schemas.openxmlformats.org/presentationml/2006/main">
+  <p:cSld>
+    <p:spTree>
+      <p:nvGrpSpPr>
+        <p:cNvPr id="1" name=""/>
+        <p:cNvGrpSpPr/>
+        <p:nvPr/>
+      </p:nvGrpSpPr>
+      <p:grpSpPr>
+        <a:xfrm>
+          <a:off x="0" y="0"/>
+          <a:ext cx="0" cy="0"/>
+          <a:chOff x="0" y="0"/>
+          <a:chExt cx="0" cy="0"/>
+        </a:xfrm>
+      </p:grpSpPr>
+      <p:sp>
+        <p:nvSpPr>
+          <p:cNvPr id="3" name="Content Placeholder 2"/>
+          <p:cNvSpPr>
+            <a:spLocks noGrp="1"/>
+          </p:cNvSpPr>
+          <p:nvPr>
+            <p:ph idx="1"/>
+          </p:nvPr>
+        </p:nvSpPr>
+        <p:spPr/>
+        <p:txBody>
+          <a:bodyPr/>
+          <a:lstStyle/>
+          <a:p>
+            <a:pPr lvl="0" indent="0" marL="0">
+              <a:spcBef>
+                <a:spcPts val="3000"/>
+              </a:spcBef>
+              <a:buNone/>
+            </a:pPr>
+            <a:r>
+              <a:rPr b="1"/>
+              <a:t>Additional custom queries</a:t>
+            </a:r>
+          </a:p>
+          <a:p>
+            <a:pPr lvl="0"/>
+            <a:r>
+              <a:rPr/>
+              <a:t>Dati tutti gli agenti di un certo tipo in un certo environment, trovare tutte le misurazioni dal timestamp X al timestamp Y.</a:t>
+            </a:r>
+          </a:p>
+          <a:p>
+            <a:pPr lvl="0"/>
+            <a:r>
+              <a:rPr/>
+              <a:t>Dato un environment, trovare le rilevazioni di tutti i device dal timestamp X al timestamp Y</a:t>
+            </a:r>
+          </a:p>
+          <a:p>
+            <a:pPr lvl="0"/>
+            <a:r>
+              <a:rPr/>
+              <a:t>Dato un environment, dammi tutti i measurement dei device di un certo tipo che superano una data soglia.</a:t>
+            </a:r>
+          </a:p>
+          <a:p>
+            <a:pPr lvl="0"/>
+            <a:r>
+              <a:rPr/>
+              <a:t>Dato un poligono, trovare tutti gli agent che hanno fatto task all’interno del poligono</a:t>
+            </a:r>
+          </a:p>
+          <a:p>
+            <a:pPr lvl="0" indent="0" marL="0">
+              <a:spcBef>
+                <a:spcPts val="3000"/>
+              </a:spcBef>
+              <a:buNone/>
+            </a:pPr>
+            <a:r>
+              <a:rPr b="1"/>
+              <a:t>Final queries v.0.1</a:t>
+            </a:r>
+          </a:p>
+        </p:txBody>
+      </p:sp>
+    </p:spTree>
+  </p:cSld>
+</p:sld>
+</file>
+
+<file path=ppt/slides/slide28.xml><?xml version="1.0" encoding="utf-8"?>
+<p:sld xmlns:a="http://schemas.openxmlformats.org/drawingml/2006/main" xmlns:r="http://schemas.openxmlformats.org/officeDocument/2006/relationships" xmlns:p="http://schemas.openxmlformats.org/presentationml/2006/main">
+  <p:cSld>
+    <p:spTree>
+      <p:nvGrpSpPr>
+        <p:cNvPr id="1" name=""/>
+        <p:cNvGrpSpPr/>
+        <p:nvPr/>
+      </p:nvGrpSpPr>
+      <p:grpSpPr>
+        <a:xfrm>
+          <a:off x="0" y="0"/>
+          <a:ext cx="0" cy="0"/>
+          <a:chOff x="0" y="0"/>
+          <a:chExt cx="0" cy="0"/>
+        </a:xfrm>
+      </p:grpSpPr>
+      <mc:AlternateContent xmlns:mc="http://schemas.openxmlformats.org/markup-compatibility/2006">
+        <mc:Choice xmlns:a14="http://schemas.microsoft.com/office/drawing/2010/main" Requires="a14">
+          <p:sp>
+            <p:nvSpPr>
+              <p:cNvPr id="3" name="Content Placeholder 2"/>
+              <p:cNvSpPr>
+                <a:spLocks noGrp="1"/>
+              </p:cNvSpPr>
+              <p:nvPr>
+                <p:ph idx="1" sz="half"/>
+              </p:nvPr>
+            </p:nvSpPr>
+            <p:spPr/>
+            <p:txBody>
+              <a:bodyPr/>
+              <a:lstStyle/>
+              <a:p>
                 <a:pPr lvl="0" indent="0" marL="0">
                   <a:buNone/>
                 </a:pPr>
@@ -6930,7 +7051,7 @@
 </p:sld>
 </file>
 
-<file path=ppt/slides/slide27.xml><?xml version="1.0" encoding="utf-8"?>
+<file path=ppt/slides/slide29.xml><?xml version="1.0" encoding="utf-8"?>
 <p:sld xmlns:a="http://schemas.openxmlformats.org/drawingml/2006/main" xmlns:r="http://schemas.openxmlformats.org/officeDocument/2006/relationships" xmlns:p="http://schemas.openxmlformats.org/presentationml/2006/main">
   <p:cSld>
     <p:spTree>
@@ -7025,7 +7146,158 @@
 </p:sld>
 </file>
 
-<file path=ppt/slides/slide28.xml><?xml version="1.0" encoding="utf-8"?>
+<file path=ppt/slides/slide3.xml><?xml version="1.0" encoding="utf-8"?>
+<p:sld xmlns:a="http://schemas.openxmlformats.org/drawingml/2006/main" xmlns:r="http://schemas.openxmlformats.org/officeDocument/2006/relationships" xmlns:p="http://schemas.openxmlformats.org/presentationml/2006/main">
+  <p:cSld>
+    <p:spTree>
+      <p:nvGrpSpPr>
+        <p:cNvPr id="1" name=""/>
+        <p:cNvGrpSpPr/>
+        <p:nvPr/>
+      </p:nvGrpSpPr>
+      <p:grpSpPr>
+        <a:xfrm>
+          <a:off x="0" y="0"/>
+          <a:ext cx="0" cy="0"/>
+          <a:chOff x="0" y="0"/>
+          <a:chExt cx="0" cy="0"/>
+        </a:xfrm>
+      </p:grpSpPr>
+      <p:sp>
+        <p:nvSpPr>
+          <p:cNvPr id="2" name="Title 1"/>
+          <p:cNvSpPr>
+            <a:spLocks noGrp="1"/>
+          </p:cNvSpPr>
+          <p:nvPr>
+            <p:ph type="title"/>
+          </p:nvPr>
+        </p:nvSpPr>
+        <p:spPr/>
+        <p:txBody>
+          <a:bodyPr/>
+          <a:lstStyle/>
+          <a:p>
+            <a:pPr lvl="0" indent="0" marL="0">
+              <a:buNone/>
+            </a:pPr>
+            <a:r>
+              <a:rPr/>
+              <a:t>DT in literature - #1</a:t>
+            </a:r>
+          </a:p>
+        </p:txBody>
+      </p:sp>
+      <p:sp>
+        <p:nvSpPr>
+          <p:cNvPr id="3" name="Content Placeholder 2"/>
+          <p:cNvSpPr>
+            <a:spLocks noGrp="1"/>
+          </p:cNvSpPr>
+          <p:nvPr>
+            <p:ph idx="1" sz="half"/>
+          </p:nvPr>
+        </p:nvSpPr>
+        <p:spPr/>
+        <p:txBody>
+          <a:bodyPr/>
+          <a:lstStyle/>
+          <a:p>
+            <a:pPr lvl="0"/>
+            <a:r>
+              <a:rPr/>
+              <a:t>Still a buzzword</a:t>
+            </a:r>
+          </a:p>
+          <a:p>
+            <a:pPr lvl="0"/>
+            <a:r>
+              <a:rPr/>
+              <a:t>Rising number of publications</a:t>
+            </a:r>
+          </a:p>
+          <a:p>
+            <a:pPr lvl="0"/>
+            <a:r>
+              <a:rPr/>
+              <a:t>Mostly non IT papers</a:t>
+            </a:r>
+          </a:p>
+          <a:p>
+            <a:pPr lvl="0"/>
+            <a:r>
+              <a:rPr/>
+              <a:t>Not really twins…</a:t>
+            </a:r>
+          </a:p>
+        </p:txBody>
+      </p:sp>
+      <p:pic>
+        <p:nvPicPr>
+          <p:cNvPr descr="https://github.com/ManuelePasini/slides-markdown/blob/master/slides/images/dt/dt_by_year.png?raw=true" id="0" name="Picture 1"/>
+          <p:cNvPicPr>
+            <a:picLocks noGrp="1" noChangeAspect="1"/>
+          </p:cNvPicPr>
+          <p:nvPr/>
+        </p:nvPicPr>
+        <p:blipFill>
+          <a:blip r:embed="rId2"/>
+          <a:stretch>
+            <a:fillRect/>
+          </a:stretch>
+        </p:blipFill>
+        <p:spPr bwMode="auto">
+          <a:xfrm>
+            <a:off x="4648200" y="1676400"/>
+            <a:ext cx="4038600" cy="1905000"/>
+          </a:xfrm>
+          <a:prstGeom prst="rect">
+            <a:avLst/>
+          </a:prstGeom>
+          <a:noFill/>
+          <a:ln w="9525">
+            <a:noFill/>
+            <a:headEnd/>
+            <a:tailEnd/>
+          </a:ln>
+        </p:spPr>
+      </p:pic>
+      <p:sp>
+        <p:nvSpPr>
+          <p:cNvPr id="1" name="TextBox 3"/>
+          <p:cNvSpPr txBox="1"/>
+          <p:nvPr/>
+        </p:nvSpPr>
+        <p:spPr>
+          <a:xfrm>
+            <a:off x="4648200" y="4076700"/>
+            <a:ext cx="4038600" cy="508000"/>
+          </a:xfrm>
+          <a:prstGeom prst="rect">
+            <a:avLst/>
+          </a:prstGeom>
+          <a:noFill/>
+        </p:spPr>
+        <p:txBody>
+          <a:bodyPr/>
+          <a:lstStyle/>
+          <a:p>
+            <a:pPr lvl="0" indent="0" marL="0" algn="ctr">
+              <a:buNone/>
+            </a:pPr>
+            <a:r>
+              <a:rPr/>
+              <a:t>DT by year (Fei, Tao 2022)</a:t>
+            </a:r>
+          </a:p>
+        </p:txBody>
+      </p:sp>
+    </p:spTree>
+  </p:cSld>
+</p:sld>
+</file>
+
+<file path=ppt/slides/slide30.xml><?xml version="1.0" encoding="utf-8"?>
 <p:sld xmlns:a="http://schemas.openxmlformats.org/drawingml/2006/main" xmlns:r="http://schemas.openxmlformats.org/officeDocument/2006/relationships" xmlns:p="http://schemas.openxmlformats.org/presentationml/2006/main">
   <p:cSld>
     <p:spTree>
@@ -7323,7 +7595,7 @@
 </p:sld>
 </file>
 
-<file path=ppt/slides/slide29.xml><?xml version="1.0" encoding="utf-8"?>
+<file path=ppt/slides/slide31.xml><?xml version="1.0" encoding="utf-8"?>
 <p:sld xmlns:a="http://schemas.openxmlformats.org/drawingml/2006/main" xmlns:r="http://schemas.openxmlformats.org/officeDocument/2006/relationships" xmlns:p="http://schemas.openxmlformats.org/presentationml/2006/main">
   <p:cSld>
     <p:spTree>
@@ -7629,157 +7901,6 @@
         MATCH (V)-[R]-(V2)
         RETURN V,R,V2
 $$) as (V agtype, R agtype, V2 agtype);</a:t>
-            </a:r>
-          </a:p>
-        </p:txBody>
-      </p:sp>
-    </p:spTree>
-  </p:cSld>
-</p:sld>
-</file>
-
-<file path=ppt/slides/slide3.xml><?xml version="1.0" encoding="utf-8"?>
-<p:sld xmlns:a="http://schemas.openxmlformats.org/drawingml/2006/main" xmlns:r="http://schemas.openxmlformats.org/officeDocument/2006/relationships" xmlns:p="http://schemas.openxmlformats.org/presentationml/2006/main">
-  <p:cSld>
-    <p:spTree>
-      <p:nvGrpSpPr>
-        <p:cNvPr id="1" name=""/>
-        <p:cNvGrpSpPr/>
-        <p:nvPr/>
-      </p:nvGrpSpPr>
-      <p:grpSpPr>
-        <a:xfrm>
-          <a:off x="0" y="0"/>
-          <a:ext cx="0" cy="0"/>
-          <a:chOff x="0" y="0"/>
-          <a:chExt cx="0" cy="0"/>
-        </a:xfrm>
-      </p:grpSpPr>
-      <p:sp>
-        <p:nvSpPr>
-          <p:cNvPr id="2" name="Title 1"/>
-          <p:cNvSpPr>
-            <a:spLocks noGrp="1"/>
-          </p:cNvSpPr>
-          <p:nvPr>
-            <p:ph type="title"/>
-          </p:nvPr>
-        </p:nvSpPr>
-        <p:spPr/>
-        <p:txBody>
-          <a:bodyPr/>
-          <a:lstStyle/>
-          <a:p>
-            <a:pPr lvl="0" indent="0" marL="0">
-              <a:buNone/>
-            </a:pPr>
-            <a:r>
-              <a:rPr/>
-              <a:t>DT in literature - #1</a:t>
-            </a:r>
-          </a:p>
-        </p:txBody>
-      </p:sp>
-      <p:sp>
-        <p:nvSpPr>
-          <p:cNvPr id="3" name="Content Placeholder 2"/>
-          <p:cNvSpPr>
-            <a:spLocks noGrp="1"/>
-          </p:cNvSpPr>
-          <p:nvPr>
-            <p:ph idx="1" sz="half"/>
-          </p:nvPr>
-        </p:nvSpPr>
-        <p:spPr/>
-        <p:txBody>
-          <a:bodyPr/>
-          <a:lstStyle/>
-          <a:p>
-            <a:pPr lvl="0"/>
-            <a:r>
-              <a:rPr/>
-              <a:t>Still a buzzword</a:t>
-            </a:r>
-          </a:p>
-          <a:p>
-            <a:pPr lvl="0"/>
-            <a:r>
-              <a:rPr/>
-              <a:t>Rising number of publications</a:t>
-            </a:r>
-          </a:p>
-          <a:p>
-            <a:pPr lvl="0"/>
-            <a:r>
-              <a:rPr/>
-              <a:t>Mostly non IT papers</a:t>
-            </a:r>
-          </a:p>
-          <a:p>
-            <a:pPr lvl="0"/>
-            <a:r>
-              <a:rPr/>
-              <a:t>Not really twins…</a:t>
-            </a:r>
-          </a:p>
-        </p:txBody>
-      </p:sp>
-      <p:pic>
-        <p:nvPicPr>
-          <p:cNvPr descr="https://github.com/ManuelePasini/slides-markdown/blob/master/slides/images/dt/dt_by_year.png?raw=true" id="0" name="Picture 1"/>
-          <p:cNvPicPr>
-            <a:picLocks noGrp="1" noChangeAspect="1"/>
-          </p:cNvPicPr>
-          <p:nvPr/>
-        </p:nvPicPr>
-        <p:blipFill>
-          <a:blip r:embed="rId2"/>
-          <a:stretch>
-            <a:fillRect/>
-          </a:stretch>
-        </p:blipFill>
-        <p:spPr bwMode="auto">
-          <a:xfrm>
-            <a:off x="4648200" y="1676400"/>
-            <a:ext cx="4038600" cy="1905000"/>
-          </a:xfrm>
-          <a:prstGeom prst="rect">
-            <a:avLst/>
-          </a:prstGeom>
-          <a:noFill/>
-          <a:ln w="9525">
-            <a:noFill/>
-            <a:headEnd/>
-            <a:tailEnd/>
-          </a:ln>
-        </p:spPr>
-      </p:pic>
-      <p:sp>
-        <p:nvSpPr>
-          <p:cNvPr id="1" name="TextBox 3"/>
-          <p:cNvSpPr txBox="1"/>
-          <p:nvPr/>
-        </p:nvSpPr>
-        <p:spPr>
-          <a:xfrm>
-            <a:off x="4648200" y="4076700"/>
-            <a:ext cx="4038600" cy="508000"/>
-          </a:xfrm>
-          <a:prstGeom prst="rect">
-            <a:avLst/>
-          </a:prstGeom>
-          <a:noFill/>
-        </p:spPr>
-        <p:txBody>
-          <a:bodyPr/>
-          <a:lstStyle/>
-          <a:p>
-            <a:pPr lvl="0" indent="0" marL="0" algn="ctr">
-              <a:buNone/>
-            </a:pPr>
-            <a:r>
-              <a:rPr/>
-              <a:t>DT by year (Fei, Tao 2022)</a:t>
             </a:r>
           </a:p>
         </p:txBody>

</xml_diff>

<commit_message>
Deploying to gh-pages from @ ManuelePasini/slides-markdown@f061b098125fb1bb343cf11b6922723eefed9301 🚀
</commit_message>
<xml_diff>
--- a/digital_twins.pptx
+++ b/digital_twins.pptx
@@ -5948,44 +5948,61 @@
           </p:sp>
         </mc:Choice>
       </mc:AlternateContent>
-      <p:sp>
-        <p:nvSpPr>
-          <p:cNvPr id="4" name="Content Placeholder 3"/>
-          <p:cNvSpPr>
-            <a:spLocks noGrp="1"/>
-          </p:cNvSpPr>
-          <p:nvPr>
-            <p:ph idx="2" sz="half"/>
-          </p:nvPr>
-        </p:nvSpPr>
-        <p:spPr/>
-        <p:txBody>
-          <a:bodyPr/>
-          <a:lstStyle/>
-          <a:p>
-            <a:pPr lvl="0" indent="0" marL="1270000">
+      <p:pic>
+        <p:nvPicPr>
+          <p:cNvPr descr="https://github.com/ManuelePasini/slides-markdown/blob/master/slides/images/dt/data_model/smartbench.png?raw=true" id="0" name="Picture 1"/>
+          <p:cNvPicPr>
+            <a:picLocks noGrp="1" noChangeAspect="1"/>
+          </p:cNvPicPr>
+          <p:nvPr/>
+        </p:nvPicPr>
+        <p:blipFill>
+          <a:blip r:embed="rId2"/>
+          <a:stretch>
+            <a:fillRect/>
+          </a:stretch>
+        </p:blipFill>
+        <p:spPr bwMode="auto">
+          <a:xfrm>
+            <a:off x="5537200" y="1193800"/>
+            <a:ext cx="2260600" cy="2882900"/>
+          </a:xfrm>
+          <a:prstGeom prst="rect">
+            <a:avLst/>
+          </a:prstGeom>
+          <a:noFill/>
+          <a:ln w="9525">
+            <a:noFill/>
+            <a:headEnd/>
+            <a:tailEnd/>
+          </a:ln>
+        </p:spPr>
+      </p:pic>
+      <p:sp>
+        <p:nvSpPr>
+          <p:cNvPr id="1" name="TextBox 3"/>
+          <p:cNvSpPr txBox="1"/>
+          <p:nvPr/>
+        </p:nvSpPr>
+        <p:spPr>
+          <a:xfrm>
+            <a:off x="4648200" y="4076700"/>
+            <a:ext cx="4038600" cy="508000"/>
+          </a:xfrm>
+          <a:prstGeom prst="rect">
+            <a:avLst/>
+          </a:prstGeom>
+          <a:noFill/>
+        </p:spPr>
+        <p:txBody>
+          <a:bodyPr/>
+          <a:lstStyle/>
+          <a:p>
+            <a:pPr lvl="0" indent="0" marL="0" algn="ctr">
               <a:buNone/>
             </a:pPr>
             <a:r>
-              <a:rPr sz="2000" b="1"/>
-              <a:t>Optimal blueprint</a:t>
-            </a:r>
-          </a:p>
-          <a:p>
-            <a:pPr lvl="0" indent="0" marL="1270000">
-              <a:buNone/>
-            </a:pPr>
-            <a:r>
-              <a:rPr sz="2000"/>
-              <a:t>SmartBench data model</a:t>
-            </a:r>
-          </a:p>
-          <a:p>
-            <a:pPr lvl="0" indent="0" marL="1270000">
-              <a:buNone/>
-            </a:pPr>
-            <a:r>
-              <a:rPr sz="2000"/>
+              <a:rPr/>
               <a:t>SmartBench data model</a:t>
             </a:r>
           </a:p>

</xml_diff>

<commit_message>
Deploying to gh-pages from @ ManuelePasini/slides-markdown@ffa8c48816d4f74d8eb290d3a7ec2d3bfae6df87 🚀
</commit_message>
<xml_diff>
--- a/digital_twins.pptx
+++ b/digital_twins.pptx
@@ -36,6 +36,7 @@
     <p:sldId id="284" r:id="rId30"/>
     <p:sldId id="285" r:id="rId31"/>
     <p:sldId id="286" r:id="rId32"/>
+    <p:sldId id="287" r:id="rId33"/>
   </p:sldIdLst>
   <p:sldSz cx="9144000" cy="5143500" type="screen16x9"/>
   <p:notesSz cx="6858000" cy="9144000"/>
@@ -5246,7 +5247,12 @@
             <p:ph type="title"/>
           </p:nvPr>
         </p:nvSpPr>
-        <p:spPr/>
+        <p:spPr>
+          <a:xfrm>
+            <a:off x="457201" y="204787"/>
+            <a:ext cx="3008313" cy="871538"/>
+          </a:xfrm>
+        </p:spPr>
         <p:txBody>
           <a:bodyPr/>
           <a:lstStyle/>
@@ -5263,12 +5269,12 @@
       </p:sp>
       <p:sp>
         <p:nvSpPr>
-          <p:cNvPr id="3" name="Content Placeholder 2"/>
-          <p:cNvSpPr>
-            <a:spLocks noGrp="1"/>
-          </p:cNvSpPr>
-          <p:nvPr>
-            <p:ph idx="1"/>
+          <p:cNvPr id="4" name="Text Placeholder 3"/>
+          <p:cNvSpPr>
+            <a:spLocks noGrp="1"/>
+          </p:cNvSpPr>
+          <p:nvPr>
+            <p:ph idx="2" sz="half" type="body"/>
           </p:nvPr>
         </p:nvSpPr>
         <p:spPr/>
@@ -5351,50 +5357,64 @@
               <a:t>IoTAbench</a:t>
             </a:r>
           </a:p>
-          <a:p>
-            <a:pPr lvl="0"/>
-            <a:r>
-              <a:rPr/>
-              <a:t>Total readings: counts the total number of readings (i.e., rows) for the given time period.</a:t>
-            </a:r>
-          </a:p>
-          <a:p>
-            <a:pPr lvl="0"/>
-            <a:r>
-              <a:rPr/>
-              <a:t>Create a sorted list of the aggregate consumption in each ten minute interval in the given time period. -&gt; Create a sorted list of the average measurement (?) in each hour interval in the given time period.</a:t>
-            </a:r>
-          </a:p>
-          <a:p>
-            <a:pPr lvl="0"/>
-            <a:r>
-              <a:rPr/>
-              <a:t>Top consumers: create a list of the distinct consumers, sorted by their total (monthly) consumption. -&gt; Top agent: create a list of the distinct agents, sorted by their total (monthly) measurements.</a:t>
-            </a:r>
-          </a:p>
-          <a:p>
-            <a:pPr lvl="0"/>
-            <a:r>
-              <a:rPr/>
-              <a:t>Time of Usage Billing: calculate the monthly bill for each consumer based on the time of usage. -&gt; Time of Task: calculate the monthly time spent doing tasks for each agent.</a:t>
-            </a:r>
-          </a:p>
-          <a:p>
-            <a:pPr lvl="0" indent="0" marL="0">
-              <a:spcBef>
-                <a:spcPts val="3000"/>
-              </a:spcBef>
+        </p:txBody>
+      </p:sp>
+      <p:pic>
+        <p:nvPicPr>
+          <p:cNvPr descr="https://github.com/ManuelePasini/slides-markdown/blob/master/slides/images/dt/iota_model.png?raw=true" id="0" name="Picture 1"/>
+          <p:cNvPicPr>
+            <a:picLocks noGrp="1" noChangeAspect="1"/>
+          </p:cNvPicPr>
+          <p:nvPr/>
+        </p:nvPicPr>
+        <p:blipFill>
+          <a:blip r:embed="rId3"/>
+          <a:stretch>
+            <a:fillRect/>
+          </a:stretch>
+        </p:blipFill>
+        <p:spPr bwMode="auto">
+          <a:xfrm>
+            <a:off x="3568700" y="431800"/>
+            <a:ext cx="5105400" cy="3403600"/>
+          </a:xfrm>
+          <a:prstGeom prst="rect">
+            <a:avLst/>
+          </a:prstGeom>
+          <a:noFill/>
+          <a:ln w="9525">
+            <a:noFill/>
+            <a:headEnd/>
+            <a:tailEnd/>
+          </a:ln>
+        </p:spPr>
+      </p:pic>
+      <p:sp>
+        <p:nvSpPr>
+          <p:cNvPr id="1" name="TextBox 3"/>
+          <p:cNvSpPr txBox="1"/>
+          <p:nvPr/>
+        </p:nvSpPr>
+        <p:spPr>
+          <a:xfrm>
+            <a:off x="3568700" y="4076700"/>
+            <a:ext cx="5105400" cy="508000"/>
+          </a:xfrm>
+          <a:prstGeom prst="rect">
+            <a:avLst/>
+          </a:prstGeom>
+          <a:noFill/>
+        </p:spPr>
+        <p:txBody>
+          <a:bodyPr/>
+          <a:lstStyle/>
+          <a:p>
+            <a:pPr lvl="0" indent="0" marL="0" algn="ctr">
               <a:buNone/>
             </a:pPr>
             <a:r>
-              <a:rPr b="1"/>
-              <a:t>From </a:t>
-            </a:r>
-            <a:r>
-              <a:rPr b="1">
-                <a:hlinkClick r:id="rId3"/>
-              </a:rPr>
-              <a:t>SmartBench, VLDB</a:t>
+              <a:rPr/>
+              <a:t>IoTABench data model</a:t>
             </a:r>
           </a:p>
         </p:txBody>
@@ -5405,6 +5425,92 @@
 </file>
 
 <file path=ppt/slides/slide26.xml><?xml version="1.0" encoding="utf-8"?>
+<p:sld xmlns:a="http://schemas.openxmlformats.org/drawingml/2006/main" xmlns:r="http://schemas.openxmlformats.org/officeDocument/2006/relationships" xmlns:p="http://schemas.openxmlformats.org/presentationml/2006/main">
+  <p:cSld>
+    <p:spTree>
+      <p:nvGrpSpPr>
+        <p:cNvPr id="1" name=""/>
+        <p:cNvGrpSpPr/>
+        <p:nvPr/>
+      </p:nvGrpSpPr>
+      <p:grpSpPr>
+        <a:xfrm>
+          <a:off x="0" y="0"/>
+          <a:ext cx="0" cy="0"/>
+          <a:chOff x="0" y="0"/>
+          <a:chExt cx="0" cy="0"/>
+        </a:xfrm>
+      </p:grpSpPr>
+      <p:sp>
+        <p:nvSpPr>
+          <p:cNvPr id="3" name="Content Placeholder 2"/>
+          <p:cNvSpPr>
+            <a:spLocks noGrp="1"/>
+          </p:cNvSpPr>
+          <p:nvPr>
+            <p:ph idx="1"/>
+          </p:nvPr>
+        </p:nvSpPr>
+        <p:spPr/>
+        <p:txBody>
+          <a:bodyPr/>
+          <a:lstStyle/>
+          <a:p>
+            <a:pPr lvl="0" indent="0" marL="0">
+              <a:buNone/>
+            </a:pPr>
+            <a:r>
+              <a:rPr/>
+              <a:t> - Total readings: counts the total number of readings (i.e., rows) for the given time period.</a:t>
+            </a:r>
+          </a:p>
+          <a:p>
+            <a:pPr lvl="0"/>
+            <a:r>
+              <a:rPr/>
+              <a:t>Create a sorted list of the aggregate consumption in each ten minute interval in the given time period. -&gt; Create a sorted list of the average measurement (?) in each hour interval in the given time period.</a:t>
+            </a:r>
+          </a:p>
+          <a:p>
+            <a:pPr lvl="0"/>
+            <a:r>
+              <a:rPr/>
+              <a:t>Top consumers: create a list of the distinct consumers, sorted by their total (monthly) consumption. -&gt; Top agent: create a list of the distinct agents, sorted by their total (monthly) measurements.</a:t>
+            </a:r>
+          </a:p>
+          <a:p>
+            <a:pPr lvl="0"/>
+            <a:r>
+              <a:rPr/>
+              <a:t>Time of Usage Billing: calculate the monthly bill for each consumer based on the time of usage. -&gt; Time of Task: calculate the monthly time spent doing tasks for each agent.</a:t>
+            </a:r>
+          </a:p>
+          <a:p>
+            <a:pPr lvl="0" indent="0" marL="0">
+              <a:spcBef>
+                <a:spcPts val="3000"/>
+              </a:spcBef>
+              <a:buNone/>
+            </a:pPr>
+            <a:r>
+              <a:rPr b="1"/>
+              <a:t>From </a:t>
+            </a:r>
+            <a:r>
+              <a:rPr b="1">
+                <a:hlinkClick r:id="rId2"/>
+              </a:rPr>
+              <a:t>SmartBench, VLDB</a:t>
+            </a:r>
+          </a:p>
+        </p:txBody>
+      </p:sp>
+    </p:spTree>
+  </p:cSld>
+</p:sld>
+</file>
+
+<file path=ppt/slides/slide27.xml><?xml version="1.0" encoding="utf-8"?>
 <p:sld xmlns:a="http://schemas.openxmlformats.org/drawingml/2006/main" xmlns:r="http://schemas.openxmlformats.org/officeDocument/2006/relationships" xmlns:p="http://schemas.openxmlformats.org/presentationml/2006/main">
   <p:cSld>
     <p:spTree>
@@ -6013,7 +6119,7 @@
 </p:sld>
 </file>
 
-<file path=ppt/slides/slide27.xml><?xml version="1.0" encoding="utf-8"?>
+<file path=ppt/slides/slide28.xml><?xml version="1.0" encoding="utf-8"?>
 <p:sld xmlns:a="http://schemas.openxmlformats.org/drawingml/2006/main" xmlns:r="http://schemas.openxmlformats.org/officeDocument/2006/relationships" xmlns:p="http://schemas.openxmlformats.org/presentationml/2006/main">
   <p:cSld>
     <p:spTree>
@@ -6103,7 +6209,7 @@
 </p:sld>
 </file>
 
-<file path=ppt/slides/slide28.xml><?xml version="1.0" encoding="utf-8"?>
+<file path=ppt/slides/slide29.xml><?xml version="1.0" encoding="utf-8"?>
 <p:sld xmlns:a="http://schemas.openxmlformats.org/drawingml/2006/main" xmlns:r="http://schemas.openxmlformats.org/officeDocument/2006/relationships" xmlns:p="http://schemas.openxmlformats.org/presentationml/2006/main">
   <p:cSld>
     <p:spTree>
@@ -7068,101 +7174,6 @@
 </p:sld>
 </file>
 
-<file path=ppt/slides/slide29.xml><?xml version="1.0" encoding="utf-8"?>
-<p:sld xmlns:a="http://schemas.openxmlformats.org/drawingml/2006/main" xmlns:r="http://schemas.openxmlformats.org/officeDocument/2006/relationships" xmlns:p="http://schemas.openxmlformats.org/presentationml/2006/main">
-  <p:cSld>
-    <p:spTree>
-      <p:nvGrpSpPr>
-        <p:cNvPr id="1" name=""/>
-        <p:cNvGrpSpPr/>
-        <p:nvPr/>
-      </p:nvGrpSpPr>
-      <p:grpSpPr>
-        <a:xfrm>
-          <a:off x="0" y="0"/>
-          <a:ext cx="0" cy="0"/>
-          <a:chOff x="0" y="0"/>
-          <a:chExt cx="0" cy="0"/>
-        </a:xfrm>
-      </p:grpSpPr>
-      <p:sp>
-        <p:nvSpPr>
-          <p:cNvPr id="3" name="Content Placeholder 2"/>
-          <p:cNvSpPr>
-            <a:spLocks noGrp="1"/>
-          </p:cNvSpPr>
-          <p:nvPr>
-            <p:ph idx="1"/>
-          </p:nvPr>
-        </p:nvSpPr>
-        <p:spPr/>
-        <p:txBody>
-          <a:bodyPr/>
-          <a:lstStyle/>
-          <a:p>
-            <a:pPr lvl="0" indent="0" marL="0">
-              <a:spcBef>
-                <a:spcPts val="3000"/>
-              </a:spcBef>
-              <a:buNone/>
-            </a:pPr>
-            <a:r>
-              <a:rPr b="1"/>
-              <a:t>Data architectures</a:t>
-            </a:r>
-          </a:p>
-          <a:p>
-            <a:pPr lvl="0" indent="-342900" marL="342900">
-              <a:buAutoNum type="arabicPeriod"/>
-            </a:pPr>
-            <a:r>
-              <a:rPr/>
-              <a:t>Metamodello Agritech (PostgreSQL ?)</a:t>
-            </a:r>
-          </a:p>
-          <a:p>
-            <a:pPr lvl="0" indent="-342900" marL="342900">
-              <a:buAutoNum type="arabicPeriod"/>
-            </a:pPr>
-            <a:r>
-              <a:rPr/>
-              <a:t>Wide-Column (?)</a:t>
-            </a:r>
-          </a:p>
-          <a:p>
-            <a:pPr lvl="0" indent="-342900" marL="342900">
-              <a:buAutoNum type="arabicPeriod"/>
-            </a:pPr>
-            <a:r>
-              <a:rPr/>
-              <a:t>Grafo + Relazionale (PostgreSQL + PostGIS + Apache AGE)</a:t>
-            </a:r>
-          </a:p>
-          <a:p>
-            <a:pPr lvl="0" indent="-342900" marL="342900">
-              <a:buAutoNum type="arabicPeriod"/>
-            </a:pPr>
-            <a:r>
-              <a:rPr/>
-              <a:t>Graph + Time Series (GraphDB + (ClickHouse || InfluxDB))</a:t>
-            </a:r>
-          </a:p>
-          <a:p>
-            <a:pPr lvl="0" indent="-342900" marL="342900">
-              <a:buAutoNum type="arabicPeriod"/>
-            </a:pPr>
-            <a:r>
-              <a:rPr/>
-              <a:t>AeonG (?)</a:t>
-            </a:r>
-          </a:p>
-        </p:txBody>
-      </p:sp>
-    </p:spTree>
-  </p:cSld>
-</p:sld>
-</file>
-
 <file path=ppt/slides/slide3.xml><?xml version="1.0" encoding="utf-8"?>
 <p:sld xmlns:a="http://schemas.openxmlformats.org/drawingml/2006/main" xmlns:r="http://schemas.openxmlformats.org/officeDocument/2006/relationships" xmlns:p="http://schemas.openxmlformats.org/presentationml/2006/main">
   <p:cSld>
@@ -7333,6 +7344,101 @@
       </p:grpSpPr>
       <p:sp>
         <p:nvSpPr>
+          <p:cNvPr id="3" name="Content Placeholder 2"/>
+          <p:cNvSpPr>
+            <a:spLocks noGrp="1"/>
+          </p:cNvSpPr>
+          <p:nvPr>
+            <p:ph idx="1"/>
+          </p:nvPr>
+        </p:nvSpPr>
+        <p:spPr/>
+        <p:txBody>
+          <a:bodyPr/>
+          <a:lstStyle/>
+          <a:p>
+            <a:pPr lvl="0" indent="0" marL="0">
+              <a:spcBef>
+                <a:spcPts val="3000"/>
+              </a:spcBef>
+              <a:buNone/>
+            </a:pPr>
+            <a:r>
+              <a:rPr b="1"/>
+              <a:t>Data architectures</a:t>
+            </a:r>
+          </a:p>
+          <a:p>
+            <a:pPr lvl="0" indent="-342900" marL="342900">
+              <a:buAutoNum type="arabicPeriod"/>
+            </a:pPr>
+            <a:r>
+              <a:rPr/>
+              <a:t>Metamodello Agritech (PostgreSQL ?)</a:t>
+            </a:r>
+          </a:p>
+          <a:p>
+            <a:pPr lvl="0" indent="-342900" marL="342900">
+              <a:buAutoNum type="arabicPeriod"/>
+            </a:pPr>
+            <a:r>
+              <a:rPr/>
+              <a:t>Wide-Column (?)</a:t>
+            </a:r>
+          </a:p>
+          <a:p>
+            <a:pPr lvl="0" indent="-342900" marL="342900">
+              <a:buAutoNum type="arabicPeriod"/>
+            </a:pPr>
+            <a:r>
+              <a:rPr/>
+              <a:t>Grafo + Relazionale (PostgreSQL + PostGIS + Apache AGE)</a:t>
+            </a:r>
+          </a:p>
+          <a:p>
+            <a:pPr lvl="0" indent="-342900" marL="342900">
+              <a:buAutoNum type="arabicPeriod"/>
+            </a:pPr>
+            <a:r>
+              <a:rPr/>
+              <a:t>Graph + Time Series (GraphDB + (ClickHouse || InfluxDB))</a:t>
+            </a:r>
+          </a:p>
+          <a:p>
+            <a:pPr lvl="0" indent="-342900" marL="342900">
+              <a:buAutoNum type="arabicPeriod"/>
+            </a:pPr>
+            <a:r>
+              <a:rPr/>
+              <a:t>AeonG (?)</a:t>
+            </a:r>
+          </a:p>
+        </p:txBody>
+      </p:sp>
+    </p:spTree>
+  </p:cSld>
+</p:sld>
+</file>
+
+<file path=ppt/slides/slide31.xml><?xml version="1.0" encoding="utf-8"?>
+<p:sld xmlns:a="http://schemas.openxmlformats.org/drawingml/2006/main" xmlns:r="http://schemas.openxmlformats.org/officeDocument/2006/relationships" xmlns:p="http://schemas.openxmlformats.org/presentationml/2006/main">
+  <p:cSld>
+    <p:spTree>
+      <p:nvGrpSpPr>
+        <p:cNvPr id="1" name=""/>
+        <p:cNvGrpSpPr/>
+        <p:nvPr/>
+      </p:nvGrpSpPr>
+      <p:grpSpPr>
+        <a:xfrm>
+          <a:off x="0" y="0"/>
+          <a:ext cx="0" cy="0"/>
+          <a:chOff x="0" y="0"/>
+          <a:chExt cx="0" cy="0"/>
+        </a:xfrm>
+      </p:grpSpPr>
+      <p:sp>
+        <p:nvSpPr>
           <p:cNvPr id="2" name="Title 1"/>
           <p:cNvSpPr>
             <a:spLocks noGrp="1"/>
@@ -7612,7 +7718,7 @@
 </p:sld>
 </file>
 
-<file path=ppt/slides/slide31.xml><?xml version="1.0" encoding="utf-8"?>
+<file path=ppt/slides/slide32.xml><?xml version="1.0" encoding="utf-8"?>
 <p:sld xmlns:a="http://schemas.openxmlformats.org/drawingml/2006/main" xmlns:r="http://schemas.openxmlformats.org/officeDocument/2006/relationships" xmlns:p="http://schemas.openxmlformats.org/presentationml/2006/main">
   <p:cSld>
     <p:spTree>

</xml_diff>

<commit_message>
Deploying to gh-pages from @ ManuelePasini/slides-markdown@1630ff25b5fefa6be720eb7794b08b1ef73a02c1 🚀
</commit_message>
<xml_diff>
--- a/digital_twins.pptx
+++ b/digital_twins.pptx
@@ -6056,7 +6056,7 @@
       </mc:AlternateContent>
       <p:pic>
         <p:nvPicPr>
-          <p:cNvPr descr="https://github.com/ManuelePasini/slides-markdown/blob/master/slides/images/dt/data_model/smartbench.png?raw=true" id="0" name="Picture 1"/>
+          <p:cNvPr descr="https://github.com/ManuelePasini/slides-markdown/blob/master/slides/images/dt/data_model/smartbench_user.png?raw=true" id="0" name="Picture 1"/>
           <p:cNvPicPr>
             <a:picLocks noGrp="1" noChangeAspect="1"/>
           </p:cNvPicPr>
@@ -6070,8 +6070,8 @@
         </p:blipFill>
         <p:spPr bwMode="auto">
           <a:xfrm>
-            <a:off x="5537200" y="1193800"/>
-            <a:ext cx="2260600" cy="2882900"/>
+            <a:off x="4648200" y="1625600"/>
+            <a:ext cx="4038600" cy="2032000"/>
           </a:xfrm>
           <a:prstGeom prst="rect">
             <a:avLst/>

</xml_diff>

<commit_message>
Deploying to gh-pages from @ ManuelePasini/slides-markdown@4754e3033ea88d80ac0465c17d01fcb96dbc93c1 🚀
</commit_message>
<xml_diff>
--- a/digital_twins.pptx
+++ b/digital_twins.pptx
@@ -36,7 +36,6 @@
     <p:sldId id="284" r:id="rId30"/>
     <p:sldId id="285" r:id="rId31"/>
     <p:sldId id="286" r:id="rId32"/>
-    <p:sldId id="287" r:id="rId33"/>
   </p:sldIdLst>
   <p:sldSz cx="9144000" cy="5143500" type="screen16x9"/>
   <p:notesSz cx="6858000" cy="9144000"/>
@@ -5247,12 +5246,7 @@
             <p:ph type="title"/>
           </p:nvPr>
         </p:nvSpPr>
-        <p:spPr>
-          <a:xfrm>
-            <a:off x="457201" y="204787"/>
-            <a:ext cx="3008313" cy="871538"/>
-          </a:xfrm>
-        </p:spPr>
+        <p:spPr/>
         <p:txBody>
           <a:bodyPr/>
           <a:lstStyle/>
@@ -5269,12 +5263,12 @@
       </p:sp>
       <p:sp>
         <p:nvSpPr>
-          <p:cNvPr id="4" name="Text Placeholder 3"/>
-          <p:cNvSpPr>
-            <a:spLocks noGrp="1"/>
-          </p:cNvSpPr>
-          <p:nvPr>
-            <p:ph idx="2" sz="half" type="body"/>
+          <p:cNvPr id="3" name="Content Placeholder 2"/>
+          <p:cNvSpPr>
+            <a:spLocks noGrp="1"/>
+          </p:cNvSpPr>
+          <p:nvPr>
+            <p:ph idx="1"/>
           </p:nvPr>
         </p:nvSpPr>
         <p:spPr/>
@@ -5361,7 +5355,7 @@
       </p:sp>
       <p:pic>
         <p:nvPicPr>
-          <p:cNvPr descr="https://github.com/ManuelePasini/slides-markdown/blob/master/slides/images/dt/iota_model.png?raw=true" id="0" name="Picture 1"/>
+          <p:cNvPr descr="https://github.com/ManuelePasini/slides-markdown/blob/master/slides/images/dt/data_model/iota_model.png?raw=true" id="0" name="Picture 1"/>
           <p:cNvPicPr>
             <a:picLocks noGrp="1" noChangeAspect="1"/>
           </p:cNvPicPr>
@@ -5375,8 +5369,8 @@
         </p:blipFill>
         <p:spPr bwMode="auto">
           <a:xfrm>
-            <a:off x="3568700" y="431800"/>
-            <a:ext cx="5105400" cy="3403600"/>
+            <a:off x="457200" y="2336800"/>
+            <a:ext cx="8229600" cy="596900"/>
           </a:xfrm>
           <a:prstGeom prst="rect">
             <a:avLst/>
@@ -5397,8 +5391,8 @@
         </p:nvSpPr>
         <p:spPr>
           <a:xfrm>
-            <a:off x="3568700" y="4076700"/>
-            <a:ext cx="5105400" cy="508000"/>
+            <a:off x="457200" y="4076700"/>
+            <a:ext cx="8229600" cy="508000"/>
           </a:xfrm>
           <a:prstGeom prst="rect">
             <a:avLst/>
@@ -5419,98 +5413,74 @@
           </a:p>
         </p:txBody>
       </p:sp>
+      <p:sp>
+        <p:nvSpPr>
+          <p:cNvPr id="3" name="Content Placeholder 2"/>
+          <p:cNvSpPr>
+            <a:spLocks noGrp="1"/>
+          </p:cNvSpPr>
+          <p:nvPr>
+            <p:ph idx="1"/>
+          </p:nvPr>
+        </p:nvSpPr>
+        <p:spPr/>
+        <p:txBody>
+          <a:bodyPr/>
+          <a:lstStyle/>
+          <a:p>
+            <a:pPr lvl="0"/>
+            <a:r>
+              <a:rPr/>
+              <a:t>Total readings: counts the total number of readings (i.e., rows) for the given time period.</a:t>
+            </a:r>
+          </a:p>
+          <a:p>
+            <a:pPr lvl="0"/>
+            <a:r>
+              <a:rPr/>
+              <a:t>Create a sorted list of the aggregate consumption in each ten minute interval in the given time period. -&gt; Create a sorted list of the average measurement (?) in each hour interval in the given time period.</a:t>
+            </a:r>
+          </a:p>
+          <a:p>
+            <a:pPr lvl="0"/>
+            <a:r>
+              <a:rPr/>
+              <a:t>Top consumers: create a list of the distinct consumers, sorted by their total (monthly) consumption. -&gt; Top agent: create a list of the distinct agents, sorted by their total (monthly) measurements.</a:t>
+            </a:r>
+          </a:p>
+          <a:p>
+            <a:pPr lvl="0"/>
+            <a:r>
+              <a:rPr/>
+              <a:t>Time of Usage Billing: calculate the monthly bill for each consumer based on the time of usage. -&gt; Time of Task: calculate the monthly time spent doing tasks for each agent.</a:t>
+            </a:r>
+          </a:p>
+          <a:p>
+            <a:pPr lvl="0" indent="0" marL="0">
+              <a:spcBef>
+                <a:spcPts val="3000"/>
+              </a:spcBef>
+              <a:buNone/>
+            </a:pPr>
+            <a:r>
+              <a:rPr b="1"/>
+              <a:t>From </a:t>
+            </a:r>
+            <a:r>
+              <a:rPr b="1">
+                <a:hlinkClick r:id="rId4"/>
+              </a:rPr>
+              <a:t>SmartBench, VLDB</a:t>
+            </a:r>
+          </a:p>
+        </p:txBody>
+      </p:sp>
     </p:spTree>
   </p:cSld>
 </p:sld>
 </file>
 
 <file path=ppt/slides/slide26.xml><?xml version="1.0" encoding="utf-8"?>
-<p:sld xmlns:a="http://schemas.openxmlformats.org/drawingml/2006/main" xmlns:r="http://schemas.openxmlformats.org/officeDocument/2006/relationships" xmlns:p="http://schemas.openxmlformats.org/presentationml/2006/main">
-  <p:cSld>
-    <p:spTree>
-      <p:nvGrpSpPr>
-        <p:cNvPr id="1" name=""/>
-        <p:cNvGrpSpPr/>
-        <p:nvPr/>
-      </p:nvGrpSpPr>
-      <p:grpSpPr>
-        <a:xfrm>
-          <a:off x="0" y="0"/>
-          <a:ext cx="0" cy="0"/>
-          <a:chOff x="0" y="0"/>
-          <a:chExt cx="0" cy="0"/>
-        </a:xfrm>
-      </p:grpSpPr>
-      <p:sp>
-        <p:nvSpPr>
-          <p:cNvPr id="3" name="Content Placeholder 2"/>
-          <p:cNvSpPr>
-            <a:spLocks noGrp="1"/>
-          </p:cNvSpPr>
-          <p:nvPr>
-            <p:ph idx="1"/>
-          </p:nvPr>
-        </p:nvSpPr>
-        <p:spPr/>
-        <p:txBody>
-          <a:bodyPr/>
-          <a:lstStyle/>
-          <a:p>
-            <a:pPr lvl="0" indent="0" marL="0">
-              <a:buNone/>
-            </a:pPr>
-            <a:r>
-              <a:rPr/>
-              <a:t> - Total readings: counts the total number of readings (i.e., rows) for the given time period.</a:t>
-            </a:r>
-          </a:p>
-          <a:p>
-            <a:pPr lvl="0"/>
-            <a:r>
-              <a:rPr/>
-              <a:t>Create a sorted list of the aggregate consumption in each ten minute interval in the given time period. -&gt; Create a sorted list of the average measurement (?) in each hour interval in the given time period.</a:t>
-            </a:r>
-          </a:p>
-          <a:p>
-            <a:pPr lvl="0"/>
-            <a:r>
-              <a:rPr/>
-              <a:t>Top consumers: create a list of the distinct consumers, sorted by their total (monthly) consumption. -&gt; Top agent: create a list of the distinct agents, sorted by their total (monthly) measurements.</a:t>
-            </a:r>
-          </a:p>
-          <a:p>
-            <a:pPr lvl="0"/>
-            <a:r>
-              <a:rPr/>
-              <a:t>Time of Usage Billing: calculate the monthly bill for each consumer based on the time of usage. -&gt; Time of Task: calculate the monthly time spent doing tasks for each agent.</a:t>
-            </a:r>
-          </a:p>
-          <a:p>
-            <a:pPr lvl="0" indent="0" marL="0">
-              <a:spcBef>
-                <a:spcPts val="3000"/>
-              </a:spcBef>
-              <a:buNone/>
-            </a:pPr>
-            <a:r>
-              <a:rPr b="1"/>
-              <a:t>From </a:t>
-            </a:r>
-            <a:r>
-              <a:rPr b="1">
-                <a:hlinkClick r:id="rId2"/>
-              </a:rPr>
-              <a:t>SmartBench, VLDB</a:t>
-            </a:r>
-          </a:p>
-        </p:txBody>
-      </p:sp>
-    </p:spTree>
-  </p:cSld>
-</p:sld>
-</file>
-
-<file path=ppt/slides/slide27.xml><?xml version="1.0" encoding="utf-8"?>
 <p:sld xmlns:a="http://schemas.openxmlformats.org/drawingml/2006/main" xmlns:r="http://schemas.openxmlformats.org/officeDocument/2006/relationships" xmlns:p="http://schemas.openxmlformats.org/presentationml/2006/main">
   <p:cSld>
     <p:spTree>
@@ -6119,7 +6089,7 @@
 </p:sld>
 </file>
 
-<file path=ppt/slides/slide28.xml><?xml version="1.0" encoding="utf-8"?>
+<file path=ppt/slides/slide27.xml><?xml version="1.0" encoding="utf-8"?>
 <p:sld xmlns:a="http://schemas.openxmlformats.org/drawingml/2006/main" xmlns:r="http://schemas.openxmlformats.org/officeDocument/2006/relationships" xmlns:p="http://schemas.openxmlformats.org/presentationml/2006/main">
   <p:cSld>
     <p:spTree>
@@ -6209,7 +6179,7 @@
 </p:sld>
 </file>
 
-<file path=ppt/slides/slide29.xml><?xml version="1.0" encoding="utf-8"?>
+<file path=ppt/slides/slide28.xml><?xml version="1.0" encoding="utf-8"?>
 <p:sld xmlns:a="http://schemas.openxmlformats.org/drawingml/2006/main" xmlns:r="http://schemas.openxmlformats.org/officeDocument/2006/relationships" xmlns:p="http://schemas.openxmlformats.org/presentationml/2006/main">
   <p:cSld>
     <p:spTree>
@@ -7174,6 +7144,101 @@
 </p:sld>
 </file>
 
+<file path=ppt/slides/slide29.xml><?xml version="1.0" encoding="utf-8"?>
+<p:sld xmlns:a="http://schemas.openxmlformats.org/drawingml/2006/main" xmlns:r="http://schemas.openxmlformats.org/officeDocument/2006/relationships" xmlns:p="http://schemas.openxmlformats.org/presentationml/2006/main">
+  <p:cSld>
+    <p:spTree>
+      <p:nvGrpSpPr>
+        <p:cNvPr id="1" name=""/>
+        <p:cNvGrpSpPr/>
+        <p:nvPr/>
+      </p:nvGrpSpPr>
+      <p:grpSpPr>
+        <a:xfrm>
+          <a:off x="0" y="0"/>
+          <a:ext cx="0" cy="0"/>
+          <a:chOff x="0" y="0"/>
+          <a:chExt cx="0" cy="0"/>
+        </a:xfrm>
+      </p:grpSpPr>
+      <p:sp>
+        <p:nvSpPr>
+          <p:cNvPr id="3" name="Content Placeholder 2"/>
+          <p:cNvSpPr>
+            <a:spLocks noGrp="1"/>
+          </p:cNvSpPr>
+          <p:nvPr>
+            <p:ph idx="1"/>
+          </p:nvPr>
+        </p:nvSpPr>
+        <p:spPr/>
+        <p:txBody>
+          <a:bodyPr/>
+          <a:lstStyle/>
+          <a:p>
+            <a:pPr lvl="0" indent="0" marL="0">
+              <a:spcBef>
+                <a:spcPts val="3000"/>
+              </a:spcBef>
+              <a:buNone/>
+            </a:pPr>
+            <a:r>
+              <a:rPr b="1"/>
+              <a:t>Data architectures</a:t>
+            </a:r>
+          </a:p>
+          <a:p>
+            <a:pPr lvl="0" indent="-342900" marL="342900">
+              <a:buAutoNum type="arabicPeriod"/>
+            </a:pPr>
+            <a:r>
+              <a:rPr/>
+              <a:t>Metamodello Agritech (PostgreSQL ?)</a:t>
+            </a:r>
+          </a:p>
+          <a:p>
+            <a:pPr lvl="0" indent="-342900" marL="342900">
+              <a:buAutoNum type="arabicPeriod"/>
+            </a:pPr>
+            <a:r>
+              <a:rPr/>
+              <a:t>Wide-Column (?)</a:t>
+            </a:r>
+          </a:p>
+          <a:p>
+            <a:pPr lvl="0" indent="-342900" marL="342900">
+              <a:buAutoNum type="arabicPeriod"/>
+            </a:pPr>
+            <a:r>
+              <a:rPr/>
+              <a:t>Grafo + Relazionale (PostgreSQL + PostGIS + Apache AGE)</a:t>
+            </a:r>
+          </a:p>
+          <a:p>
+            <a:pPr lvl="0" indent="-342900" marL="342900">
+              <a:buAutoNum type="arabicPeriod"/>
+            </a:pPr>
+            <a:r>
+              <a:rPr/>
+              <a:t>Graph + Time Series (GraphDB + (ClickHouse || InfluxDB))</a:t>
+            </a:r>
+          </a:p>
+          <a:p>
+            <a:pPr lvl="0" indent="-342900" marL="342900">
+              <a:buAutoNum type="arabicPeriod"/>
+            </a:pPr>
+            <a:r>
+              <a:rPr/>
+              <a:t>AeonG (?)</a:t>
+            </a:r>
+          </a:p>
+        </p:txBody>
+      </p:sp>
+    </p:spTree>
+  </p:cSld>
+</p:sld>
+</file>
+
 <file path=ppt/slides/slide3.xml><?xml version="1.0" encoding="utf-8"?>
 <p:sld xmlns:a="http://schemas.openxmlformats.org/drawingml/2006/main" xmlns:r="http://schemas.openxmlformats.org/officeDocument/2006/relationships" xmlns:p="http://schemas.openxmlformats.org/presentationml/2006/main">
   <p:cSld>
@@ -7344,101 +7409,6 @@
       </p:grpSpPr>
       <p:sp>
         <p:nvSpPr>
-          <p:cNvPr id="3" name="Content Placeholder 2"/>
-          <p:cNvSpPr>
-            <a:spLocks noGrp="1"/>
-          </p:cNvSpPr>
-          <p:nvPr>
-            <p:ph idx="1"/>
-          </p:nvPr>
-        </p:nvSpPr>
-        <p:spPr/>
-        <p:txBody>
-          <a:bodyPr/>
-          <a:lstStyle/>
-          <a:p>
-            <a:pPr lvl="0" indent="0" marL="0">
-              <a:spcBef>
-                <a:spcPts val="3000"/>
-              </a:spcBef>
-              <a:buNone/>
-            </a:pPr>
-            <a:r>
-              <a:rPr b="1"/>
-              <a:t>Data architectures</a:t>
-            </a:r>
-          </a:p>
-          <a:p>
-            <a:pPr lvl="0" indent="-342900" marL="342900">
-              <a:buAutoNum type="arabicPeriod"/>
-            </a:pPr>
-            <a:r>
-              <a:rPr/>
-              <a:t>Metamodello Agritech (PostgreSQL ?)</a:t>
-            </a:r>
-          </a:p>
-          <a:p>
-            <a:pPr lvl="0" indent="-342900" marL="342900">
-              <a:buAutoNum type="arabicPeriod"/>
-            </a:pPr>
-            <a:r>
-              <a:rPr/>
-              <a:t>Wide-Column (?)</a:t>
-            </a:r>
-          </a:p>
-          <a:p>
-            <a:pPr lvl="0" indent="-342900" marL="342900">
-              <a:buAutoNum type="arabicPeriod"/>
-            </a:pPr>
-            <a:r>
-              <a:rPr/>
-              <a:t>Grafo + Relazionale (PostgreSQL + PostGIS + Apache AGE)</a:t>
-            </a:r>
-          </a:p>
-          <a:p>
-            <a:pPr lvl="0" indent="-342900" marL="342900">
-              <a:buAutoNum type="arabicPeriod"/>
-            </a:pPr>
-            <a:r>
-              <a:rPr/>
-              <a:t>Graph + Time Series (GraphDB + (ClickHouse || InfluxDB))</a:t>
-            </a:r>
-          </a:p>
-          <a:p>
-            <a:pPr lvl="0" indent="-342900" marL="342900">
-              <a:buAutoNum type="arabicPeriod"/>
-            </a:pPr>
-            <a:r>
-              <a:rPr/>
-              <a:t>AeonG (?)</a:t>
-            </a:r>
-          </a:p>
-        </p:txBody>
-      </p:sp>
-    </p:spTree>
-  </p:cSld>
-</p:sld>
-</file>
-
-<file path=ppt/slides/slide31.xml><?xml version="1.0" encoding="utf-8"?>
-<p:sld xmlns:a="http://schemas.openxmlformats.org/drawingml/2006/main" xmlns:r="http://schemas.openxmlformats.org/officeDocument/2006/relationships" xmlns:p="http://schemas.openxmlformats.org/presentationml/2006/main">
-  <p:cSld>
-    <p:spTree>
-      <p:nvGrpSpPr>
-        <p:cNvPr id="1" name=""/>
-        <p:cNvGrpSpPr/>
-        <p:nvPr/>
-      </p:nvGrpSpPr>
-      <p:grpSpPr>
-        <a:xfrm>
-          <a:off x="0" y="0"/>
-          <a:ext cx="0" cy="0"/>
-          <a:chOff x="0" y="0"/>
-          <a:chExt cx="0" cy="0"/>
-        </a:xfrm>
-      </p:grpSpPr>
-      <p:sp>
-        <p:nvSpPr>
           <p:cNvPr id="2" name="Title 1"/>
           <p:cNvSpPr>
             <a:spLocks noGrp="1"/>
@@ -7718,7 +7688,7 @@
 </p:sld>
 </file>
 
-<file path=ppt/slides/slide32.xml><?xml version="1.0" encoding="utf-8"?>
+<file path=ppt/slides/slide31.xml><?xml version="1.0" encoding="utf-8"?>
 <p:sld xmlns:a="http://schemas.openxmlformats.org/drawingml/2006/main" xmlns:r="http://schemas.openxmlformats.org/officeDocument/2006/relationships" xmlns:p="http://schemas.openxmlformats.org/presentationml/2006/main">
   <p:cSld>
     <p:spTree>

</xml_diff>

<commit_message>
Deploying to gh-pages from @ ManuelePasini/slides-markdown@09ad7f67b068da5947351a4dd376d0b2c1052453 🚀
</commit_message>
<xml_diff>
--- a/digital_twins.pptx
+++ b/digital_twins.pptx
@@ -5348,7 +5348,7 @@
               <a:rPr b="1">
                 <a:hlinkClick r:id="rId2"/>
               </a:rPr>
-              <a:t>IoTAbench</a:t>
+              <a:t>IoTAbench, ICPE 2015</a:t>
             </a:r>
           </a:p>
         </p:txBody>
@@ -5470,7 +5470,7 @@
               <a:rPr b="1">
                 <a:hlinkClick r:id="rId4"/>
               </a:rPr>
-              <a:t>SmartBench, VLDB</a:t>
+              <a:t>SmartBench, VLDB 2020</a:t>
             </a:r>
           </a:p>
         </p:txBody>
@@ -6042,6 +6042,66 @@
           <a:xfrm>
             <a:off x="4648200" y="1625600"/>
             <a:ext cx="4038600" cy="2032000"/>
+          </a:xfrm>
+          <a:prstGeom prst="rect">
+            <a:avLst/>
+          </a:prstGeom>
+          <a:noFill/>
+          <a:ln w="9525">
+            <a:noFill/>
+            <a:headEnd/>
+            <a:tailEnd/>
+          </a:ln>
+        </p:spPr>
+      </p:pic>
+      <p:sp>
+        <p:nvSpPr>
+          <p:cNvPr id="1" name="TextBox 3"/>
+          <p:cNvSpPr txBox="1"/>
+          <p:nvPr/>
+        </p:nvSpPr>
+        <p:spPr>
+          <a:xfrm>
+            <a:off x="4648200" y="4076700"/>
+            <a:ext cx="4038600" cy="508000"/>
+          </a:xfrm>
+          <a:prstGeom prst="rect">
+            <a:avLst/>
+          </a:prstGeom>
+          <a:noFill/>
+        </p:spPr>
+        <p:txBody>
+          <a:bodyPr/>
+          <a:lstStyle/>
+          <a:p>
+            <a:pPr lvl="0" indent="0" marL="0" algn="ctr">
+              <a:buNone/>
+            </a:pPr>
+            <a:r>
+              <a:rPr/>
+              <a:t>SmartBench data model</a:t>
+            </a:r>
+          </a:p>
+        </p:txBody>
+      </p:sp>
+      <p:pic>
+        <p:nvPicPr>
+          <p:cNvPr descr="https://github.com/ManuelePasini/slides-markdown/blob/master/slides/images/dt/data_model/smartbench_sensor.png?raw=true" id="0" name="Picture 1"/>
+          <p:cNvPicPr>
+            <a:picLocks noGrp="1" noChangeAspect="1"/>
+          </p:cNvPicPr>
+          <p:nvPr/>
+        </p:nvPicPr>
+        <p:blipFill>
+          <a:blip r:embed="rId3"/>
+          <a:stretch>
+            <a:fillRect/>
+          </a:stretch>
+        </p:blipFill>
+        <p:spPr bwMode="auto">
+          <a:xfrm>
+            <a:off x="4826000" y="1193800"/>
+            <a:ext cx="3670300" cy="2882900"/>
           </a:xfrm>
           <a:prstGeom prst="rect">
             <a:avLst/>

</xml_diff>

<commit_message>
Deploying to gh-pages from @ ManuelePasini/slides-markdown@b4486ce4c65faf7c7aed46746bd35d4f9d2daa2b 🚀
</commit_message>
<xml_diff>
--- a/digital_twins.pptx
+++ b/digital_twins.pptx
@@ -6040,7 +6040,7 @@
         </p:blipFill>
         <p:spPr bwMode="auto">
           <a:xfrm>
-            <a:off x="4648200" y="1625600"/>
+            <a:off x="4648200" y="1879600"/>
             <a:ext cx="4038600" cy="2032000"/>
           </a:xfrm>
           <a:prstGeom prst="rect">
@@ -6054,96 +6054,6 @@
           </a:ln>
         </p:spPr>
       </p:pic>
-      <p:sp>
-        <p:nvSpPr>
-          <p:cNvPr id="1" name="TextBox 3"/>
-          <p:cNvSpPr txBox="1"/>
-          <p:nvPr/>
-        </p:nvSpPr>
-        <p:spPr>
-          <a:xfrm>
-            <a:off x="4648200" y="4076700"/>
-            <a:ext cx="4038600" cy="508000"/>
-          </a:xfrm>
-          <a:prstGeom prst="rect">
-            <a:avLst/>
-          </a:prstGeom>
-          <a:noFill/>
-        </p:spPr>
-        <p:txBody>
-          <a:bodyPr/>
-          <a:lstStyle/>
-          <a:p>
-            <a:pPr lvl="0" indent="0" marL="0" algn="ctr">
-              <a:buNone/>
-            </a:pPr>
-            <a:r>
-              <a:rPr/>
-              <a:t>SmartBench data model</a:t>
-            </a:r>
-          </a:p>
-        </p:txBody>
-      </p:sp>
-      <p:pic>
-        <p:nvPicPr>
-          <p:cNvPr descr="https://github.com/ManuelePasini/slides-markdown/blob/master/slides/images/dt/data_model/smartbench_sensor.png?raw=true" id="0" name="Picture 1"/>
-          <p:cNvPicPr>
-            <a:picLocks noGrp="1" noChangeAspect="1"/>
-          </p:cNvPicPr>
-          <p:nvPr/>
-        </p:nvPicPr>
-        <p:blipFill>
-          <a:blip r:embed="rId3"/>
-          <a:stretch>
-            <a:fillRect/>
-          </a:stretch>
-        </p:blipFill>
-        <p:spPr bwMode="auto">
-          <a:xfrm>
-            <a:off x="4826000" y="1193800"/>
-            <a:ext cx="3670300" cy="2882900"/>
-          </a:xfrm>
-          <a:prstGeom prst="rect">
-            <a:avLst/>
-          </a:prstGeom>
-          <a:noFill/>
-          <a:ln w="9525">
-            <a:noFill/>
-            <a:headEnd/>
-            <a:tailEnd/>
-          </a:ln>
-        </p:spPr>
-      </p:pic>
-      <p:sp>
-        <p:nvSpPr>
-          <p:cNvPr id="1" name="TextBox 3"/>
-          <p:cNvSpPr txBox="1"/>
-          <p:nvPr/>
-        </p:nvSpPr>
-        <p:spPr>
-          <a:xfrm>
-            <a:off x="4648200" y="4076700"/>
-            <a:ext cx="4038600" cy="508000"/>
-          </a:xfrm>
-          <a:prstGeom prst="rect">
-            <a:avLst/>
-          </a:prstGeom>
-          <a:noFill/>
-        </p:spPr>
-        <p:txBody>
-          <a:bodyPr/>
-          <a:lstStyle/>
-          <a:p>
-            <a:pPr lvl="0" indent="0" marL="0" algn="ctr">
-              <a:buNone/>
-            </a:pPr>
-            <a:r>
-              <a:rPr/>
-              <a:t>SmartBench data model</a:t>
-            </a:r>
-          </a:p>
-        </p:txBody>
-      </p:sp>
     </p:spTree>
   </p:cSld>
 </p:sld>

</xml_diff>

<commit_message>
Deploying to gh-pages from @ ManuelePasini/slides-markdown@d8ca0f6d22ab7826d14e1a954225b5a9b8318092 🚀
</commit_message>
<xml_diff>
--- a/digital_twins.pptx
+++ b/digital_twins.pptx
@@ -5705,7 +5705,47 @@
                 <a:pPr lvl="0"/>
                 <a:r>
                   <a:rPr/>
-                  <a:t>Statistics(S ⊆ Sensors, A, F, tb, te): retrieves statistics (e.g., average) based on functions specifed in F during the time range [</a:t>
+                  <a:t>Statistics(S ⊆ Sensors, A, F, </a:t>
+                </a:r>
+                <a14:m>
+                  <m:oMath xmlns:m="http://schemas.openxmlformats.org/officeDocument/2006/math">
+                    <m:sSub>
+                      <m:e>
+                        <m:r>
+                          <m:t>t</m:t>
+                        </m:r>
+                      </m:e>
+                      <m:sub>
+                        <m:r>
+                          <m:t>b</m:t>
+                        </m:r>
+                      </m:sub>
+                    </m:sSub>
+                  </m:oMath>
+                </a14:m>
+                <a:r>
+                  <a:rPr/>
+                  <a:t>, </a:t>
+                </a:r>
+                <a14:m>
+                  <m:oMath xmlns:m="http://schemas.openxmlformats.org/officeDocument/2006/math">
+                    <m:sSub>
+                      <m:e>
+                        <m:r>
+                          <m:t>t</m:t>
+                        </m:r>
+                      </m:e>
+                      <m:sub>
+                        <m:r>
+                          <m:t>e</m:t>
+                        </m:r>
+                      </m:sub>
+                    </m:sSub>
+                  </m:oMath>
+                </a14:m>
+                <a:r>
+                  <a:rPr/>
+                  <a:t>): retrieves statistics (e.g., average) based on functions specifed in F during the time range [</a:t>
                 </a:r>
                 <a14:m>
                   <m:oMath xmlns:m="http://schemas.openxmlformats.org/officeDocument/2006/math">
@@ -6090,46 +6130,6 @@
         <p:txBody>
           <a:bodyPr/>
           <a:lstStyle/>
-          <a:p>
-            <a:pPr lvl="0" indent="0" marL="0">
-              <a:spcBef>
-                <a:spcPts val="3000"/>
-              </a:spcBef>
-              <a:buNone/>
-            </a:pPr>
-            <a:r>
-              <a:rPr b="1"/>
-              <a:t>Additional custom queries</a:t>
-            </a:r>
-          </a:p>
-          <a:p>
-            <a:pPr lvl="0"/>
-            <a:r>
-              <a:rPr/>
-              <a:t>Dati tutti gli agenti di un certo tipo in un certo environment, trovare tutte le misurazioni dal timestamp X al timestamp Y.</a:t>
-            </a:r>
-          </a:p>
-          <a:p>
-            <a:pPr lvl="0"/>
-            <a:r>
-              <a:rPr/>
-              <a:t>Dato un environment, trovare le rilevazioni di tutti i device dal timestamp X al timestamp Y</a:t>
-            </a:r>
-          </a:p>
-          <a:p>
-            <a:pPr lvl="0"/>
-            <a:r>
-              <a:rPr/>
-              <a:t>Dato un environment, dammi tutti i measurement dei device di un certo tipo che superano una data soglia.</a:t>
-            </a:r>
-          </a:p>
-          <a:p>
-            <a:pPr lvl="0"/>
-            <a:r>
-              <a:rPr/>
-              <a:t>Dato un poligono, trovare tutti gli agent che hanno fatto task all’interno del poligono</a:t>
-            </a:r>
-          </a:p>
           <a:p>
             <a:pPr lvl="0" indent="0" marL="0">
               <a:spcBef>

</xml_diff>

<commit_message>
Deploying to gh-pages from @ ManuelePasini/slides-markdown@2eb14571f6f9ec5e88d58aed1ce7185e925b7004 🚀
</commit_message>
<xml_diff>
--- a/digital_twins.pptx
+++ b/digital_twins.pptx
@@ -7158,45 +7158,28 @@
             </a:r>
           </a:p>
           <a:p>
-            <a:pPr lvl="0" indent="-342900" marL="342900">
-              <a:buAutoNum type="arabicPeriod"/>
-            </a:pPr>
-            <a:r>
-              <a:rPr/>
-              <a:t>Metamodello Agritech (PostgreSQL ?)</a:t>
-            </a:r>
-          </a:p>
-          <a:p>
-            <a:pPr lvl="0" indent="-342900" marL="342900">
-              <a:buAutoNum type="arabicPeriod"/>
-            </a:pPr>
+            <a:pPr lvl="0"/>
             <a:r>
               <a:rPr/>
               <a:t>Wide-Column (?)</a:t>
             </a:r>
           </a:p>
           <a:p>
-            <a:pPr lvl="0" indent="-342900" marL="342900">
-              <a:buAutoNum type="arabicPeriod"/>
-            </a:pPr>
+            <a:pPr lvl="0"/>
             <a:r>
               <a:rPr/>
               <a:t>Grafo + Relazionale (PostgreSQL + PostGIS + Apache AGE)</a:t>
             </a:r>
           </a:p>
           <a:p>
-            <a:pPr lvl="0" indent="-342900" marL="342900">
-              <a:buAutoNum type="arabicPeriod"/>
-            </a:pPr>
+            <a:pPr lvl="0"/>
             <a:r>
               <a:rPr/>
               <a:t>Graph + Time Series (GraphDB + (ClickHouse || InfluxDB))</a:t>
             </a:r>
           </a:p>
           <a:p>
-            <a:pPr lvl="0" indent="-342900" marL="342900">
-              <a:buAutoNum type="arabicPeriod"/>
-            </a:pPr>
+            <a:pPr lvl="0"/>
             <a:r>
               <a:rPr/>
               <a:t>AeonG (?)</a:t>

</xml_diff>

<commit_message>
Deploying to gh-pages from @ ManuelePasini/slides-markdown@ad6fdc6aba4e1475bcd6f293990cbdff72e27380 🚀
</commit_message>
<xml_diff>
--- a/digital_twins.pptx
+++ b/digital_twins.pptx
@@ -5438,21 +5438,21 @@
             <a:pPr lvl="0"/>
             <a:r>
               <a:rPr/>
-              <a:t>Create a sorted list of the aggregate consumption in each ten minute interval in the given time period. -&gt; Create a sorted list of the average measurement (?) in each hour interval in the given time period.</a:t>
-            </a:r>
-          </a:p>
-          <a:p>
-            <a:pPr lvl="0"/>
-            <a:r>
-              <a:rPr/>
-              <a:t>Top consumers: create a list of the distinct consumers, sorted by their total (monthly) consumption. -&gt; Top agent: create a list of the distinct agents, sorted by their total (monthly) measurements.</a:t>
-            </a:r>
-          </a:p>
-          <a:p>
-            <a:pPr lvl="0"/>
-            <a:r>
-              <a:rPr/>
-              <a:t>Time of Usage Billing: calculate the monthly bill for each consumer based on the time of usage. -&gt; Time of Task: calculate the monthly time spent doing tasks for each agent.</a:t>
+              <a:t>Create a sorted list of the aggregate consumption in each ten minute interval in the given time period.</a:t>
+            </a:r>
+          </a:p>
+          <a:p>
+            <a:pPr lvl="0"/>
+            <a:r>
+              <a:rPr/>
+              <a:t>Top consumers: create a list of the distinct consumers, sorted by their total (monthly) consumption.</a:t>
+            </a:r>
+          </a:p>
+          <a:p>
+            <a:pPr lvl="0"/>
+            <a:r>
+              <a:rPr/>
+              <a:t>Time of Usage Billing: calculate the monthly bill for each consumer based on the time of usage.</a:t>
             </a:r>
           </a:p>
           <a:p>

</xml_diff>

<commit_message>
Deploying to gh-pages from @ ManuelePasini/slides-markdown@3e03fd88bfd33f3c1bd6cc686658493782548208 🚀
</commit_message>
<xml_diff>
--- a/digital_twins.pptx
+++ b/digital_twins.pptx
@@ -34,8 +34,6 @@
     <p:sldId id="282" r:id="rId28"/>
     <p:sldId id="283" r:id="rId29"/>
     <p:sldId id="284" r:id="rId30"/>
-    <p:sldId id="285" r:id="rId31"/>
-    <p:sldId id="286" r:id="rId32"/>
   </p:sldIdLst>
   <p:sldSz cx="9144000" cy="5143500" type="screen16x9"/>
   <p:notesSz cx="6858000" cy="9144000"/>
@@ -6116,34 +6114,941 @@
           <a:chExt cx="0" cy="0"/>
         </a:xfrm>
       </p:grpSpPr>
-      <p:sp>
-        <p:nvSpPr>
-          <p:cNvPr id="3" name="Content Placeholder 2"/>
-          <p:cNvSpPr>
-            <a:spLocks noGrp="1"/>
-          </p:cNvSpPr>
-          <p:nvPr>
-            <p:ph idx="1"/>
-          </p:nvPr>
-        </p:nvSpPr>
-        <p:spPr/>
-        <p:txBody>
-          <a:bodyPr/>
-          <a:lstStyle/>
-          <a:p>
-            <a:pPr lvl="0" indent="0" marL="0">
-              <a:spcBef>
-                <a:spcPts val="3000"/>
-              </a:spcBef>
-              <a:buNone/>
-            </a:pPr>
-            <a:r>
-              <a:rPr b="1"/>
-              <a:t>Final queries v.0.1</a:t>
-            </a:r>
-          </a:p>
-        </p:txBody>
-      </p:sp>
+      <mc:AlternateContent xmlns:mc="http://schemas.openxmlformats.org/markup-compatibility/2006">
+        <mc:Choice xmlns:a14="http://schemas.microsoft.com/office/drawing/2010/main" Requires="a14">
+          <p:sp>
+            <p:nvSpPr>
+              <p:cNvPr id="3" name="Content Placeholder 2"/>
+              <p:cNvSpPr>
+                <a:spLocks noGrp="1"/>
+              </p:cNvSpPr>
+              <p:nvPr>
+                <p:ph idx="1"/>
+              </p:nvPr>
+            </p:nvSpPr>
+            <p:spPr/>
+            <p:txBody>
+              <a:bodyPr/>
+              <a:lstStyle/>
+              <a:p>
+                <a:pPr lvl="0" indent="0" marL="0">
+                  <a:spcBef>
+                    <a:spcPts val="3000"/>
+                  </a:spcBef>
+                  <a:buNone/>
+                </a:pPr>
+                <a:r>
+                  <a:rPr b="1"/>
+                  <a:t>Final queries v.0.1</a:t>
+                </a:r>
+              </a:p>
+              <a:p>
+                <a:pPr lvl="0" indent="0" marL="0">
+                  <a:buNone/>
+                </a:pPr>
+                <a:r>
+                  <a:rPr b="1"/>
+                  <a:t>Q1</a:t>
+                </a:r>
+                <a:r>
+                  <a:rPr/>
+                  <a:t> Total measurements (</a:t>
+                </a:r>
+                <a14:m>
+                  <m:oMath xmlns:m="http://schemas.openxmlformats.org/officeDocument/2006/math">
+                    <m:sSub>
+                      <m:e>
+                        <m:r>
+                          <m:t>t</m:t>
+                        </m:r>
+                      </m:e>
+                      <m:sub>
+                        <m:r>
+                          <m:t>b</m:t>
+                        </m:r>
+                      </m:sub>
+                    </m:sSub>
+                  </m:oMath>
+                </a14:m>
+                <a:r>
+                  <a:rPr/>
+                  <a:t>, </a:t>
+                </a:r>
+                <a14:m>
+                  <m:oMath xmlns:m="http://schemas.openxmlformats.org/officeDocument/2006/math">
+                    <m:sSub>
+                      <m:e>
+                        <m:r>
+                          <m:t>t</m:t>
+                        </m:r>
+                      </m:e>
+                      <m:sub>
+                        <m:r>
+                          <m:t>e</m:t>
+                        </m:r>
+                      </m:sub>
+                    </m:sSub>
+                  </m:oMath>
+                </a14:m>
+                <a:r>
+                  <a:rPr/>
+                  <a:t>): counts the total number of measurements for each device during the period [</a:t>
+                </a:r>
+                <a14:m>
+                  <m:oMath xmlns:m="http://schemas.openxmlformats.org/officeDocument/2006/math">
+                    <m:sSub>
+                      <m:e>
+                        <m:r>
+                          <m:t>t</m:t>
+                        </m:r>
+                      </m:e>
+                      <m:sub>
+                        <m:r>
+                          <m:t>b</m:t>
+                        </m:r>
+                      </m:sub>
+                    </m:sSub>
+                  </m:oMath>
+                </a14:m>
+                <a:r>
+                  <a:rPr/>
+                  <a:t>; </a:t>
+                </a:r>
+                <a14:m>
+                  <m:oMath xmlns:m="http://schemas.openxmlformats.org/officeDocument/2006/math">
+                    <m:sSub>
+                      <m:e>
+                        <m:r>
+                          <m:t>t</m:t>
+                        </m:r>
+                      </m:e>
+                      <m:sub>
+                        <m:r>
+                          <m:t>e</m:t>
+                        </m:r>
+                      </m:sub>
+                    </m:sSub>
+                  </m:oMath>
+                </a14:m>
+                <a:r>
+                  <a:rPr/>
+                  <a:t>].</a:t>
+                </a:r>
+              </a:p>
+              <a:p>
+                <a:pPr lvl="0" indent="0" marL="0">
+                  <a:buNone/>
+                </a:pPr>
+                <a:r>
+                  <a:rPr b="1"/>
+                  <a:t>Q2</a:t>
+                </a:r>
+                <a:r>
+                  <a:rPr/>
+                  <a:t> Average hourly measurements (η, [</a:t>
+                </a:r>
+                <a14:m>
+                  <m:oMath xmlns:m="http://schemas.openxmlformats.org/officeDocument/2006/math">
+                    <m:sSub>
+                      <m:e>
+                        <m:r>
+                          <m:t>t</m:t>
+                        </m:r>
+                      </m:e>
+                      <m:sub>
+                        <m:r>
+                          <m:t>b</m:t>
+                        </m:r>
+                      </m:sub>
+                    </m:sSub>
+                  </m:oMath>
+                </a14:m>
+                <a:r>
+                  <a:rPr/>
+                  <a:t>; </a:t>
+                </a:r>
+                <a14:m>
+                  <m:oMath xmlns:m="http://schemas.openxmlformats.org/officeDocument/2006/math">
+                    <m:sSub>
+                      <m:e>
+                        <m:r>
+                          <m:t>t</m:t>
+                        </m:r>
+                      </m:e>
+                      <m:sub>
+                        <m:r>
+                          <m:t>e</m:t>
+                        </m:r>
+                      </m:sub>
+                    </m:sSub>
+                  </m:oMath>
+                </a14:m>
+                <a:r>
+                  <a:rPr/>
+                  <a:t>]): Create a sorted list of the average measurement of type η in each hour interval in the given period [</a:t>
+                </a:r>
+                <a14:m>
+                  <m:oMath xmlns:m="http://schemas.openxmlformats.org/officeDocument/2006/math">
+                    <m:sSub>
+                      <m:e>
+                        <m:r>
+                          <m:t>t</m:t>
+                        </m:r>
+                      </m:e>
+                      <m:sub>
+                        <m:r>
+                          <m:t>b</m:t>
+                        </m:r>
+                      </m:sub>
+                    </m:sSub>
+                  </m:oMath>
+                </a14:m>
+                <a:r>
+                  <a:rPr/>
+                  <a:t>; </a:t>
+                </a:r>
+                <a14:m>
+                  <m:oMath xmlns:m="http://schemas.openxmlformats.org/officeDocument/2006/math">
+                    <m:sSub>
+                      <m:e>
+                        <m:r>
+                          <m:t>t</m:t>
+                        </m:r>
+                      </m:e>
+                      <m:sub>
+                        <m:r>
+                          <m:t>e</m:t>
+                        </m:r>
+                      </m:sub>
+                    </m:sSub>
+                  </m:oMath>
+                </a14:m>
+                <a:r>
+                  <a:rPr/>
+                  <a:t>].</a:t>
+                </a:r>
+              </a:p>
+              <a:p>
+                <a:pPr lvl="0" indent="0" marL="0">
+                  <a:buNone/>
+                </a:pPr>
+                <a:r>
+                  <a:rPr b="1"/>
+                  <a:t>Q3</a:t>
+                </a:r>
+                <a:r>
+                  <a:rPr/>
+                  <a:t> Monthly measurements(</a:t>
+                </a:r>
+                <a14:m>
+                  <m:oMath xmlns:m="http://schemas.openxmlformats.org/officeDocument/2006/math">
+                    <m:r>
+                      <m:t>A</m:t>
+                    </m:r>
+                  </m:oMath>
+                </a14:m>
+                <a:r>
+                  <a:rPr/>
+                  <a:t>): Create a list of the distinct agents </a:t>
+                </a:r>
+                <a14:m>
+                  <m:oMath xmlns:m="http://schemas.openxmlformats.org/officeDocument/2006/math">
+                    <m:r>
+                      <m:t>a</m:t>
+                    </m:r>
+                  </m:oMath>
+                </a14:m>
+                <a:r>
+                  <a:rPr/>
+                  <a:t> ∈ </a:t>
+                </a:r>
+                <a14:m>
+                  <m:oMath xmlns:m="http://schemas.openxmlformats.org/officeDocument/2006/math">
+                    <m:r>
+                      <m:t>A</m:t>
+                    </m:r>
+                  </m:oMath>
+                </a14:m>
+                <a:r>
+                  <a:rPr/>
+                  <a:t>, sorted by their total (monthly) measurements.</a:t>
+                </a:r>
+              </a:p>
+              <a:p>
+                <a:pPr lvl="0" indent="0" marL="0">
+                  <a:buNone/>
+                </a:pPr>
+                <a:r>
+                  <a:rPr b="1"/>
+                  <a:t>Q4</a:t>
+                </a:r>
+                <a:r>
+                  <a:rPr/>
+                  <a:t> Latest known agents location (</a:t>
+                </a:r>
+                <a14:m>
+                  <m:oMath xmlns:m="http://schemas.openxmlformats.org/officeDocument/2006/math">
+                    <m:r>
+                      <m:t>A</m:t>
+                    </m:r>
+                  </m:oMath>
+                </a14:m>
+                <a:r>
+                  <a:rPr/>
+                  <a:t>): Return the latest location for each agent </a:t>
+                </a:r>
+                <a14:m>
+                  <m:oMath xmlns:m="http://schemas.openxmlformats.org/officeDocument/2006/math">
+                    <m:r>
+                      <m:t>a</m:t>
+                    </m:r>
+                  </m:oMath>
+                </a14:m>
+                <a:r>
+                  <a:rPr/>
+                  <a:t> ∈ </a:t>
+                </a:r>
+                <a14:m>
+                  <m:oMath xmlns:m="http://schemas.openxmlformats.org/officeDocument/2006/math">
+                    <m:r>
+                      <m:t>A</m:t>
+                    </m:r>
+                  </m:oMath>
+                </a14:m>
+                <a:r>
+                  <a:rPr/>
+                  <a:t>.</a:t>
+                </a:r>
+              </a:p>
+              <a:p>
+                <a:pPr lvl="0" indent="0" marL="0">
+                  <a:buNone/>
+                </a:pPr>
+                <a:r>
+                  <a:rPr b="1"/>
+                  <a:t>Q5</a:t>
+                </a:r>
+                <a:r>
+                  <a:rPr/>
+                  <a:t> Observations (τ , </a:t>
+                </a:r>
+                <a14:m>
+                  <m:oMath xmlns:m="http://schemas.openxmlformats.org/officeDocument/2006/math">
+                    <m:r>
+                      <m:t>c</m:t>
+                    </m:r>
+                    <m:r>
+                      <m:t>o</m:t>
+                    </m:r>
+                    <m:r>
+                      <m:t>n</m:t>
+                    </m:r>
+                    <m:r>
+                      <m:t>d</m:t>
+                    </m:r>
+                  </m:oMath>
+                </a14:m>
+                <a:r>
+                  <a:rPr/>
+                  <a:t>, </a:t>
+                </a:r>
+                <a14:m>
+                  <m:oMath xmlns:m="http://schemas.openxmlformats.org/officeDocument/2006/math">
+                    <m:sSub>
+                      <m:e>
+                        <m:r>
+                          <m:t>t</m:t>
+                        </m:r>
+                      </m:e>
+                      <m:sub>
+                        <m:r>
+                          <m:t>b</m:t>
+                        </m:r>
+                      </m:sub>
+                    </m:sSub>
+                  </m:oMath>
+                </a14:m>
+                <a:r>
+                  <a:rPr/>
+                  <a:t>, </a:t>
+                </a:r>
+                <a14:m>
+                  <m:oMath xmlns:m="http://schemas.openxmlformats.org/officeDocument/2006/math">
+                    <m:sSub>
+                      <m:e>
+                        <m:r>
+                          <m:t>t</m:t>
+                        </m:r>
+                      </m:e>
+                      <m:sub>
+                        <m:r>
+                          <m:t>e</m:t>
+                        </m:r>
+                      </m:sub>
+                    </m:sSub>
+                  </m:oMath>
+                </a14:m>
+                <a:r>
+                  <a:rPr/>
+                  <a:t>): selects measurements generated by agents of given type τ in the time range [</a:t>
+                </a:r>
+                <a14:m>
+                  <m:oMath xmlns:m="http://schemas.openxmlformats.org/officeDocument/2006/math">
+                    <m:sSub>
+                      <m:e>
+                        <m:r>
+                          <m:t>t</m:t>
+                        </m:r>
+                      </m:e>
+                      <m:sub>
+                        <m:r>
+                          <m:t>b</m:t>
+                        </m:r>
+                      </m:sub>
+                    </m:sSub>
+                  </m:oMath>
+                </a14:m>
+                <a:r>
+                  <a:rPr/>
+                  <a:t>; </a:t>
+                </a:r>
+                <a14:m>
+                  <m:oMath xmlns:m="http://schemas.openxmlformats.org/officeDocument/2006/math">
+                    <m:sSub>
+                      <m:e>
+                        <m:r>
+                          <m:t>t</m:t>
+                        </m:r>
+                      </m:e>
+                      <m:sub>
+                        <m:r>
+                          <m:t>e</m:t>
+                        </m:r>
+                      </m:sub>
+                    </m:sSub>
+                  </m:oMath>
+                </a14:m>
+                <a:r>
+                  <a:rPr/>
+                  <a:t>] that satisfy the condition </a:t>
+                </a:r>
+                <a14:m>
+                  <m:oMath xmlns:m="http://schemas.openxmlformats.org/officeDocument/2006/math">
+                    <m:r>
+                      <m:t>c</m:t>
+                    </m:r>
+                    <m:r>
+                      <m:t>o</m:t>
+                    </m:r>
+                    <m:r>
+                      <m:t>n</m:t>
+                    </m:r>
+                    <m:r>
+                      <m:t>d</m:t>
+                    </m:r>
+                  </m:oMath>
+                </a14:m>
+                <a:r>
+                  <a:rPr/>
+                  <a:t>.</a:t>
+                </a:r>
+              </a:p>
+              <a:p>
+                <a:pPr lvl="0" indent="0" marL="0">
+                  <a:buNone/>
+                </a:pPr>
+                <a:r>
+                  <a:rPr b="1"/>
+                  <a:t>Q6</a:t>
+                </a:r>
+                <a:r>
+                  <a:rPr/>
+                  <a:t> InverseCoverage(</a:t>
+                </a:r>
+                <a14:m>
+                  <m:oMath xmlns:m="http://schemas.openxmlformats.org/officeDocument/2006/math">
+                    <m:r>
+                      <m:t>A</m:t>
+                    </m:r>
+                  </m:oMath>
+                </a14:m>
+                <a:r>
+                  <a:rPr/>
+                  <a:t>, </a:t>
+                </a:r>
+                <a14:m>
+                  <m:oMath xmlns:m="http://schemas.openxmlformats.org/officeDocument/2006/math">
+                    <m:r>
+                      <m:t>L</m:t>
+                    </m:r>
+                  </m:oMath>
+                </a14:m>
+                <a:r>
+                  <a:rPr/>
+                  <a:t>, η) lists all agents </a:t>
+                </a:r>
+                <a14:m>
+                  <m:oMath xmlns:m="http://schemas.openxmlformats.org/officeDocument/2006/math">
+                    <m:r>
+                      <m:t>a</m:t>
+                    </m:r>
+                  </m:oMath>
+                </a14:m>
+                <a:r>
+                  <a:rPr/>
+                  <a:t> ∈ </a:t>
+                </a:r>
+                <a14:m>
+                  <m:oMath xmlns:m="http://schemas.openxmlformats.org/officeDocument/2006/math">
+                    <m:r>
+                      <m:t>A</m:t>
+                    </m:r>
+                  </m:oMath>
+                </a14:m>
+                <a:r>
+                  <a:rPr/>
+                  <a:t> that generated measurements of a given type η in the polygon specified by the set of points </a:t>
+                </a:r>
+                <a14:m>
+                  <m:oMath xmlns:m="http://schemas.openxmlformats.org/officeDocument/2006/math">
+                    <m:r>
+                      <m:t>L</m:t>
+                    </m:r>
+                  </m:oMath>
+                </a14:m>
+                <a:r>
+                  <a:rPr/>
+                  <a:t>.</a:t>
+                </a:r>
+              </a:p>
+              <a:p>
+                <a:pPr lvl="0" indent="0" marL="0">
+                  <a:buNone/>
+                </a:pPr>
+                <a:r>
+                  <a:rPr b="1"/>
+                  <a:t>Q7</a:t>
+                </a:r>
+                <a:r>
+                  <a:rPr/>
+                  <a:t> Time in environment (</a:t>
+                </a:r>
+                <a14:m>
+                  <m:oMath xmlns:m="http://schemas.openxmlformats.org/officeDocument/2006/math">
+                    <m:r>
+                      <m:t>A</m:t>
+                    </m:r>
+                  </m:oMath>
+                </a14:m>
+                <a:r>
+                  <a:rPr/>
+                  <a:t>, </a:t>
+                </a:r>
+                <a14:m>
+                  <m:oMath xmlns:m="http://schemas.openxmlformats.org/officeDocument/2006/math">
+                    <m:r>
+                      <m:t>l</m:t>
+                    </m:r>
+                  </m:oMath>
+                </a14:m>
+                <a:r>
+                  <a:rPr/>
+                  <a:t>): Return the times for which agents </a:t>
+                </a:r>
+                <a14:m>
+                  <m:oMath xmlns:m="http://schemas.openxmlformats.org/officeDocument/2006/math">
+                    <m:r>
+                      <m:t>a</m:t>
+                    </m:r>
+                  </m:oMath>
+                </a14:m>
+                <a:r>
+                  <a:rPr/>
+                  <a:t> ∈ </a:t>
+                </a:r>
+                <a14:m>
+                  <m:oMath xmlns:m="http://schemas.openxmlformats.org/officeDocument/2006/math">
+                    <m:r>
+                      <m:t>A</m:t>
+                    </m:r>
+                  </m:oMath>
+                </a14:m>
+                <a:r>
+                  <a:rPr/>
+                  <a:t> were in an environment </a:t>
+                </a:r>
+                <a14:m>
+                  <m:oMath xmlns:m="http://schemas.openxmlformats.org/officeDocument/2006/math">
+                    <m:r>
+                      <m:t>l</m:t>
+                    </m:r>
+                  </m:oMath>
+                </a14:m>
+                <a:r>
+                  <a:rPr/>
+                  <a:t>.</a:t>
+                </a:r>
+              </a:p>
+              <a:p>
+                <a:pPr lvl="0" indent="0" marL="0">
+                  <a:buNone/>
+                </a:pPr>
+                <a:r>
+                  <a:rPr b="1"/>
+                  <a:t>Q8</a:t>
+                </a:r>
+                <a:r>
+                  <a:rPr/>
+                  <a:t> Latest measurement in environment(</a:t>
+                </a:r>
+                <a14:m>
+                  <m:oMath xmlns:m="http://schemas.openxmlformats.org/officeDocument/2006/math">
+                    <m:r>
+                      <m:t>A</m:t>
+                    </m:r>
+                  </m:oMath>
+                </a14:m>
+                <a:r>
+                  <a:rPr/>
+                  <a:t>, </a:t>
+                </a:r>
+                <a14:m>
+                  <m:oMath xmlns:m="http://schemas.openxmlformats.org/officeDocument/2006/math">
+                    <m:r>
+                      <m:t>l</m:t>
+                    </m:r>
+                  </m:oMath>
+                </a14:m>
+                <a:r>
+                  <a:rPr/>
+                  <a:t>): Return the latest measurement for each agent </a:t>
+                </a:r>
+                <a14:m>
+                  <m:oMath xmlns:m="http://schemas.openxmlformats.org/officeDocument/2006/math">
+                    <m:r>
+                      <m:t>a</m:t>
+                    </m:r>
+                  </m:oMath>
+                </a14:m>
+                <a:r>
+                  <a:rPr/>
+                  <a:t> ∈ </a:t>
+                </a:r>
+                <a14:m>
+                  <m:oMath xmlns:m="http://schemas.openxmlformats.org/officeDocument/2006/math">
+                    <m:r>
+                      <m:t>A</m:t>
+                    </m:r>
+                  </m:oMath>
+                </a14:m>
+                <a:r>
+                  <a:rPr/>
+                  <a:t> that performed measurements in a given environment </a:t>
+                </a:r>
+                <a14:m>
+                  <m:oMath xmlns:m="http://schemas.openxmlformats.org/officeDocument/2006/math">
+                    <m:r>
+                      <m:t>l</m:t>
+                    </m:r>
+                  </m:oMath>
+                </a14:m>
+                <a:r>
+                  <a:rPr/>
+                  <a:t>.</a:t>
+                </a:r>
+              </a:p>
+              <a:p>
+                <a:pPr lvl="0" indent="0" marL="0">
+                  <a:buNone/>
+                </a:pPr>
+                <a:r>
+                  <a:rPr b="1"/>
+                  <a:t>Q9</a:t>
+                </a:r>
+                <a:r>
+                  <a:rPr/>
+                  <a:t> Trajectories(</a:t>
+                </a:r>
+                <a14:m>
+                  <m:oMath xmlns:m="http://schemas.openxmlformats.org/officeDocument/2006/math">
+                    <m:sSub>
+                      <m:e>
+                        <m:r>
+                          <m:t>t</m:t>
+                        </m:r>
+                      </m:e>
+                      <m:sub>
+                        <m:r>
+                          <m:t>b</m:t>
+                        </m:r>
+                      </m:sub>
+                    </m:sSub>
+                  </m:oMath>
+                </a14:m>
+                <a:r>
+                  <a:rPr/>
+                  <a:t>, </a:t>
+                </a:r>
+                <a14:m>
+                  <m:oMath xmlns:m="http://schemas.openxmlformats.org/officeDocument/2006/math">
+                    <m:sSub>
+                      <m:e>
+                        <m:r>
+                          <m:t>t</m:t>
+                        </m:r>
+                      </m:e>
+                      <m:sub>
+                        <m:r>
+                          <m:t>e</m:t>
+                        </m:r>
+                      </m:sub>
+                    </m:sSub>
+                  </m:oMath>
+                </a14:m>
+                <a:r>
+                  <a:rPr/>
+                  <a:t>, </a:t>
+                </a:r>
+                <a14:m>
+                  <m:oMath xmlns:m="http://schemas.openxmlformats.org/officeDocument/2006/math">
+                    <m:sSub>
+                      <m:e>
+                        <m:r>
+                          <m:t>l</m:t>
+                        </m:r>
+                      </m:e>
+                      <m:sub>
+                        <m:r>
+                          <m:t>b</m:t>
+                        </m:r>
+                      </m:sub>
+                    </m:sSub>
+                  </m:oMath>
+                </a14:m>
+                <a:r>
+                  <a:rPr/>
+                  <a:t>, </a:t>
+                </a:r>
+                <a14:m>
+                  <m:oMath xmlns:m="http://schemas.openxmlformats.org/officeDocument/2006/math">
+                    <m:sSub>
+                      <m:e>
+                        <m:r>
+                          <m:t>l</m:t>
+                        </m:r>
+                      </m:e>
+                      <m:sub>
+                        <m:r>
+                          <m:t>e</m:t>
+                        </m:r>
+                      </m:sub>
+                    </m:sSub>
+                  </m:oMath>
+                </a14:m>
+                <a:r>
+                  <a:rPr/>
+                  <a:t>): retrieves the names of agents who went from location </a:t>
+                </a:r>
+                <a14:m>
+                  <m:oMath xmlns:m="http://schemas.openxmlformats.org/officeDocument/2006/math">
+                    <m:sSub>
+                      <m:e>
+                        <m:r>
+                          <m:t>l</m:t>
+                        </m:r>
+                      </m:e>
+                      <m:sub>
+                        <m:r>
+                          <m:t>b</m:t>
+                        </m:r>
+                      </m:sub>
+                    </m:sSub>
+                  </m:oMath>
+                </a14:m>
+                <a:r>
+                  <a:rPr/>
+                  <a:t> to location </a:t>
+                </a:r>
+                <a14:m>
+                  <m:oMath xmlns:m="http://schemas.openxmlformats.org/officeDocument/2006/math">
+                    <m:sSub>
+                      <m:e>
+                        <m:r>
+                          <m:t>l</m:t>
+                        </m:r>
+                      </m:e>
+                      <m:sub>
+                        <m:r>
+                          <m:t>e</m:t>
+                        </m:r>
+                      </m:sub>
+                    </m:sSub>
+                  </m:oMath>
+                </a14:m>
+                <a:r>
+                  <a:rPr/>
+                  <a:t> during the time interval [</a:t>
+                </a:r>
+                <a14:m>
+                  <m:oMath xmlns:m="http://schemas.openxmlformats.org/officeDocument/2006/math">
+                    <m:sSub>
+                      <m:e>
+                        <m:r>
+                          <m:t>t</m:t>
+                        </m:r>
+                      </m:e>
+                      <m:sub>
+                        <m:r>
+                          <m:t>b</m:t>
+                        </m:r>
+                      </m:sub>
+                    </m:sSub>
+                  </m:oMath>
+                </a14:m>
+                <a:r>
+                  <a:rPr/>
+                  <a:t>; </a:t>
+                </a:r>
+                <a14:m>
+                  <m:oMath xmlns:m="http://schemas.openxmlformats.org/officeDocument/2006/math">
+                    <m:sSub>
+                      <m:e>
+                        <m:r>
+                          <m:t>t</m:t>
+                        </m:r>
+                      </m:e>
+                      <m:sub>
+                        <m:r>
+                          <m:t>e</m:t>
+                        </m:r>
+                      </m:sub>
+                    </m:sSub>
+                  </m:oMath>
+                </a14:m>
+                <a:r>
+                  <a:rPr/>
+                  <a:t>]</a:t>
+                </a:r>
+              </a:p>
+              <a:p>
+                <a:pPr lvl="0" indent="0" marL="0">
+                  <a:buNone/>
+                </a:pPr>
+                <a:r>
+                  <a:rPr b="1"/>
+                  <a:t>Q10</a:t>
+                </a:r>
+                <a:r>
+                  <a:rPr/>
+                  <a:t> CoLocate(</a:t>
+                </a:r>
+                <a14:m>
+                  <m:oMath xmlns:m="http://schemas.openxmlformats.org/officeDocument/2006/math">
+                    <m:r>
+                      <m:t>a</m:t>
+                    </m:r>
+                  </m:oMath>
+                </a14:m>
+                <a:r>
+                  <a:rPr/>
+                  <a:t> ∈ A, </a:t>
+                </a:r>
+                <a14:m>
+                  <m:oMath xmlns:m="http://schemas.openxmlformats.org/officeDocument/2006/math">
+                    <m:sSub>
+                      <m:e>
+                        <m:r>
+                          <m:t>t</m:t>
+                        </m:r>
+                      </m:e>
+                      <m:sub>
+                        <m:r>
+                          <m:t>b</m:t>
+                        </m:r>
+                      </m:sub>
+                    </m:sSub>
+                  </m:oMath>
+                </a14:m>
+                <a:r>
+                  <a:rPr/>
+                  <a:t>, </a:t>
+                </a:r>
+                <a14:m>
+                  <m:oMath xmlns:m="http://schemas.openxmlformats.org/officeDocument/2006/math">
+                    <m:sSub>
+                      <m:e>
+                        <m:r>
+                          <m:t>t</m:t>
+                        </m:r>
+                      </m:e>
+                      <m:sub>
+                        <m:r>
+                          <m:t>e</m:t>
+                        </m:r>
+                      </m:sub>
+                    </m:sSub>
+                  </m:oMath>
+                </a14:m>
+                <a:r>
+                  <a:rPr/>
+                  <a:t>): retrieves all agents who were in the same environment as agent </a:t>
+                </a:r>
+                <a14:m>
+                  <m:oMath xmlns:m="http://schemas.openxmlformats.org/officeDocument/2006/math">
+                    <m:r>
+                      <m:t>a</m:t>
+                    </m:r>
+                  </m:oMath>
+                </a14:m>
+                <a:r>
+                  <a:rPr/>
+                  <a:t> during the specified time period.</a:t>
+                </a:r>
+              </a:p>
+              <a:p>
+                <a:pPr lvl="0" indent="0" marL="0">
+                  <a:spcBef>
+                    <a:spcPts val="3000"/>
+                  </a:spcBef>
+                  <a:buNone/>
+                </a:pPr>
+                <a:r>
+                  <a:rPr b="1"/>
+                  <a:t>Data architectures</a:t>
+                </a:r>
+              </a:p>
+              <a:p>
+                <a:pPr lvl="0"/>
+                <a:r>
+                  <a:rPr/>
+                  <a:t>Wide-Column (?)</a:t>
+                </a:r>
+              </a:p>
+              <a:p>
+                <a:pPr lvl="0"/>
+                <a:r>
+                  <a:rPr/>
+                  <a:t>Graph + Relational (PostgreSQL + PostGIS + Apache AGE)</a:t>
+                </a:r>
+              </a:p>
+              <a:p>
+                <a:pPr lvl="0"/>
+                <a:r>
+                  <a:rPr/>
+                  <a:t>Graph + Time Series (GraphDB + (ClickHouse || InfluxDB))</a:t>
+                </a:r>
+              </a:p>
+              <a:p>
+                <a:pPr lvl="0"/>
+                <a:r>
+                  <a:rPr/>
+                  <a:t>AeonG (?)</a:t>
+                </a:r>
+              </a:p>
+            </p:txBody>
+          </p:sp>
+        </mc:Choice>
+      </mc:AlternateContent>
     </p:spTree>
   </p:cSld>
 </p:sld>
@@ -6166,892 +7071,90 @@
           <a:chExt cx="0" cy="0"/>
         </a:xfrm>
       </p:grpSpPr>
-      <mc:AlternateContent xmlns:mc="http://schemas.openxmlformats.org/markup-compatibility/2006">
-        <mc:Choice xmlns:a14="http://schemas.microsoft.com/office/drawing/2010/main" Requires="a14">
-          <p:sp>
-            <p:nvSpPr>
-              <p:cNvPr id="3" name="Content Placeholder 2"/>
-              <p:cNvSpPr>
-                <a:spLocks noGrp="1"/>
-              </p:cNvSpPr>
-              <p:nvPr>
-                <p:ph idx="1" sz="half"/>
-              </p:nvPr>
-            </p:nvSpPr>
-            <p:spPr/>
-            <p:txBody>
-              <a:bodyPr/>
-              <a:lstStyle/>
-              <a:p>
-                <a:pPr lvl="0" indent="0" marL="0">
-                  <a:buNone/>
-                </a:pPr>
-                <a:r>
-                  <a:rPr b="1"/>
-                  <a:t>Q1</a:t>
-                </a:r>
-                <a:r>
-                  <a:rPr/>
-                  <a:t> Total measurements (</a:t>
-                </a:r>
-                <a14:m>
-                  <m:oMath xmlns:m="http://schemas.openxmlformats.org/officeDocument/2006/math">
-                    <m:sSub>
-                      <m:e>
-                        <m:r>
-                          <m:t>t</m:t>
-                        </m:r>
-                      </m:e>
-                      <m:sub>
-                        <m:r>
-                          <m:t>b</m:t>
-                        </m:r>
-                      </m:sub>
-                    </m:sSub>
-                  </m:oMath>
-                </a14:m>
-                <a:r>
-                  <a:rPr/>
-                  <a:t>, </a:t>
-                </a:r>
-                <a14:m>
-                  <m:oMath xmlns:m="http://schemas.openxmlformats.org/officeDocument/2006/math">
-                    <m:sSub>
-                      <m:e>
-                        <m:r>
-                          <m:t>t</m:t>
-                        </m:r>
-                      </m:e>
-                      <m:sub>
-                        <m:r>
-                          <m:t>e</m:t>
-                        </m:r>
-                      </m:sub>
-                    </m:sSub>
-                  </m:oMath>
-                </a14:m>
-                <a:r>
-                  <a:rPr/>
-                  <a:t>): counts the total number of measurements for each device during the period [</a:t>
-                </a:r>
-                <a14:m>
-                  <m:oMath xmlns:m="http://schemas.openxmlformats.org/officeDocument/2006/math">
-                    <m:sSub>
-                      <m:e>
-                        <m:r>
-                          <m:t>t</m:t>
-                        </m:r>
-                      </m:e>
-                      <m:sub>
-                        <m:r>
-                          <m:t>b</m:t>
-                        </m:r>
-                      </m:sub>
-                    </m:sSub>
-                  </m:oMath>
-                </a14:m>
-                <a:r>
-                  <a:rPr/>
-                  <a:t>; </a:t>
-                </a:r>
-                <a14:m>
-                  <m:oMath xmlns:m="http://schemas.openxmlformats.org/officeDocument/2006/math">
-                    <m:sSub>
-                      <m:e>
-                        <m:r>
-                          <m:t>t</m:t>
-                        </m:r>
-                      </m:e>
-                      <m:sub>
-                        <m:r>
-                          <m:t>e</m:t>
-                        </m:r>
-                      </m:sub>
-                    </m:sSub>
-                  </m:oMath>
-                </a14:m>
-                <a:r>
-                  <a:rPr/>
-                  <a:t>].</a:t>
-                </a:r>
-              </a:p>
-              <a:p>
-                <a:pPr lvl="0" indent="0" marL="0">
-                  <a:buNone/>
-                </a:pPr>
-                <a:r>
-                  <a:rPr b="1"/>
-                  <a:t>Q2</a:t>
-                </a:r>
-                <a:r>
-                  <a:rPr/>
-                  <a:t> Average hourly measurements (η, [</a:t>
-                </a:r>
-                <a14:m>
-                  <m:oMath xmlns:m="http://schemas.openxmlformats.org/officeDocument/2006/math">
-                    <m:sSub>
-                      <m:e>
-                        <m:r>
-                          <m:t>t</m:t>
-                        </m:r>
-                      </m:e>
-                      <m:sub>
-                        <m:r>
-                          <m:t>b</m:t>
-                        </m:r>
-                      </m:sub>
-                    </m:sSub>
-                  </m:oMath>
-                </a14:m>
-                <a:r>
-                  <a:rPr/>
-                  <a:t>; </a:t>
-                </a:r>
-                <a14:m>
-                  <m:oMath xmlns:m="http://schemas.openxmlformats.org/officeDocument/2006/math">
-                    <m:sSub>
-                      <m:e>
-                        <m:r>
-                          <m:t>t</m:t>
-                        </m:r>
-                      </m:e>
-                      <m:sub>
-                        <m:r>
-                          <m:t>e</m:t>
-                        </m:r>
-                      </m:sub>
-                    </m:sSub>
-                  </m:oMath>
-                </a14:m>
-                <a:r>
-                  <a:rPr/>
-                  <a:t>]): Create a sorted list of the average measurement of type η in each hour interval in the given period [</a:t>
-                </a:r>
-                <a14:m>
-                  <m:oMath xmlns:m="http://schemas.openxmlformats.org/officeDocument/2006/math">
-                    <m:sSub>
-                      <m:e>
-                        <m:r>
-                          <m:t>t</m:t>
-                        </m:r>
-                      </m:e>
-                      <m:sub>
-                        <m:r>
-                          <m:t>b</m:t>
-                        </m:r>
-                      </m:sub>
-                    </m:sSub>
-                  </m:oMath>
-                </a14:m>
-                <a:r>
-                  <a:rPr/>
-                  <a:t>; </a:t>
-                </a:r>
-                <a14:m>
-                  <m:oMath xmlns:m="http://schemas.openxmlformats.org/officeDocument/2006/math">
-                    <m:sSub>
-                      <m:e>
-                        <m:r>
-                          <m:t>t</m:t>
-                        </m:r>
-                      </m:e>
-                      <m:sub>
-                        <m:r>
-                          <m:t>e</m:t>
-                        </m:r>
-                      </m:sub>
-                    </m:sSub>
-                  </m:oMath>
-                </a14:m>
-                <a:r>
-                  <a:rPr/>
-                  <a:t>].</a:t>
-                </a:r>
-              </a:p>
-              <a:p>
-                <a:pPr lvl="0" indent="0" marL="0">
-                  <a:buNone/>
-                </a:pPr>
-                <a:r>
-                  <a:rPr b="1"/>
-                  <a:t>Q3</a:t>
-                </a:r>
-                <a:r>
-                  <a:rPr/>
-                  <a:t> Monthly measurements(</a:t>
-                </a:r>
-                <a14:m>
-                  <m:oMath xmlns:m="http://schemas.openxmlformats.org/officeDocument/2006/math">
-                    <m:r>
-                      <m:t>A</m:t>
-                    </m:r>
-                  </m:oMath>
-                </a14:m>
-                <a:r>
-                  <a:rPr/>
-                  <a:t>): Create a list of the distinct agents </a:t>
-                </a:r>
-                <a14:m>
-                  <m:oMath xmlns:m="http://schemas.openxmlformats.org/officeDocument/2006/math">
-                    <m:r>
-                      <m:t>a</m:t>
-                    </m:r>
-                  </m:oMath>
-                </a14:m>
-                <a:r>
-                  <a:rPr/>
-                  <a:t> ∈ </a:t>
-                </a:r>
-                <a14:m>
-                  <m:oMath xmlns:m="http://schemas.openxmlformats.org/officeDocument/2006/math">
-                    <m:r>
-                      <m:t>A</m:t>
-                    </m:r>
-                  </m:oMath>
-                </a14:m>
-                <a:r>
-                  <a:rPr/>
-                  <a:t>, sorted by their total (monthly) measurements.</a:t>
-                </a:r>
-              </a:p>
-              <a:p>
-                <a:pPr lvl="0" indent="0" marL="0">
-                  <a:buNone/>
-                </a:pPr>
-                <a:r>
-                  <a:rPr b="1"/>
-                  <a:t>Q4</a:t>
-                </a:r>
-                <a:r>
-                  <a:rPr/>
-                  <a:t> Latest known agents location (</a:t>
-                </a:r>
-                <a14:m>
-                  <m:oMath xmlns:m="http://schemas.openxmlformats.org/officeDocument/2006/math">
-                    <m:r>
-                      <m:t>A</m:t>
-                    </m:r>
-                  </m:oMath>
-                </a14:m>
-                <a:r>
-                  <a:rPr/>
-                  <a:t>): Return the latest location for each agent </a:t>
-                </a:r>
-                <a14:m>
-                  <m:oMath xmlns:m="http://schemas.openxmlformats.org/officeDocument/2006/math">
-                    <m:r>
-                      <m:t>a</m:t>
-                    </m:r>
-                  </m:oMath>
-                </a14:m>
-                <a:r>
-                  <a:rPr/>
-                  <a:t> ∈ </a:t>
-                </a:r>
-                <a14:m>
-                  <m:oMath xmlns:m="http://schemas.openxmlformats.org/officeDocument/2006/math">
-                    <m:r>
-                      <m:t>A</m:t>
-                    </m:r>
-                  </m:oMath>
-                </a14:m>
-                <a:r>
-                  <a:rPr/>
-                  <a:t>.</a:t>
-                </a:r>
-              </a:p>
-              <a:p>
-                <a:pPr lvl="0" indent="0" marL="0">
-                  <a:buNone/>
-                </a:pPr>
-                <a:r>
-                  <a:rPr b="1"/>
-                  <a:t>Q5</a:t>
-                </a:r>
-                <a:r>
-                  <a:rPr/>
-                  <a:t> Observations (τ , </a:t>
-                </a:r>
-                <a14:m>
-                  <m:oMath xmlns:m="http://schemas.openxmlformats.org/officeDocument/2006/math">
-                    <m:r>
-                      <m:t>c</m:t>
-                    </m:r>
-                    <m:r>
-                      <m:t>o</m:t>
-                    </m:r>
-                    <m:r>
-                      <m:t>n</m:t>
-                    </m:r>
-                    <m:r>
-                      <m:t>d</m:t>
-                    </m:r>
-                  </m:oMath>
-                </a14:m>
-                <a:r>
-                  <a:rPr/>
-                  <a:t>, </a:t>
-                </a:r>
-                <a14:m>
-                  <m:oMath xmlns:m="http://schemas.openxmlformats.org/officeDocument/2006/math">
-                    <m:sSub>
-                      <m:e>
-                        <m:r>
-                          <m:t>t</m:t>
-                        </m:r>
-                      </m:e>
-                      <m:sub>
-                        <m:r>
-                          <m:t>b</m:t>
-                        </m:r>
-                      </m:sub>
-                    </m:sSub>
-                  </m:oMath>
-                </a14:m>
-                <a:r>
-                  <a:rPr/>
-                  <a:t>, </a:t>
-                </a:r>
-                <a14:m>
-                  <m:oMath xmlns:m="http://schemas.openxmlformats.org/officeDocument/2006/math">
-                    <m:sSub>
-                      <m:e>
-                        <m:r>
-                          <m:t>t</m:t>
-                        </m:r>
-                      </m:e>
-                      <m:sub>
-                        <m:r>
-                          <m:t>e</m:t>
-                        </m:r>
-                      </m:sub>
-                    </m:sSub>
-                  </m:oMath>
-                </a14:m>
-                <a:r>
-                  <a:rPr/>
-                  <a:t>): selects measurements generated by agents of given type τ in the time range [</a:t>
-                </a:r>
-                <a14:m>
-                  <m:oMath xmlns:m="http://schemas.openxmlformats.org/officeDocument/2006/math">
-                    <m:sSub>
-                      <m:e>
-                        <m:r>
-                          <m:t>t</m:t>
-                        </m:r>
-                      </m:e>
-                      <m:sub>
-                        <m:r>
-                          <m:t>b</m:t>
-                        </m:r>
-                      </m:sub>
-                    </m:sSub>
-                  </m:oMath>
-                </a14:m>
-                <a:r>
-                  <a:rPr/>
-                  <a:t>; </a:t>
-                </a:r>
-                <a14:m>
-                  <m:oMath xmlns:m="http://schemas.openxmlformats.org/officeDocument/2006/math">
-                    <m:sSub>
-                      <m:e>
-                        <m:r>
-                          <m:t>t</m:t>
-                        </m:r>
-                      </m:e>
-                      <m:sub>
-                        <m:r>
-                          <m:t>e</m:t>
-                        </m:r>
-                      </m:sub>
-                    </m:sSub>
-                  </m:oMath>
-                </a14:m>
-                <a:r>
-                  <a:rPr/>
-                  <a:t>] that satisfy the condition </a:t>
-                </a:r>
-                <a14:m>
-                  <m:oMath xmlns:m="http://schemas.openxmlformats.org/officeDocument/2006/math">
-                    <m:r>
-                      <m:t>c</m:t>
-                    </m:r>
-                    <m:r>
-                      <m:t>o</m:t>
-                    </m:r>
-                    <m:r>
-                      <m:t>n</m:t>
-                    </m:r>
-                    <m:r>
-                      <m:t>d</m:t>
-                    </m:r>
-                  </m:oMath>
-                </a14:m>
-                <a:r>
-                  <a:rPr/>
-                  <a:t>.</a:t>
-                </a:r>
-              </a:p>
-              <a:p>
-                <a:pPr lvl="0" indent="0" marL="0">
-                  <a:buNone/>
-                </a:pPr>
-                <a:r>
-                  <a:rPr b="1"/>
-                  <a:t>Q6</a:t>
-                </a:r>
-                <a:r>
-                  <a:rPr/>
-                  <a:t> InverseCoverage(</a:t>
-                </a:r>
-                <a14:m>
-                  <m:oMath xmlns:m="http://schemas.openxmlformats.org/officeDocument/2006/math">
-                    <m:r>
-                      <m:t>A</m:t>
-                    </m:r>
-                  </m:oMath>
-                </a14:m>
-                <a:r>
-                  <a:rPr/>
-                  <a:t>, </a:t>
-                </a:r>
-                <a14:m>
-                  <m:oMath xmlns:m="http://schemas.openxmlformats.org/officeDocument/2006/math">
-                    <m:r>
-                      <m:t>L</m:t>
-                    </m:r>
-                  </m:oMath>
-                </a14:m>
-                <a:r>
-                  <a:rPr/>
-                  <a:t>, η) lists all agents </a:t>
-                </a:r>
-                <a14:m>
-                  <m:oMath xmlns:m="http://schemas.openxmlformats.org/officeDocument/2006/math">
-                    <m:r>
-                      <m:t>a</m:t>
-                    </m:r>
-                  </m:oMath>
-                </a14:m>
-                <a:r>
-                  <a:rPr/>
-                  <a:t> ∈ </a:t>
-                </a:r>
-                <a14:m>
-                  <m:oMath xmlns:m="http://schemas.openxmlformats.org/officeDocument/2006/math">
-                    <m:r>
-                      <m:t>A</m:t>
-                    </m:r>
-                  </m:oMath>
-                </a14:m>
-                <a:r>
-                  <a:rPr/>
-                  <a:t> that generated measurements of a given type η in the polygon specified by the set of points </a:t>
-                </a:r>
-                <a14:m>
-                  <m:oMath xmlns:m="http://schemas.openxmlformats.org/officeDocument/2006/math">
-                    <m:r>
-                      <m:t>L</m:t>
-                    </m:r>
-                  </m:oMath>
-                </a14:m>
-                <a:r>
-                  <a:rPr/>
-                  <a:t>.</a:t>
-                </a:r>
-              </a:p>
-              <a:p>
-                <a:pPr lvl="0" indent="0" marL="0">
-                  <a:buNone/>
-                </a:pPr>
-                <a:r>
-                  <a:rPr b="1"/>
-                  <a:t>Q7</a:t>
-                </a:r>
-                <a:r>
-                  <a:rPr/>
-                  <a:t> Time in environment (</a:t>
-                </a:r>
-                <a14:m>
-                  <m:oMath xmlns:m="http://schemas.openxmlformats.org/officeDocument/2006/math">
-                    <m:r>
-                      <m:t>A</m:t>
-                    </m:r>
-                  </m:oMath>
-                </a14:m>
-                <a:r>
-                  <a:rPr/>
-                  <a:t>, </a:t>
-                </a:r>
-                <a14:m>
-                  <m:oMath xmlns:m="http://schemas.openxmlformats.org/officeDocument/2006/math">
-                    <m:r>
-                      <m:t>l</m:t>
-                    </m:r>
-                  </m:oMath>
-                </a14:m>
-                <a:r>
-                  <a:rPr/>
-                  <a:t>): Return the times for which agents </a:t>
-                </a:r>
-                <a14:m>
-                  <m:oMath xmlns:m="http://schemas.openxmlformats.org/officeDocument/2006/math">
-                    <m:r>
-                      <m:t>a</m:t>
-                    </m:r>
-                  </m:oMath>
-                </a14:m>
-                <a:r>
-                  <a:rPr/>
-                  <a:t> ∈ </a:t>
-                </a:r>
-                <a14:m>
-                  <m:oMath xmlns:m="http://schemas.openxmlformats.org/officeDocument/2006/math">
-                    <m:r>
-                      <m:t>A</m:t>
-                    </m:r>
-                  </m:oMath>
-                </a14:m>
-                <a:r>
-                  <a:rPr/>
-                  <a:t> were in an environment </a:t>
-                </a:r>
-                <a14:m>
-                  <m:oMath xmlns:m="http://schemas.openxmlformats.org/officeDocument/2006/math">
-                    <m:r>
-                      <m:t>l</m:t>
-                    </m:r>
-                  </m:oMath>
-                </a14:m>
-                <a:r>
-                  <a:rPr/>
-                  <a:t>.</a:t>
-                </a:r>
-              </a:p>
-              <a:p>
-                <a:pPr lvl="0" indent="0" marL="0">
-                  <a:buNone/>
-                </a:pPr>
-                <a:r>
-                  <a:rPr b="1"/>
-                  <a:t>Q8</a:t>
-                </a:r>
-                <a:r>
-                  <a:rPr/>
-                  <a:t> Latest measurement in environment(</a:t>
-                </a:r>
-                <a14:m>
-                  <m:oMath xmlns:m="http://schemas.openxmlformats.org/officeDocument/2006/math">
-                    <m:r>
-                      <m:t>A</m:t>
-                    </m:r>
-                  </m:oMath>
-                </a14:m>
-                <a:r>
-                  <a:rPr/>
-                  <a:t>, </a:t>
-                </a:r>
-                <a14:m>
-                  <m:oMath xmlns:m="http://schemas.openxmlformats.org/officeDocument/2006/math">
-                    <m:r>
-                      <m:t>l</m:t>
-                    </m:r>
-                  </m:oMath>
-                </a14:m>
-                <a:r>
-                  <a:rPr/>
-                  <a:t>): Return the latest measurement for each agent </a:t>
-                </a:r>
-                <a14:m>
-                  <m:oMath xmlns:m="http://schemas.openxmlformats.org/officeDocument/2006/math">
-                    <m:r>
-                      <m:t>a</m:t>
-                    </m:r>
-                  </m:oMath>
-                </a14:m>
-                <a:r>
-                  <a:rPr/>
-                  <a:t> ∈ </a:t>
-                </a:r>
-                <a14:m>
-                  <m:oMath xmlns:m="http://schemas.openxmlformats.org/officeDocument/2006/math">
-                    <m:r>
-                      <m:t>A</m:t>
-                    </m:r>
-                  </m:oMath>
-                </a14:m>
-                <a:r>
-                  <a:rPr/>
-                  <a:t> that performed measurements in a given environment </a:t>
-                </a:r>
-                <a14:m>
-                  <m:oMath xmlns:m="http://schemas.openxmlformats.org/officeDocument/2006/math">
-                    <m:r>
-                      <m:t>l</m:t>
-                    </m:r>
-                  </m:oMath>
-                </a14:m>
-                <a:r>
-                  <a:rPr/>
-                  <a:t>.</a:t>
-                </a:r>
-              </a:p>
-              <a:p>
-                <a:pPr lvl="0" indent="0" marL="0">
-                  <a:buNone/>
-                </a:pPr>
-                <a:r>
-                  <a:rPr b="1"/>
-                  <a:t>Q9</a:t>
-                </a:r>
-                <a:r>
-                  <a:rPr/>
-                  <a:t> Trajectories(</a:t>
-                </a:r>
-                <a14:m>
-                  <m:oMath xmlns:m="http://schemas.openxmlformats.org/officeDocument/2006/math">
-                    <m:sSub>
-                      <m:e>
-                        <m:r>
-                          <m:t>t</m:t>
-                        </m:r>
-                      </m:e>
-                      <m:sub>
-                        <m:r>
-                          <m:t>b</m:t>
-                        </m:r>
-                      </m:sub>
-                    </m:sSub>
-                  </m:oMath>
-                </a14:m>
-                <a:r>
-                  <a:rPr/>
-                  <a:t>, </a:t>
-                </a:r>
-                <a14:m>
-                  <m:oMath xmlns:m="http://schemas.openxmlformats.org/officeDocument/2006/math">
-                    <m:sSub>
-                      <m:e>
-                        <m:r>
-                          <m:t>t</m:t>
-                        </m:r>
-                      </m:e>
-                      <m:sub>
-                        <m:r>
-                          <m:t>e</m:t>
-                        </m:r>
-                      </m:sub>
-                    </m:sSub>
-                  </m:oMath>
-                </a14:m>
-                <a:r>
-                  <a:rPr/>
-                  <a:t>, </a:t>
-                </a:r>
-                <a14:m>
-                  <m:oMath xmlns:m="http://schemas.openxmlformats.org/officeDocument/2006/math">
-                    <m:sSub>
-                      <m:e>
-                        <m:r>
-                          <m:t>l</m:t>
-                        </m:r>
-                      </m:e>
-                      <m:sub>
-                        <m:r>
-                          <m:t>b</m:t>
-                        </m:r>
-                      </m:sub>
-                    </m:sSub>
-                  </m:oMath>
-                </a14:m>
-                <a:r>
-                  <a:rPr/>
-                  <a:t>, </a:t>
-                </a:r>
-                <a14:m>
-                  <m:oMath xmlns:m="http://schemas.openxmlformats.org/officeDocument/2006/math">
-                    <m:sSub>
-                      <m:e>
-                        <m:r>
-                          <m:t>l</m:t>
-                        </m:r>
-                      </m:e>
-                      <m:sub>
-                        <m:r>
-                          <m:t>e</m:t>
-                        </m:r>
-                      </m:sub>
-                    </m:sSub>
-                  </m:oMath>
-                </a14:m>
-                <a:r>
-                  <a:rPr/>
-                  <a:t>): retrieves the names of agents who went from location </a:t>
-                </a:r>
-                <a14:m>
-                  <m:oMath xmlns:m="http://schemas.openxmlformats.org/officeDocument/2006/math">
-                    <m:sSub>
-                      <m:e>
-                        <m:r>
-                          <m:t>l</m:t>
-                        </m:r>
-                      </m:e>
-                      <m:sub>
-                        <m:r>
-                          <m:t>b</m:t>
-                        </m:r>
-                      </m:sub>
-                    </m:sSub>
-                  </m:oMath>
-                </a14:m>
-                <a:r>
-                  <a:rPr/>
-                  <a:t> to location </a:t>
-                </a:r>
-                <a14:m>
-                  <m:oMath xmlns:m="http://schemas.openxmlformats.org/officeDocument/2006/math">
-                    <m:sSub>
-                      <m:e>
-                        <m:r>
-                          <m:t>l</m:t>
-                        </m:r>
-                      </m:e>
-                      <m:sub>
-                        <m:r>
-                          <m:t>e</m:t>
-                        </m:r>
-                      </m:sub>
-                    </m:sSub>
-                  </m:oMath>
-                </a14:m>
-                <a:r>
-                  <a:rPr/>
-                  <a:t> during the time interval [</a:t>
-                </a:r>
-                <a14:m>
-                  <m:oMath xmlns:m="http://schemas.openxmlformats.org/officeDocument/2006/math">
-                    <m:sSub>
-                      <m:e>
-                        <m:r>
-                          <m:t>t</m:t>
-                        </m:r>
-                      </m:e>
-                      <m:sub>
-                        <m:r>
-                          <m:t>b</m:t>
-                        </m:r>
-                      </m:sub>
-                    </m:sSub>
-                  </m:oMath>
-                </a14:m>
-                <a:r>
-                  <a:rPr/>
-                  <a:t>; </a:t>
-                </a:r>
-                <a14:m>
-                  <m:oMath xmlns:m="http://schemas.openxmlformats.org/officeDocument/2006/math">
-                    <m:sSub>
-                      <m:e>
-                        <m:r>
-                          <m:t>t</m:t>
-                        </m:r>
-                      </m:e>
-                      <m:sub>
-                        <m:r>
-                          <m:t>e</m:t>
-                        </m:r>
-                      </m:sub>
-                    </m:sSub>
-                  </m:oMath>
-                </a14:m>
-                <a:r>
-                  <a:rPr/>
-                  <a:t>]</a:t>
-                </a:r>
-              </a:p>
-              <a:p>
-                <a:pPr lvl="0" indent="0" marL="0">
-                  <a:buNone/>
-                </a:pPr>
-                <a:r>
-                  <a:rPr b="1"/>
-                  <a:t>Q10</a:t>
-                </a:r>
-                <a:r>
-                  <a:rPr/>
-                  <a:t> CoLocate(</a:t>
-                </a:r>
-                <a14:m>
-                  <m:oMath xmlns:m="http://schemas.openxmlformats.org/officeDocument/2006/math">
-                    <m:r>
-                      <m:t>a</m:t>
-                    </m:r>
-                  </m:oMath>
-                </a14:m>
-                <a:r>
-                  <a:rPr/>
-                  <a:t> ∈ A, </a:t>
-                </a:r>
-                <a14:m>
-                  <m:oMath xmlns:m="http://schemas.openxmlformats.org/officeDocument/2006/math">
-                    <m:sSub>
-                      <m:e>
-                        <m:r>
-                          <m:t>t</m:t>
-                        </m:r>
-                      </m:e>
-                      <m:sub>
-                        <m:r>
-                          <m:t>b</m:t>
-                        </m:r>
-                      </m:sub>
-                    </m:sSub>
-                  </m:oMath>
-                </a14:m>
-                <a:r>
-                  <a:rPr/>
-                  <a:t>, </a:t>
-                </a:r>
-                <a14:m>
-                  <m:oMath xmlns:m="http://schemas.openxmlformats.org/officeDocument/2006/math">
-                    <m:sSub>
-                      <m:e>
-                        <m:r>
-                          <m:t>t</m:t>
-                        </m:r>
-                      </m:e>
-                      <m:sub>
-                        <m:r>
-                          <m:t>e</m:t>
-                        </m:r>
-                      </m:sub>
-                    </m:sSub>
-                  </m:oMath>
-                </a14:m>
-                <a:r>
-                  <a:rPr/>
-                  <a:t>): retrieves all agents who were in the same environment as agent </a:t>
-                </a:r>
-                <a14:m>
-                  <m:oMath xmlns:m="http://schemas.openxmlformats.org/officeDocument/2006/math">
-                    <m:r>
-                      <m:t>a</m:t>
-                    </m:r>
-                  </m:oMath>
-                </a14:m>
-                <a:r>
-                  <a:rPr/>
-                  <a:t> during the specified time period.</a:t>
-                </a:r>
-              </a:p>
-            </p:txBody>
-          </p:sp>
-        </mc:Choice>
-      </mc:AlternateContent>
+      <p:sp>
+        <p:nvSpPr>
+          <p:cNvPr id="2" name="Title 1"/>
+          <p:cNvSpPr>
+            <a:spLocks noGrp="1"/>
+          </p:cNvSpPr>
+          <p:nvPr>
+            <p:ph type="title"/>
+          </p:nvPr>
+        </p:nvSpPr>
+        <p:spPr/>
+        <p:txBody>
+          <a:bodyPr/>
+          <a:lstStyle/>
+          <a:p>
+            <a:pPr lvl="0" indent="0" marL="0">
+              <a:buNone/>
+            </a:pPr>
+            <a:r>
+              <a:rPr/>
+              <a:t>PostGIS</a:t>
+            </a:r>
+          </a:p>
+        </p:txBody>
+      </p:sp>
+      <p:sp>
+        <p:nvSpPr>
+          <p:cNvPr id="3" name="Content Placeholder 2"/>
+          <p:cNvSpPr>
+            <a:spLocks noGrp="1"/>
+          </p:cNvSpPr>
+          <p:nvPr>
+            <p:ph idx="1"/>
+          </p:nvPr>
+        </p:nvSpPr>
+        <p:spPr/>
+        <p:txBody>
+          <a:bodyPr/>
+          <a:lstStyle/>
+          <a:p>
+            <a:pPr lvl="0" indent="0" marL="0">
+              <a:spcBef>
+                <a:spcPts val="3000"/>
+              </a:spcBef>
+              <a:buNone/>
+            </a:pPr>
+            <a:r>
+              <a:rPr b="1"/>
+              <a:t>Spatial Functions</a:t>
+            </a:r>
+          </a:p>
+          <a:p>
+            <a:pPr lvl="0"/>
+            <a:r>
+              <a:rPr/>
+              <a:t>Routing. With pgRouting and road data you can find optimal routes and do different network analytics;</a:t>
+            </a:r>
+          </a:p>
+          <a:p>
+            <a:pPr lvl="0"/>
+            <a:r>
+              <a:rPr/>
+              <a:t>Polygon skeletonization. This function enables you to build the medial axis of a polygon on the fly;</a:t>
+            </a:r>
+          </a:p>
+          <a:p>
+            <a:pPr lvl="0"/>
+            <a:r>
+              <a:rPr/>
+              <a:t>Geometry subdivision. Dividing your geometries for further processing can significantly speed up your processes;</a:t>
+            </a:r>
+          </a:p>
+          <a:p>
+            <a:pPr lvl="0"/>
+            <a:r>
+              <a:rPr/>
+              <a:t>Clustering. Find clusters and patterns from your data. With the AI hype at peak, the k-means might be even more interesting for some than before…</a:t>
+            </a:r>
+          </a:p>
+        </p:txBody>
+      </p:sp>
       <p:pic>
         <p:nvPicPr>
-          <p:cNvPr descr="https://github.com/ManuelePasini/slides-markdown/blob/master/slides/images/dt/workload.png?raw=true" id="0" name="Picture 1"/>
+          <p:cNvPr descr="https://github.com/ManuelePasini/slides-markdown/blob/master/slides/images/dt/postgis/geometry_hierarchy.png?raw=true" id="0" name="Picture 1"/>
           <p:cNvPicPr>
             <a:picLocks noGrp="1" noChangeAspect="1"/>
           </p:cNvPicPr>
@@ -7065,8 +7168,8 @@
         </p:blipFill>
         <p:spPr bwMode="auto">
           <a:xfrm>
-            <a:off x="4648200" y="1244600"/>
-            <a:ext cx="4038600" cy="2781300"/>
+            <a:off x="457200" y="1244600"/>
+            <a:ext cx="8229600" cy="2794000"/>
           </a:xfrm>
           <a:prstGeom prst="rect">
             <a:avLst/>
@@ -7087,8 +7190,8 @@
         </p:nvSpPr>
         <p:spPr>
           <a:xfrm>
-            <a:off x="4648200" y="4076700"/>
-            <a:ext cx="4038600" cy="508000"/>
+            <a:off x="457200" y="4076700"/>
+            <a:ext cx="8229600" cy="508000"/>
           </a:xfrm>
           <a:prstGeom prst="rect">
             <a:avLst/>
@@ -7104,7 +7207,142 @@
             </a:pPr>
             <a:r>
               <a:rPr/>
-              <a:t>Workload overview</a:t>
+              <a:t>PostGIS Geometry Hierarchy</a:t>
+            </a:r>
+          </a:p>
+        </p:txBody>
+      </p:sp>
+      <p:sp>
+        <p:nvSpPr>
+          <p:cNvPr id="3" name="Content Placeholder 2"/>
+          <p:cNvSpPr>
+            <a:spLocks noGrp="1"/>
+          </p:cNvSpPr>
+          <p:nvPr>
+            <p:ph idx="1"/>
+          </p:nvPr>
+        </p:nvSpPr>
+        <p:spPr/>
+        <p:txBody>
+          <a:bodyPr/>
+          <a:lstStyle/>
+          <a:p>
+            <a:pPr lvl="0" indent="0" marL="0">
+              <a:spcBef>
+                <a:spcPts val="3000"/>
+              </a:spcBef>
+              <a:buNone/>
+            </a:pPr>
+            <a:r>
+              <a:rPr b="1"/>
+              <a:t>Indexing</a:t>
+            </a:r>
+          </a:p>
+          <a:p>
+            <a:pPr lvl="0"/>
+            <a:r>
+              <a:rPr/>
+              <a:t>Indexes have to perform quickly in order to be useful. So instead of providing exact results, as B-trees do, spatial indexes provide approximate results. The question “what lines are inside this polygon?” will be instead interpreted by a spatial index as “what lines have bounding boxes that are contained inside this polygon’s bounding box?”</a:t>
+            </a:r>
+          </a:p>
+          <a:p>
+            <a:pPr lvl="0"/>
+            <a:r>
+              <a:rPr/>
+              <a:t>The most common implementations are the </a:t>
+            </a:r>
+            <a:r>
+              <a:rPr>
+                <a:hlinkClick r:id="rId3"/>
+              </a:rPr>
+              <a:t>R-Tree</a:t>
+            </a:r>
+            <a:r>
+              <a:rPr/>
+              <a:t> and Quadtree (used in PostGIS), but there are also grid-based indexes and GeoHash indexes implemented in other spatial databases.</a:t>
+            </a:r>
+          </a:p>
+        </p:txBody>
+      </p:sp>
+      <p:pic>
+        <p:nvPicPr>
+          <p:cNvPr descr="https://github.com/ManuelePasini/slides-markdown/blob/master/slides/images/dt/postgis/bbox.png?raw=true" id="0" name="Picture 1"/>
+          <p:cNvPicPr>
+            <a:picLocks noGrp="1" noChangeAspect="1"/>
+          </p:cNvPicPr>
+          <p:nvPr/>
+        </p:nvPicPr>
+        <p:blipFill>
+          <a:blip r:embed="rId4"/>
+          <a:stretch>
+            <a:fillRect/>
+          </a:stretch>
+        </p:blipFill>
+        <p:spPr bwMode="auto">
+          <a:xfrm>
+            <a:off x="457200" y="1600200"/>
+            <a:ext cx="8229600" cy="2057400"/>
+          </a:xfrm>
+          <a:prstGeom prst="rect">
+            <a:avLst/>
+          </a:prstGeom>
+          <a:noFill/>
+          <a:ln w="9525">
+            <a:noFill/>
+            <a:headEnd/>
+            <a:tailEnd/>
+          </a:ln>
+        </p:spPr>
+      </p:pic>
+      <p:sp>
+        <p:nvSpPr>
+          <p:cNvPr id="1" name="TextBox 3"/>
+          <p:cNvSpPr txBox="1"/>
+          <p:nvPr/>
+        </p:nvSpPr>
+        <p:spPr>
+          <a:xfrm>
+            <a:off x="457200" y="4076700"/>
+            <a:ext cx="8229600" cy="508000"/>
+          </a:xfrm>
+          <a:prstGeom prst="rect">
+            <a:avLst/>
+          </a:prstGeom>
+          <a:noFill/>
+        </p:spPr>
+        <p:txBody>
+          <a:bodyPr/>
+          <a:lstStyle/>
+          <a:p>
+            <a:pPr lvl="0" indent="0" marL="0" algn="ctr">
+              <a:buNone/>
+            </a:pPr>
+            <a:r>
+              <a:rPr/>
+              <a:t>BBox Example</a:t>
+            </a:r>
+          </a:p>
+        </p:txBody>
+      </p:sp>
+      <p:sp>
+        <p:nvSpPr>
+          <p:cNvPr id="3" name="Content Placeholder 2"/>
+          <p:cNvSpPr>
+            <a:spLocks noGrp="1"/>
+          </p:cNvSpPr>
+          <p:nvPr>
+            <p:ph idx="1"/>
+          </p:nvPr>
+        </p:nvSpPr>
+        <p:spPr/>
+        <p:txBody>
+          <a:bodyPr/>
+          <a:lstStyle/>
+          <a:p>
+            <a:pPr lvl="0"/>
+            <a:r>
+              <a:rPr/>
+              <a:t>The way the database efficiently answers the question “what lines intersect the yellow star” is to first answer the question “what boxes intersect the yellow box” using the index (which is very fast) and then do an exact calculation of “what lines intersect the yellow star” only for those features returned by the first test.</a:t>
             </a:r>
           </a:p>
         </p:txBody>
@@ -7133,6 +7371,135 @@
       </p:grpSpPr>
       <p:sp>
         <p:nvSpPr>
+          <p:cNvPr id="2" name="Title 1"/>
+          <p:cNvSpPr>
+            <a:spLocks noGrp="1"/>
+          </p:cNvSpPr>
+          <p:nvPr>
+            <p:ph type="title"/>
+          </p:nvPr>
+        </p:nvSpPr>
+        <p:spPr/>
+        <p:txBody>
+          <a:bodyPr/>
+          <a:lstStyle/>
+          <a:p>
+            <a:pPr lvl="0" indent="0" marL="0">
+              <a:buNone/>
+            </a:pPr>
+            <a:r>
+              <a:rPr/>
+              <a:t>Apache AGE</a:t>
+            </a:r>
+          </a:p>
+        </p:txBody>
+      </p:sp>
+      <p:sp>
+        <p:nvSpPr>
+          <p:cNvPr id="3" name="Content Placeholder 2"/>
+          <p:cNvSpPr>
+            <a:spLocks noGrp="1"/>
+          </p:cNvSpPr>
+          <p:nvPr>
+            <p:ph idx="1"/>
+          </p:nvPr>
+        </p:nvSpPr>
+        <p:spPr/>
+        <p:txBody>
+          <a:bodyPr/>
+          <a:lstStyle/>
+          <a:p>
+            <a:pPr lvl="0"/>
+            <a:r>
+              <a:rPr/>
+              <a:t>Extends PostgreSQL with graph semantics</a:t>
+            </a:r>
+          </a:p>
+          <a:p>
+            <a:pPr lvl="0"/>
+            <a:r>
+              <a:rPr/>
+              <a:t>No graph data model!</a:t>
+            </a:r>
+          </a:p>
+          <a:p>
+            <a:pPr lvl="0"/>
+            <a:r>
+              <a:rPr/>
+              <a:t>Wrapper upon PostgreSQL relational storage</a:t>
+            </a:r>
+          </a:p>
+          <a:p>
+            <a:pPr lvl="0"/>
+            <a:r>
+              <a:rPr/>
+              <a:t>A table for each node/vertex</a:t>
+            </a:r>
+          </a:p>
+        </p:txBody>
+      </p:sp>
+      <p:pic>
+        <p:nvPicPr>
+          <p:cNvPr descr="https://github.com/ManuelePasini/slides-markdown/blob/master/slides/images/dt/apache_age/architecture.png?raw=true" id="0" name="Picture 1"/>
+          <p:cNvPicPr>
+            <a:picLocks noGrp="1" noChangeAspect="1"/>
+          </p:cNvPicPr>
+          <p:nvPr/>
+        </p:nvPicPr>
+        <p:blipFill>
+          <a:blip r:embed="rId2"/>
+          <a:stretch>
+            <a:fillRect/>
+          </a:stretch>
+        </p:blipFill>
+        <p:spPr bwMode="auto">
+          <a:xfrm>
+            <a:off x="1866900" y="1193800"/>
+            <a:ext cx="5410200" cy="2882900"/>
+          </a:xfrm>
+          <a:prstGeom prst="rect">
+            <a:avLst/>
+          </a:prstGeom>
+          <a:noFill/>
+          <a:ln w="9525">
+            <a:noFill/>
+            <a:headEnd/>
+            <a:tailEnd/>
+          </a:ln>
+        </p:spPr>
+      </p:pic>
+      <p:sp>
+        <p:nvSpPr>
+          <p:cNvPr id="1" name="TextBox 3"/>
+          <p:cNvSpPr txBox="1"/>
+          <p:nvPr/>
+        </p:nvSpPr>
+        <p:spPr>
+          <a:xfrm>
+            <a:off x="457200" y="4076700"/>
+            <a:ext cx="8229600" cy="508000"/>
+          </a:xfrm>
+          <a:prstGeom prst="rect">
+            <a:avLst/>
+          </a:prstGeom>
+          <a:noFill/>
+        </p:spPr>
+        <p:txBody>
+          <a:bodyPr/>
+          <a:lstStyle/>
+          <a:p>
+            <a:pPr lvl="0" indent="0" marL="0" algn="ctr">
+              <a:buNone/>
+            </a:pPr>
+            <a:r>
+              <a:rPr/>
+              <a:t>Apachce AGE under the hood architecture</a:t>
+            </a:r>
+          </a:p>
+        </p:txBody>
+      </p:sp>
+      <p:sp>
+        <p:nvSpPr>
           <p:cNvPr id="3" name="Content Placeholder 2"/>
           <p:cNvSpPr>
             <a:spLocks noGrp="1"/>
@@ -7154,35 +7521,143 @@
             </a:pPr>
             <a:r>
               <a:rPr b="1"/>
-              <a:t>Data architectures</a:t>
-            </a:r>
-          </a:p>
-          <a:p>
-            <a:pPr lvl="0"/>
-            <a:r>
-              <a:rPr/>
-              <a:t>Wide-Column (?)</a:t>
-            </a:r>
-          </a:p>
-          <a:p>
-            <a:pPr lvl="0"/>
-            <a:r>
-              <a:rPr/>
-              <a:t>Graph + Relational (PostgreSQL + PostGIS + Apache AGE)</a:t>
-            </a:r>
-          </a:p>
-          <a:p>
-            <a:pPr lvl="0"/>
-            <a:r>
-              <a:rPr/>
-              <a:t>Graph + Time Series (GraphDB + (ClickHouse || InfluxDB))</a:t>
-            </a:r>
-          </a:p>
-          <a:p>
-            <a:pPr lvl="0"/>
-            <a:r>
-              <a:rPr/>
-              <a:t>AeonG (?)</a:t>
+              <a:t>Setup</a:t>
+            </a:r>
+          </a:p>
+          <a:p>
+            <a:pPr lvl="0" indent="0" marL="0">
+              <a:buNone/>
+            </a:pPr>
+            <a:r>
+              <a:rPr/>
+              <a:t>Create and load AGE extension</a:t>
+            </a:r>
+          </a:p>
+          <a:p>
+            <a:pPr lvl="0" indent="0">
+              <a:buNone/>
+            </a:pPr>
+            <a:r>
+              <a:rPr>
+                <a:latin typeface="Courier"/>
+              </a:rPr>
+              <a:t>CREATE EXTENSION IF NOT EXISTS age;
+LOAD 'age';</a:t>
+            </a:r>
+          </a:p>
+          <a:p>
+            <a:pPr lvl="0" indent="0" marL="0">
+              <a:buNone/>
+            </a:pPr>
+            <a:r>
+              <a:rPr/>
+              <a:t>Allow user access to such path</a:t>
+            </a:r>
+          </a:p>
+          <a:p>
+            <a:pPr lvl="0" indent="0">
+              <a:buNone/>
+            </a:pPr>
+            <a:r>
+              <a:rPr>
+                <a:latin typeface="Courier"/>
+              </a:rPr>
+              <a:t>SET search_path = ag_catalog, "$user", public;</a:t>
+            </a:r>
+          </a:p>
+          <a:p>
+            <a:pPr lvl="0" indent="0" marL="0">
+              <a:buNone/>
+            </a:pPr>
+            <a:r>
+              <a:rPr/>
+              <a:t>Create a node A</a:t>
+            </a:r>
+          </a:p>
+          <a:p>
+            <a:pPr lvl="0" indent="0">
+              <a:buNone/>
+            </a:pPr>
+            <a:r>
+              <a:rPr>
+                <a:latin typeface="Courier"/>
+              </a:rPr>
+              <a:t>SELECT * 
+FROM cypher('test_graph', $$
+    CREATE (:label {property:"Node A"})
+$$) as (v agtype);</a:t>
+            </a:r>
+          </a:p>
+          <a:p>
+            <a:pPr lvl="0" indent="0" marL="0">
+              <a:buNone/>
+            </a:pPr>
+            <a:r>
+              <a:rPr/>
+              <a:t>Create a node B</a:t>
+            </a:r>
+          </a:p>
+          <a:p>
+            <a:pPr lvl="0" indent="0">
+              <a:buNone/>
+            </a:pPr>
+            <a:r>
+              <a:rPr>
+                <a:latin typeface="Courier"/>
+              </a:rPr>
+              <a:t>SELECT * 
+FROM cypher('test_graph', $$
+    CREATE (:label {property:"Node B"})
+$$) as (v agtype);</a:t>
+            </a:r>
+          </a:p>
+          <a:p>
+            <a:pPr lvl="0" indent="0" marL="0">
+              <a:buNone/>
+            </a:pPr>
+            <a:r>
+              <a:rPr/>
+              <a:t>Create an edge between node A and node B</a:t>
+            </a:r>
+          </a:p>
+          <a:p>
+            <a:pPr lvl="0" indent="0">
+              <a:buNone/>
+            </a:pPr>
+            <a:r>
+              <a:rPr>
+                <a:latin typeface="Courier"/>
+              </a:rPr>
+              <a:t>SELECT * 
+FROM cypher('test_graph', $$
+    MATCH (a:label), (b:label)
+    WHERE a.property = 'Node A' AND b.property = 'Node B'
+    CREATE (a)-[e:RELTYPE {property:a.property + '&lt;-&gt;' + b.property}]-&gt;(b)
+    RETURN e
+$$) as (e agtype);</a:t>
+            </a:r>
+          </a:p>
+          <a:p>
+            <a:pPr lvl="0" indent="0" marL="0">
+              <a:buNone/>
+            </a:pPr>
+            <a:r>
+              <a:rPr/>
+              <a:t>Select those edges</a:t>
+            </a:r>
+          </a:p>
+          <a:p>
+            <a:pPr lvl="0" indent="0">
+              <a:buNone/>
+            </a:pPr>
+            <a:r>
+              <a:rPr>
+                <a:latin typeface="Courier"/>
+              </a:rPr>
+              <a:t>SELECT * from cypher('test_graph', $$
+        MATCH (V)-[R]-(V2)
+        RETURN V,R,V2
+$$) as (V agtype, R agtype, V2 agtype);</a:t>
             </a:r>
           </a:p>
         </p:txBody>
@@ -7334,619 +7809,6 @@
             <a:r>
               <a:rPr/>
               <a:t>DT by year (Fei, Tao 2022)</a:t>
-            </a:r>
-          </a:p>
-        </p:txBody>
-      </p:sp>
-    </p:spTree>
-  </p:cSld>
-</p:sld>
-</file>
-
-<file path=ppt/slides/slide30.xml><?xml version="1.0" encoding="utf-8"?>
-<p:sld xmlns:a="http://schemas.openxmlformats.org/drawingml/2006/main" xmlns:r="http://schemas.openxmlformats.org/officeDocument/2006/relationships" xmlns:p="http://schemas.openxmlformats.org/presentationml/2006/main">
-  <p:cSld>
-    <p:spTree>
-      <p:nvGrpSpPr>
-        <p:cNvPr id="1" name=""/>
-        <p:cNvGrpSpPr/>
-        <p:nvPr/>
-      </p:nvGrpSpPr>
-      <p:grpSpPr>
-        <a:xfrm>
-          <a:off x="0" y="0"/>
-          <a:ext cx="0" cy="0"/>
-          <a:chOff x="0" y="0"/>
-          <a:chExt cx="0" cy="0"/>
-        </a:xfrm>
-      </p:grpSpPr>
-      <p:sp>
-        <p:nvSpPr>
-          <p:cNvPr id="2" name="Title 1"/>
-          <p:cNvSpPr>
-            <a:spLocks noGrp="1"/>
-          </p:cNvSpPr>
-          <p:nvPr>
-            <p:ph type="title"/>
-          </p:nvPr>
-        </p:nvSpPr>
-        <p:spPr/>
-        <p:txBody>
-          <a:bodyPr/>
-          <a:lstStyle/>
-          <a:p>
-            <a:pPr lvl="0" indent="0" marL="0">
-              <a:buNone/>
-            </a:pPr>
-            <a:r>
-              <a:rPr/>
-              <a:t>PostGIS</a:t>
-            </a:r>
-          </a:p>
-        </p:txBody>
-      </p:sp>
-      <p:sp>
-        <p:nvSpPr>
-          <p:cNvPr id="3" name="Content Placeholder 2"/>
-          <p:cNvSpPr>
-            <a:spLocks noGrp="1"/>
-          </p:cNvSpPr>
-          <p:nvPr>
-            <p:ph idx="1"/>
-          </p:nvPr>
-        </p:nvSpPr>
-        <p:spPr/>
-        <p:txBody>
-          <a:bodyPr/>
-          <a:lstStyle/>
-          <a:p>
-            <a:pPr lvl="0" indent="0" marL="0">
-              <a:spcBef>
-                <a:spcPts val="3000"/>
-              </a:spcBef>
-              <a:buNone/>
-            </a:pPr>
-            <a:r>
-              <a:rPr b="1"/>
-              <a:t>Spatial Functions</a:t>
-            </a:r>
-          </a:p>
-          <a:p>
-            <a:pPr lvl="0"/>
-            <a:r>
-              <a:rPr/>
-              <a:t>Routing. With pgRouting and road data you can find optimal routes and do different network analytics;</a:t>
-            </a:r>
-          </a:p>
-          <a:p>
-            <a:pPr lvl="0"/>
-            <a:r>
-              <a:rPr/>
-              <a:t>Polygon skeletonization. This function enables you to build the medial axis of a polygon on the fly;</a:t>
-            </a:r>
-          </a:p>
-          <a:p>
-            <a:pPr lvl="0"/>
-            <a:r>
-              <a:rPr/>
-              <a:t>Geometry subdivision. Dividing your geometries for further processing can significantly speed up your processes;</a:t>
-            </a:r>
-          </a:p>
-          <a:p>
-            <a:pPr lvl="0"/>
-            <a:r>
-              <a:rPr/>
-              <a:t>Clustering. Find clusters and patterns from your data. With the AI hype at peak, the k-means might be even more interesting for some than before…</a:t>
-            </a:r>
-          </a:p>
-        </p:txBody>
-      </p:sp>
-      <p:pic>
-        <p:nvPicPr>
-          <p:cNvPr descr="https://github.com/ManuelePasini/slides-markdown/blob/master/slides/images/dt/postgis/geometry_hierarchy.png?raw=true" id="0" name="Picture 1"/>
-          <p:cNvPicPr>
-            <a:picLocks noGrp="1" noChangeAspect="1"/>
-          </p:cNvPicPr>
-          <p:nvPr/>
-        </p:nvPicPr>
-        <p:blipFill>
-          <a:blip r:embed="rId2"/>
-          <a:stretch>
-            <a:fillRect/>
-          </a:stretch>
-        </p:blipFill>
-        <p:spPr bwMode="auto">
-          <a:xfrm>
-            <a:off x="457200" y="1244600"/>
-            <a:ext cx="8229600" cy="2794000"/>
-          </a:xfrm>
-          <a:prstGeom prst="rect">
-            <a:avLst/>
-          </a:prstGeom>
-          <a:noFill/>
-          <a:ln w="9525">
-            <a:noFill/>
-            <a:headEnd/>
-            <a:tailEnd/>
-          </a:ln>
-        </p:spPr>
-      </p:pic>
-      <p:sp>
-        <p:nvSpPr>
-          <p:cNvPr id="1" name="TextBox 3"/>
-          <p:cNvSpPr txBox="1"/>
-          <p:nvPr/>
-        </p:nvSpPr>
-        <p:spPr>
-          <a:xfrm>
-            <a:off x="457200" y="4076700"/>
-            <a:ext cx="8229600" cy="508000"/>
-          </a:xfrm>
-          <a:prstGeom prst="rect">
-            <a:avLst/>
-          </a:prstGeom>
-          <a:noFill/>
-        </p:spPr>
-        <p:txBody>
-          <a:bodyPr/>
-          <a:lstStyle/>
-          <a:p>
-            <a:pPr lvl="0" indent="0" marL="0" algn="ctr">
-              <a:buNone/>
-            </a:pPr>
-            <a:r>
-              <a:rPr/>
-              <a:t>PostGIS Geometry Hierarchy</a:t>
-            </a:r>
-          </a:p>
-        </p:txBody>
-      </p:sp>
-      <p:sp>
-        <p:nvSpPr>
-          <p:cNvPr id="3" name="Content Placeholder 2"/>
-          <p:cNvSpPr>
-            <a:spLocks noGrp="1"/>
-          </p:cNvSpPr>
-          <p:nvPr>
-            <p:ph idx="1"/>
-          </p:nvPr>
-        </p:nvSpPr>
-        <p:spPr/>
-        <p:txBody>
-          <a:bodyPr/>
-          <a:lstStyle/>
-          <a:p>
-            <a:pPr lvl="0" indent="0" marL="0">
-              <a:spcBef>
-                <a:spcPts val="3000"/>
-              </a:spcBef>
-              <a:buNone/>
-            </a:pPr>
-            <a:r>
-              <a:rPr b="1"/>
-              <a:t>Indexing</a:t>
-            </a:r>
-          </a:p>
-          <a:p>
-            <a:pPr lvl="0"/>
-            <a:r>
-              <a:rPr/>
-              <a:t>Indexes have to perform quickly in order to be useful. So instead of providing exact results, as B-trees do, spatial indexes provide approximate results. The question “what lines are inside this polygon?” will be instead interpreted by a spatial index as “what lines have bounding boxes that are contained inside this polygon’s bounding box?”</a:t>
-            </a:r>
-          </a:p>
-          <a:p>
-            <a:pPr lvl="0"/>
-            <a:r>
-              <a:rPr/>
-              <a:t>The most common implementations are the </a:t>
-            </a:r>
-            <a:r>
-              <a:rPr>
-                <a:hlinkClick r:id="rId3"/>
-              </a:rPr>
-              <a:t>R-Tree</a:t>
-            </a:r>
-            <a:r>
-              <a:rPr/>
-              <a:t> and Quadtree (used in PostGIS), but there are also grid-based indexes and GeoHash indexes implemented in other spatial databases.</a:t>
-            </a:r>
-          </a:p>
-        </p:txBody>
-      </p:sp>
-      <p:pic>
-        <p:nvPicPr>
-          <p:cNvPr descr="https://github.com/ManuelePasini/slides-markdown/blob/master/slides/images/dt/postgis/bbox.png?raw=true" id="0" name="Picture 1"/>
-          <p:cNvPicPr>
-            <a:picLocks noGrp="1" noChangeAspect="1"/>
-          </p:cNvPicPr>
-          <p:nvPr/>
-        </p:nvPicPr>
-        <p:blipFill>
-          <a:blip r:embed="rId4"/>
-          <a:stretch>
-            <a:fillRect/>
-          </a:stretch>
-        </p:blipFill>
-        <p:spPr bwMode="auto">
-          <a:xfrm>
-            <a:off x="457200" y="1600200"/>
-            <a:ext cx="8229600" cy="2057400"/>
-          </a:xfrm>
-          <a:prstGeom prst="rect">
-            <a:avLst/>
-          </a:prstGeom>
-          <a:noFill/>
-          <a:ln w="9525">
-            <a:noFill/>
-            <a:headEnd/>
-            <a:tailEnd/>
-          </a:ln>
-        </p:spPr>
-      </p:pic>
-      <p:sp>
-        <p:nvSpPr>
-          <p:cNvPr id="1" name="TextBox 3"/>
-          <p:cNvSpPr txBox="1"/>
-          <p:nvPr/>
-        </p:nvSpPr>
-        <p:spPr>
-          <a:xfrm>
-            <a:off x="457200" y="4076700"/>
-            <a:ext cx="8229600" cy="508000"/>
-          </a:xfrm>
-          <a:prstGeom prst="rect">
-            <a:avLst/>
-          </a:prstGeom>
-          <a:noFill/>
-        </p:spPr>
-        <p:txBody>
-          <a:bodyPr/>
-          <a:lstStyle/>
-          <a:p>
-            <a:pPr lvl="0" indent="0" marL="0" algn="ctr">
-              <a:buNone/>
-            </a:pPr>
-            <a:r>
-              <a:rPr/>
-              <a:t>BBox Example</a:t>
-            </a:r>
-          </a:p>
-        </p:txBody>
-      </p:sp>
-      <p:sp>
-        <p:nvSpPr>
-          <p:cNvPr id="3" name="Content Placeholder 2"/>
-          <p:cNvSpPr>
-            <a:spLocks noGrp="1"/>
-          </p:cNvSpPr>
-          <p:nvPr>
-            <p:ph idx="1"/>
-          </p:nvPr>
-        </p:nvSpPr>
-        <p:spPr/>
-        <p:txBody>
-          <a:bodyPr/>
-          <a:lstStyle/>
-          <a:p>
-            <a:pPr lvl="0"/>
-            <a:r>
-              <a:rPr/>
-              <a:t>The way the database efficiently answers the question “what lines intersect the yellow star” is to first answer the question “what boxes intersect the yellow box” using the index (which is very fast) and then do an exact calculation of “what lines intersect the yellow star” only for those features returned by the first test.</a:t>
-            </a:r>
-          </a:p>
-        </p:txBody>
-      </p:sp>
-    </p:spTree>
-  </p:cSld>
-</p:sld>
-</file>
-
-<file path=ppt/slides/slide31.xml><?xml version="1.0" encoding="utf-8"?>
-<p:sld xmlns:a="http://schemas.openxmlformats.org/drawingml/2006/main" xmlns:r="http://schemas.openxmlformats.org/officeDocument/2006/relationships" xmlns:p="http://schemas.openxmlformats.org/presentationml/2006/main">
-  <p:cSld>
-    <p:spTree>
-      <p:nvGrpSpPr>
-        <p:cNvPr id="1" name=""/>
-        <p:cNvGrpSpPr/>
-        <p:nvPr/>
-      </p:nvGrpSpPr>
-      <p:grpSpPr>
-        <a:xfrm>
-          <a:off x="0" y="0"/>
-          <a:ext cx="0" cy="0"/>
-          <a:chOff x="0" y="0"/>
-          <a:chExt cx="0" cy="0"/>
-        </a:xfrm>
-      </p:grpSpPr>
-      <p:sp>
-        <p:nvSpPr>
-          <p:cNvPr id="2" name="Title 1"/>
-          <p:cNvSpPr>
-            <a:spLocks noGrp="1"/>
-          </p:cNvSpPr>
-          <p:nvPr>
-            <p:ph type="title"/>
-          </p:nvPr>
-        </p:nvSpPr>
-        <p:spPr/>
-        <p:txBody>
-          <a:bodyPr/>
-          <a:lstStyle/>
-          <a:p>
-            <a:pPr lvl="0" indent="0" marL="0">
-              <a:buNone/>
-            </a:pPr>
-            <a:r>
-              <a:rPr/>
-              <a:t>Apache AGE</a:t>
-            </a:r>
-          </a:p>
-        </p:txBody>
-      </p:sp>
-      <p:sp>
-        <p:nvSpPr>
-          <p:cNvPr id="3" name="Content Placeholder 2"/>
-          <p:cNvSpPr>
-            <a:spLocks noGrp="1"/>
-          </p:cNvSpPr>
-          <p:nvPr>
-            <p:ph idx="1"/>
-          </p:nvPr>
-        </p:nvSpPr>
-        <p:spPr/>
-        <p:txBody>
-          <a:bodyPr/>
-          <a:lstStyle/>
-          <a:p>
-            <a:pPr lvl="0"/>
-            <a:r>
-              <a:rPr/>
-              <a:t>Extends PostgreSQL with graph semantics</a:t>
-            </a:r>
-          </a:p>
-          <a:p>
-            <a:pPr lvl="0"/>
-            <a:r>
-              <a:rPr/>
-              <a:t>No graph data model!</a:t>
-            </a:r>
-          </a:p>
-          <a:p>
-            <a:pPr lvl="0"/>
-            <a:r>
-              <a:rPr/>
-              <a:t>Wrapper upon PostgreSQL relational storage</a:t>
-            </a:r>
-          </a:p>
-          <a:p>
-            <a:pPr lvl="0"/>
-            <a:r>
-              <a:rPr/>
-              <a:t>A table for each node/vertex</a:t>
-            </a:r>
-          </a:p>
-        </p:txBody>
-      </p:sp>
-      <p:pic>
-        <p:nvPicPr>
-          <p:cNvPr descr="https://github.com/ManuelePasini/slides-markdown/blob/master/slides/images/dt/apache_age/architecture.png?raw=true" id="0" name="Picture 1"/>
-          <p:cNvPicPr>
-            <a:picLocks noGrp="1" noChangeAspect="1"/>
-          </p:cNvPicPr>
-          <p:nvPr/>
-        </p:nvPicPr>
-        <p:blipFill>
-          <a:blip r:embed="rId2"/>
-          <a:stretch>
-            <a:fillRect/>
-          </a:stretch>
-        </p:blipFill>
-        <p:spPr bwMode="auto">
-          <a:xfrm>
-            <a:off x="1866900" y="1193800"/>
-            <a:ext cx="5410200" cy="2882900"/>
-          </a:xfrm>
-          <a:prstGeom prst="rect">
-            <a:avLst/>
-          </a:prstGeom>
-          <a:noFill/>
-          <a:ln w="9525">
-            <a:noFill/>
-            <a:headEnd/>
-            <a:tailEnd/>
-          </a:ln>
-        </p:spPr>
-      </p:pic>
-      <p:sp>
-        <p:nvSpPr>
-          <p:cNvPr id="1" name="TextBox 3"/>
-          <p:cNvSpPr txBox="1"/>
-          <p:nvPr/>
-        </p:nvSpPr>
-        <p:spPr>
-          <a:xfrm>
-            <a:off x="457200" y="4076700"/>
-            <a:ext cx="8229600" cy="508000"/>
-          </a:xfrm>
-          <a:prstGeom prst="rect">
-            <a:avLst/>
-          </a:prstGeom>
-          <a:noFill/>
-        </p:spPr>
-        <p:txBody>
-          <a:bodyPr/>
-          <a:lstStyle/>
-          <a:p>
-            <a:pPr lvl="0" indent="0" marL="0" algn="ctr">
-              <a:buNone/>
-            </a:pPr>
-            <a:r>
-              <a:rPr/>
-              <a:t>Apachce AGE under the hood architecture</a:t>
-            </a:r>
-          </a:p>
-        </p:txBody>
-      </p:sp>
-      <p:sp>
-        <p:nvSpPr>
-          <p:cNvPr id="3" name="Content Placeholder 2"/>
-          <p:cNvSpPr>
-            <a:spLocks noGrp="1"/>
-          </p:cNvSpPr>
-          <p:nvPr>
-            <p:ph idx="1"/>
-          </p:nvPr>
-        </p:nvSpPr>
-        <p:spPr/>
-        <p:txBody>
-          <a:bodyPr/>
-          <a:lstStyle/>
-          <a:p>
-            <a:pPr lvl="0" indent="0" marL="0">
-              <a:spcBef>
-                <a:spcPts val="3000"/>
-              </a:spcBef>
-              <a:buNone/>
-            </a:pPr>
-            <a:r>
-              <a:rPr b="1"/>
-              <a:t>Setup</a:t>
-            </a:r>
-          </a:p>
-          <a:p>
-            <a:pPr lvl="0" indent="0" marL="0">
-              <a:buNone/>
-            </a:pPr>
-            <a:r>
-              <a:rPr/>
-              <a:t>Create and load AGE extension</a:t>
-            </a:r>
-          </a:p>
-          <a:p>
-            <a:pPr lvl="0" indent="0">
-              <a:buNone/>
-            </a:pPr>
-            <a:r>
-              <a:rPr>
-                <a:latin typeface="Courier"/>
-              </a:rPr>
-              <a:t>CREATE EXTENSION IF NOT EXISTS age;
-LOAD 'age';</a:t>
-            </a:r>
-          </a:p>
-          <a:p>
-            <a:pPr lvl="0" indent="0" marL="0">
-              <a:buNone/>
-            </a:pPr>
-            <a:r>
-              <a:rPr/>
-              <a:t>Allow user access to such path</a:t>
-            </a:r>
-          </a:p>
-          <a:p>
-            <a:pPr lvl="0" indent="0">
-              <a:buNone/>
-            </a:pPr>
-            <a:r>
-              <a:rPr>
-                <a:latin typeface="Courier"/>
-              </a:rPr>
-              <a:t>SET search_path = ag_catalog, "$user", public;</a:t>
-            </a:r>
-          </a:p>
-          <a:p>
-            <a:pPr lvl="0" indent="0" marL="0">
-              <a:buNone/>
-            </a:pPr>
-            <a:r>
-              <a:rPr/>
-              <a:t>Create a node A</a:t>
-            </a:r>
-          </a:p>
-          <a:p>
-            <a:pPr lvl="0" indent="0">
-              <a:buNone/>
-            </a:pPr>
-            <a:r>
-              <a:rPr>
-                <a:latin typeface="Courier"/>
-              </a:rPr>
-              <a:t>SELECT * 
-FROM cypher('test_graph', $$
-    CREATE (:label {property:"Node A"})
-$$) as (v agtype);</a:t>
-            </a:r>
-          </a:p>
-          <a:p>
-            <a:pPr lvl="0" indent="0" marL="0">
-              <a:buNone/>
-            </a:pPr>
-            <a:r>
-              <a:rPr/>
-              <a:t>Create a node B</a:t>
-            </a:r>
-          </a:p>
-          <a:p>
-            <a:pPr lvl="0" indent="0">
-              <a:buNone/>
-            </a:pPr>
-            <a:r>
-              <a:rPr>
-                <a:latin typeface="Courier"/>
-              </a:rPr>
-              <a:t>SELECT * 
-FROM cypher('test_graph', $$
-    CREATE (:label {property:"Node B"})
-$$) as (v agtype);</a:t>
-            </a:r>
-          </a:p>
-          <a:p>
-            <a:pPr lvl="0" indent="0" marL="0">
-              <a:buNone/>
-            </a:pPr>
-            <a:r>
-              <a:rPr/>
-              <a:t>Create an edge between node A and node B</a:t>
-            </a:r>
-          </a:p>
-          <a:p>
-            <a:pPr lvl="0" indent="0">
-              <a:buNone/>
-            </a:pPr>
-            <a:r>
-              <a:rPr>
-                <a:latin typeface="Courier"/>
-              </a:rPr>
-              <a:t>SELECT * 
-FROM cypher('test_graph', $$
-    MATCH (a:label), (b:label)
-    WHERE a.property = 'Node A' AND b.property = 'Node B'
-    CREATE (a)-[e:RELTYPE {property:a.property + '&lt;-&gt;' + b.property}]-&gt;(b)
-    RETURN e
-$$) as (e agtype);</a:t>
-            </a:r>
-          </a:p>
-          <a:p>
-            <a:pPr lvl="0" indent="0" marL="0">
-              <a:buNone/>
-            </a:pPr>
-            <a:r>
-              <a:rPr/>
-              <a:t>Select those edges</a:t>
-            </a:r>
-          </a:p>
-          <a:p>
-            <a:pPr lvl="0" indent="0">
-              <a:buNone/>
-            </a:pPr>
-            <a:r>
-              <a:rPr>
-                <a:latin typeface="Courier"/>
-              </a:rPr>
-              <a:t>SELECT * from cypher('test_graph', $$
-        MATCH (V)-[R]-(V2)
-        RETURN V,R,V2
-$$) as (V agtype, R agtype, V2 agtype);</a:t>
             </a:r>
           </a:p>
         </p:txBody>

</xml_diff>

<commit_message>
Deploying to gh-pages from @ ManuelePasini/slides-markdown@8fcfc4341cd610800e501613e77ed3ff3a7451de 🚀
</commit_message>
<xml_diff>
--- a/digital_twins.pptx
+++ b/digital_twins.pptx
@@ -5436,7 +5436,14 @@
             <a:pPr lvl="0"/>
             <a:r>
               <a:rPr/>
-              <a:t>Create a sorted list of the aggregate consumption in each ten minute interval in the given time period.</a:t>
+              <a:t>Total consumption: sums the resource consumption for the given time period.</a:t>
+            </a:r>
+          </a:p>
+          <a:p>
+            <a:pPr lvl="0"/>
+            <a:r>
+              <a:rPr/>
+              <a:t>Peak consumption: Create a sorted list of the aggregate consumption in each ten minute interval in the given time period.</a:t>
             </a:r>
           </a:p>
           <a:p>

</xml_diff>

<commit_message>
Deploying to gh-pages from @ ManuelePasini/slides-markdown@89115e47f82a53dd25cb42ebb2de7796b5b2f742 🚀
</commit_message>
<xml_diff>
--- a/digital_twins.pptx
+++ b/digital_twins.pptx
@@ -34,6 +34,9 @@
     <p:sldId id="282" r:id="rId28"/>
     <p:sldId id="283" r:id="rId29"/>
     <p:sldId id="284" r:id="rId30"/>
+    <p:sldId id="285" r:id="rId31"/>
+    <p:sldId id="286" r:id="rId32"/>
+    <p:sldId id="287" r:id="rId33"/>
   </p:sldIdLst>
   <p:sldSz cx="9144000" cy="5143500" type="screen16x9"/>
   <p:notesSz cx="6858000" cy="9144000"/>
@@ -5307,6 +5310,13 @@
             </a:r>
           </a:p>
           <a:p>
+            <a:pPr lvl="1"/>
+            <a:r>
+              <a:rPr/>
+              <a:t>Frequency (?)</a:t>
+            </a:r>
+          </a:p>
+          <a:p>
             <a:pPr lvl="0"/>
             <a:r>
               <a:rPr b="1"/>
@@ -5329,6 +5339,31 @@
             <a:r>
               <a:rPr/>
               <a:t>Analytical</a:t>
+            </a:r>
+          </a:p>
+          <a:p>
+            <a:pPr lvl="0"/>
+            <a:r>
+              <a:rPr b="1"/>
+              <a:t>Mode</a:t>
+            </a:r>
+            <a:r>
+              <a:rPr/>
+              <a:t>:</a:t>
+            </a:r>
+          </a:p>
+          <a:p>
+            <a:pPr lvl="1"/>
+            <a:r>
+              <a:rPr/>
+              <a:t>Online (?)</a:t>
+            </a:r>
+          </a:p>
+          <a:p>
+            <a:pPr lvl="1"/>
+            <a:r>
+              <a:rPr/>
+              <a:t>Offline (?)</a:t>
             </a:r>
           </a:p>
           <a:p>
@@ -6121,941 +6156,62 @@
           <a:chExt cx="0" cy="0"/>
         </a:xfrm>
       </p:grpSpPr>
-      <mc:AlternateContent xmlns:mc="http://schemas.openxmlformats.org/markup-compatibility/2006">
-        <mc:Choice xmlns:a14="http://schemas.microsoft.com/office/drawing/2010/main" Requires="a14">
-          <p:sp>
-            <p:nvSpPr>
-              <p:cNvPr id="3" name="Content Placeholder 2"/>
-              <p:cNvSpPr>
-                <a:spLocks noGrp="1"/>
-              </p:cNvSpPr>
-              <p:nvPr>
-                <p:ph idx="1"/>
-              </p:nvPr>
-            </p:nvSpPr>
-            <p:spPr/>
-            <p:txBody>
-              <a:bodyPr/>
-              <a:lstStyle/>
-              <a:p>
-                <a:pPr lvl="0" indent="0" marL="0">
-                  <a:spcBef>
-                    <a:spcPts val="3000"/>
-                  </a:spcBef>
-                  <a:buNone/>
-                </a:pPr>
-                <a:r>
-                  <a:rPr b="1"/>
-                  <a:t>Final queries v.0.1</a:t>
-                </a:r>
-              </a:p>
-              <a:p>
-                <a:pPr lvl="0" indent="0" marL="0">
-                  <a:buNone/>
-                </a:pPr>
-                <a:r>
-                  <a:rPr b="1"/>
-                  <a:t>Q1</a:t>
-                </a:r>
-                <a:r>
-                  <a:rPr/>
-                  <a:t> Total measurements (</a:t>
-                </a:r>
-                <a14:m>
-                  <m:oMath xmlns:m="http://schemas.openxmlformats.org/officeDocument/2006/math">
-                    <m:sSub>
-                      <m:e>
-                        <m:r>
-                          <m:t>t</m:t>
-                        </m:r>
-                      </m:e>
-                      <m:sub>
-                        <m:r>
-                          <m:t>b</m:t>
-                        </m:r>
-                      </m:sub>
-                    </m:sSub>
-                  </m:oMath>
-                </a14:m>
-                <a:r>
-                  <a:rPr/>
-                  <a:t>, </a:t>
-                </a:r>
-                <a14:m>
-                  <m:oMath xmlns:m="http://schemas.openxmlformats.org/officeDocument/2006/math">
-                    <m:sSub>
-                      <m:e>
-                        <m:r>
-                          <m:t>t</m:t>
-                        </m:r>
-                      </m:e>
-                      <m:sub>
-                        <m:r>
-                          <m:t>e</m:t>
-                        </m:r>
-                      </m:sub>
-                    </m:sSub>
-                  </m:oMath>
-                </a14:m>
-                <a:r>
-                  <a:rPr/>
-                  <a:t>): counts the total number of measurements for each device during the period [</a:t>
-                </a:r>
-                <a14:m>
-                  <m:oMath xmlns:m="http://schemas.openxmlformats.org/officeDocument/2006/math">
-                    <m:sSub>
-                      <m:e>
-                        <m:r>
-                          <m:t>t</m:t>
-                        </m:r>
-                      </m:e>
-                      <m:sub>
-                        <m:r>
-                          <m:t>b</m:t>
-                        </m:r>
-                      </m:sub>
-                    </m:sSub>
-                  </m:oMath>
-                </a14:m>
-                <a:r>
-                  <a:rPr/>
-                  <a:t>; </a:t>
-                </a:r>
-                <a14:m>
-                  <m:oMath xmlns:m="http://schemas.openxmlformats.org/officeDocument/2006/math">
-                    <m:sSub>
-                      <m:e>
-                        <m:r>
-                          <m:t>t</m:t>
-                        </m:r>
-                      </m:e>
-                      <m:sub>
-                        <m:r>
-                          <m:t>e</m:t>
-                        </m:r>
-                      </m:sub>
-                    </m:sSub>
-                  </m:oMath>
-                </a14:m>
-                <a:r>
-                  <a:rPr/>
-                  <a:t>].</a:t>
-                </a:r>
-              </a:p>
-              <a:p>
-                <a:pPr lvl="0" indent="0" marL="0">
-                  <a:buNone/>
-                </a:pPr>
-                <a:r>
-                  <a:rPr b="1"/>
-                  <a:t>Q2</a:t>
-                </a:r>
-                <a:r>
-                  <a:rPr/>
-                  <a:t> Average hourly measurements (η, [</a:t>
-                </a:r>
-                <a14:m>
-                  <m:oMath xmlns:m="http://schemas.openxmlformats.org/officeDocument/2006/math">
-                    <m:sSub>
-                      <m:e>
-                        <m:r>
-                          <m:t>t</m:t>
-                        </m:r>
-                      </m:e>
-                      <m:sub>
-                        <m:r>
-                          <m:t>b</m:t>
-                        </m:r>
-                      </m:sub>
-                    </m:sSub>
-                  </m:oMath>
-                </a14:m>
-                <a:r>
-                  <a:rPr/>
-                  <a:t>; </a:t>
-                </a:r>
-                <a14:m>
-                  <m:oMath xmlns:m="http://schemas.openxmlformats.org/officeDocument/2006/math">
-                    <m:sSub>
-                      <m:e>
-                        <m:r>
-                          <m:t>t</m:t>
-                        </m:r>
-                      </m:e>
-                      <m:sub>
-                        <m:r>
-                          <m:t>e</m:t>
-                        </m:r>
-                      </m:sub>
-                    </m:sSub>
-                  </m:oMath>
-                </a14:m>
-                <a:r>
-                  <a:rPr/>
-                  <a:t>]): Create a sorted list of the average measurement of type η in each hour interval in the given period [</a:t>
-                </a:r>
-                <a14:m>
-                  <m:oMath xmlns:m="http://schemas.openxmlformats.org/officeDocument/2006/math">
-                    <m:sSub>
-                      <m:e>
-                        <m:r>
-                          <m:t>t</m:t>
-                        </m:r>
-                      </m:e>
-                      <m:sub>
-                        <m:r>
-                          <m:t>b</m:t>
-                        </m:r>
-                      </m:sub>
-                    </m:sSub>
-                  </m:oMath>
-                </a14:m>
-                <a:r>
-                  <a:rPr/>
-                  <a:t>; </a:t>
-                </a:r>
-                <a14:m>
-                  <m:oMath xmlns:m="http://schemas.openxmlformats.org/officeDocument/2006/math">
-                    <m:sSub>
-                      <m:e>
-                        <m:r>
-                          <m:t>t</m:t>
-                        </m:r>
-                      </m:e>
-                      <m:sub>
-                        <m:r>
-                          <m:t>e</m:t>
-                        </m:r>
-                      </m:sub>
-                    </m:sSub>
-                  </m:oMath>
-                </a14:m>
-                <a:r>
-                  <a:rPr/>
-                  <a:t>].</a:t>
-                </a:r>
-              </a:p>
-              <a:p>
-                <a:pPr lvl="0" indent="0" marL="0">
-                  <a:buNone/>
-                </a:pPr>
-                <a:r>
-                  <a:rPr b="1"/>
-                  <a:t>Q3</a:t>
-                </a:r>
-                <a:r>
-                  <a:rPr/>
-                  <a:t> Monthly measurements(</a:t>
-                </a:r>
-                <a14:m>
-                  <m:oMath xmlns:m="http://schemas.openxmlformats.org/officeDocument/2006/math">
-                    <m:r>
-                      <m:t>A</m:t>
-                    </m:r>
-                  </m:oMath>
-                </a14:m>
-                <a:r>
-                  <a:rPr/>
-                  <a:t>): Create a list of the distinct agents </a:t>
-                </a:r>
-                <a14:m>
-                  <m:oMath xmlns:m="http://schemas.openxmlformats.org/officeDocument/2006/math">
-                    <m:r>
-                      <m:t>a</m:t>
-                    </m:r>
-                  </m:oMath>
-                </a14:m>
-                <a:r>
-                  <a:rPr/>
-                  <a:t> ∈ </a:t>
-                </a:r>
-                <a14:m>
-                  <m:oMath xmlns:m="http://schemas.openxmlformats.org/officeDocument/2006/math">
-                    <m:r>
-                      <m:t>A</m:t>
-                    </m:r>
-                  </m:oMath>
-                </a14:m>
-                <a:r>
-                  <a:rPr/>
-                  <a:t>, sorted by their total (monthly) measurements.</a:t>
-                </a:r>
-              </a:p>
-              <a:p>
-                <a:pPr lvl="0" indent="0" marL="0">
-                  <a:buNone/>
-                </a:pPr>
-                <a:r>
-                  <a:rPr b="1"/>
-                  <a:t>Q4</a:t>
-                </a:r>
-                <a:r>
-                  <a:rPr/>
-                  <a:t> Latest known agents location (</a:t>
-                </a:r>
-                <a14:m>
-                  <m:oMath xmlns:m="http://schemas.openxmlformats.org/officeDocument/2006/math">
-                    <m:r>
-                      <m:t>A</m:t>
-                    </m:r>
-                  </m:oMath>
-                </a14:m>
-                <a:r>
-                  <a:rPr/>
-                  <a:t>): Return the latest location for each agent </a:t>
-                </a:r>
-                <a14:m>
-                  <m:oMath xmlns:m="http://schemas.openxmlformats.org/officeDocument/2006/math">
-                    <m:r>
-                      <m:t>a</m:t>
-                    </m:r>
-                  </m:oMath>
-                </a14:m>
-                <a:r>
-                  <a:rPr/>
-                  <a:t> ∈ </a:t>
-                </a:r>
-                <a14:m>
-                  <m:oMath xmlns:m="http://schemas.openxmlformats.org/officeDocument/2006/math">
-                    <m:r>
-                      <m:t>A</m:t>
-                    </m:r>
-                  </m:oMath>
-                </a14:m>
-                <a:r>
-                  <a:rPr/>
-                  <a:t>.</a:t>
-                </a:r>
-              </a:p>
-              <a:p>
-                <a:pPr lvl="0" indent="0" marL="0">
-                  <a:buNone/>
-                </a:pPr>
-                <a:r>
-                  <a:rPr b="1"/>
-                  <a:t>Q5</a:t>
-                </a:r>
-                <a:r>
-                  <a:rPr/>
-                  <a:t> Observations (τ , </a:t>
-                </a:r>
-                <a14:m>
-                  <m:oMath xmlns:m="http://schemas.openxmlformats.org/officeDocument/2006/math">
-                    <m:r>
-                      <m:t>c</m:t>
-                    </m:r>
-                    <m:r>
-                      <m:t>o</m:t>
-                    </m:r>
-                    <m:r>
-                      <m:t>n</m:t>
-                    </m:r>
-                    <m:r>
-                      <m:t>d</m:t>
-                    </m:r>
-                  </m:oMath>
-                </a14:m>
-                <a:r>
-                  <a:rPr/>
-                  <a:t>, </a:t>
-                </a:r>
-                <a14:m>
-                  <m:oMath xmlns:m="http://schemas.openxmlformats.org/officeDocument/2006/math">
-                    <m:sSub>
-                      <m:e>
-                        <m:r>
-                          <m:t>t</m:t>
-                        </m:r>
-                      </m:e>
-                      <m:sub>
-                        <m:r>
-                          <m:t>b</m:t>
-                        </m:r>
-                      </m:sub>
-                    </m:sSub>
-                  </m:oMath>
-                </a14:m>
-                <a:r>
-                  <a:rPr/>
-                  <a:t>, </a:t>
-                </a:r>
-                <a14:m>
-                  <m:oMath xmlns:m="http://schemas.openxmlformats.org/officeDocument/2006/math">
-                    <m:sSub>
-                      <m:e>
-                        <m:r>
-                          <m:t>t</m:t>
-                        </m:r>
-                      </m:e>
-                      <m:sub>
-                        <m:r>
-                          <m:t>e</m:t>
-                        </m:r>
-                      </m:sub>
-                    </m:sSub>
-                  </m:oMath>
-                </a14:m>
-                <a:r>
-                  <a:rPr/>
-                  <a:t>): selects measurements generated by agents of given type τ in the time range [</a:t>
-                </a:r>
-                <a14:m>
-                  <m:oMath xmlns:m="http://schemas.openxmlformats.org/officeDocument/2006/math">
-                    <m:sSub>
-                      <m:e>
-                        <m:r>
-                          <m:t>t</m:t>
-                        </m:r>
-                      </m:e>
-                      <m:sub>
-                        <m:r>
-                          <m:t>b</m:t>
-                        </m:r>
-                      </m:sub>
-                    </m:sSub>
-                  </m:oMath>
-                </a14:m>
-                <a:r>
-                  <a:rPr/>
-                  <a:t>; </a:t>
-                </a:r>
-                <a14:m>
-                  <m:oMath xmlns:m="http://schemas.openxmlformats.org/officeDocument/2006/math">
-                    <m:sSub>
-                      <m:e>
-                        <m:r>
-                          <m:t>t</m:t>
-                        </m:r>
-                      </m:e>
-                      <m:sub>
-                        <m:r>
-                          <m:t>e</m:t>
-                        </m:r>
-                      </m:sub>
-                    </m:sSub>
-                  </m:oMath>
-                </a14:m>
-                <a:r>
-                  <a:rPr/>
-                  <a:t>] that satisfy the condition </a:t>
-                </a:r>
-                <a14:m>
-                  <m:oMath xmlns:m="http://schemas.openxmlformats.org/officeDocument/2006/math">
-                    <m:r>
-                      <m:t>c</m:t>
-                    </m:r>
-                    <m:r>
-                      <m:t>o</m:t>
-                    </m:r>
-                    <m:r>
-                      <m:t>n</m:t>
-                    </m:r>
-                    <m:r>
-                      <m:t>d</m:t>
-                    </m:r>
-                  </m:oMath>
-                </a14:m>
-                <a:r>
-                  <a:rPr/>
-                  <a:t>.</a:t>
-                </a:r>
-              </a:p>
-              <a:p>
-                <a:pPr lvl="0" indent="0" marL="0">
-                  <a:buNone/>
-                </a:pPr>
-                <a:r>
-                  <a:rPr b="1"/>
-                  <a:t>Q6</a:t>
-                </a:r>
-                <a:r>
-                  <a:rPr/>
-                  <a:t> InverseCoverage(</a:t>
-                </a:r>
-                <a14:m>
-                  <m:oMath xmlns:m="http://schemas.openxmlformats.org/officeDocument/2006/math">
-                    <m:r>
-                      <m:t>A</m:t>
-                    </m:r>
-                  </m:oMath>
-                </a14:m>
-                <a:r>
-                  <a:rPr/>
-                  <a:t>, </a:t>
-                </a:r>
-                <a14:m>
-                  <m:oMath xmlns:m="http://schemas.openxmlformats.org/officeDocument/2006/math">
-                    <m:r>
-                      <m:t>L</m:t>
-                    </m:r>
-                  </m:oMath>
-                </a14:m>
-                <a:r>
-                  <a:rPr/>
-                  <a:t>, η) lists all agents </a:t>
-                </a:r>
-                <a14:m>
-                  <m:oMath xmlns:m="http://schemas.openxmlformats.org/officeDocument/2006/math">
-                    <m:r>
-                      <m:t>a</m:t>
-                    </m:r>
-                  </m:oMath>
-                </a14:m>
-                <a:r>
-                  <a:rPr/>
-                  <a:t> ∈ </a:t>
-                </a:r>
-                <a14:m>
-                  <m:oMath xmlns:m="http://schemas.openxmlformats.org/officeDocument/2006/math">
-                    <m:r>
-                      <m:t>A</m:t>
-                    </m:r>
-                  </m:oMath>
-                </a14:m>
-                <a:r>
-                  <a:rPr/>
-                  <a:t> that generated measurements of a given type η in the polygon specified by the set of points </a:t>
-                </a:r>
-                <a14:m>
-                  <m:oMath xmlns:m="http://schemas.openxmlformats.org/officeDocument/2006/math">
-                    <m:r>
-                      <m:t>L</m:t>
-                    </m:r>
-                  </m:oMath>
-                </a14:m>
-                <a:r>
-                  <a:rPr/>
-                  <a:t>.</a:t>
-                </a:r>
-              </a:p>
-              <a:p>
-                <a:pPr lvl="0" indent="0" marL="0">
-                  <a:buNone/>
-                </a:pPr>
-                <a:r>
-                  <a:rPr b="1"/>
-                  <a:t>Q7</a:t>
-                </a:r>
-                <a:r>
-                  <a:rPr/>
-                  <a:t> Time in environment (</a:t>
-                </a:r>
-                <a14:m>
-                  <m:oMath xmlns:m="http://schemas.openxmlformats.org/officeDocument/2006/math">
-                    <m:r>
-                      <m:t>A</m:t>
-                    </m:r>
-                  </m:oMath>
-                </a14:m>
-                <a:r>
-                  <a:rPr/>
-                  <a:t>, </a:t>
-                </a:r>
-                <a14:m>
-                  <m:oMath xmlns:m="http://schemas.openxmlformats.org/officeDocument/2006/math">
-                    <m:r>
-                      <m:t>l</m:t>
-                    </m:r>
-                  </m:oMath>
-                </a14:m>
-                <a:r>
-                  <a:rPr/>
-                  <a:t>): Return the times for which agents </a:t>
-                </a:r>
-                <a14:m>
-                  <m:oMath xmlns:m="http://schemas.openxmlformats.org/officeDocument/2006/math">
-                    <m:r>
-                      <m:t>a</m:t>
-                    </m:r>
-                  </m:oMath>
-                </a14:m>
-                <a:r>
-                  <a:rPr/>
-                  <a:t> ∈ </a:t>
-                </a:r>
-                <a14:m>
-                  <m:oMath xmlns:m="http://schemas.openxmlformats.org/officeDocument/2006/math">
-                    <m:r>
-                      <m:t>A</m:t>
-                    </m:r>
-                  </m:oMath>
-                </a14:m>
-                <a:r>
-                  <a:rPr/>
-                  <a:t> were in an environment </a:t>
-                </a:r>
-                <a14:m>
-                  <m:oMath xmlns:m="http://schemas.openxmlformats.org/officeDocument/2006/math">
-                    <m:r>
-                      <m:t>l</m:t>
-                    </m:r>
-                  </m:oMath>
-                </a14:m>
-                <a:r>
-                  <a:rPr/>
-                  <a:t>.</a:t>
-                </a:r>
-              </a:p>
-              <a:p>
-                <a:pPr lvl="0" indent="0" marL="0">
-                  <a:buNone/>
-                </a:pPr>
-                <a:r>
-                  <a:rPr b="1"/>
-                  <a:t>Q8</a:t>
-                </a:r>
-                <a:r>
-                  <a:rPr/>
-                  <a:t> Latest measurement in environment(</a:t>
-                </a:r>
-                <a14:m>
-                  <m:oMath xmlns:m="http://schemas.openxmlformats.org/officeDocument/2006/math">
-                    <m:r>
-                      <m:t>A</m:t>
-                    </m:r>
-                  </m:oMath>
-                </a14:m>
-                <a:r>
-                  <a:rPr/>
-                  <a:t>, </a:t>
-                </a:r>
-                <a14:m>
-                  <m:oMath xmlns:m="http://schemas.openxmlformats.org/officeDocument/2006/math">
-                    <m:r>
-                      <m:t>l</m:t>
-                    </m:r>
-                  </m:oMath>
-                </a14:m>
-                <a:r>
-                  <a:rPr/>
-                  <a:t>): Return the latest measurement for each agent </a:t>
-                </a:r>
-                <a14:m>
-                  <m:oMath xmlns:m="http://schemas.openxmlformats.org/officeDocument/2006/math">
-                    <m:r>
-                      <m:t>a</m:t>
-                    </m:r>
-                  </m:oMath>
-                </a14:m>
-                <a:r>
-                  <a:rPr/>
-                  <a:t> ∈ </a:t>
-                </a:r>
-                <a14:m>
-                  <m:oMath xmlns:m="http://schemas.openxmlformats.org/officeDocument/2006/math">
-                    <m:r>
-                      <m:t>A</m:t>
-                    </m:r>
-                  </m:oMath>
-                </a14:m>
-                <a:r>
-                  <a:rPr/>
-                  <a:t> that performed measurements in a given environment </a:t>
-                </a:r>
-                <a14:m>
-                  <m:oMath xmlns:m="http://schemas.openxmlformats.org/officeDocument/2006/math">
-                    <m:r>
-                      <m:t>l</m:t>
-                    </m:r>
-                  </m:oMath>
-                </a14:m>
-                <a:r>
-                  <a:rPr/>
-                  <a:t>.</a:t>
-                </a:r>
-              </a:p>
-              <a:p>
-                <a:pPr lvl="0" indent="0" marL="0">
-                  <a:buNone/>
-                </a:pPr>
-                <a:r>
-                  <a:rPr b="1"/>
-                  <a:t>Q9</a:t>
-                </a:r>
-                <a:r>
-                  <a:rPr/>
-                  <a:t> Trajectories(</a:t>
-                </a:r>
-                <a14:m>
-                  <m:oMath xmlns:m="http://schemas.openxmlformats.org/officeDocument/2006/math">
-                    <m:sSub>
-                      <m:e>
-                        <m:r>
-                          <m:t>t</m:t>
-                        </m:r>
-                      </m:e>
-                      <m:sub>
-                        <m:r>
-                          <m:t>b</m:t>
-                        </m:r>
-                      </m:sub>
-                    </m:sSub>
-                  </m:oMath>
-                </a14:m>
-                <a:r>
-                  <a:rPr/>
-                  <a:t>, </a:t>
-                </a:r>
-                <a14:m>
-                  <m:oMath xmlns:m="http://schemas.openxmlformats.org/officeDocument/2006/math">
-                    <m:sSub>
-                      <m:e>
-                        <m:r>
-                          <m:t>t</m:t>
-                        </m:r>
-                      </m:e>
-                      <m:sub>
-                        <m:r>
-                          <m:t>e</m:t>
-                        </m:r>
-                      </m:sub>
-                    </m:sSub>
-                  </m:oMath>
-                </a14:m>
-                <a:r>
-                  <a:rPr/>
-                  <a:t>, </a:t>
-                </a:r>
-                <a14:m>
-                  <m:oMath xmlns:m="http://schemas.openxmlformats.org/officeDocument/2006/math">
-                    <m:sSub>
-                      <m:e>
-                        <m:r>
-                          <m:t>l</m:t>
-                        </m:r>
-                      </m:e>
-                      <m:sub>
-                        <m:r>
-                          <m:t>b</m:t>
-                        </m:r>
-                      </m:sub>
-                    </m:sSub>
-                  </m:oMath>
-                </a14:m>
-                <a:r>
-                  <a:rPr/>
-                  <a:t>, </a:t>
-                </a:r>
-                <a14:m>
-                  <m:oMath xmlns:m="http://schemas.openxmlformats.org/officeDocument/2006/math">
-                    <m:sSub>
-                      <m:e>
-                        <m:r>
-                          <m:t>l</m:t>
-                        </m:r>
-                      </m:e>
-                      <m:sub>
-                        <m:r>
-                          <m:t>e</m:t>
-                        </m:r>
-                      </m:sub>
-                    </m:sSub>
-                  </m:oMath>
-                </a14:m>
-                <a:r>
-                  <a:rPr/>
-                  <a:t>): retrieves the names of agents who went from location </a:t>
-                </a:r>
-                <a14:m>
-                  <m:oMath xmlns:m="http://schemas.openxmlformats.org/officeDocument/2006/math">
-                    <m:sSub>
-                      <m:e>
-                        <m:r>
-                          <m:t>l</m:t>
-                        </m:r>
-                      </m:e>
-                      <m:sub>
-                        <m:r>
-                          <m:t>b</m:t>
-                        </m:r>
-                      </m:sub>
-                    </m:sSub>
-                  </m:oMath>
-                </a14:m>
-                <a:r>
-                  <a:rPr/>
-                  <a:t> to location </a:t>
-                </a:r>
-                <a14:m>
-                  <m:oMath xmlns:m="http://schemas.openxmlformats.org/officeDocument/2006/math">
-                    <m:sSub>
-                      <m:e>
-                        <m:r>
-                          <m:t>l</m:t>
-                        </m:r>
-                      </m:e>
-                      <m:sub>
-                        <m:r>
-                          <m:t>e</m:t>
-                        </m:r>
-                      </m:sub>
-                    </m:sSub>
-                  </m:oMath>
-                </a14:m>
-                <a:r>
-                  <a:rPr/>
-                  <a:t> during the time interval [</a:t>
-                </a:r>
-                <a14:m>
-                  <m:oMath xmlns:m="http://schemas.openxmlformats.org/officeDocument/2006/math">
-                    <m:sSub>
-                      <m:e>
-                        <m:r>
-                          <m:t>t</m:t>
-                        </m:r>
-                      </m:e>
-                      <m:sub>
-                        <m:r>
-                          <m:t>b</m:t>
-                        </m:r>
-                      </m:sub>
-                    </m:sSub>
-                  </m:oMath>
-                </a14:m>
-                <a:r>
-                  <a:rPr/>
-                  <a:t>; </a:t>
-                </a:r>
-                <a14:m>
-                  <m:oMath xmlns:m="http://schemas.openxmlformats.org/officeDocument/2006/math">
-                    <m:sSub>
-                      <m:e>
-                        <m:r>
-                          <m:t>t</m:t>
-                        </m:r>
-                      </m:e>
-                      <m:sub>
-                        <m:r>
-                          <m:t>e</m:t>
-                        </m:r>
-                      </m:sub>
-                    </m:sSub>
-                  </m:oMath>
-                </a14:m>
-                <a:r>
-                  <a:rPr/>
-                  <a:t>]</a:t>
-                </a:r>
-              </a:p>
-              <a:p>
-                <a:pPr lvl="0" indent="0" marL="0">
-                  <a:buNone/>
-                </a:pPr>
-                <a:r>
-                  <a:rPr b="1"/>
-                  <a:t>Q10</a:t>
-                </a:r>
-                <a:r>
-                  <a:rPr/>
-                  <a:t> CoLocate(</a:t>
-                </a:r>
-                <a14:m>
-                  <m:oMath xmlns:m="http://schemas.openxmlformats.org/officeDocument/2006/math">
-                    <m:r>
-                      <m:t>a</m:t>
-                    </m:r>
-                  </m:oMath>
-                </a14:m>
-                <a:r>
-                  <a:rPr/>
-                  <a:t> ∈ A, </a:t>
-                </a:r>
-                <a14:m>
-                  <m:oMath xmlns:m="http://schemas.openxmlformats.org/officeDocument/2006/math">
-                    <m:sSub>
-                      <m:e>
-                        <m:r>
-                          <m:t>t</m:t>
-                        </m:r>
-                      </m:e>
-                      <m:sub>
-                        <m:r>
-                          <m:t>b</m:t>
-                        </m:r>
-                      </m:sub>
-                    </m:sSub>
-                  </m:oMath>
-                </a14:m>
-                <a:r>
-                  <a:rPr/>
-                  <a:t>, </a:t>
-                </a:r>
-                <a14:m>
-                  <m:oMath xmlns:m="http://schemas.openxmlformats.org/officeDocument/2006/math">
-                    <m:sSub>
-                      <m:e>
-                        <m:r>
-                          <m:t>t</m:t>
-                        </m:r>
-                      </m:e>
-                      <m:sub>
-                        <m:r>
-                          <m:t>e</m:t>
-                        </m:r>
-                      </m:sub>
-                    </m:sSub>
-                  </m:oMath>
-                </a14:m>
-                <a:r>
-                  <a:rPr/>
-                  <a:t>): retrieves all agents who were in the same environment as agent </a:t>
-                </a:r>
-                <a14:m>
-                  <m:oMath xmlns:m="http://schemas.openxmlformats.org/officeDocument/2006/math">
-                    <m:r>
-                      <m:t>a</m:t>
-                    </m:r>
-                  </m:oMath>
-                </a14:m>
-                <a:r>
-                  <a:rPr/>
-                  <a:t> during the specified time period.</a:t>
-                </a:r>
-              </a:p>
-              <a:p>
-                <a:pPr lvl="0" indent="0" marL="0">
-                  <a:spcBef>
-                    <a:spcPts val="3000"/>
-                  </a:spcBef>
-                  <a:buNone/>
-                </a:pPr>
-                <a:r>
-                  <a:rPr b="1"/>
-                  <a:t>Data architectures</a:t>
-                </a:r>
-              </a:p>
-              <a:p>
-                <a:pPr lvl="0"/>
-                <a:r>
-                  <a:rPr/>
-                  <a:t>Wide-Column (?)</a:t>
-                </a:r>
-              </a:p>
-              <a:p>
-                <a:pPr lvl="0"/>
-                <a:r>
-                  <a:rPr/>
-                  <a:t>Graph + Relational (PostgreSQL + PostGIS + Apache AGE)</a:t>
-                </a:r>
-              </a:p>
-              <a:p>
-                <a:pPr lvl="0"/>
-                <a:r>
-                  <a:rPr/>
-                  <a:t>Graph + Time Series (GraphDB + (ClickHouse || InfluxDB))</a:t>
-                </a:r>
-              </a:p>
-              <a:p>
-                <a:pPr lvl="0"/>
-                <a:r>
-                  <a:rPr/>
-                  <a:t>AeonG (?)</a:t>
-                </a:r>
-              </a:p>
-            </p:txBody>
-          </p:sp>
-        </mc:Choice>
-      </mc:AlternateContent>
+      <p:sp>
+        <p:nvSpPr>
+          <p:cNvPr id="3" name="Content Placeholder 2"/>
+          <p:cNvSpPr>
+            <a:spLocks noGrp="1"/>
+          </p:cNvSpPr>
+          <p:nvPr>
+            <p:ph idx="1"/>
+          </p:nvPr>
+        </p:nvSpPr>
+        <p:spPr/>
+        <p:txBody>
+          <a:bodyPr/>
+          <a:lstStyle/>
+          <a:p>
+            <a:pPr lvl="0" indent="0" marL="0">
+              <a:spcBef>
+                <a:spcPts val="3000"/>
+              </a:spcBef>
+              <a:buNone/>
+            </a:pPr>
+            <a:r>
+              <a:rPr b="1"/>
+              <a:t>Data architectures</a:t>
+            </a:r>
+          </a:p>
+          <a:p>
+            <a:pPr lvl="0"/>
+            <a:r>
+              <a:rPr/>
+              <a:t>Wide-Column (?)</a:t>
+            </a:r>
+          </a:p>
+          <a:p>
+            <a:pPr lvl="0"/>
+            <a:r>
+              <a:rPr/>
+              <a:t>Graph + Relational (PostgreSQL + PostGIS + Apache AGE)</a:t>
+            </a:r>
+          </a:p>
+          <a:p>
+            <a:pPr lvl="0"/>
+            <a:r>
+              <a:rPr/>
+              <a:t>Graph + Time Series (GraphDB + (ClickHouse || InfluxDB))</a:t>
+            </a:r>
+          </a:p>
+          <a:p>
+            <a:pPr lvl="0"/>
+            <a:r>
+              <a:rPr/>
+              <a:t>AeonG (?)</a:t>
+            </a:r>
+          </a:p>
+        </p:txBody>
+      </p:sp>
     </p:spTree>
   </p:cSld>
 </p:sld>
@@ -7667,6 +6823,107 @@
 $$) as (V agtype, R agtype, V2 agtype);</a:t>
             </a:r>
           </a:p>
+          <a:p>
+            <a:pPr lvl="0" indent="0" marL="0">
+              <a:spcBef>
+                <a:spcPts val="3000"/>
+              </a:spcBef>
+              <a:buNone/>
+            </a:pPr>
+            <a:r>
+              <a:rPr b="1"/>
+              <a:t>A Survey on Spatio-temporal Data Analytics Systems (ACM Surveys, 2022)</a:t>
+            </a:r>
+          </a:p>
+          <a:p>
+            <a:pPr lvl="0"/>
+            <a:r>
+              <a:rPr/>
+              <a:t>Categorizes spatio-temporal dmbs in groups:</a:t>
+            </a:r>
+          </a:p>
+          <a:p>
+            <a:pPr lvl="1"/>
+            <a:r>
+              <a:rPr/>
+              <a:t>Spatio-temporal DBMS:</a:t>
+            </a:r>
+          </a:p>
+          <a:p>
+            <a:pPr lvl="2"/>
+            <a:r>
+              <a:rPr/>
+              <a:t>RDBMS</a:t>
+            </a:r>
+          </a:p>
+          <a:p>
+            <a:pPr lvl="2"/>
+            <a:r>
+              <a:rPr/>
+              <a:t>No-SQL DBMS</a:t>
+            </a:r>
+          </a:p>
+          <a:p>
+            <a:pPr lvl="1"/>
+            <a:r>
+              <a:rPr/>
+              <a:t>Big data spatio-temporal processing infrastructures</a:t>
+            </a:r>
+          </a:p>
+          <a:p>
+            <a:pPr lvl="2"/>
+            <a:r>
+              <a:rPr/>
+              <a:t>Hadoop based infrastructures</a:t>
+            </a:r>
+          </a:p>
+          <a:p>
+            <a:pPr lvl="2"/>
+            <a:r>
+              <a:rPr/>
+              <a:t>Spark based infrastructures</a:t>
+            </a:r>
+          </a:p>
+          <a:p>
+            <a:pPr lvl="2"/>
+            <a:r>
+              <a:rPr/>
+              <a:t>No-SQL infrastructures</a:t>
+            </a:r>
+          </a:p>
+          <a:p>
+            <a:pPr lvl="1"/>
+            <a:r>
+              <a:rPr/>
+              <a:t>Programming languages</a:t>
+            </a:r>
+          </a:p>
+          <a:p>
+            <a:pPr lvl="2"/>
+            <a:r>
+              <a:rPr/>
+              <a:t>DASK</a:t>
+            </a:r>
+          </a:p>
+          <a:p>
+            <a:pPr lvl="2"/>
+            <a:r>
+              <a:rPr/>
+              <a:t>RAPIDS</a:t>
+            </a:r>
+          </a:p>
+          <a:p>
+            <a:pPr lvl="0" indent="0" marL="0">
+              <a:spcBef>
+                <a:spcPts val="3000"/>
+              </a:spcBef>
+              <a:buNone/>
+            </a:pPr>
+            <a:r>
+              <a:rPr b="1"/>
+              <a:t>Spatio-Temporal DBMS</a:t>
+            </a:r>
+          </a:p>
         </p:txBody>
       </p:sp>
     </p:spTree>
@@ -7816,6 +7073,452 @@
             <a:r>
               <a:rPr/>
               <a:t>DT by year (Fei, Tao 2022)</a:t>
+            </a:r>
+          </a:p>
+        </p:txBody>
+      </p:sp>
+    </p:spTree>
+  </p:cSld>
+</p:sld>
+</file>
+
+<file path=ppt/slides/slide30.xml><?xml version="1.0" encoding="utf-8"?>
+<p:sld xmlns:a="http://schemas.openxmlformats.org/drawingml/2006/main" xmlns:r="http://schemas.openxmlformats.org/officeDocument/2006/relationships" xmlns:p="http://schemas.openxmlformats.org/presentationml/2006/main">
+  <p:cSld>
+    <p:spTree>
+      <p:nvGrpSpPr>
+        <p:cNvPr id="1" name=""/>
+        <p:cNvGrpSpPr/>
+        <p:nvPr/>
+      </p:nvGrpSpPr>
+      <p:grpSpPr>
+        <a:xfrm>
+          <a:off x="0" y="0"/>
+          <a:ext cx="0" cy="0"/>
+          <a:chOff x="0" y="0"/>
+          <a:chExt cx="0" cy="0"/>
+        </a:xfrm>
+      </p:grpSpPr>
+      <p:sp>
+        <p:nvSpPr>
+          <p:cNvPr id="3" name="Content Placeholder 2"/>
+          <p:cNvSpPr>
+            <a:spLocks noGrp="1"/>
+          </p:cNvSpPr>
+          <p:nvPr>
+            <p:ph idx="1" sz="half"/>
+          </p:nvPr>
+        </p:nvSpPr>
+        <p:spPr/>
+        <p:txBody>
+          <a:bodyPr/>
+          <a:lstStyle/>
+          <a:p>
+            <a:pPr lvl="0" indent="0" marL="0">
+              <a:spcBef>
+                <a:spcPts val="3000"/>
+              </a:spcBef>
+              <a:buNone/>
+            </a:pPr>
+            <a:r>
+              <a:rPr b="1"/>
+              <a:t>RDBMS</a:t>
+            </a:r>
+          </a:p>
+        </p:txBody>
+      </p:sp>
+      <p:pic>
+        <p:nvPicPr>
+          <p:cNvPr descr="https://github.com/ManuelePasini/slides-markdown/blob/master/slides/images/dt/spatiotemp_dbms/rdbms.png?raw=true" id="0" name="Picture 1"/>
+          <p:cNvPicPr>
+            <a:picLocks noGrp="1" noChangeAspect="1"/>
+          </p:cNvPicPr>
+          <p:nvPr/>
+        </p:nvPicPr>
+        <p:blipFill>
+          <a:blip r:embed="rId2"/>
+          <a:stretch>
+            <a:fillRect/>
+          </a:stretch>
+        </p:blipFill>
+        <p:spPr bwMode="auto">
+          <a:xfrm>
+            <a:off x="457200" y="1511300"/>
+            <a:ext cx="4038600" cy="2247900"/>
+          </a:xfrm>
+          <a:prstGeom prst="rect">
+            <a:avLst/>
+          </a:prstGeom>
+          <a:noFill/>
+          <a:ln w="9525">
+            <a:noFill/>
+            <a:headEnd/>
+            <a:tailEnd/>
+          </a:ln>
+        </p:spPr>
+      </p:pic>
+      <p:sp>
+        <p:nvSpPr>
+          <p:cNvPr id="1" name="TextBox 3"/>
+          <p:cNvSpPr txBox="1"/>
+          <p:nvPr/>
+        </p:nvSpPr>
+        <p:spPr>
+          <a:xfrm>
+            <a:off x="457200" y="4076700"/>
+            <a:ext cx="4038600" cy="508000"/>
+          </a:xfrm>
+          <a:prstGeom prst="rect">
+            <a:avLst/>
+          </a:prstGeom>
+          <a:noFill/>
+        </p:spPr>
+        <p:txBody>
+          <a:bodyPr/>
+          <a:lstStyle/>
+          <a:p>
+            <a:pPr lvl="0" indent="0" marL="0" algn="ctr">
+              <a:buNone/>
+            </a:pPr>
+            <a:r>
+              <a:rPr/>
+              <a:t>Taxonmy of RDBMS for spatio-temporal data</a:t>
+            </a:r>
+          </a:p>
+        </p:txBody>
+      </p:sp>
+      <p:sp>
+        <p:nvSpPr>
+          <p:cNvPr id="4" name="Content Placeholder 3"/>
+          <p:cNvSpPr>
+            <a:spLocks noGrp="1"/>
+          </p:cNvSpPr>
+          <p:nvPr>
+            <p:ph idx="2" sz="half"/>
+          </p:nvPr>
+        </p:nvSpPr>
+        <p:spPr/>
+        <p:txBody>
+          <a:bodyPr/>
+          <a:lstStyle/>
+          <a:p>
+            <a:pPr lvl="0" indent="0" marL="0">
+              <a:spcBef>
+                <a:spcPts val="3000"/>
+              </a:spcBef>
+              <a:buNone/>
+            </a:pPr>
+            <a:r>
+              <a:rPr b="1"/>
+              <a:t>No-SQL DBMS</a:t>
+            </a:r>
+          </a:p>
+        </p:txBody>
+      </p:sp>
+      <p:pic>
+        <p:nvPicPr>
+          <p:cNvPr descr="https://github.com/ManuelePasini/slides-markdown/blob/master/slides/images/dt/spatiotemp_dbms/nosql.png?raw=true" id="0" name="Picture 1"/>
+          <p:cNvPicPr>
+            <a:picLocks noGrp="1" noChangeAspect="1"/>
+          </p:cNvPicPr>
+          <p:nvPr/>
+        </p:nvPicPr>
+        <p:blipFill>
+          <a:blip r:embed="rId3"/>
+          <a:stretch>
+            <a:fillRect/>
+          </a:stretch>
+        </p:blipFill>
+        <p:spPr bwMode="auto">
+          <a:xfrm>
+            <a:off x="4648200" y="1765300"/>
+            <a:ext cx="4038600" cy="1752600"/>
+          </a:xfrm>
+          <a:prstGeom prst="rect">
+            <a:avLst/>
+          </a:prstGeom>
+          <a:noFill/>
+          <a:ln w="9525">
+            <a:noFill/>
+            <a:headEnd/>
+            <a:tailEnd/>
+          </a:ln>
+        </p:spPr>
+      </p:pic>
+      <p:sp>
+        <p:nvSpPr>
+          <p:cNvPr id="1" name="TextBox 3"/>
+          <p:cNvSpPr txBox="1"/>
+          <p:nvPr/>
+        </p:nvSpPr>
+        <p:spPr>
+          <a:xfrm>
+            <a:off x="4648200" y="4076700"/>
+            <a:ext cx="4038600" cy="508000"/>
+          </a:xfrm>
+          <a:prstGeom prst="rect">
+            <a:avLst/>
+          </a:prstGeom>
+          <a:noFill/>
+        </p:spPr>
+        <p:txBody>
+          <a:bodyPr/>
+          <a:lstStyle/>
+          <a:p>
+            <a:pPr lvl="0" indent="0" marL="0" algn="ctr">
+              <a:buNone/>
+            </a:pPr>
+            <a:r>
+              <a:rPr/>
+              <a:t>Taxonmy of RDBMS for spatio-temporal data</a:t>
+            </a:r>
+          </a:p>
+        </p:txBody>
+      </p:sp>
+    </p:spTree>
+  </p:cSld>
+</p:sld>
+</file>
+
+<file path=ppt/slides/slide31.xml><?xml version="1.0" encoding="utf-8"?>
+<p:sld xmlns:a="http://schemas.openxmlformats.org/drawingml/2006/main" xmlns:r="http://schemas.openxmlformats.org/officeDocument/2006/relationships" xmlns:p="http://schemas.openxmlformats.org/presentationml/2006/main">
+  <p:cSld>
+    <p:spTree>
+      <p:nvGrpSpPr>
+        <p:cNvPr id="1" name=""/>
+        <p:cNvGrpSpPr/>
+        <p:nvPr/>
+      </p:nvGrpSpPr>
+      <p:grpSpPr>
+        <a:xfrm>
+          <a:off x="0" y="0"/>
+          <a:ext cx="0" cy="0"/>
+          <a:chOff x="0" y="0"/>
+          <a:chExt cx="0" cy="0"/>
+        </a:xfrm>
+      </p:grpSpPr>
+      <p:sp>
+        <p:nvSpPr>
+          <p:cNvPr id="3" name="Content Placeholder 2"/>
+          <p:cNvSpPr>
+            <a:spLocks noGrp="1"/>
+          </p:cNvSpPr>
+          <p:nvPr>
+            <p:ph idx="1"/>
+          </p:nvPr>
+        </p:nvSpPr>
+        <p:spPr/>
+        <p:txBody>
+          <a:bodyPr/>
+          <a:lstStyle/>
+          <a:p>
+            <a:pPr lvl="0" indent="0" marL="0">
+              <a:spcBef>
+                <a:spcPts val="3000"/>
+              </a:spcBef>
+              <a:buNone/>
+            </a:pPr>
+            <a:r>
+              <a:rPr b="1"/>
+              <a:t>Big data spatio-temporal processing infrastructures</a:t>
+            </a:r>
+          </a:p>
+        </p:txBody>
+      </p:sp>
+    </p:spTree>
+  </p:cSld>
+</p:sld>
+</file>
+
+<file path=ppt/slides/slide32.xml><?xml version="1.0" encoding="utf-8"?>
+<p:sld xmlns:a="http://schemas.openxmlformats.org/drawingml/2006/main" xmlns:r="http://schemas.openxmlformats.org/officeDocument/2006/relationships" xmlns:p="http://schemas.openxmlformats.org/presentationml/2006/main">
+  <p:cSld>
+    <p:spTree>
+      <p:nvGrpSpPr>
+        <p:cNvPr id="1" name=""/>
+        <p:cNvGrpSpPr/>
+        <p:nvPr/>
+      </p:nvGrpSpPr>
+      <p:grpSpPr>
+        <a:xfrm>
+          <a:off x="0" y="0"/>
+          <a:ext cx="0" cy="0"/>
+          <a:chOff x="0" y="0"/>
+          <a:chExt cx="0" cy="0"/>
+        </a:xfrm>
+      </p:grpSpPr>
+      <p:sp>
+        <p:nvSpPr>
+          <p:cNvPr id="3" name="Content Placeholder 2"/>
+          <p:cNvSpPr>
+            <a:spLocks noGrp="1"/>
+          </p:cNvSpPr>
+          <p:nvPr>
+            <p:ph idx="1" sz="half"/>
+          </p:nvPr>
+        </p:nvSpPr>
+        <p:spPr/>
+        <p:txBody>
+          <a:bodyPr/>
+          <a:lstStyle/>
+          <a:p>
+            <a:pPr lvl="0" indent="0" marL="0">
+              <a:spcBef>
+                <a:spcPts val="3000"/>
+              </a:spcBef>
+              <a:buNone/>
+            </a:pPr>
+            <a:r>
+              <a:rPr b="1"/>
+              <a:t>Hadoop based</a:t>
+            </a:r>
+          </a:p>
+        </p:txBody>
+      </p:sp>
+      <p:pic>
+        <p:nvPicPr>
+          <p:cNvPr descr="https://github.com/ManuelePasini/slides-markdown/blob/master/slides/images/dt/spatiotemp_dbms/hadoop.png?raw=true" id="0" name="Picture 1"/>
+          <p:cNvPicPr>
+            <a:picLocks noGrp="1" noChangeAspect="1"/>
+          </p:cNvPicPr>
+          <p:nvPr/>
+        </p:nvPicPr>
+        <p:blipFill>
+          <a:blip r:embed="rId2"/>
+          <a:stretch>
+            <a:fillRect/>
+          </a:stretch>
+        </p:blipFill>
+        <p:spPr bwMode="auto">
+          <a:xfrm>
+            <a:off x="457200" y="1778000"/>
+            <a:ext cx="4038600" cy="1701800"/>
+          </a:xfrm>
+          <a:prstGeom prst="rect">
+            <a:avLst/>
+          </a:prstGeom>
+          <a:noFill/>
+          <a:ln w="9525">
+            <a:noFill/>
+            <a:headEnd/>
+            <a:tailEnd/>
+          </a:ln>
+        </p:spPr>
+      </p:pic>
+      <p:sp>
+        <p:nvSpPr>
+          <p:cNvPr id="1" name="TextBox 3"/>
+          <p:cNvSpPr txBox="1"/>
+          <p:nvPr/>
+        </p:nvSpPr>
+        <p:spPr>
+          <a:xfrm>
+            <a:off x="457200" y="4076700"/>
+            <a:ext cx="4038600" cy="508000"/>
+          </a:xfrm>
+          <a:prstGeom prst="rect">
+            <a:avLst/>
+          </a:prstGeom>
+          <a:noFill/>
+        </p:spPr>
+        <p:txBody>
+          <a:bodyPr/>
+          <a:lstStyle/>
+          <a:p>
+            <a:pPr lvl="0" indent="0" marL="0" algn="ctr">
+              <a:buNone/>
+            </a:pPr>
+            <a:r>
+              <a:rPr/>
+              <a:t>Taxonmy of Hadoop based systems for spatio-temporal data</a:t>
+            </a:r>
+          </a:p>
+        </p:txBody>
+      </p:sp>
+      <p:sp>
+        <p:nvSpPr>
+          <p:cNvPr id="4" name="Content Placeholder 3"/>
+          <p:cNvSpPr>
+            <a:spLocks noGrp="1"/>
+          </p:cNvSpPr>
+          <p:nvPr>
+            <p:ph idx="2" sz="half"/>
+          </p:nvPr>
+        </p:nvSpPr>
+        <p:spPr/>
+        <p:txBody>
+          <a:bodyPr/>
+          <a:lstStyle/>
+          <a:p>
+            <a:pPr lvl="0" indent="0" marL="0">
+              <a:spcBef>
+                <a:spcPts val="3000"/>
+              </a:spcBef>
+              <a:buNone/>
+            </a:pPr>
+            <a:r>
+              <a:rPr b="1"/>
+              <a:t>Spark-based</a:t>
+            </a:r>
+          </a:p>
+        </p:txBody>
+      </p:sp>
+      <p:pic>
+        <p:nvPicPr>
+          <p:cNvPr descr="https://github.com/ManuelePasini/slides-markdown/blob/master/slides/images/dt/spatiotemp_dbms/spark.png?raw=true" id="0" name="Picture 1"/>
+          <p:cNvPicPr>
+            <a:picLocks noGrp="1" noChangeAspect="1"/>
+          </p:cNvPicPr>
+          <p:nvPr/>
+        </p:nvPicPr>
+        <p:blipFill>
+          <a:blip r:embed="rId3"/>
+          <a:stretch>
+            <a:fillRect/>
+          </a:stretch>
+        </p:blipFill>
+        <p:spPr bwMode="auto">
+          <a:xfrm>
+            <a:off x="4648200" y="1244600"/>
+            <a:ext cx="4038600" cy="2794000"/>
+          </a:xfrm>
+          <a:prstGeom prst="rect">
+            <a:avLst/>
+          </a:prstGeom>
+          <a:noFill/>
+          <a:ln w="9525">
+            <a:noFill/>
+            <a:headEnd/>
+            <a:tailEnd/>
+          </a:ln>
+        </p:spPr>
+      </p:pic>
+      <p:sp>
+        <p:nvSpPr>
+          <p:cNvPr id="1" name="TextBox 3"/>
+          <p:cNvSpPr txBox="1"/>
+          <p:nvPr/>
+        </p:nvSpPr>
+        <p:spPr>
+          <a:xfrm>
+            <a:off x="4648200" y="4076700"/>
+            <a:ext cx="4038600" cy="508000"/>
+          </a:xfrm>
+          <a:prstGeom prst="rect">
+            <a:avLst/>
+          </a:prstGeom>
+          <a:noFill/>
+        </p:spPr>
+        <p:txBody>
+          <a:bodyPr/>
+          <a:lstStyle/>
+          <a:p>
+            <a:pPr lvl="0" indent="0" marL="0" algn="ctr">
+              <a:buNone/>
+            </a:pPr>
+            <a:r>
+              <a:rPr/>
+              <a:t>Taxonmy of Spark based systems for spatio-temporal data</a:t>
             </a:r>
           </a:p>
         </p:txBody>

</xml_diff>

<commit_message>
Deploying to gh-pages from @ ManuelePasini/slides-markdown@5eb4f5ca2e7a26cfe9020eebaf5be2351da0bc47 🚀
</commit_message>
<xml_diff>
--- a/digital_twins.pptx
+++ b/digital_twins.pptx
@@ -6921,7 +6921,7 @@
             </a:pPr>
             <a:r>
               <a:rPr b="1"/>
-              <a:t>Spatio-Temporal DBMS</a:t>
+              <a:t>Spatial DBMS</a:t>
             </a:r>
           </a:p>
         </p:txBody>
@@ -7189,6 +7189,43 @@
       </p:sp>
       <p:sp>
         <p:nvSpPr>
+          <p:cNvPr id="3" name="Content Placeholder 2"/>
+          <p:cNvSpPr>
+            <a:spLocks noGrp="1"/>
+          </p:cNvSpPr>
+          <p:nvPr>
+            <p:ph idx="1" sz="half"/>
+          </p:nvPr>
+        </p:nvSpPr>
+        <p:spPr/>
+        <p:txBody>
+          <a:bodyPr/>
+          <a:lstStyle/>
+          <a:p>
+            <a:pPr lvl="0"/>
+            <a:r>
+              <a:rPr/>
+              <a:t>Due to the I/O bottleneck, lack of parallelism and scalability, the performance of these systems deteriorated with the increasing volume of data.</a:t>
+            </a:r>
+          </a:p>
+          <a:p>
+            <a:pPr lvl="0"/>
+            <a:r>
+              <a:rPr/>
+              <a:t>PostgreSQL -&gt; PostgreXL</a:t>
+            </a:r>
+          </a:p>
+          <a:p>
+            <a:pPr lvl="0"/>
+            <a:r>
+              <a:rPr/>
+              <a:t>MobilityDB was developed as an extension of PostgreSQL/PostGIS, providing support for storing and querying moving objects data (trajectory). This support includes spatio-temporal data types, indexing techniques, and query operations. Recently, MobilityDB emerged as a distributed system by integrating with Citus for processing massive trajectory data</a:t>
+            </a:r>
+          </a:p>
+        </p:txBody>
+      </p:sp>
+      <p:sp>
+        <p:nvSpPr>
           <p:cNvPr id="4" name="Content Placeholder 3"/>
           <p:cNvSpPr>
             <a:spLocks noGrp="1"/>
@@ -7270,7 +7307,30 @@
             </a:pPr>
             <a:r>
               <a:rPr/>
-              <a:t>Taxonmy of RDBMS for spatio-temporal data</a:t>
+              <a:t>Taxonmy of No-SQL DBMS for spatio-temporal data</a:t>
+            </a:r>
+          </a:p>
+        </p:txBody>
+      </p:sp>
+      <p:sp>
+        <p:nvSpPr>
+          <p:cNvPr id="4" name="Content Placeholder 3"/>
+          <p:cNvSpPr>
+            <a:spLocks noGrp="1"/>
+          </p:cNvSpPr>
+          <p:nvPr>
+            <p:ph idx="2" sz="half"/>
+          </p:nvPr>
+        </p:nvSpPr>
+        <p:spPr/>
+        <p:txBody>
+          <a:bodyPr/>
+          <a:lstStyle/>
+          <a:p>
+            <a:pPr lvl="0"/>
+            <a:r>
+              <a:rPr/>
+              <a:t>Currently, the spatial support of NoSQL databases lacks available spatial operations compared to spatial RDBMSs.</a:t>
             </a:r>
           </a:p>
         </p:txBody>
@@ -7320,7 +7380,7 @@
             </a:pPr>
             <a:r>
               <a:rPr b="1"/>
-              <a:t>Big data spatio-temporal processing infrastructures</a:t>
+              <a:t>Big spatio-temporal data processing infrastructures</a:t>
             </a:r>
           </a:p>
         </p:txBody>

</xml_diff>

<commit_message>
Deploying to gh-pages from @ ManuelePasini/slides-markdown@680528db6a46fbbded44aeb17a455399216caa78 🚀
</commit_message>
<xml_diff>
--- a/digital_twins.pptx
+++ b/digital_twins.pptx
@@ -7490,7 +7490,7 @@
             </a:pPr>
             <a:r>
               <a:rPr/>
-              <a:t>Taxonmy of Hadoop based systems for spatio-temporal data</a:t>
+              <a:t>Taxonmy of Hadoop based systems for spatial data</a:t>
             </a:r>
           </a:p>
         </p:txBody>
@@ -7578,7 +7578,7 @@
             </a:pPr>
             <a:r>
               <a:rPr/>
-              <a:t>Taxonmy of Spark based systems for spatio-temporal data</a:t>
+              <a:t>Taxonmy of Spark based systems for spatial data</a:t>
             </a:r>
           </a:p>
         </p:txBody>

</xml_diff>

<commit_message>
Deploying to gh-pages from @ ManuelePasini/slides-markdown@3057866a3cdd51dd313390da5e69be2e0c2f407c 🚀
</commit_message>
<xml_diff>
--- a/digital_twins.pptx
+++ b/digital_twins.pptx
@@ -37,6 +37,8 @@
     <p:sldId id="285" r:id="rId31"/>
     <p:sldId id="286" r:id="rId32"/>
     <p:sldId id="287" r:id="rId33"/>
+    <p:sldId id="288" r:id="rId34"/>
+    <p:sldId id="289" r:id="rId35"/>
   </p:sldIdLst>
   <p:sldSz cx="9144000" cy="5143500" type="screen16x9"/>
   <p:notesSz cx="6858000" cy="9144000"/>
@@ -7380,7 +7382,79 @@
             </a:pPr>
             <a:r>
               <a:rPr b="1"/>
-              <a:t>Big spatio-temporal data processing infrastructures</a:t>
+              <a:t>RDBMS vs NoSQL for Spatial Data</a:t>
+            </a:r>
+          </a:p>
+          <a:p>
+            <a:pPr lvl="0" indent="0" marL="0">
+              <a:spcBef>
+                <a:spcPts val="3000"/>
+              </a:spcBef>
+              <a:buNone/>
+            </a:pPr>
+            <a:r>
+              <a:rPr b="1"/>
+              <a:t>Performance Evaluation of MongoDB and PostgreSQL for Spatio-temporal Data (EDBT/ICDT Workshops, 2019)</a:t>
+            </a:r>
+          </a:p>
+        </p:txBody>
+      </p:sp>
+      <p:pic>
+        <p:nvPicPr>
+          <p:cNvPr descr="https://github.com/ManuelePasini/slides-markdown/blob/master/slides/images/dt/spatiotemp_dbms/mongo_postgre_dataset_schema.png?raw=true" id="0" name="Picture 1"/>
+          <p:cNvPicPr>
+            <a:picLocks noGrp="1" noChangeAspect="1"/>
+          </p:cNvPicPr>
+          <p:nvPr/>
+        </p:nvPicPr>
+        <p:blipFill>
+          <a:blip r:embed="rId2"/>
+          <a:stretch>
+            <a:fillRect/>
+          </a:stretch>
+        </p:blipFill>
+        <p:spPr bwMode="auto">
+          <a:xfrm>
+            <a:off x="3467100" y="1193800"/>
+            <a:ext cx="2222500" cy="2882900"/>
+          </a:xfrm>
+          <a:prstGeom prst="rect">
+            <a:avLst/>
+          </a:prstGeom>
+          <a:noFill/>
+          <a:ln w="9525">
+            <a:noFill/>
+            <a:headEnd/>
+            <a:tailEnd/>
+          </a:ln>
+        </p:spPr>
+      </p:pic>
+      <p:sp>
+        <p:nvSpPr>
+          <p:cNvPr id="1" name="TextBox 3"/>
+          <p:cNvSpPr txBox="1"/>
+          <p:nvPr/>
+        </p:nvSpPr>
+        <p:spPr>
+          <a:xfrm>
+            <a:off x="457200" y="4076700"/>
+            <a:ext cx="8229600" cy="508000"/>
+          </a:xfrm>
+          <a:prstGeom prst="rect">
+            <a:avLst/>
+          </a:prstGeom>
+          <a:noFill/>
+        </p:spPr>
+        <p:txBody>
+          <a:bodyPr/>
+          <a:lstStyle/>
+          <a:p>
+            <a:pPr lvl="0" indent="0" marL="0" algn="ctr">
+              <a:buNone/>
+            </a:pPr>
+            <a:r>
+              <a:rPr/>
+              <a:t>Dataset schema</a:t>
             </a:r>
           </a:p>
         </p:txBody>
@@ -7391,6 +7465,195 @@
 </file>
 
 <file path=ppt/slides/slide32.xml><?xml version="1.0" encoding="utf-8"?>
+<p:sld xmlns:a="http://schemas.openxmlformats.org/drawingml/2006/main" xmlns:r="http://schemas.openxmlformats.org/officeDocument/2006/relationships" xmlns:p="http://schemas.openxmlformats.org/presentationml/2006/main">
+  <p:cSld>
+    <p:spTree>
+      <p:nvGrpSpPr>
+        <p:cNvPr id="1" name=""/>
+        <p:cNvGrpSpPr/>
+        <p:nvPr/>
+      </p:nvGrpSpPr>
+      <p:grpSpPr>
+        <a:xfrm>
+          <a:off x="0" y="0"/>
+          <a:ext cx="0" cy="0"/>
+          <a:chOff x="0" y="0"/>
+          <a:chExt cx="0" cy="0"/>
+        </a:xfrm>
+      </p:grpSpPr>
+      <p:sp>
+        <p:nvSpPr>
+          <p:cNvPr id="3" name="Content Placeholder 2"/>
+          <p:cNvSpPr>
+            <a:spLocks noGrp="1"/>
+          </p:cNvSpPr>
+          <p:nvPr>
+            <p:ph idx="1" sz="half"/>
+          </p:nvPr>
+        </p:nvSpPr>
+        <p:spPr/>
+        <p:txBody>
+          <a:bodyPr/>
+          <a:lstStyle/>
+          <a:p>
+            <a:pPr lvl="0" indent="0" marL="0">
+              <a:spcBef>
+                <a:spcPts val="3000"/>
+              </a:spcBef>
+              <a:buNone/>
+            </a:pPr>
+            <a:r>
+              <a:rPr b="1"/>
+              <a:t>Spatio-temporal Queries</a:t>
+            </a:r>
+          </a:p>
+          <a:p>
+            <a:pPr lvl="0"/>
+            <a:r>
+              <a:rPr/>
+              <a:t>Find coordinates of different amount of vessels from 1/May/2016 - 31/July/2016 (entire time window) within the whole bounded area, Q1;</a:t>
+            </a:r>
+          </a:p>
+          <a:p>
+            <a:pPr lvl="0"/>
+            <a:r>
+              <a:rPr/>
+              <a:t>Find coordinates of vessels for different time windows within the whole bounded area, Q2;</a:t>
+            </a:r>
+          </a:p>
+          <a:p>
+            <a:pPr lvl="0"/>
+            <a:r>
+              <a:rPr/>
+              <a:t>Find coordinates of vessels for different geographical polygons within the entire time window, Q3.</a:t>
+            </a:r>
+          </a:p>
+        </p:txBody>
+      </p:sp>
+      <p:sp>
+        <p:nvSpPr>
+          <p:cNvPr id="4" name="Content Placeholder 3"/>
+          <p:cNvSpPr>
+            <a:spLocks noGrp="1"/>
+          </p:cNvSpPr>
+          <p:nvPr>
+            <p:ph idx="2" sz="half"/>
+          </p:nvPr>
+        </p:nvSpPr>
+        <p:spPr/>
+        <p:txBody>
+          <a:bodyPr/>
+          <a:lstStyle/>
+          <a:p>
+            <a:pPr lvl="0" indent="0" marL="0">
+              <a:spcBef>
+                <a:spcPts val="3000"/>
+              </a:spcBef>
+              <a:buNone/>
+            </a:pPr>
+            <a:r>
+              <a:rPr b="1"/>
+              <a:t>Dataset Size</a:t>
+            </a:r>
+          </a:p>
+          <a:p>
+            <a:pPr lvl="0"/>
+            <a:r>
+              <a:rPr/>
+              <a:t>MongoDB: 116 GB</a:t>
+            </a:r>
+          </a:p>
+          <a:p>
+            <a:pPr lvl="0"/>
+            <a:r>
+              <a:rPr/>
+              <a:t>PostgreSQL: 32 GB</a:t>
+            </a:r>
+          </a:p>
+        </p:txBody>
+      </p:sp>
+    </p:spTree>
+  </p:cSld>
+</p:sld>
+</file>
+
+<file path=ppt/slides/slide33.xml><?xml version="1.0" encoding="utf-8"?>
+<p:sld xmlns:a="http://schemas.openxmlformats.org/drawingml/2006/main" xmlns:r="http://schemas.openxmlformats.org/officeDocument/2006/relationships" xmlns:p="http://schemas.openxmlformats.org/presentationml/2006/main">
+  <p:cSld>
+    <p:spTree>
+      <p:nvGrpSpPr>
+        <p:cNvPr id="1" name=""/>
+        <p:cNvGrpSpPr/>
+        <p:nvPr/>
+      </p:nvGrpSpPr>
+      <p:grpSpPr>
+        <a:xfrm>
+          <a:off x="0" y="0"/>
+          <a:ext cx="0" cy="0"/>
+          <a:chOff x="0" y="0"/>
+          <a:chExt cx="0" cy="0"/>
+        </a:xfrm>
+      </p:grpSpPr>
+      <p:sp>
+        <p:nvSpPr>
+          <p:cNvPr id="3" name="Content Placeholder 2"/>
+          <p:cNvSpPr>
+            <a:spLocks noGrp="1"/>
+          </p:cNvSpPr>
+          <p:nvPr>
+            <p:ph idx="1"/>
+          </p:nvPr>
+        </p:nvSpPr>
+        <p:spPr/>
+        <p:txBody>
+          <a:bodyPr/>
+          <a:lstStyle/>
+          <a:p>
+            <a:pPr lvl="0"/>
+            <a:r>
+              <a:rPr/>
+              <a:t>The reason for this behavior is that the data stored in MongoDB are in GeoJson format and each record consist of many extra characters and a unique auto created id called ObjectId. Thus, each record is significant bigger in size than it was in its original CSV format. On the other hand, in PostgreSQL the data ingested in database as CSV, with the addition of the_geom column that contains the POINT geometries of each latitude and longitude.</a:t>
+            </a:r>
+          </a:p>
+          <a:p>
+            <a:pPr lvl="0" indent="0" marL="0">
+              <a:spcBef>
+                <a:spcPts val="3000"/>
+              </a:spcBef>
+              <a:buNone/>
+            </a:pPr>
+            <a:r>
+              <a:rPr b="1"/>
+              <a:t>Results</a:t>
+            </a:r>
+          </a:p>
+          <a:p>
+            <a:pPr lvl="0"/>
+            <a:r>
+              <a:rPr/>
+              <a:t>The results show that PostgreSQL with the PostGIS extension, outperforms MongoDB in all queries.</a:t>
+            </a:r>
+          </a:p>
+          <a:p>
+            <a:pPr lvl="0" indent="0" marL="0">
+              <a:spcBef>
+                <a:spcPts val="3000"/>
+              </a:spcBef>
+              <a:buNone/>
+            </a:pPr>
+            <a:r>
+              <a:rPr b="1"/>
+              <a:t>Big spatio-temporal data processing infrastructures</a:t>
+            </a:r>
+          </a:p>
+        </p:txBody>
+      </p:sp>
+    </p:spTree>
+  </p:cSld>
+</p:sld>
+</file>
+
+<file path=ppt/slides/slide34.xml><?xml version="1.0" encoding="utf-8"?>
 <p:sld xmlns:a="http://schemas.openxmlformats.org/drawingml/2006/main" xmlns:r="http://schemas.openxmlformats.org/officeDocument/2006/relationships" xmlns:p="http://schemas.openxmlformats.org/presentationml/2006/main">
   <p:cSld>
     <p:spTree>

</xml_diff>

<commit_message>
Deploying to gh-pages from @ ManuelePasini/slides-markdown@98c5047a12692f116cdf32eaf4c9cd4b58df0b98 🚀
</commit_message>
<xml_diff>
--- a/digital_twins.pptx
+++ b/digital_twins.pptx
@@ -39,6 +39,8 @@
     <p:sldId id="287" r:id="rId33"/>
     <p:sldId id="288" r:id="rId34"/>
     <p:sldId id="289" r:id="rId35"/>
+    <p:sldId id="290" r:id="rId36"/>
+    <p:sldId id="291" r:id="rId37"/>
   </p:sldIdLst>
   <p:sldSz cx="9144000" cy="5143500" type="screen16x9"/>
   <p:notesSz cx="6858000" cy="9144000"/>
@@ -6181,6 +6183,117 @@
             </a:pPr>
             <a:r>
               <a:rPr b="1"/>
+              <a:t>Other benchmarks</a:t>
+            </a:r>
+          </a:p>
+          <a:p>
+            <a:pPr lvl="0" indent="0" marL="0">
+              <a:spcBef>
+                <a:spcPts val="3000"/>
+              </a:spcBef>
+              <a:buNone/>
+            </a:pPr>
+            <a:r>
+              <a:rPr b="1"/>
+              <a:t>Spatio-Temporal</a:t>
+            </a:r>
+          </a:p>
+          <a:p>
+            <a:pPr lvl="0"/>
+            <a:r>
+              <a:rPr/>
+              <a:t>BerlinMOD: A benchmark for moving object databases, VLDB Journal 2009</a:t>
+            </a:r>
+          </a:p>
+          <a:p>
+            <a:pPr lvl="0"/>
+            <a:r>
+              <a:rPr/>
+              <a:t>Benchmarking moving object functionalities of DBMSs using real-world spatiotemporal workload, International Conference on Mobile Data Management 2022</a:t>
+            </a:r>
+          </a:p>
+          <a:p>
+            <a:pPr lvl="0"/>
+            <a:r>
+              <a:rPr/>
+              <a:t>Performance Evaluation of MongoDB and PostgreSQL for spatio-temporal data, EDBT/ICDT Workshops 2019</a:t>
+            </a:r>
+          </a:p>
+          <a:p>
+            <a:pPr lvl="0"/>
+            <a:r>
+              <a:rPr/>
+              <a:t>How to manage massive spatiotemporal dataset from stationary and non-stationary sensors in commercial DBMS?, Knowledge and Information Systems 2024</a:t>
+            </a:r>
+          </a:p>
+          <a:p>
+            <a:pPr lvl="0" indent="0" marL="0">
+              <a:spcBef>
+                <a:spcPts val="3000"/>
+              </a:spcBef>
+              <a:buNone/>
+            </a:pPr>
+            <a:r>
+              <a:rPr b="1"/>
+              <a:t>Time Series DB</a:t>
+            </a:r>
+          </a:p>
+          <a:p>
+            <a:pPr lvl="0"/>
+            <a:r>
+              <a:rPr/>
+              <a:t>TS-Benchmark: A Benchmark for Time Series Databases, ICDE 2021</a:t>
+            </a:r>
+          </a:p>
+          <a:p>
+            <a:pPr lvl="0"/>
+            <a:r>
+              <a:rPr/>
+              <a:t>SciTS: A Benchmark for Time-Series Databases in Scientific Experiments and Industrial Internet of Things, International Conference on Scientific and Statistical Database Management 2022 (SSDBM) </a:t>
+            </a:r>
+          </a:p>
+          <a:p>
+            <a:pPr lvl="0"/>
+            <a:r>
+              <a:rPr/>
+              <a:t>TSM-Bench: Benchmarking Time Series Database Systems for Monitoring Applications,  VLDB 2023 </a:t>
+            </a:r>
+          </a:p>
+          <a:p>
+            <a:pPr lvl="0" indent="0" marL="0">
+              <a:spcBef>
+                <a:spcPts val="3000"/>
+              </a:spcBef>
+              <a:buNone/>
+            </a:pPr>
+            <a:r>
+              <a:rPr b="1"/>
+              <a:t>Spatial DB</a:t>
+            </a:r>
+          </a:p>
+          <a:p>
+            <a:pPr lvl="0"/>
+            <a:r>
+              <a:rPr/>
+              <a:t>The SEQUOIA 2000 Storage Benchmark, SIGMOD 1993</a:t>
+            </a:r>
+          </a:p>
+          <a:p>
+            <a:pPr lvl="0"/>
+            <a:r>
+              <a:rPr/>
+              <a:t>Building a ScalableGee-SpatialDBMS: Technology, Implementation,and Evaluation SIGMOD 1997</a:t>
+            </a:r>
+          </a:p>
+          <a:p>
+            <a:pPr lvl="0" indent="0" marL="0">
+              <a:spcBef>
+                <a:spcPts val="3000"/>
+              </a:spcBef>
+              <a:buNone/>
+            </a:pPr>
+            <a:r>
+              <a:rPr b="1"/>
               <a:t>Data architectures</a:t>
             </a:r>
           </a:p>
@@ -6825,107 +6938,6 @@
 $$) as (V agtype, R agtype, V2 agtype);</a:t>
             </a:r>
           </a:p>
-          <a:p>
-            <a:pPr lvl="0" indent="0" marL="0">
-              <a:spcBef>
-                <a:spcPts val="3000"/>
-              </a:spcBef>
-              <a:buNone/>
-            </a:pPr>
-            <a:r>
-              <a:rPr b="1"/>
-              <a:t>A Survey on Spatio-temporal Data Analytics Systems (ACM Surveys, 2022)</a:t>
-            </a:r>
-          </a:p>
-          <a:p>
-            <a:pPr lvl="0"/>
-            <a:r>
-              <a:rPr/>
-              <a:t>Categorizes spatio-temporal dmbs in groups:</a:t>
-            </a:r>
-          </a:p>
-          <a:p>
-            <a:pPr lvl="1"/>
-            <a:r>
-              <a:rPr/>
-              <a:t>Spatio-temporal DBMS:</a:t>
-            </a:r>
-          </a:p>
-          <a:p>
-            <a:pPr lvl="2"/>
-            <a:r>
-              <a:rPr/>
-              <a:t>RDBMS</a:t>
-            </a:r>
-          </a:p>
-          <a:p>
-            <a:pPr lvl="2"/>
-            <a:r>
-              <a:rPr/>
-              <a:t>No-SQL DBMS</a:t>
-            </a:r>
-          </a:p>
-          <a:p>
-            <a:pPr lvl="1"/>
-            <a:r>
-              <a:rPr/>
-              <a:t>Big data spatio-temporal processing infrastructures</a:t>
-            </a:r>
-          </a:p>
-          <a:p>
-            <a:pPr lvl="2"/>
-            <a:r>
-              <a:rPr/>
-              <a:t>Hadoop based infrastructures</a:t>
-            </a:r>
-          </a:p>
-          <a:p>
-            <a:pPr lvl="2"/>
-            <a:r>
-              <a:rPr/>
-              <a:t>Spark based infrastructures</a:t>
-            </a:r>
-          </a:p>
-          <a:p>
-            <a:pPr lvl="2"/>
-            <a:r>
-              <a:rPr/>
-              <a:t>No-SQL infrastructures</a:t>
-            </a:r>
-          </a:p>
-          <a:p>
-            <a:pPr lvl="1"/>
-            <a:r>
-              <a:rPr/>
-              <a:t>Programming languages</a:t>
-            </a:r>
-          </a:p>
-          <a:p>
-            <a:pPr lvl="2"/>
-            <a:r>
-              <a:rPr/>
-              <a:t>DASK</a:t>
-            </a:r>
-          </a:p>
-          <a:p>
-            <a:pPr lvl="2"/>
-            <a:r>
-              <a:rPr/>
-              <a:t>RAPIDS</a:t>
-            </a:r>
-          </a:p>
-          <a:p>
-            <a:pPr lvl="0" indent="0" marL="0">
-              <a:spcBef>
-                <a:spcPts val="3000"/>
-              </a:spcBef>
-              <a:buNone/>
-            </a:pPr>
-            <a:r>
-              <a:rPr b="1"/>
-              <a:t>Spatial DBMS</a:t>
-            </a:r>
-          </a:p>
         </p:txBody>
       </p:sp>
     </p:spTree>
@@ -7103,6 +7115,172 @@
       </p:grpSpPr>
       <p:sp>
         <p:nvSpPr>
+          <p:cNvPr id="2" name="Title 1"/>
+          <p:cNvSpPr>
+            <a:spLocks noGrp="1"/>
+          </p:cNvSpPr>
+          <p:nvPr>
+            <p:ph type="title"/>
+          </p:nvPr>
+        </p:nvSpPr>
+        <p:spPr/>
+        <p:txBody>
+          <a:bodyPr/>
+          <a:lstStyle/>
+          <a:p>
+            <a:pPr lvl="0" indent="0" marL="0">
+              <a:buNone/>
+            </a:pPr>
+            <a:r>
+              <a:rPr/>
+              <a:t>Spatio Temporal DBMS</a:t>
+            </a:r>
+          </a:p>
+        </p:txBody>
+      </p:sp>
+      <p:sp>
+        <p:nvSpPr>
+          <p:cNvPr id="3" name="Content Placeholder 2"/>
+          <p:cNvSpPr>
+            <a:spLocks noGrp="1"/>
+          </p:cNvSpPr>
+          <p:nvPr>
+            <p:ph idx="1"/>
+          </p:nvPr>
+        </p:nvSpPr>
+        <p:spPr/>
+        <p:txBody>
+          <a:bodyPr/>
+          <a:lstStyle/>
+          <a:p>
+            <a:pPr lvl="0" indent="0" marL="0">
+              <a:spcBef>
+                <a:spcPts val="3000"/>
+              </a:spcBef>
+              <a:buNone/>
+            </a:pPr>
+            <a:r>
+              <a:rPr b="1">
+                <a:hlinkClick r:id="rId2"/>
+              </a:rPr>
+              <a:t>A Survey on Spatio-temporal Data Analytics Systems, ACM Surveys 2022</a:t>
+            </a:r>
+          </a:p>
+          <a:p>
+            <a:pPr lvl="0"/>
+            <a:r>
+              <a:rPr/>
+              <a:t>Categorizes spatio-temporal DBMSs in groups:</a:t>
+            </a:r>
+          </a:p>
+          <a:p>
+            <a:pPr lvl="1"/>
+            <a:r>
+              <a:rPr/>
+              <a:t>Spatial DBMS:</a:t>
+            </a:r>
+          </a:p>
+          <a:p>
+            <a:pPr lvl="2"/>
+            <a:r>
+              <a:rPr/>
+              <a:t>RDBMS</a:t>
+            </a:r>
+          </a:p>
+          <a:p>
+            <a:pPr lvl="2"/>
+            <a:r>
+              <a:rPr/>
+              <a:t>No-SQL DBMS</a:t>
+            </a:r>
+          </a:p>
+          <a:p>
+            <a:pPr lvl="1"/>
+            <a:r>
+              <a:rPr/>
+              <a:t>Big data spatio-temporal processing infrastructures</a:t>
+            </a:r>
+          </a:p>
+          <a:p>
+            <a:pPr lvl="2"/>
+            <a:r>
+              <a:rPr/>
+              <a:t>Hadoop based infrastructures</a:t>
+            </a:r>
+          </a:p>
+          <a:p>
+            <a:pPr lvl="2"/>
+            <a:r>
+              <a:rPr/>
+              <a:t>Spark based infrastructures</a:t>
+            </a:r>
+          </a:p>
+          <a:p>
+            <a:pPr lvl="2"/>
+            <a:r>
+              <a:rPr/>
+              <a:t>No-SQL infrastructures</a:t>
+            </a:r>
+          </a:p>
+          <a:p>
+            <a:pPr lvl="1"/>
+            <a:r>
+              <a:rPr/>
+              <a:t>Programming languages</a:t>
+            </a:r>
+          </a:p>
+          <a:p>
+            <a:pPr lvl="2"/>
+            <a:r>
+              <a:rPr/>
+              <a:t>DASK</a:t>
+            </a:r>
+          </a:p>
+          <a:p>
+            <a:pPr lvl="2"/>
+            <a:r>
+              <a:rPr/>
+              <a:t>RAPIDS</a:t>
+            </a:r>
+          </a:p>
+          <a:p>
+            <a:pPr lvl="0" indent="0" marL="0">
+              <a:spcBef>
+                <a:spcPts val="3000"/>
+              </a:spcBef>
+              <a:buNone/>
+            </a:pPr>
+            <a:r>
+              <a:rPr b="1"/>
+              <a:t>Spatial DBMS</a:t>
+            </a:r>
+          </a:p>
+        </p:txBody>
+      </p:sp>
+    </p:spTree>
+  </p:cSld>
+</p:sld>
+</file>
+
+<file path=ppt/slides/slide31.xml><?xml version="1.0" encoding="utf-8"?>
+<p:sld xmlns:a="http://schemas.openxmlformats.org/drawingml/2006/main" xmlns:r="http://schemas.openxmlformats.org/officeDocument/2006/relationships" xmlns:p="http://schemas.openxmlformats.org/presentationml/2006/main">
+  <p:cSld>
+    <p:spTree>
+      <p:nvGrpSpPr>
+        <p:cNvPr id="1" name=""/>
+        <p:cNvGrpSpPr/>
+        <p:nvPr/>
+      </p:nvGrpSpPr>
+      <p:grpSpPr>
+        <a:xfrm>
+          <a:off x="0" y="0"/>
+          <a:ext cx="0" cy="0"/>
+          <a:chOff x="0" y="0"/>
+          <a:chExt cx="0" cy="0"/>
+        </a:xfrm>
+      </p:grpSpPr>
+      <p:sp>
+        <p:nvSpPr>
           <p:cNvPr id="3" name="Content Placeholder 2"/>
           <p:cNvSpPr>
             <a:spLocks noGrp="1"/>
@@ -7214,7 +7392,7 @@
             <a:pPr lvl="0"/>
             <a:r>
               <a:rPr/>
-              <a:t>PostgreSQL -&gt; PostgreXL</a:t>
+              <a:t>PostgreSQL -&gt; PostgresXL</a:t>
             </a:r>
           </a:p>
           <a:p>
@@ -7342,128 +7520,6 @@
 </p:sld>
 </file>
 
-<file path=ppt/slides/slide31.xml><?xml version="1.0" encoding="utf-8"?>
-<p:sld xmlns:a="http://schemas.openxmlformats.org/drawingml/2006/main" xmlns:r="http://schemas.openxmlformats.org/officeDocument/2006/relationships" xmlns:p="http://schemas.openxmlformats.org/presentationml/2006/main">
-  <p:cSld>
-    <p:spTree>
-      <p:nvGrpSpPr>
-        <p:cNvPr id="1" name=""/>
-        <p:cNvGrpSpPr/>
-        <p:nvPr/>
-      </p:nvGrpSpPr>
-      <p:grpSpPr>
-        <a:xfrm>
-          <a:off x="0" y="0"/>
-          <a:ext cx="0" cy="0"/>
-          <a:chOff x="0" y="0"/>
-          <a:chExt cx="0" cy="0"/>
-        </a:xfrm>
-      </p:grpSpPr>
-      <p:sp>
-        <p:nvSpPr>
-          <p:cNvPr id="3" name="Content Placeholder 2"/>
-          <p:cNvSpPr>
-            <a:spLocks noGrp="1"/>
-          </p:cNvSpPr>
-          <p:nvPr>
-            <p:ph idx="1"/>
-          </p:nvPr>
-        </p:nvSpPr>
-        <p:spPr/>
-        <p:txBody>
-          <a:bodyPr/>
-          <a:lstStyle/>
-          <a:p>
-            <a:pPr lvl="0" indent="0" marL="0">
-              <a:spcBef>
-                <a:spcPts val="3000"/>
-              </a:spcBef>
-              <a:buNone/>
-            </a:pPr>
-            <a:r>
-              <a:rPr b="1"/>
-              <a:t>RDBMS vs NoSQL for Spatial Data</a:t>
-            </a:r>
-          </a:p>
-          <a:p>
-            <a:pPr lvl="0" indent="0" marL="0">
-              <a:spcBef>
-                <a:spcPts val="3000"/>
-              </a:spcBef>
-              <a:buNone/>
-            </a:pPr>
-            <a:r>
-              <a:rPr b="1"/>
-              <a:t>Performance Evaluation of MongoDB and PostgreSQL for Spatio-temporal Data (EDBT/ICDT Workshops, 2019)</a:t>
-            </a:r>
-          </a:p>
-        </p:txBody>
-      </p:sp>
-      <p:pic>
-        <p:nvPicPr>
-          <p:cNvPr descr="https://github.com/ManuelePasini/slides-markdown/blob/master/slides/images/dt/spatiotemp_dbms/mongo_postgre_dataset_schema.png?raw=true" id="0" name="Picture 1"/>
-          <p:cNvPicPr>
-            <a:picLocks noGrp="1" noChangeAspect="1"/>
-          </p:cNvPicPr>
-          <p:nvPr/>
-        </p:nvPicPr>
-        <p:blipFill>
-          <a:blip r:embed="rId2"/>
-          <a:stretch>
-            <a:fillRect/>
-          </a:stretch>
-        </p:blipFill>
-        <p:spPr bwMode="auto">
-          <a:xfrm>
-            <a:off x="3467100" y="1193800"/>
-            <a:ext cx="2222500" cy="2882900"/>
-          </a:xfrm>
-          <a:prstGeom prst="rect">
-            <a:avLst/>
-          </a:prstGeom>
-          <a:noFill/>
-          <a:ln w="9525">
-            <a:noFill/>
-            <a:headEnd/>
-            <a:tailEnd/>
-          </a:ln>
-        </p:spPr>
-      </p:pic>
-      <p:sp>
-        <p:nvSpPr>
-          <p:cNvPr id="1" name="TextBox 3"/>
-          <p:cNvSpPr txBox="1"/>
-          <p:nvPr/>
-        </p:nvSpPr>
-        <p:spPr>
-          <a:xfrm>
-            <a:off x="457200" y="4076700"/>
-            <a:ext cx="8229600" cy="508000"/>
-          </a:xfrm>
-          <a:prstGeom prst="rect">
-            <a:avLst/>
-          </a:prstGeom>
-          <a:noFill/>
-        </p:spPr>
-        <p:txBody>
-          <a:bodyPr/>
-          <a:lstStyle/>
-          <a:p>
-            <a:pPr lvl="0" indent="0" marL="0" algn="ctr">
-              <a:buNone/>
-            </a:pPr>
-            <a:r>
-              <a:rPr/>
-              <a:t>Dataset schema</a:t>
-            </a:r>
-          </a:p>
-        </p:txBody>
-      </p:sp>
-    </p:spTree>
-  </p:cSld>
-</p:sld>
-</file>
-
 <file path=ppt/slides/slide32.xml><?xml version="1.0" encoding="utf-8"?>
 <p:sld xmlns:a="http://schemas.openxmlformats.org/drawingml/2006/main" xmlns:r="http://schemas.openxmlformats.org/officeDocument/2006/relationships" xmlns:p="http://schemas.openxmlformats.org/presentationml/2006/main">
   <p:cSld>
@@ -7488,7 +7544,7 @@
             <a:spLocks noGrp="1"/>
           </p:cNvSpPr>
           <p:nvPr>
-            <p:ph idx="1" sz="half"/>
+            <p:ph idx="1"/>
           </p:nvPr>
         </p:nvSpPr>
         <p:spPr/>
@@ -7504,70 +7560,18 @@
             </a:pPr>
             <a:r>
               <a:rPr b="1"/>
-              <a:t>Spatio-temporal Queries</a:t>
-            </a:r>
-          </a:p>
-          <a:p>
-            <a:pPr lvl="0"/>
-            <a:r>
-              <a:rPr/>
-              <a:t>Find coordinates of different amount of vessels from 1/May/2016 - 31/July/2016 (entire time window) within the whole bounded area, Q1;</a:t>
-            </a:r>
-          </a:p>
-          <a:p>
-            <a:pPr lvl="0"/>
-            <a:r>
-              <a:rPr/>
-              <a:t>Find coordinates of vessels for different time windows within the whole bounded area, Q2;</a:t>
-            </a:r>
-          </a:p>
-          <a:p>
-            <a:pPr lvl="0"/>
-            <a:r>
-              <a:rPr/>
-              <a:t>Find coordinates of vessels for different geographical polygons within the entire time window, Q3.</a:t>
-            </a:r>
-          </a:p>
-        </p:txBody>
-      </p:sp>
-      <p:sp>
-        <p:nvSpPr>
-          <p:cNvPr id="4" name="Content Placeholder 3"/>
-          <p:cNvSpPr>
-            <a:spLocks noGrp="1"/>
-          </p:cNvSpPr>
-          <p:nvPr>
-            <p:ph idx="2" sz="half"/>
-          </p:nvPr>
-        </p:nvSpPr>
-        <p:spPr/>
-        <p:txBody>
-          <a:bodyPr/>
-          <a:lstStyle/>
+              <a:t>RDBMS vs NoSQL for Spatial Data</a:t>
+            </a:r>
+          </a:p>
           <a:p>
             <a:pPr lvl="0" indent="0" marL="0">
-              <a:spcBef>
-                <a:spcPts val="3000"/>
-              </a:spcBef>
               <a:buNone/>
             </a:pPr>
             <a:r>
-              <a:rPr b="1"/>
-              <a:t>Dataset Size</a:t>
-            </a:r>
-          </a:p>
-          <a:p>
-            <a:pPr lvl="0"/>
-            <a:r>
-              <a:rPr/>
-              <a:t>MongoDB: 116 GB</a:t>
-            </a:r>
-          </a:p>
-          <a:p>
-            <a:pPr lvl="0"/>
-            <a:r>
-              <a:rPr/>
-              <a:t>PostgreSQL: 32 GB</a:t>
+              <a:rPr>
+                <a:hlinkClick r:id="rId2"/>
+              </a:rPr>
+              <a:t>Performance Evaluation of MongoDB and PostgreSQL for Spatio-temporal Data, EDBT/ICDT Workshops 2019</a:t>
             </a:r>
           </a:p>
         </p:txBody>
@@ -7596,25 +7600,18 @@
       </p:grpSpPr>
       <p:sp>
         <p:nvSpPr>
-          <p:cNvPr id="3" name="Content Placeholder 2"/>
-          <p:cNvSpPr>
-            <a:spLocks noGrp="1"/>
-          </p:cNvSpPr>
-          <p:nvPr>
-            <p:ph idx="1"/>
-          </p:nvPr>
-        </p:nvSpPr>
-        <p:spPr/>
-        <p:txBody>
-          <a:bodyPr/>
-          <a:lstStyle/>
-          <a:p>
-            <a:pPr lvl="0"/>
-            <a:r>
-              <a:rPr/>
-              <a:t>The reason for this behavior is that the data stored in MongoDB are in GeoJson format and each record consist of many extra characters and a unique auto created id called ObjectId. Thus, each record is significant bigger in size than it was in its original CSV format. On the other hand, in PostgreSQL the data ingested in database as CSV, with the addition of the_geom column that contains the POINT geometries of each latitude and longitude.</a:t>
-            </a:r>
-          </a:p>
+          <p:cNvPr id="3" name="Text Placeholder 2"/>
+          <p:cNvSpPr>
+            <a:spLocks noGrp="1"/>
+          </p:cNvSpPr>
+          <p:nvPr>
+            <p:ph idx="1" type="body"/>
+          </p:nvPr>
+        </p:nvSpPr>
+        <p:spPr/>
+        <p:txBody>
+          <a:bodyPr/>
+          <a:lstStyle/>
           <a:p>
             <a:pPr lvl="0" indent="0" marL="0">
               <a:spcBef>
@@ -7624,16 +7621,46 @@
             </a:pPr>
             <a:r>
               <a:rPr b="1"/>
-              <a:t>Results</a:t>
-            </a:r>
-          </a:p>
-          <a:p>
-            <a:pPr lvl="0"/>
-            <a:r>
-              <a:rPr/>
-              <a:t>The results show that PostgreSQL with the PostGIS extension, outperforms MongoDB in all queries.</a:t>
-            </a:r>
-          </a:p>
+              <a:t>Dataset Size</a:t>
+            </a:r>
+          </a:p>
+          <a:p>
+            <a:pPr lvl="0"/>
+            <a:r>
+              <a:rPr/>
+              <a:t>11 GB, 43 288 vessels, 146.491.511 records</a:t>
+            </a:r>
+          </a:p>
+          <a:p>
+            <a:pPr lvl="0"/>
+            <a:r>
+              <a:rPr/>
+              <a:t>MongoDB: 116 GB</a:t>
+            </a:r>
+          </a:p>
+          <a:p>
+            <a:pPr lvl="0"/>
+            <a:r>
+              <a:rPr/>
+              <a:t>PostgreSQL: 32 GB</a:t>
+            </a:r>
+          </a:p>
+        </p:txBody>
+      </p:sp>
+      <p:sp>
+        <p:nvSpPr>
+          <p:cNvPr id="5" name="Text Placeholder 4"/>
+          <p:cNvSpPr>
+            <a:spLocks noGrp="1"/>
+          </p:cNvSpPr>
+          <p:nvPr>
+            <p:ph idx="3" sz="quarter" type="body"/>
+          </p:nvPr>
+        </p:nvSpPr>
+        <p:spPr/>
+        <p:txBody>
+          <a:bodyPr/>
+          <a:lstStyle/>
           <a:p>
             <a:pPr lvl="0" indent="0" marL="0">
               <a:spcBef>
@@ -7643,17 +7670,123 @@
             </a:pPr>
             <a:r>
               <a:rPr b="1"/>
-              <a:t>Big spatio-temporal data processing infrastructures</a:t>
-            </a:r>
-          </a:p>
-        </p:txBody>
-      </p:sp>
+              <a:t>Dataset Schema</a:t>
+            </a:r>
+          </a:p>
+        </p:txBody>
+      </p:sp>
+      <p:pic>
+        <p:nvPicPr>
+          <p:cNvPr descr="https://github.com/ManuelePasini/slides-markdown/blob/master/slides/images/dt/spatiotemp_dbms/mongo_postgre_dataset_schema.png?raw=true" id="0" name="Picture 1"/>
+          <p:cNvPicPr>
+            <a:picLocks noGrp="1" noChangeAspect="1"/>
+          </p:cNvPicPr>
+          <p:nvPr/>
+        </p:nvPicPr>
+        <p:blipFill>
+          <a:blip r:embed="rId2"/>
+          <a:stretch>
+            <a:fillRect/>
+          </a:stretch>
+        </p:blipFill>
+        <p:spPr bwMode="auto">
+          <a:xfrm>
+            <a:off x="5511800" y="1625600"/>
+            <a:ext cx="2273300" cy="2959100"/>
+          </a:xfrm>
+          <a:prstGeom prst="rect">
+            <a:avLst/>
+          </a:prstGeom>
+          <a:noFill/>
+          <a:ln w="9525">
+            <a:noFill/>
+            <a:headEnd/>
+            <a:tailEnd/>
+          </a:ln>
+        </p:spPr>
+      </p:pic>
     </p:spTree>
   </p:cSld>
 </p:sld>
 </file>
 
 <file path=ppt/slides/slide34.xml><?xml version="1.0" encoding="utf-8"?>
+<p:sld xmlns:a="http://schemas.openxmlformats.org/drawingml/2006/main" xmlns:r="http://schemas.openxmlformats.org/officeDocument/2006/relationships" xmlns:p="http://schemas.openxmlformats.org/presentationml/2006/main">
+  <p:cSld>
+    <p:spTree>
+      <p:nvGrpSpPr>
+        <p:cNvPr id="1" name=""/>
+        <p:cNvGrpSpPr/>
+        <p:nvPr/>
+      </p:nvGrpSpPr>
+      <p:grpSpPr>
+        <a:xfrm>
+          <a:off x="0" y="0"/>
+          <a:ext cx="0" cy="0"/>
+          <a:chOff x="0" y="0"/>
+          <a:chExt cx="0" cy="0"/>
+        </a:xfrm>
+      </p:grpSpPr>
+      <p:sp>
+        <p:nvSpPr>
+          <p:cNvPr id="3" name="Content Placeholder 2"/>
+          <p:cNvSpPr>
+            <a:spLocks noGrp="1"/>
+          </p:cNvSpPr>
+          <p:nvPr>
+            <p:ph idx="1"/>
+          </p:nvPr>
+        </p:nvSpPr>
+        <p:spPr/>
+        <p:txBody>
+          <a:bodyPr/>
+          <a:lstStyle/>
+          <a:p>
+            <a:pPr lvl="0"/>
+            <a:r>
+              <a:rPr/>
+              <a:t>MongoDB stores data in GeoJson format, each record has many extra characters + unique auto created ObjectId. PostgreSQL ingests data as CSV, with adding the_geom column that contains the POINT geometries for latitude and longitude.</a:t>
+            </a:r>
+          </a:p>
+          <a:p>
+            <a:pPr lvl="0" indent="0" marL="0">
+              <a:spcBef>
+                <a:spcPts val="3000"/>
+              </a:spcBef>
+              <a:buNone/>
+            </a:pPr>
+            <a:r>
+              <a:rPr b="1"/>
+              <a:t>Results</a:t>
+            </a:r>
+          </a:p>
+          <a:p>
+            <a:pPr lvl="0"/>
+            <a:r>
+              <a:rPr/>
+              <a:t>The results show that PostgreSQL with the PostGIS extension, outperforms MongoDB in all queries.</a:t>
+            </a:r>
+          </a:p>
+          <a:p>
+            <a:pPr lvl="0" indent="0" marL="0">
+              <a:spcBef>
+                <a:spcPts val="3000"/>
+              </a:spcBef>
+              <a:buNone/>
+            </a:pPr>
+            <a:r>
+              <a:rPr b="1"/>
+              <a:t>Big spatio-temporal data processing infrastructures</a:t>
+            </a:r>
+          </a:p>
+        </p:txBody>
+      </p:sp>
+    </p:spTree>
+  </p:cSld>
+</p:sld>
+</file>
+
+<file path=ppt/slides/slide35.xml><?xml version="1.0" encoding="utf-8"?>
 <p:sld xmlns:a="http://schemas.openxmlformats.org/drawingml/2006/main" xmlns:r="http://schemas.openxmlformats.org/officeDocument/2006/relationships" xmlns:p="http://schemas.openxmlformats.org/presentationml/2006/main">
   <p:cSld>
     <p:spTree>
@@ -7760,6 +7893,50 @@
       </p:sp>
       <p:sp>
         <p:nvSpPr>
+          <p:cNvPr id="3" name="Content Placeholder 2"/>
+          <p:cNvSpPr>
+            <a:spLocks noGrp="1"/>
+          </p:cNvSpPr>
+          <p:nvPr>
+            <p:ph idx="1" sz="half"/>
+          </p:nvPr>
+        </p:nvSpPr>
+        <p:spPr/>
+        <p:txBody>
+          <a:bodyPr/>
+          <a:lstStyle/>
+          <a:p>
+            <a:pPr lvl="0"/>
+            <a:r>
+              <a:rPr/>
+              <a:t>Due to the lack of spatio-temporal data types, partitioning, and indexing techniques, Hadoop-GIS &amp; SpatialHadoop suffer querying spatio-temporal datasets</a:t>
+            </a:r>
+          </a:p>
+          <a:p>
+            <a:pPr lvl="0"/>
+            <a:r>
+              <a:rPr/>
+              <a:t>ST-Hadoop was developed by considering attributes of discrete spatio-temporal point data, not trajectory data. So data might be wrong-sharded when indexed.</a:t>
+            </a:r>
+          </a:p>
+          <a:p>
+            <a:pPr lvl="0"/>
+            <a:r>
+              <a:rPr/>
+              <a:t>Summit is an extension of ST-Hadoop to include data types, partitioning and indexing techniques, and operations, for processing trajectory data.</a:t>
+            </a:r>
+          </a:p>
+          <a:p>
+            <a:pPr lvl="0"/>
+            <a:r>
+              <a:rPr/>
+              <a:t>Bakli et al. [27] have proposed HadoopTrajectory, which adds a diverse set of data types and operators into the core of Hadoop to store and process trajectory data.</a:t>
+            </a:r>
+          </a:p>
+        </p:txBody>
+      </p:sp>
+      <p:sp>
+        <p:nvSpPr>
           <p:cNvPr id="4" name="Content Placeholder 3"/>
           <p:cNvSpPr>
             <a:spLocks noGrp="1"/>
@@ -7842,6 +8019,334 @@
             <a:r>
               <a:rPr/>
               <a:t>Taxonmy of Spark based systems for spatial data</a:t>
+            </a:r>
+          </a:p>
+        </p:txBody>
+      </p:sp>
+      <p:sp>
+        <p:nvSpPr>
+          <p:cNvPr id="4" name="Content Placeholder 3"/>
+          <p:cNvSpPr>
+            <a:spLocks noGrp="1"/>
+          </p:cNvSpPr>
+          <p:nvPr>
+            <p:ph idx="2" sz="half"/>
+          </p:nvPr>
+        </p:nvSpPr>
+        <p:spPr/>
+        <p:txBody>
+          <a:bodyPr/>
+          <a:lstStyle/>
+          <a:p>
+            <a:pPr lvl="0"/>
+            <a:r>
+              <a:rPr/>
+              <a:t>First five spatial data processing solutions are not fully compliant with the ISO standard and OGC specifications.</a:t>
+            </a:r>
+          </a:p>
+          <a:p>
+            <a:pPr lvl="0"/>
+            <a:r>
+              <a:rPr/>
+              <a:t>STARK integrates spatio-temporal support to Spark RDDs</a:t>
+            </a:r>
+          </a:p>
+          <a:p>
+            <a:pPr lvl="0"/>
+            <a:r>
+              <a:rPr/>
+              <a:t>DiStRDF is a distributed system for processing spatio-temporal RDF data; however, these last two focus on discrete data points and not trajectories.</a:t>
+            </a:r>
+          </a:p>
+          <a:p>
+            <a:pPr lvl="0"/>
+            <a:r>
+              <a:rPr/>
+              <a:t>TrajSpark does not have any support for SQL-like queries.</a:t>
+            </a:r>
+          </a:p>
+          <a:p>
+            <a:pPr lvl="0"/>
+            <a:r>
+              <a:rPr/>
+              <a:t>UITraMan has added an off-heap key-value store, Chronicle Map</a:t>
+            </a:r>
+          </a:p>
+          <a:p>
+            <a:pPr lvl="0"/>
+            <a:r>
+              <a:rPr/>
+              <a:t>Among TrajSpark, DITA, and UITraMan, only TrajSpark alleviates the overhead of repartitioning the whole dataset when a new batch of dataset arrives. Thus, TrajSpark achieves near real-time trajectory processing capability. Besides, this newbatch of data is loaded as RDDs in Spark, which are immutable, and any updates on RDD create a new RDD, which is costly.</a:t>
+            </a:r>
+          </a:p>
+          <a:p>
+            <a:pPr lvl="0"/>
+            <a:r>
+              <a:rPr/>
+              <a:t>Dragoon [93] is a hybrid system for processing both historical (offline) and streaming (online) trajectories. The offline module of Dragoon is similar to UITraMan, but Dragoon has utilized Chronicle Map in such a way that it works for both historical and streaming trajectories.</a:t>
+            </a:r>
+          </a:p>
+          <a:p>
+            <a:pPr lvl="0"/>
+            <a:r>
+              <a:rPr/>
+              <a:t> All these systems are for processing vector spatial and spatio-temporal data. None of these systems has support for raster data except Apache Sedona. </a:t>
+            </a:r>
+          </a:p>
+          <a:p>
+            <a:pPr lvl="0"/>
+            <a:r>
+              <a:rPr/>
+              <a:t>Beast supports both vector and raster data with multidimensional data types and partition and index structures.</a:t>
+            </a:r>
+          </a:p>
+        </p:txBody>
+      </p:sp>
+    </p:spTree>
+  </p:cSld>
+</p:sld>
+</file>
+
+<file path=ppt/slides/slide36.xml><?xml version="1.0" encoding="utf-8"?>
+<p:sld xmlns:a="http://schemas.openxmlformats.org/drawingml/2006/main" xmlns:r="http://schemas.openxmlformats.org/officeDocument/2006/relationships" xmlns:p="http://schemas.openxmlformats.org/presentationml/2006/main">
+  <p:cSld>
+    <p:spTree>
+      <p:nvGrpSpPr>
+        <p:cNvPr id="1" name=""/>
+        <p:cNvGrpSpPr/>
+        <p:nvPr/>
+      </p:nvGrpSpPr>
+      <p:grpSpPr>
+        <a:xfrm>
+          <a:off x="0" y="0"/>
+          <a:ext cx="0" cy="0"/>
+          <a:chOff x="0" y="0"/>
+          <a:chExt cx="0" cy="0"/>
+        </a:xfrm>
+      </p:grpSpPr>
+      <p:sp>
+        <p:nvSpPr>
+          <p:cNvPr id="3" name="Content Placeholder 2"/>
+          <p:cNvSpPr>
+            <a:spLocks noGrp="1"/>
+          </p:cNvSpPr>
+          <p:nvPr>
+            <p:ph idx="1"/>
+          </p:nvPr>
+        </p:nvSpPr>
+        <p:spPr/>
+        <p:txBody>
+          <a:bodyPr/>
+          <a:lstStyle/>
+          <a:p>
+            <a:pPr lvl="0" indent="0" marL="0">
+              <a:spcBef>
+                <a:spcPts val="3000"/>
+              </a:spcBef>
+              <a:buNone/>
+            </a:pPr>
+            <a:r>
+              <a:rPr b="1"/>
+              <a:t>Big spatio-temporal data processing infrastructures</a:t>
+            </a:r>
+          </a:p>
+          <a:p>
+            <a:pPr lvl="0" indent="0" marL="0">
+              <a:spcBef>
+                <a:spcPts val="3000"/>
+              </a:spcBef>
+              <a:buNone/>
+            </a:pPr>
+            <a:r>
+              <a:rPr b="1"/>
+              <a:t>NoSQL based</a:t>
+            </a:r>
+          </a:p>
+        </p:txBody>
+      </p:sp>
+      <p:pic>
+        <p:nvPicPr>
+          <p:cNvPr descr="https://github.com/ManuelePasini/slides-markdown/blob/master/slides/images/dt/spatiotemp_dbms/nosql_big.png?raw=true" id="0" name="Picture 1"/>
+          <p:cNvPicPr>
+            <a:picLocks noGrp="1" noChangeAspect="1"/>
+          </p:cNvPicPr>
+          <p:nvPr/>
+        </p:nvPicPr>
+        <p:blipFill>
+          <a:blip r:embed="rId2"/>
+          <a:stretch>
+            <a:fillRect/>
+          </a:stretch>
+        </p:blipFill>
+        <p:spPr bwMode="auto">
+          <a:xfrm>
+            <a:off x="1295400" y="1193800"/>
+            <a:ext cx="6540500" cy="2882900"/>
+          </a:xfrm>
+          <a:prstGeom prst="rect">
+            <a:avLst/>
+          </a:prstGeom>
+          <a:noFill/>
+          <a:ln w="9525">
+            <a:noFill/>
+            <a:headEnd/>
+            <a:tailEnd/>
+          </a:ln>
+        </p:spPr>
+      </p:pic>
+      <p:sp>
+        <p:nvSpPr>
+          <p:cNvPr id="1" name="TextBox 3"/>
+          <p:cNvSpPr txBox="1"/>
+          <p:nvPr/>
+        </p:nvSpPr>
+        <p:spPr>
+          <a:xfrm>
+            <a:off x="457200" y="4076700"/>
+            <a:ext cx="8229600" cy="508000"/>
+          </a:xfrm>
+          <a:prstGeom prst="rect">
+            <a:avLst/>
+          </a:prstGeom>
+          <a:noFill/>
+        </p:spPr>
+        <p:txBody>
+          <a:bodyPr/>
+          <a:lstStyle/>
+          <a:p>
+            <a:pPr lvl="0" indent="0" marL="0" algn="ctr">
+              <a:buNone/>
+            </a:pPr>
+            <a:r>
+              <a:rPr/>
+              <a:t>Taxonmy of NoSql based big systems for spatial data</a:t>
+            </a:r>
+          </a:p>
+        </p:txBody>
+      </p:sp>
+      <p:sp>
+        <p:nvSpPr>
+          <p:cNvPr id="3" name="Content Placeholder 2"/>
+          <p:cNvSpPr>
+            <a:spLocks noGrp="1"/>
+          </p:cNvSpPr>
+          <p:nvPr>
+            <p:ph idx="1"/>
+          </p:nvPr>
+        </p:nvSpPr>
+        <p:spPr/>
+        <p:txBody>
+          <a:bodyPr/>
+          <a:lstStyle/>
+          <a:p>
+            <a:pPr lvl="0"/>
+            <a:r>
+              <a:rPr/>
+              <a:t>GeoMesa linearizes the keyspace by transforming multi-dimensional data (location, timestamp) into 1D keys using space-filling curves.</a:t>
+            </a:r>
+          </a:p>
+          <a:p>
+            <a:pPr lvl="0"/>
+            <a:r>
+              <a:rPr/>
+              <a:t>JUST incorporates leverages HBase, GeoMesa, and Spark. Introduces two new indexing techniques, Z2T and XZ2T and efficient compression mechanism that improves the query performance significantly.</a:t>
+            </a:r>
+          </a:p>
+          <a:p>
+            <a:pPr lvl="0"/>
+            <a:r>
+              <a:rPr/>
+              <a:t>TrajMesa, horizontal storage schema (H-Store) is proposed. Allowing to store an entire trajectory in one-row with compression.</a:t>
+            </a:r>
+          </a:p>
+          <a:p>
+            <a:pPr lvl="0" indent="0" marL="0">
+              <a:spcBef>
+                <a:spcPts val="3000"/>
+              </a:spcBef>
+              <a:buNone/>
+            </a:pPr>
+            <a:r>
+              <a:rPr b="1"/>
+              <a:t>Recent literature</a:t>
+            </a:r>
+          </a:p>
+          <a:p>
+            <a:pPr lvl="0"/>
+            <a:r>
+              <a:rPr/>
+              <a:t>SpaceTimeDB (commercial, (?))</a:t>
+            </a:r>
+          </a:p>
+          <a:p>
+            <a:pPr lvl="0"/>
+            <a:r>
+              <a:rPr/>
+              <a:t>Springbok, ICDE 2024</a:t>
+            </a:r>
+          </a:p>
+          <a:p>
+            <a:pPr lvl="0"/>
+            <a:r>
+              <a:rPr/>
+              <a:t>Cupid, Future Generation Computer Systems 2024</a:t>
+            </a:r>
+          </a:p>
+          <a:p>
+            <a:pPr lvl="0"/>
+            <a:r>
+              <a:rPr/>
+              <a:t>TMan, ICDE 2024</a:t>
+            </a:r>
+          </a:p>
+          <a:p>
+            <a:pPr lvl="0" indent="0" marL="0">
+              <a:spcBef>
+                <a:spcPts val="3000"/>
+              </a:spcBef>
+              <a:buNone/>
+            </a:pPr>
+            <a:r>
+              <a:rPr b="1"/>
+              <a:t>Other Research Trends</a:t>
+            </a:r>
+          </a:p>
+          <a:p>
+            <a:pPr lvl="0" indent="0" marL="0">
+              <a:spcBef>
+                <a:spcPts val="3000"/>
+              </a:spcBef>
+              <a:buNone/>
+            </a:pPr>
+            <a:r>
+              <a:rPr b="1"/>
+              <a:t>ML for sharding and query optimization</a:t>
+            </a:r>
+          </a:p>
+          <a:p>
+            <a:pPr lvl="0"/>
+            <a:r>
+              <a:rPr/>
+              <a:t>Spatial Query Optimization With Learning, VLD 2024</a:t>
+            </a:r>
+          </a:p>
+          <a:p>
+            <a:pPr lvl="0" indent="0" marL="0">
+              <a:spcBef>
+                <a:spcPts val="3000"/>
+              </a:spcBef>
+              <a:buNone/>
+            </a:pPr>
+            <a:r>
+              <a:rPr b="1"/>
+              <a:t>Indexing</a:t>
+            </a:r>
+          </a:p>
+          <a:p>
+            <a:pPr lvl="0"/>
+            <a:r>
+              <a:rPr/>
+              <a:t>A Time-Identified R-Tree: A Workload-Controllable Dynamic Spatio-Temporal Index Scheme for Streaming Processing, International Journal of Geo-Information 2024</a:t>
             </a:r>
           </a:p>
         </p:txBody>

</xml_diff>

<commit_message>
Deploying to gh-pages from @ ManuelePasini/slides-markdown@95c997aa7566626b83fb3baa9c0492445e0ec2ef 🚀
</commit_message>
<xml_diff>
--- a/digital_twins.pptx
+++ b/digital_twins.pptx
@@ -5311,13 +5311,6 @@
             <a:r>
               <a:rPr/>
               <a:t>Temporal</a:t>
-            </a:r>
-          </a:p>
-          <a:p>
-            <a:pPr lvl="1"/>
-            <a:r>
-              <a:rPr/>
-              <a:t>Frequency (?)</a:t>
             </a:r>
           </a:p>
           <a:p>

</xml_diff>

<commit_message>
Deploying to gh-pages from @ ManuelePasini/slides-markdown@d7d8cffa0366bdef2fb15522d2862bd91ebda860 🚀
</commit_message>
<xml_diff>
--- a/digital_twins.pptx
+++ b/digital_twins.pptx
@@ -8313,14 +8313,14 @@
             </a:pPr>
             <a:r>
               <a:rPr b="1"/>
-              <a:t>ML for sharding and query optimization</a:t>
-            </a:r>
-          </a:p>
-          <a:p>
-            <a:pPr lvl="0"/>
-            <a:r>
-              <a:rPr/>
-              <a:t>Spatial Query Optimization With Learning, VLD 2024</a:t>
+              <a:t>ML for query optimization</a:t>
+            </a:r>
+          </a:p>
+          <a:p>
+            <a:pPr lvl="0"/>
+            <a:r>
+              <a:rPr/>
+              <a:t>Spatial Query Optimization With Learning, VLDB 2024</a:t>
             </a:r>
           </a:p>
           <a:p>

</xml_diff>

<commit_message>
Deploying to gh-pages from @ ManuelePasini/slides-markdown@b8c3f5f16f9181126c70d4493c04b1fa90fcef05 🚀
</commit_message>
<xml_diff>
--- a/digital_twins.pptx
+++ b/digital_twins.pptx
@@ -6188,35 +6188,21 @@
             </a:pPr>
             <a:r>
               <a:rPr b="1"/>
-              <a:t>Spatio-Temporal</a:t>
-            </a:r>
-          </a:p>
-          <a:p>
-            <a:pPr lvl="0"/>
-            <a:r>
-              <a:rPr/>
-              <a:t>BerlinMOD: A benchmark for moving object databases, VLDB Journal 2009</a:t>
-            </a:r>
-          </a:p>
-          <a:p>
-            <a:pPr lvl="0"/>
-            <a:r>
-              <a:rPr/>
-              <a:t>Benchmarking moving object functionalities of DBMSs using real-world spatiotemporal workload, International Conference on Mobile Data Management 2022</a:t>
-            </a:r>
-          </a:p>
-          <a:p>
-            <a:pPr lvl="0"/>
-            <a:r>
-              <a:rPr/>
-              <a:t>Performance Evaluation of MongoDB and PostgreSQL for spatio-temporal data, EDBT/ICDT Workshops 2019</a:t>
-            </a:r>
-          </a:p>
-          <a:p>
-            <a:pPr lvl="0"/>
-            <a:r>
-              <a:rPr/>
-              <a:t>How to manage massive spatiotemporal dataset from stationary and non-stationary sensors in commercial DBMS?, Knowledge and Information Systems 2024</a:t>
+              <a:t>Spatial DB</a:t>
+            </a:r>
+          </a:p>
+          <a:p>
+            <a:pPr lvl="0"/>
+            <a:r>
+              <a:rPr/>
+              <a:t>The SEQUOIA 2000 Storage Benchmark, SIGMOD 1993</a:t>
+            </a:r>
+          </a:p>
+          <a:p>
+            <a:pPr lvl="0"/>
+            <a:r>
+              <a:rPr/>
+              <a:t>Building a ScalableGee-SpatialDBMS: Technology, Implementation,and Evaluation SIGMOD 1997</a:t>
             </a:r>
           </a:p>
           <a:p>
@@ -6261,21 +6247,35 @@
             </a:pPr>
             <a:r>
               <a:rPr b="1"/>
-              <a:t>Spatial DB</a:t>
-            </a:r>
-          </a:p>
-          <a:p>
-            <a:pPr lvl="0"/>
-            <a:r>
-              <a:rPr/>
-              <a:t>The SEQUOIA 2000 Storage Benchmark, SIGMOD 1993</a:t>
-            </a:r>
-          </a:p>
-          <a:p>
-            <a:pPr lvl="0"/>
-            <a:r>
-              <a:rPr/>
-              <a:t>Building a ScalableGee-SpatialDBMS: Technology, Implementation,and Evaluation SIGMOD 1997</a:t>
+              <a:t>Spatio-Temporal</a:t>
+            </a:r>
+          </a:p>
+          <a:p>
+            <a:pPr lvl="0"/>
+            <a:r>
+              <a:rPr/>
+              <a:t>BerlinMOD: A benchmark for moving object databases, VLDB Journal 2009</a:t>
+            </a:r>
+          </a:p>
+          <a:p>
+            <a:pPr lvl="0"/>
+            <a:r>
+              <a:rPr/>
+              <a:t>Benchmarking moving object functionalities of DBMSs using real-world spatiotemporal workload, International Conference on Mobile Data Management 2022</a:t>
+            </a:r>
+          </a:p>
+          <a:p>
+            <a:pPr lvl="0"/>
+            <a:r>
+              <a:rPr/>
+              <a:t>Performance Evaluation of MongoDB and PostgreSQL for spatio-temporal data, EDBT/ICDT Workshops 2019</a:t>
+            </a:r>
+          </a:p>
+          <a:p>
+            <a:pPr lvl="0"/>
+            <a:r>
+              <a:rPr/>
+              <a:t>How to manage massive spatiotemporal dataset from stationary and non-stationary sensors in commercial DBMS?, Knowledge and Information Systems 2024</a:t>
             </a:r>
           </a:p>
           <a:p>

</xml_diff>

<commit_message>
Deploying to gh-pages from @ ManuelePasini/slides-markdown@a1667cf69bb85925fb74cd20a0482726cec097b2 🚀
</commit_message>
<xml_diff>
--- a/digital_twins.pptx
+++ b/digital_twins.pptx
@@ -6278,46 +6278,6 @@
               <a:t>How to manage massive spatiotemporal dataset from stationary and non-stationary sensors in commercial DBMS?, Knowledge and Information Systems 2024</a:t>
             </a:r>
           </a:p>
-          <a:p>
-            <a:pPr lvl="0" indent="0" marL="0">
-              <a:spcBef>
-                <a:spcPts val="3000"/>
-              </a:spcBef>
-              <a:buNone/>
-            </a:pPr>
-            <a:r>
-              <a:rPr b="1"/>
-              <a:t>Data architectures</a:t>
-            </a:r>
-          </a:p>
-          <a:p>
-            <a:pPr lvl="0"/>
-            <a:r>
-              <a:rPr/>
-              <a:t>Wide-Column (?)</a:t>
-            </a:r>
-          </a:p>
-          <a:p>
-            <a:pPr lvl="0"/>
-            <a:r>
-              <a:rPr/>
-              <a:t>Graph + Relational (PostgreSQL + PostGIS + Apache AGE)</a:t>
-            </a:r>
-          </a:p>
-          <a:p>
-            <a:pPr lvl="0"/>
-            <a:r>
-              <a:rPr/>
-              <a:t>Graph + Time Series (GraphDB + (ClickHouse || InfluxDB))</a:t>
-            </a:r>
-          </a:p>
-          <a:p>
-            <a:pPr lvl="0"/>
-            <a:r>
-              <a:rPr/>
-              <a:t>AeonG (?)</a:t>
-            </a:r>
-          </a:p>
         </p:txBody>
       </p:sp>
     </p:spTree>

</xml_diff>

<commit_message>
Deploying to gh-pages from @ ManuelePasini/slides-markdown@f3d22ce3b2412bcf46a7c4cb74a77f91807b053e 🚀
</commit_message>
<xml_diff>
--- a/digital_twins.pptx
+++ b/digital_twins.pptx
@@ -8302,6 +8302,119 @@
               <a:t>A Time-Identified R-Tree: A Workload-Controllable Dynamic Spatio-Temporal Index Scheme for Streaming Processing, International Journal of Geo-Information 2024</a:t>
             </a:r>
           </a:p>
+          <a:p>
+            <a:pPr lvl="0" indent="0" marL="0">
+              <a:spcBef>
+                <a:spcPts val="3000"/>
+              </a:spcBef>
+              <a:buNone/>
+            </a:pPr>
+            <a:r>
+              <a:rPr b="1"/>
+              <a:t>A case study for Digital Twins</a:t>
+            </a:r>
+          </a:p>
+          <a:p>
+            <a:pPr lvl="0"/>
+            <a:r>
+              <a:rPr/>
+              <a:t>Graph + TimeSeries (Apache AGE + PostgreSQL + PostGIS + Timescale)</a:t>
+            </a:r>
+          </a:p>
+          <a:p>
+            <a:pPr lvl="0"/>
+            <a:r>
+              <a:rPr/>
+              <a:t>MobilityDB (PostgreSQL + PostGIS + trajectory data support)</a:t>
+            </a:r>
+          </a:p>
+          <a:p>
+            <a:pPr lvl="0"/>
+            <a:r>
+              <a:rPr/>
+              <a:t>Beast</a:t>
+            </a:r>
+          </a:p>
+          <a:p>
+            <a:pPr lvl="0"/>
+            <a:r>
+              <a:rPr/>
+              <a:t>CUPID</a:t>
+            </a:r>
+          </a:p>
+          <a:p>
+            <a:pPr lvl="0"/>
+            <a:r>
+              <a:rPr/>
+              <a:t>Springbok</a:t>
+            </a:r>
+          </a:p>
+          <a:p>
+            <a:pPr lvl="0" indent="0" marL="0">
+              <a:spcBef>
+                <a:spcPts val="3000"/>
+              </a:spcBef>
+              <a:buNone/>
+            </a:pPr>
+            <a:r>
+              <a:rPr b="1"/>
+              <a:t>Case study 0 - Apache Age + TimescaleDB + PostGIS</a:t>
+            </a:r>
+          </a:p>
+          <a:p>
+            <a:pPr lvl="0" indent="0" marL="0">
+              <a:spcBef>
+                <a:spcPts val="3000"/>
+              </a:spcBef>
+              <a:buNone/>
+            </a:pPr>
+            <a:r>
+              <a:rPr b="1"/>
+              <a:t>Emerged considerations</a:t>
+            </a:r>
+          </a:p>
+          <a:p>
+            <a:pPr lvl="0"/>
+            <a:r>
+              <a:rPr/>
+              <a:t>Given a FIWARE document, what’s a Property and what’s an Edge?</a:t>
+            </a:r>
+          </a:p>
+          <a:p>
+            <a:pPr lvl="1"/>
+            <a:r>
+              <a:rPr/>
+              <a:t>Should the graph enforce some kind of schema? E.g. metamodel</a:t>
+            </a:r>
+          </a:p>
+          <a:p>
+            <a:pPr lvl="1"/>
+            <a:r>
+              <a:rPr/>
+              <a:t>If not, Do I have to check wether a FIWARE key-value pair links to a node?</a:t>
+            </a:r>
+          </a:p>
+          <a:p>
+            <a:pPr lvl="2"/>
+            <a:r>
+              <a:rPr/>
+              <a:t>But then, I have to check all properties, understand if its an edge or a property, remove it from the entity if it’s an edge, check if the edge destination already exists and if it does not, create it and link it to the source node-</a:t>
+            </a:r>
+          </a:p>
+          <a:p>
+            <a:pPr lvl="1"/>
+            <a:r>
+              <a:rPr/>
+              <a:t>What about device composition? e.g. moisture grid</a:t>
+            </a:r>
+          </a:p>
+          <a:p>
+            <a:pPr lvl="0"/>
+            <a:r>
+              <a:rPr/>
+              <a:t>What about Ids? Apache AGE uses its own custom IDs that  cannot  be disabled.</a:t>
+            </a:r>
+          </a:p>
         </p:txBody>
       </p:sp>
     </p:spTree>

</xml_diff>

<commit_message>
Deploying to gh-pages from @ ManuelePasini/slides-markdown@c47dfabf6dc774701aeab44051f30fd75f366abf 🚀
</commit_message>
<xml_diff>
--- a/digital_twins.pptx
+++ b/digital_twins.pptx
@@ -8177,246 +8177,1282 @@
           </a:p>
         </p:txBody>
       </p:sp>
-      <p:sp>
-        <p:nvSpPr>
-          <p:cNvPr id="3" name="Content Placeholder 2"/>
-          <p:cNvSpPr>
-            <a:spLocks noGrp="1"/>
-          </p:cNvSpPr>
-          <p:nvPr>
-            <p:ph idx="1"/>
-          </p:nvPr>
-        </p:nvSpPr>
-        <p:spPr/>
-        <p:txBody>
-          <a:bodyPr/>
-          <a:lstStyle/>
-          <a:p>
-            <a:pPr lvl="0"/>
-            <a:r>
-              <a:rPr/>
-              <a:t>GeoMesa linearizes the keyspace by transforming multi-dimensional data (location, timestamp) into 1D keys using space-filling curves.</a:t>
-            </a:r>
-          </a:p>
-          <a:p>
-            <a:pPr lvl="0"/>
-            <a:r>
-              <a:rPr/>
-              <a:t>JUST incorporates leverages HBase, GeoMesa, and Spark. Introduces two new indexing techniques, Z2T and XZ2T and efficient compression mechanism that improves the query performance significantly.</a:t>
-            </a:r>
-          </a:p>
-          <a:p>
-            <a:pPr lvl="0"/>
-            <a:r>
-              <a:rPr/>
-              <a:t>TrajMesa, horizontal storage schema (H-Store) is proposed. Allowing to store an entire trajectory in one-row with compression.</a:t>
-            </a:r>
-          </a:p>
-          <a:p>
-            <a:pPr lvl="0" indent="0" marL="0">
-              <a:spcBef>
-                <a:spcPts val="3000"/>
-              </a:spcBef>
-              <a:buNone/>
-            </a:pPr>
-            <a:r>
-              <a:rPr b="1"/>
-              <a:t>Recent literature</a:t>
-            </a:r>
-          </a:p>
-          <a:p>
-            <a:pPr lvl="0"/>
-            <a:r>
-              <a:rPr/>
-              <a:t>SpaceTimeDB (commercial, (?))</a:t>
-            </a:r>
-          </a:p>
-          <a:p>
-            <a:pPr lvl="0"/>
-            <a:r>
-              <a:rPr/>
-              <a:t>Springbok, ICDE 2024</a:t>
-            </a:r>
-          </a:p>
-          <a:p>
-            <a:pPr lvl="0"/>
-            <a:r>
-              <a:rPr/>
-              <a:t>CUPID, Future Generation Computer Systems 2024</a:t>
-            </a:r>
-          </a:p>
-          <a:p>
-            <a:pPr lvl="0"/>
-            <a:r>
-              <a:rPr/>
-              <a:t>TMan, ICDE 2024</a:t>
-            </a:r>
-          </a:p>
-          <a:p>
-            <a:pPr lvl="0" indent="0" marL="0">
-              <a:spcBef>
-                <a:spcPts val="3000"/>
-              </a:spcBef>
-              <a:buNone/>
-            </a:pPr>
-            <a:r>
-              <a:rPr b="1"/>
-              <a:t>Other Research Trends</a:t>
-            </a:r>
-          </a:p>
-          <a:p>
-            <a:pPr lvl="0" indent="0" marL="0">
-              <a:spcBef>
-                <a:spcPts val="3000"/>
-              </a:spcBef>
-              <a:buNone/>
-            </a:pPr>
-            <a:r>
-              <a:rPr b="1"/>
-              <a:t>ML for query optimization</a:t>
-            </a:r>
-          </a:p>
-          <a:p>
-            <a:pPr lvl="0"/>
-            <a:r>
-              <a:rPr/>
-              <a:t>Spatial Query Optimization With Learning, VLDB 2024</a:t>
-            </a:r>
-          </a:p>
-          <a:p>
-            <a:pPr lvl="0" indent="0" marL="0">
-              <a:spcBef>
-                <a:spcPts val="3000"/>
-              </a:spcBef>
-              <a:buNone/>
-            </a:pPr>
-            <a:r>
-              <a:rPr b="1"/>
-              <a:t>Indexing</a:t>
-            </a:r>
-          </a:p>
-          <a:p>
-            <a:pPr lvl="0"/>
-            <a:r>
-              <a:rPr/>
-              <a:t>A Time-Identified R-Tree: A Workload-Controllable Dynamic Spatio-Temporal Index Scheme for Streaming Processing, International Journal of Geo-Information 2024</a:t>
-            </a:r>
-          </a:p>
-          <a:p>
-            <a:pPr lvl="0" indent="0" marL="0">
-              <a:spcBef>
-                <a:spcPts val="3000"/>
-              </a:spcBef>
-              <a:buNone/>
-            </a:pPr>
-            <a:r>
-              <a:rPr b="1"/>
-              <a:t>A case study for Digital Twins</a:t>
-            </a:r>
-          </a:p>
-          <a:p>
-            <a:pPr lvl="0"/>
-            <a:r>
-              <a:rPr/>
-              <a:t>Graph + TimeSeries (Apache AGE + PostgreSQL + PostGIS + Timescale)</a:t>
-            </a:r>
-          </a:p>
-          <a:p>
-            <a:pPr lvl="0"/>
-            <a:r>
-              <a:rPr/>
-              <a:t>MobilityDB (PostgreSQL + PostGIS + trajectory data support)</a:t>
-            </a:r>
-          </a:p>
-          <a:p>
-            <a:pPr lvl="0"/>
-            <a:r>
-              <a:rPr/>
-              <a:t>Beast</a:t>
-            </a:r>
-          </a:p>
-          <a:p>
-            <a:pPr lvl="0"/>
-            <a:r>
-              <a:rPr/>
-              <a:t>CUPID</a:t>
-            </a:r>
-          </a:p>
-          <a:p>
-            <a:pPr lvl="0"/>
-            <a:r>
-              <a:rPr/>
-              <a:t>Springbok</a:t>
-            </a:r>
-          </a:p>
-          <a:p>
-            <a:pPr lvl="0" indent="0" marL="0">
-              <a:spcBef>
-                <a:spcPts val="3000"/>
-              </a:spcBef>
-              <a:buNone/>
-            </a:pPr>
-            <a:r>
-              <a:rPr b="1"/>
-              <a:t>Case study 0 - Apache Age + TimescaleDB + PostGIS</a:t>
-            </a:r>
-          </a:p>
-          <a:p>
-            <a:pPr lvl="0" indent="0" marL="0">
-              <a:spcBef>
-                <a:spcPts val="3000"/>
-              </a:spcBef>
-              <a:buNone/>
-            </a:pPr>
-            <a:r>
-              <a:rPr b="1"/>
-              <a:t>Emerged considerations</a:t>
-            </a:r>
-          </a:p>
-          <a:p>
-            <a:pPr lvl="0"/>
-            <a:r>
-              <a:rPr/>
-              <a:t>Given a FIWARE document, what’s a Property and what’s an Edge?</a:t>
-            </a:r>
-          </a:p>
-          <a:p>
-            <a:pPr lvl="1"/>
-            <a:r>
-              <a:rPr/>
-              <a:t>Should the graph enforce some kind of schema? E.g. metamodel</a:t>
-            </a:r>
-          </a:p>
-          <a:p>
-            <a:pPr lvl="1"/>
-            <a:r>
-              <a:rPr/>
-              <a:t>If not, Do I have to check wether a FIWARE key-value pair links to a node?</a:t>
-            </a:r>
-          </a:p>
-          <a:p>
-            <a:pPr lvl="2"/>
-            <a:r>
-              <a:rPr/>
-              <a:t>But then, I have to check all properties, understand if its an edge or a property, remove it from the entity if it’s an edge, check if the edge destination already exists and if it does not, create it and link it to the source node-</a:t>
-            </a:r>
-          </a:p>
-          <a:p>
-            <a:pPr lvl="1"/>
-            <a:r>
-              <a:rPr/>
-              <a:t>What about device composition? e.g. moisture grid</a:t>
-            </a:r>
-          </a:p>
-          <a:p>
-            <a:pPr lvl="0"/>
-            <a:r>
-              <a:rPr/>
-              <a:t>What about Ids? Apache AGE uses its own custom IDs that  cannot  be disabled.</a:t>
-            </a:r>
-          </a:p>
-        </p:txBody>
-      </p:sp>
+      <mc:AlternateContent xmlns:mc="http://schemas.openxmlformats.org/markup-compatibility/2006">
+        <mc:Choice xmlns:a14="http://schemas.microsoft.com/office/drawing/2010/main" Requires="a14">
+          <p:sp>
+            <p:nvSpPr>
+              <p:cNvPr id="3" name="Content Placeholder 2"/>
+              <p:cNvSpPr>
+                <a:spLocks noGrp="1"/>
+              </p:cNvSpPr>
+              <p:nvPr>
+                <p:ph idx="1"/>
+              </p:nvPr>
+            </p:nvSpPr>
+            <p:spPr/>
+            <p:txBody>
+              <a:bodyPr/>
+              <a:lstStyle/>
+              <a:p>
+                <a:pPr lvl="0"/>
+                <a:r>
+                  <a:rPr/>
+                  <a:t>GeoMesa linearizes the keyspace by transforming multi-dimensional data (location, timestamp) into 1D keys using space-filling curves.</a:t>
+                </a:r>
+              </a:p>
+              <a:p>
+                <a:pPr lvl="0"/>
+                <a:r>
+                  <a:rPr/>
+                  <a:t>JUST incorporates leverages HBase, GeoMesa, and Spark. Introduces two new indexing techniques, Z2T and XZ2T and efficient compression mechanism that improves the query performance significantly.</a:t>
+                </a:r>
+              </a:p>
+              <a:p>
+                <a:pPr lvl="0"/>
+                <a:r>
+                  <a:rPr/>
+                  <a:t>TrajMesa, horizontal storage schema (H-Store) is proposed. Allowing to store an entire trajectory in one-row with compression.</a:t>
+                </a:r>
+              </a:p>
+              <a:p>
+                <a:pPr lvl="0" indent="0" marL="0">
+                  <a:spcBef>
+                    <a:spcPts val="3000"/>
+                  </a:spcBef>
+                  <a:buNone/>
+                </a:pPr>
+                <a:r>
+                  <a:rPr b="1"/>
+                  <a:t>Recent literature</a:t>
+                </a:r>
+              </a:p>
+              <a:p>
+                <a:pPr lvl="0"/>
+                <a:r>
+                  <a:rPr/>
+                  <a:t>SpaceTimeDB (commercial, (?))</a:t>
+                </a:r>
+              </a:p>
+              <a:p>
+                <a:pPr lvl="0"/>
+                <a:r>
+                  <a:rPr/>
+                  <a:t>Springbok, ICDE 2024</a:t>
+                </a:r>
+              </a:p>
+              <a:p>
+                <a:pPr lvl="0"/>
+                <a:r>
+                  <a:rPr/>
+                  <a:t>CUPID, Future Generation Computer Systems 2024</a:t>
+                </a:r>
+              </a:p>
+              <a:p>
+                <a:pPr lvl="0"/>
+                <a:r>
+                  <a:rPr/>
+                  <a:t>TMan, ICDE 2024</a:t>
+                </a:r>
+              </a:p>
+              <a:p>
+                <a:pPr lvl="0" indent="0" marL="0">
+                  <a:spcBef>
+                    <a:spcPts val="3000"/>
+                  </a:spcBef>
+                  <a:buNone/>
+                </a:pPr>
+                <a:r>
+                  <a:rPr b="1"/>
+                  <a:t>Other Research Trends</a:t>
+                </a:r>
+              </a:p>
+              <a:p>
+                <a:pPr lvl="0" indent="0" marL="0">
+                  <a:spcBef>
+                    <a:spcPts val="3000"/>
+                  </a:spcBef>
+                  <a:buNone/>
+                </a:pPr>
+                <a:r>
+                  <a:rPr b="1"/>
+                  <a:t>ML for query optimization</a:t>
+                </a:r>
+              </a:p>
+              <a:p>
+                <a:pPr lvl="0"/>
+                <a:r>
+                  <a:rPr/>
+                  <a:t>Spatial Query Optimization With Learning, VLDB 2024</a:t>
+                </a:r>
+              </a:p>
+              <a:p>
+                <a:pPr lvl="0" indent="0" marL="0">
+                  <a:spcBef>
+                    <a:spcPts val="3000"/>
+                  </a:spcBef>
+                  <a:buNone/>
+                </a:pPr>
+                <a:r>
+                  <a:rPr b="1"/>
+                  <a:t>Indexing</a:t>
+                </a:r>
+              </a:p>
+              <a:p>
+                <a:pPr lvl="0"/>
+                <a:r>
+                  <a:rPr/>
+                  <a:t>A Time-Identified R-Tree: A Workload-Controllable Dynamic Spatio-Temporal Index Scheme for Streaming Processing, International Journal of Geo-Information 2024</a:t>
+                </a:r>
+              </a:p>
+              <a:p>
+                <a:pPr lvl="0" indent="0" marL="0">
+                  <a:spcBef>
+                    <a:spcPts val="3000"/>
+                  </a:spcBef>
+                  <a:buNone/>
+                </a:pPr>
+                <a:r>
+                  <a:rPr b="1"/>
+                  <a:t>A case study for Digital Twins</a:t>
+                </a:r>
+              </a:p>
+              <a:p>
+                <a:pPr lvl="0"/>
+                <a:r>
+                  <a:rPr/>
+                  <a:t>Graph + TimeSeries (Apache AGE + PostgreSQL + PostGIS + Timescale)</a:t>
+                </a:r>
+              </a:p>
+              <a:p>
+                <a:pPr lvl="0"/>
+                <a:r>
+                  <a:rPr/>
+                  <a:t>MobilityDB (PostgreSQL + PostGIS + trajectory data support)</a:t>
+                </a:r>
+              </a:p>
+              <a:p>
+                <a:pPr lvl="0"/>
+                <a:r>
+                  <a:rPr/>
+                  <a:t>Beast</a:t>
+                </a:r>
+              </a:p>
+              <a:p>
+                <a:pPr lvl="0"/>
+                <a:r>
+                  <a:rPr/>
+                  <a:t>CUPID</a:t>
+                </a:r>
+              </a:p>
+              <a:p>
+                <a:pPr lvl="0"/>
+                <a:r>
+                  <a:rPr/>
+                  <a:t>Springbok</a:t>
+                </a:r>
+              </a:p>
+              <a:p>
+                <a:pPr lvl="0" indent="0" marL="0">
+                  <a:spcBef>
+                    <a:spcPts val="3000"/>
+                  </a:spcBef>
+                  <a:buNone/>
+                </a:pPr>
+                <a:r>
+                  <a:rPr b="1"/>
+                  <a:t>Case study 0 - Apache Age + TimescaleDB + PostGIS</a:t>
+                </a:r>
+              </a:p>
+              <a:p>
+                <a:pPr lvl="0" indent="0" marL="0">
+                  <a:buNone/>
+                </a:pPr>
+                <a:r>
+                  <a:rPr/>
+                  <a:t>()[] ### Emerged considerations - Given a FIWARE document, what’s a Property and what’s an Edge? - Should the graph enforce some kind of schema? E.g. metamodel - If not, Do I have to check wether a FIWARE key-value pair links to a node? - But then, I have to check all properties, understand if its an edge or a property, remove it from the entity if it’s an edge, check if the edge destination already exists and if it does not, create it and link it to the source node- - What about device composition? e.g. moisture grid - What about Ids? Apache AGE uses its own custom IDs that  cannot  be disabled -  What happens when a new measurements comes by? - I have to check if such node exists, if not, it’s a new edge, if it is - An entity comes in: there’s already a node with such id; is it an update? Is it a measurement?</a:t>
+                </a:r>
+              </a:p>
+              <a:p>
+                <a:pPr lvl="0" indent="0" marL="0">
+                  <a:buNone/>
+                </a:pPr>
+                <a:r>
+                  <a:rPr/>
+                  <a:t>### Modellazioni Measurement</a:t>
+                </a:r>
+              </a:p>
+              <a:p>
+                <a:pPr lvl="0"/>
+                <a:r>
+                  <a:rPr/>
+                  <a:t>AgriRobot non è un device, come capisco se qualcosa ha dei measurement da storicizzare?</a:t>
+                </a:r>
+              </a:p>
+              <a:p>
+                <a:pPr lvl="0"/>
+                <a:r>
+                  <a:rPr/>
+                  <a:t>Agri robot non storicizza le controlled property, come faccio a capire cosa devo storicizzare?</a:t>
+                </a:r>
+              </a:p>
+              <a:p>
+                <a:pPr lvl="0"/>
+                <a:r>
+                  <a:rPr/>
+                  <a:t>Cosa succede sul grafo se il nodo esiste già? Lo aggiorno, ma in che modo? Sovrascrivo il vecchio? Aggiungo le diff? E le diff in negativo vanno tolte? Cosa succede ai suoi archi? Se nella nuova versione non vedo un arco?</a:t>
+                </a:r>
+              </a:p>
+              <a:p>
+                <a:pPr lvl="0" indent="0" marL="0">
+                  <a:buNone/>
+                </a:pPr>
+                <a:r>
+                  <a:rPr/>
+                  <a:t>## Problemi sui dati</a:t>
+                </a:r>
+              </a:p>
+              <a:p>
+                <a:pPr lvl="0"/>
+                <a:r>
+                  <a:rPr/>
+                  <a:t>I dati dei pinotech hanno il dateObserved sbagliato (“Z” alla fine della data)</a:t>
+                </a:r>
+              </a:p>
+              <a:p>
+                <a:pPr lvl="0"/>
+                <a:r>
+                  <a:rPr/>
+                  <a:t>Per creare un arco, devo prima avere entrambi i nodi altrimenti non funzia</a:t>
+                </a:r>
+              </a:p>
+              <a:p>
+                <a:pPr lvl="0" indent="0" marL="0">
+                  <a:spcBef>
+                    <a:spcPts val="3000"/>
+                  </a:spcBef>
+                  <a:buNone/>
+                </a:pPr>
+                <a:r>
+                  <a:rPr b="1"/>
+                  <a:t>Age Middleware</a:t>
+                </a:r>
+              </a:p>
+              <a:p>
+                <a:pPr lvl="0"/>
+                <a:r>
+                  <a:rPr/>
+                  <a:t>Builds a connection to a Apache Age + PostGIS + Timescale DBMSs.</a:t>
+                </a:r>
+              </a:p>
+              <a:p>
+                <a:pPr lvl="0"/>
+                <a:r>
+                  <a:rPr/>
+                  <a:t>Processes JSON entities following the NGSI schema.</a:t>
+                </a:r>
+              </a:p>
+              <a:p>
+                <a:pPr lvl="0" indent="0" marL="0">
+                  <a:buNone/>
+                </a:pPr>
+                <a:r>
+                  <a:rPr/>
+                  <a:t>#### Entity required schema - “id”: follows the NGSI standard (urn-ngsi-[…]) and define the existence of an entity in the graph - “type”: defines the label of the node in the graph.</a:t>
+                </a:r>
+              </a:p>
+              <a:p>
+                <a:pPr lvl="0" indent="0" marL="0">
+                  <a:spcBef>
+                    <a:spcPts val="3000"/>
+                  </a:spcBef>
+                  <a:buNone/>
+                </a:pPr>
+                <a:r>
+                  <a:rPr b="1"/>
+                  <a:t>Entity optional schema</a:t>
+                </a:r>
+              </a:p>
+              <a:p>
+                <a:pPr lvl="0"/>
+                <a:r>
+                  <a:rPr/>
+                  <a:t>“hasDevice”: defines device composition. Each value of this key needs to be a json representing an entity.</a:t>
+                </a:r>
+              </a:p>
+              <a:p>
+                <a:pPr lvl="0"/>
+                <a:r>
+                  <a:rPr/>
+                  <a:t>Each entity gets mapped into the graph as a node.</a:t>
+                </a:r>
+              </a:p>
+              <a:p>
+                <a:pPr lvl="0"/>
+                <a:r>
+                  <a:rPr/>
+                  <a:t>Each entity key that has an ID as a value becomes an edge.</a:t>
+                </a:r>
+              </a:p>
+              <a:p>
+                <a:pPr lvl="0"/>
+                <a:r>
+                  <a:rPr/>
+                  <a:t>IDs follow the NGSI standard.</a:t>
+                </a:r>
+              </a:p>
+              <a:p>
+                <a:pPr lvl="0" indent="0" marL="0">
+                  <a:spcBef>
+                    <a:spcPts val="3000"/>
+                  </a:spcBef>
+                  <a:buNone/>
+                </a:pPr>
+                <a:r>
+                  <a:rPr b="1"/>
+                  <a:t>Parsing into measurement</a:t>
+                </a:r>
+              </a:p>
+              <a:p>
+                <a:pPr lvl="0" indent="0" marL="0">
+                  <a:buNone/>
+                </a:pPr>
+                <a:r>
+                  <a:rPr/>
+                  <a:t>Measurement = TimescaleTable(timestamp, device_id, controlledProperty, value, raw_value)</a:t>
+                </a:r>
+              </a:p>
+              <a:p>
+                <a:pPr lvl="0"/>
+                <a:r>
+                  <a:rPr/>
+                  <a:t>A mapping can defined for each entity “type”: it’s a Python functions that extracts the measurements from a JSON entity with the Measurement table structure</a:t>
+                </a:r>
+              </a:p>
+              <a:p>
+                <a:pPr lvl="0" indent="0" marL="0">
+                  <a:buNone/>
+                </a:pPr>
+                <a:r>
+                  <a:rPr/>
+                  <a:t>Se la property è una e ha un array di valori, come la storicizzo? e.g. status del robot, la mia chiave è timestamp,device,property…</a:t>
+                </a:r>
+              </a:p>
+              <a:p>
+                <a:pPr lvl="0" indent="0" marL="0">
+                  <a:buNone/>
+                </a:pPr>
+                <a:r>
+                  <a:rPr/>
+                  <a:t>Il protocollo per estrarre i measurement di un device, vale anche per i suoi subdevice?</a:t>
+                </a:r>
+              </a:p>
+              <a:p>
+                <a:pPr lvl="0" indent="0" marL="0">
+                  <a:buNone/>
+                </a:pPr>
+                <a:r>
+                  <a:rPr/>
+                  <a:t>CREATE EXTENSION IF NOT EXISTS age; CREATE EXTENSION IF NOT EXISTS postgis; LOAD ‘age’;</a:t>
+                </a:r>
+              </a:p>
+              <a:p>
+                <a:pPr lvl="0" indent="0" marL="0">
+                  <a:buNone/>
+                </a:pPr>
+                <a:r>
+                  <a:rPr/>
+                  <a:t>SET search_path = ag_catalog, “$user”, public;</a:t>
+                </a:r>
+              </a:p>
+              <a:p>
+                <a:pPr lvl="0" indent="0" marL="0">
+                  <a:buNone/>
+                </a:pPr>
+                <a:r>
+                  <a:rPr/>
+                  <a:t>SELECT postgis_full_version();</a:t>
+                </a:r>
+              </a:p>
+              <a:p>
+                <a:pPr lvl="0" indent="0" marL="0">
+                  <a:buNone/>
+                </a:pPr>
+                <a:r>
+                  <a:rPr/>
+                  <a:t>SELECT * FROM cypher(‘watering_adf_graph’,</a:t>
+                </a:r>
+              </a:p>
+              <a:p>
+                <a:pPr lvl="0" indent="0" marL="0">
+                  <a:buNone/>
+                </a:pPr>
+                <a14:m>
+                  <m:oMathPara xmlns:m="http://schemas.openxmlformats.org/officeDocument/2006/math">
+                    <m:oMathParaPr>
+                      <m:jc m:val="center"/>
+                    </m:oMathParaPr>
+                    <m:oMath>
+                      <m:r>
+                        <m:t>M</m:t>
+                      </m:r>
+                      <m:r>
+                        <m:t>A</m:t>
+                      </m:r>
+                      <m:r>
+                        <m:t>T</m:t>
+                      </m:r>
+                      <m:r>
+                        <m:t>C</m:t>
+                      </m:r>
+                      <m:r>
+                        <m:t>H</m:t>
+                      </m:r>
+                      <m:d>
+                        <m:dPr>
+                          <m:begChr m:val="("/>
+                          <m:endChr m:val=")"/>
+                          <m:sepChr m:val=""/>
+                          <m:grow/>
+                        </m:dPr>
+                        <m:e>
+                          <m:r>
+                            <m:t>v</m:t>
+                          </m:r>
+                          <m:r>
+                            <m:rPr>
+                              <m:sty m:val="p"/>
+                            </m:rPr>
+                            <m:t>:</m:t>
+                          </m:r>
+                          <m:r>
+                            <m:t>t</m:t>
+                          </m:r>
+                          <m:r>
+                            <m:t>e</m:t>
+                          </m:r>
+                          <m:r>
+                            <m:t>s</m:t>
+                          </m:r>
+                          <m:sSub>
+                            <m:e>
+                              <m:r>
+                                <m:t>t</m:t>
+                              </m:r>
+                            </m:e>
+                            <m:sub>
+                              <m:r>
+                                <m:t>n</m:t>
+                              </m:r>
+                            </m:sub>
+                          </m:sSub>
+                          <m:r>
+                            <m:t>o</m:t>
+                          </m:r>
+                          <m:r>
+                            <m:t>d</m:t>
+                          </m:r>
+                          <m:r>
+                            <m:t>e</m:t>
+                          </m:r>
+                        </m:e>
+                      </m:d>
+                      <m:r>
+                        <m:t>D</m:t>
+                      </m:r>
+                      <m:r>
+                        <m:t>E</m:t>
+                      </m:r>
+                      <m:r>
+                        <m:t>L</m:t>
+                      </m:r>
+                      <m:r>
+                        <m:t>E</m:t>
+                      </m:r>
+                      <m:r>
+                        <m:t>T</m:t>
+                      </m:r>
+                      <m:r>
+                        <m:t>E</m:t>
+                      </m:r>
+                      <m:r>
+                        <m:t>v</m:t>
+                      </m:r>
+                    </m:oMath>
+                  </m:oMathPara>
+                </a14:m>
+              </a:p>
+              <a:p>
+                <a:pPr lvl="0" indent="0" marL="0">
+                  <a:buNone/>
+                </a:pPr>
+                <a:r>
+                  <a:rPr/>
+                  <a:t>) as (v agtype);</a:t>
+                </a:r>
+              </a:p>
+              <a:p>
+                <a:pPr lvl="0" indent="0" marL="0">
+                  <a:buNone/>
+                </a:pPr>
+                <a:r>
+                  <a:rPr/>
+                  <a:t>SELECT * FROM cypher(‘watering_adf_graph’,</a:t>
+                </a:r>
+              </a:p>
+              <a:p>
+                <a:pPr lvl="0" indent="0" marL="0">
+                  <a:buNone/>
+                </a:pPr>
+                <a14:m>
+                  <m:oMathPara xmlns:m="http://schemas.openxmlformats.org/officeDocument/2006/math">
+                    <m:oMathParaPr>
+                      <m:jc m:val="center"/>
+                    </m:oMathParaPr>
+                    <m:oMath>
+                      <m:r>
+                        <m:t>M</m:t>
+                      </m:r>
+                      <m:r>
+                        <m:t>A</m:t>
+                      </m:r>
+                      <m:r>
+                        <m:t>T</m:t>
+                      </m:r>
+                      <m:r>
+                        <m:t>C</m:t>
+                      </m:r>
+                      <m:r>
+                        <m:t>H</m:t>
+                      </m:r>
+                      <m:d>
+                        <m:dPr>
+                          <m:begChr m:val="("/>
+                          <m:endChr m:val=")"/>
+                          <m:sepChr m:val=""/>
+                          <m:grow/>
+                        </m:dPr>
+                        <m:e>
+                          <m:r>
+                            <m:t>v</m:t>
+                          </m:r>
+                        </m:e>
+                      </m:d>
+                      <m:r>
+                        <m:t>D</m:t>
+                      </m:r>
+                      <m:r>
+                        <m:t>E</m:t>
+                      </m:r>
+                      <m:r>
+                        <m:t>T</m:t>
+                      </m:r>
+                      <m:r>
+                        <m:t>A</m:t>
+                      </m:r>
+                      <m:r>
+                        <m:t>C</m:t>
+                      </m:r>
+                      <m:r>
+                        <m:t>H</m:t>
+                      </m:r>
+                      <m:r>
+                        <m:t>D</m:t>
+                      </m:r>
+                      <m:r>
+                        <m:t>E</m:t>
+                      </m:r>
+                      <m:r>
+                        <m:t>L</m:t>
+                      </m:r>
+                      <m:r>
+                        <m:t>E</m:t>
+                      </m:r>
+                      <m:r>
+                        <m:t>T</m:t>
+                      </m:r>
+                      <m:r>
+                        <m:t>E</m:t>
+                      </m:r>
+                      <m:r>
+                        <m:t>v</m:t>
+                      </m:r>
+                    </m:oMath>
+                  </m:oMathPara>
+                </a14:m>
+              </a:p>
+              <a:p>
+                <a:pPr lvl="0" indent="0" marL="0">
+                  <a:buNone/>
+                </a:pPr>
+                <a:r>
+                  <a:rPr/>
+                  <a:t>) as (v agtype);</a:t>
+                </a:r>
+              </a:p>
+              <a:p>
+                <a:pPr lvl="0" indent="0" marL="0">
+                  <a:buNone/>
+                </a:pPr>
+                <a:r>
+                  <a:rPr/>
+                  <a:t>SELECT * FROM ag_catalog.drop_graph(‘watering_adf_graph’, cascade := true);</a:t>
+                </a:r>
+              </a:p>
+              <a:p>
+                <a:pPr lvl="0" indent="0" marL="0">
+                  <a:buNone/>
+                </a:pPr>
+                <a:r>
+                  <a:rPr/>
+                  <a:t>CREATE TABLE Measurements( timestamp timestamp NOT NULL, device_id text NOT NULL, controlledProperty text NOT NULL, location geometry, value float NOT NULL )</a:t>
+                </a:r>
+              </a:p>
+              <a:p>
+                <a:pPr lvl="0" indent="0" marL="0">
+                  <a:buNone/>
+                </a:pPr>
+                <a:r>
+                  <a:rPr/>
+                  <a:t>SELECT create_hypertable(‘Measurements’, ‘timestamp’); SELECT * from measurements INSERT INTO ag_catalog.measurements VALUES (to_timestamp(1717541105.0), ‘urn:ngsi-ld:Device:unibo:f7b82d1d75e79188f5efc73c7a6d34f6’, ‘wind_gust_max’, ST_GeomFromGeoJSON(‘{“type”: “Point”, “coordinates”: [11.798998, 44.235024]}’), 0)</a:t>
+                </a:r>
+              </a:p>
+              <a:p>
+                <a:pPr lvl="0" indent="0" marL="0">
+                  <a:buNone/>
+                </a:pPr>
+                <a:r>
+                  <a:rPr/>
+                  <a:t>SELECT * FROM cypher(‘watering_adf_graph’,</a:t>
+                </a:r>
+              </a:p>
+              <a:p>
+                <a:pPr lvl="0" indent="0" marL="0">
+                  <a:buNone/>
+                </a:pPr>
+                <a14:m>
+                  <m:oMathPara xmlns:m="http://schemas.openxmlformats.org/officeDocument/2006/math">
+                    <m:oMathParaPr>
+                      <m:jc m:val="center"/>
+                    </m:oMathParaPr>
+                    <m:oMath>
+                      <m:r>
+                        <m:t>M</m:t>
+                      </m:r>
+                      <m:r>
+                        <m:t>A</m:t>
+                      </m:r>
+                      <m:r>
+                        <m:t>T</m:t>
+                      </m:r>
+                      <m:r>
+                        <m:t>C</m:t>
+                      </m:r>
+                      <m:r>
+                        <m:t>H</m:t>
+                      </m:r>
+                      <m:d>
+                        <m:dPr>
+                          <m:begChr m:val="("/>
+                          <m:endChr m:val=")"/>
+                          <m:sepChr m:val=""/>
+                          <m:grow/>
+                        </m:dPr>
+                        <m:e>
+                          <m:r>
+                            <m:t>n</m:t>
+                          </m:r>
+                        </m:e>
+                      </m:d>
+                      <m:r>
+                        <m:t>W</m:t>
+                      </m:r>
+                      <m:r>
+                        <m:t>H</m:t>
+                      </m:r>
+                      <m:r>
+                        <m:t>E</m:t>
+                      </m:r>
+                      <m:r>
+                        <m:t>R</m:t>
+                      </m:r>
+                      <m:r>
+                        <m:t>E</m:t>
+                      </m:r>
+                      <m:r>
+                        <m:t>n</m:t>
+                      </m:r>
+                      <m:r>
+                        <m:rPr>
+                          <m:sty m:val="p"/>
+                        </m:rPr>
+                        <m:t>.</m:t>
+                      </m:r>
+                      <m:r>
+                        <m:t>i</m:t>
+                      </m:r>
+                      <m:r>
+                        <m:t>d</m:t>
+                      </m:r>
+                      <m:r>
+                        <m:rPr>
+                          <m:sty m:val="p"/>
+                        </m:rPr>
+                        <m:t>=</m:t>
+                      </m:r>
+                      <m:r>
+                        <m:rPr>
+                          <m:sty m:val="p"/>
+                        </m:rPr>
+                        <m:t>′</m:t>
+                      </m:r>
+                      <m:r>
+                        <m:t>u</m:t>
+                      </m:r>
+                      <m:r>
+                        <m:t>r</m:t>
+                      </m:r>
+                      <m:r>
+                        <m:t>n</m:t>
+                      </m:r>
+                      <m:r>
+                        <m:rPr>
+                          <m:sty m:val="p"/>
+                        </m:rPr>
+                        <m:t>:</m:t>
+                      </m:r>
+                      <m:r>
+                        <m:t>n</m:t>
+                      </m:r>
+                      <m:r>
+                        <m:t>g</m:t>
+                      </m:r>
+                      <m:r>
+                        <m:t>s</m:t>
+                      </m:r>
+                      <m:r>
+                        <m:t>i</m:t>
+                      </m:r>
+                      <m:r>
+                        <m:rPr>
+                          <m:sty m:val="p"/>
+                        </m:rPr>
+                        <m:t>−</m:t>
+                      </m:r>
+                      <m:r>
+                        <m:t>l</m:t>
+                      </m:r>
+                      <m:r>
+                        <m:t>d</m:t>
+                      </m:r>
+                      <m:r>
+                        <m:rPr>
+                          <m:sty m:val="p"/>
+                        </m:rPr>
+                        <m:t>:</m:t>
+                      </m:r>
+                      <m:r>
+                        <m:t>D</m:t>
+                      </m:r>
+                      <m:r>
+                        <m:t>e</m:t>
+                      </m:r>
+                      <m:r>
+                        <m:t>v</m:t>
+                      </m:r>
+                      <m:r>
+                        <m:t>i</m:t>
+                      </m:r>
+                      <m:r>
+                        <m:t>c</m:t>
+                      </m:r>
+                      <m:r>
+                        <m:t>e</m:t>
+                      </m:r>
+                      <m:r>
+                        <m:rPr>
+                          <m:sty m:val="p"/>
+                        </m:rPr>
+                        <m:t>:</m:t>
+                      </m:r>
+                      <m:r>
+                        <m:t>u</m:t>
+                      </m:r>
+                      <m:r>
+                        <m:t>n</m:t>
+                      </m:r>
+                      <m:r>
+                        <m:t>i</m:t>
+                      </m:r>
+                      <m:r>
+                        <m:t>b</m:t>
+                      </m:r>
+                      <m:r>
+                        <m:t>o</m:t>
+                      </m:r>
+                      <m:r>
+                        <m:rPr>
+                          <m:sty m:val="p"/>
+                        </m:rPr>
+                        <m:t>:</m:t>
+                      </m:r>
+                      <m:r>
+                        <m:t>a</m:t>
+                      </m:r>
+                      <m:r>
+                        <m:t>c</m:t>
+                      </m:r>
+                      <m:r>
+                        <m:t>e</m:t>
+                      </m:r>
+                      <m:r>
+                        <m:t>4</m:t>
+                      </m:r>
+                      <m:r>
+                        <m:t>b</m:t>
+                      </m:r>
+                      <m:r>
+                        <m:t>1</m:t>
+                      </m:r>
+                      <m:r>
+                        <m:t>a</m:t>
+                      </m:r>
+                      <m:r>
+                        <m:t>d</m:t>
+                      </m:r>
+                      <m:r>
+                        <m:t>b</m:t>
+                      </m:r>
+                      <m:r>
+                        <m:t>69</m:t>
+                      </m:r>
+                      <m:r>
+                        <m:t>d</m:t>
+                      </m:r>
+                      <m:r>
+                        <m:t>a</m:t>
+                      </m:r>
+                      <m:r>
+                        <m:t>4</m:t>
+                      </m:r>
+                      <m:r>
+                        <m:t>c</m:t>
+                      </m:r>
+                      <m:r>
+                        <m:t>71</m:t>
+                      </m:r>
+                      <m:r>
+                        <m:t>c</m:t>
+                      </m:r>
+                      <m:r>
+                        <m:t>3</m:t>
+                      </m:r>
+                      <m:r>
+                        <m:t>e</m:t>
+                      </m:r>
+                      <m:r>
+                        <m:t>02</m:t>
+                      </m:r>
+                      <m:r>
+                        <m:t>e</m:t>
+                      </m:r>
+                      <m:r>
+                        <m:t>6509</m:t>
+                      </m:r>
+                      <m:r>
+                        <m:t>e</m:t>
+                      </m:r>
+                      <m:r>
+                        <m:t>859</m:t>
+                      </m:r>
+                      <m:r>
+                        <m:t>e</m:t>
+                      </m:r>
+                      <m:r>
+                        <m:rPr>
+                          <m:sty m:val="p"/>
+                        </m:rPr>
+                        <m:t>′</m:t>
+                      </m:r>
+                      <m:r>
+                        <m:t>D</m:t>
+                      </m:r>
+                      <m:r>
+                        <m:t>E</m:t>
+                      </m:r>
+                      <m:r>
+                        <m:t>T</m:t>
+                      </m:r>
+                      <m:r>
+                        <m:t>A</m:t>
+                      </m:r>
+                      <m:r>
+                        <m:t>C</m:t>
+                      </m:r>
+                      <m:r>
+                        <m:t>H</m:t>
+                      </m:r>
+                      <m:r>
+                        <m:t>D</m:t>
+                      </m:r>
+                      <m:r>
+                        <m:t>E</m:t>
+                      </m:r>
+                      <m:r>
+                        <m:t>L</m:t>
+                      </m:r>
+                      <m:r>
+                        <m:t>E</m:t>
+                      </m:r>
+                      <m:r>
+                        <m:t>T</m:t>
+                      </m:r>
+                      <m:r>
+                        <m:t>E</m:t>
+                      </m:r>
+                      <m:r>
+                        <m:t>n</m:t>
+                      </m:r>
+                    </m:oMath>
+                  </m:oMathPara>
+                </a14:m>
+              </a:p>
+              <a:p>
+                <a:pPr lvl="0" indent="0" marL="0">
+                  <a:buNone/>
+                </a:pPr>
+                <a:r>
+                  <a:rPr/>
+                  <a:t>) AS (n agtype);</a:t>
+                </a:r>
+              </a:p>
+              <a:p>
+                <a:pPr lvl="0" indent="0" marL="0">
+                  <a:buNone/>
+                </a:pPr>
+                <a:r>
+                  <a:rPr/>
+                  <a:t>SELECT * FROM cypher(‘watering_adf_graph’,</a:t>
+                </a:r>
+              </a:p>
+              <a:p>
+                <a:pPr lvl="0" indent="0" marL="0">
+                  <a:buNone/>
+                </a:pPr>
+                <a14:m>
+                  <m:oMathPara xmlns:m="http://schemas.openxmlformats.org/officeDocument/2006/math">
+                    <m:oMathParaPr>
+                      <m:jc m:val="center"/>
+                    </m:oMathParaPr>
+                    <m:oMath>
+                      <m:r>
+                        <m:t>M</m:t>
+                      </m:r>
+                      <m:r>
+                        <m:t>A</m:t>
+                      </m:r>
+                      <m:r>
+                        <m:t>T</m:t>
+                      </m:r>
+                      <m:r>
+                        <m:t>C</m:t>
+                      </m:r>
+                      <m:r>
+                        <m:t>H</m:t>
+                      </m:r>
+                      <m:d>
+                        <m:dPr>
+                          <m:begChr m:val="("/>
+                          <m:endChr m:val=")"/>
+                          <m:sepChr m:val=""/>
+                          <m:grow/>
+                        </m:dPr>
+                        <m:e>
+                          <m:r>
+                            <m:t>n</m:t>
+                          </m:r>
+                          <m:r>
+                            <m:rPr>
+                              <m:sty m:val="p"/>
+                            </m:rPr>
+                            <m:t>:</m:t>
+                          </m:r>
+                          <m:r>
+                            <m:t>D</m:t>
+                          </m:r>
+                          <m:r>
+                            <m:t>e</m:t>
+                          </m:r>
+                          <m:r>
+                            <m:t>v</m:t>
+                          </m:r>
+                          <m:r>
+                            <m:t>i</m:t>
+                          </m:r>
+                          <m:r>
+                            <m:t>c</m:t>
+                          </m:r>
+                          <m:r>
+                            <m:t>e</m:t>
+                          </m:r>
+                        </m:e>
+                      </m:d>
+                      <m:r>
+                        <m:t>R</m:t>
+                      </m:r>
+                      <m:r>
+                        <m:t>E</m:t>
+                      </m:r>
+                      <m:r>
+                        <m:t>T</m:t>
+                      </m:r>
+                      <m:r>
+                        <m:t>U</m:t>
+                      </m:r>
+                      <m:r>
+                        <m:t>R</m:t>
+                      </m:r>
+                      <m:r>
+                        <m:t>N</m:t>
+                      </m:r>
+                      <m:r>
+                        <m:t>n</m:t>
+                      </m:r>
+                      <m:r>
+                        <m:rPr>
+                          <m:sty m:val="p"/>
+                        </m:rPr>
+                        <m:t>.</m:t>
+                      </m:r>
+                      <m:r>
+                        <m:t>l</m:t>
+                      </m:r>
+                      <m:r>
+                        <m:t>o</m:t>
+                      </m:r>
+                      <m:r>
+                        <m:t>c</m:t>
+                      </m:r>
+                      <m:r>
+                        <m:t>a</m:t>
+                      </m:r>
+                      <m:r>
+                        <m:t>t</m:t>
+                      </m:r>
+                      <m:r>
+                        <m:t>i</m:t>
+                      </m:r>
+                      <m:r>
+                        <m:t>o</m:t>
+                      </m:r>
+                      <m:r>
+                        <m:t>n</m:t>
+                      </m:r>
+                      <m:r>
+                        <m:rPr>
+                          <m:sty m:val="p"/>
+                        </m:rPr>
+                        <m:t>.</m:t>
+                      </m:r>
+                      <m:r>
+                        <m:t>c</m:t>
+                      </m:r>
+                      <m:r>
+                        <m:t>o</m:t>
+                      </m:r>
+                      <m:r>
+                        <m:t>o</m:t>
+                      </m:r>
+                      <m:r>
+                        <m:t>r</m:t>
+                      </m:r>
+                      <m:r>
+                        <m:t>d</m:t>
+                      </m:r>
+                      <m:r>
+                        <m:t>i</m:t>
+                      </m:r>
+                      <m:r>
+                        <m:t>n</m:t>
+                      </m:r>
+                      <m:r>
+                        <m:t>a</m:t>
+                      </m:r>
+                      <m:r>
+                        <m:t>t</m:t>
+                      </m:r>
+                      <m:r>
+                        <m:t>e</m:t>
+                      </m:r>
+                      <m:r>
+                        <m:t>s</m:t>
+                      </m:r>
+                      <m:d>
+                        <m:dPr>
+                          <m:begChr m:val="["/>
+                          <m:endChr m:val="]"/>
+                          <m:sepChr m:val=""/>
+                          <m:grow/>
+                        </m:dPr>
+                        <m:e>
+                          <m:r>
+                            <m:t>0</m:t>
+                          </m:r>
+                        </m:e>
+                      </m:d>
+                    </m:oMath>
+                  </m:oMathPara>
+                </a14:m>
+              </a:p>
+              <a:p>
+                <a:pPr lvl="0" indent="0" marL="0">
+                  <a:buNone/>
+                </a:pPr>
+                <a:r>
+                  <a:rPr/>
+                  <a:t>) AS (n agtype);</a:t>
+                </a:r>
+              </a:p>
+              <a:p>
+                <a:pPr lvl="0" indent="0" marL="0">
+                  <a:buNone/>
+                </a:pPr>
+                <a:r>
+                  <a:rPr/>
+                  <a:t>create table spatial_measurements ( timestamp timestamp DEFAULT CURRENT_TIMESTAMP, device_id text, controlled_property text, location geometry, value float );</a:t>
+                </a:r>
+              </a:p>
+              <a:p>
+                <a:pPr lvl="0" indent="0" marL="0">
+                  <a:buNone/>
+                </a:pPr>
+                <a:r>
+                  <a:rPr/>
+                  <a:t>CREATE INDEX geom_index ON spatial_measurements USING GIST (location);</a:t>
+                </a:r>
+              </a:p>
+              <a:p>
+                <a:pPr lvl="0" indent="0" marL="0">
+                  <a:buNone/>
+                </a:pPr>
+                <a:r>
+                  <a:rPr/>
+                  <a:t>SELECT * FROM cypher(‘watering_adf_graph’,</a:t>
+                </a:r>
+              </a:p>
+              <a:p>
+                <a:pPr lvl="0" indent="0" marL="0">
+                  <a:buNone/>
+                </a:pPr>
+                <a:r>
+                  <a:rPr/>
+                  <a:t>$$
+                MATCH (n:Device {id: 'urn:ngsi-ld:Device:unibo:a316ef4f55a925842cca39af7280f4d8'})
+                SET n.location = st_geomfromgeojson('{"type": "Point", "coordinates": [11.45345, 44.235024]}')
+                RETURN n
+                $$</a:t>
+                </a:r>
+              </a:p>
+              <a:p>
+                <a:pPr lvl="0" indent="0" marL="0">
+                  <a:buNone/>
+                </a:pPr>
+                <a:r>
+                  <a:rPr/>
+                  <a:t>) AS (ne agtype);</a:t>
+                </a:r>
+              </a:p>
+              <a:p>
+                <a:pPr lvl="0" indent="0" marL="0">
+                  <a:buNone/>
+                </a:pPr>
+                <a:r>
+                  <a:rPr/>
+                  <a:t>SELECT * FROM cypher(‘watering_adf_graph’,</a:t>
+                </a:r>
+              </a:p>
+              <a:p>
+                <a:pPr lvl="0" indent="0" marL="0">
+                  <a:buNone/>
+                </a:pPr>
+                <a:r>
+                  <a:rPr/>
+                  <a:t>$$
+                CREATE (n:Device {id: 'urn:ngsi-ld:Device:unibo:a316ef4f55a925842cca39af7280f4d8',
+                type: 'Device',
+                belongsTo: 'urn:ngsi-ld:AgriParcel:unibo:647c399b2188ff484f7416389f94885c',
+                controlledProperty: ['dripper'],
+                dateCreated: '2024-10-17T07:00:02',
+                dateObserved: '2024-10-15T12:45:09',
+                deviceCategory: ['sensor'],
+                domain: 'unibo',
+                location: st_geomfromtext('{"type": "Point", "coordinates": [11.798998, 44.235024]}'),
+                name: 'Dripper Fondo Errano 2024 T0 T0',
+                namespace: 'unibo.watering.',
+                unixtimestampCreated: 1729141203,
+                unixtimestampModified: 1728989109,
+                value: [0]})
+                RETURN n
+                $$</a:t>
+                </a:r>
+              </a:p>
+              <a:p>
+                <a:pPr lvl="0" indent="0" marL="0">
+                  <a:buNone/>
+                </a:pPr>
+                <a:r>
+                  <a:rPr/>
+                  <a:t>) AS (ne agtype);</a:t>
+                </a:r>
+              </a:p>
+              <a:p>
+                <a:pPr lvl="0" indent="0" marL="0">
+                  <a:buNone/>
+                </a:pPr>
+                <a:r>
+                  <a:rPr/>
+                  <a:t>INSERT INTO ag_catalog.measurements VALUES (to_timestamp(1728989109.0), ‘urn:ngsi-ld:Device:unibo:a316ef4f55a925842cca39af7280f4d8’, ‘dripper’, st_geomfromtext(‘POINT(11.798998 44.235024)’), 0)</a:t>
+                </a:r>
+              </a:p>
+              <a:p>
+                <a:pPr lvl="0" indent="0" marL="0">
+                  <a:buNone/>
+                </a:pPr>
+                <a:r>
+                  <a:rPr/>
+                  <a:t>SELECT * FROM cypher(‘watering_adf_graph’,</a:t>
+                </a:r>
+              </a:p>
+              <a:p>
+                <a:pPr lvl="0" indent="0" marL="0">
+                  <a:buNone/>
+                </a:pPr>
+                <a:r>
+                  <a:rPr/>
+                  <a:t>$$  
+MATCH (n:Device {id: 'urn:ngsi-ld:Device:unibo:a316ef4f55a925842cca39af7280f4d8'})
+SET n.id = 'urn:ngsi-ld:Device:unibo:a316ef4f55a925842cca39af7280f4d8',
+n.type = 'Device', n.belongsTo = 'urn:ngsi-ld:AgriParcel:unibo:647c399b2188ff484f7416389f94885c',
+n.controlledProperty = ['dripper'],
+n.dateCreated = '2024-10-17T07:00:02',
+n.dateObserved = '2024-10-15T12:45:09',
+n.deviceCategory = ['sensor'],
+n.domain = 'unibo',
+n.location = st_geomfromgeojson('{"type": "Point", "coordinates": [11.798998, 44.235024]}')::geometry, n.name = 'Dripper Fondo Errano 2024 T0 T0', n.namespace = 'unibo.watering.', n.unixtimestampCreated = 1729141203, n.unixtimestampModified = 1728989109, n.value = [0]                 RETURN n                 $$</a:t>
+                </a:r>
+              </a:p>
+              <a:p>
+                <a:pPr lvl="0" indent="0" marL="0">
+                  <a:buNone/>
+                </a:pPr>
+                <a:r>
+                  <a:rPr/>
+                  <a:t>) AS (n agtype);</a:t>
+                </a:r>
+              </a:p>
+            </p:txBody>
+          </p:sp>
+        </mc:Choice>
+      </mc:AlternateContent>
     </p:spTree>
   </p:cSld>
 </p:sld>

</xml_diff>

<commit_message>
Deploying to gh-pages from @ ManuelePasini/slides-markdown@70a4907c2b1e160328e2cbda91572ebfe40c7a6b 🚀
</commit_message>
<xml_diff>
--- a/digital_twins.pptx
+++ b/digital_twins.pptx
@@ -8457,7 +8457,21 @@
                 </a:pPr>
                 <a:r>
                   <a:rPr/>
-                  <a:t>#### Entity required schema - “id”: follows the NGSI standard (urn-ngsi-[…]) and define the existence of an entity in the graph - “type”: defines the label of the node in the graph.</a:t>
+                  <a:t>##### Entity required schema</a:t>
+                </a:r>
+              </a:p>
+              <a:p>
+                <a:pPr lvl="0"/>
+                <a:r>
+                  <a:rPr/>
+                  <a:t>“id”: follows the NGSI standard (urn-ngsi-[…]) and define the existence of an entity in the graph</a:t>
+                </a:r>
+              </a:p>
+              <a:p>
+                <a:pPr lvl="0"/>
+                <a:r>
+                  <a:rPr/>
+                  <a:t>“type”: defines the label of the node in the graph.</a:t>
                 </a:r>
               </a:p>
               <a:p>
@@ -8526,6 +8540,18 @@
                 <a:r>
                   <a:rPr/>
                   <a:t>A mapping can defined for each entity “type”: it’s a Python functions that extracts the measurements from a JSON entity with the Measurement table structure</a:t>
+                </a:r>
+              </a:p>
+              <a:p>
+                <a:pPr lvl="0" indent="0" marL="0">
+                  <a:spcBef>
+                    <a:spcPts val="3000"/>
+                  </a:spcBef>
+                  <a:buNone/>
+                </a:pPr>
+                <a:r>
+                  <a:rPr b="1"/>
+                  <a:t>Random considerations (constantly updated)</a:t>
                 </a:r>
               </a:p>
               <a:p>

</xml_diff>

<commit_message>
Deploying to gh-pages from @ ManuelePasini/slides-markdown@0fcd06764eb8b985a2917afb0da0c9968fb0c516 🚀
</commit_message>
<xml_diff>
--- a/digital_twins.pptx
+++ b/digital_twins.pptx
@@ -8453,11 +8453,14 @@
               </a:p>
               <a:p>
                 <a:pPr lvl="0" indent="0" marL="0">
+                  <a:spcBef>
+                    <a:spcPts val="3000"/>
+                  </a:spcBef>
                   <a:buNone/>
                 </a:pPr>
                 <a:r>
-                  <a:rPr/>
-                  <a:t>##### Entity required schema</a:t>
+                  <a:rPr b="1"/>
+                  <a:t>Entity required schema</a:t>
                 </a:r>
               </a:p>
               <a:p>

</xml_diff>

<commit_message>
Deploying to gh-pages from @ ManuelePasini/slides-markdown@5f727c0806bebea72f8b5c6a69cdc612b243033c 🚀
</commit_message>
<xml_diff>
--- a/digital_twins.pptx
+++ b/digital_twins.pptx
@@ -8464,14 +8464,14 @@
                 </a:r>
               </a:p>
               <a:p>
-                <a:pPr lvl="0"/>
+                <a:pPr lvl="1"/>
                 <a:r>
                   <a:rPr/>
                   <a:t>“id”: follows the NGSI standard (urn-ngsi-[…]) and define the existence of an entity in the graph</a:t>
                 </a:r>
               </a:p>
               <a:p>
-                <a:pPr lvl="0"/>
+                <a:pPr lvl="1"/>
                 <a:r>
                   <a:rPr/>
                   <a:t>“type”: defines the label of the node in the graph.</a:t>
@@ -8490,17 +8490,29 @@
                 </a:r>
               </a:p>
               <a:p>
-                <a:pPr lvl="0"/>
+                <a:pPr lvl="1"/>
                 <a:r>
                   <a:rPr/>
                   <a:t>“hasDevice”: defines device composition. Each value of this key needs to be a json representing an entity.</a:t>
                 </a:r>
               </a:p>
               <a:p>
+                <a:pPr lvl="0" indent="0" marL="0">
+                  <a:spcBef>
+                    <a:spcPts val="3000"/>
+                  </a:spcBef>
+                  <a:buNone/>
+                </a:pPr>
+                <a:r>
+                  <a:rPr b="1"/>
+                  <a:t>Building the graph</a:t>
+                </a:r>
+              </a:p>
+              <a:p>
                 <a:pPr lvl="0"/>
                 <a:r>
                   <a:rPr/>
-                  <a:t>Each entity gets mapped into the graph as a node.</a:t>
+                  <a:t>Each distinct entity (unique “id”) gets mapped into the graph as a node.</a:t>
                 </a:r>
               </a:p>
               <a:p>
@@ -8514,7 +8526,7 @@
                 <a:pPr lvl="0"/>
                 <a:r>
                   <a:rPr/>
-                  <a:t>IDs follow the NGSI standard.</a:t>
+                  <a:t>If an entity with the given “id” exists, update such entity in the graph</a:t>
                 </a:r>
               </a:p>
               <a:p>

</xml_diff>

<commit_message>
Deploying to gh-pages from @ ManuelePasini/slides-markdown@73559c7648a117c59f4af9530847deb002df440e 🚀
</commit_message>
<xml_diff>
--- a/digital_twins.pptx
+++ b/digital_twins.pptx
@@ -8365,20 +8365,89 @@
               </a:p>
               <a:p>
                 <a:pPr lvl="0" indent="0" marL="0">
+                  <a:spcBef>
+                    <a:spcPts val="3000"/>
+                  </a:spcBef>
                   <a:buNone/>
                 </a:pPr>
                 <a:r>
+                  <a:rPr b="1"/>
+                  <a:t>Emerged considerations</a:t>
+                </a:r>
+              </a:p>
+              <a:p>
+                <a:pPr lvl="0"/>
+                <a:r>
                   <a:rPr/>
-                  <a:t>()[] ### Emerged considerations - Given a FIWARE document, what’s a Property and what’s an Edge? - Should the graph enforce some kind of schema? E.g. metamodel - If not, Do I have to check wether a FIWARE key-value pair links to a node? - But then, I have to check all properties, understand if its an edge or a property, remove it from the entity if it’s an edge, check if the edge destination already exists and if it does not, create it and link it to the source node- - What about device composition? e.g. moisture grid - What about Ids? Apache AGE uses its own custom IDs that  cannot  be disabled -  What happens when a new measurements comes by? - I have to check if such node exists, if not, it’s a new edge, if it is - An entity comes in: there’s already a node with such id; is it an update? Is it a measurement?</a:t>
+                  <a:t>Given a FIWARE document, what’s a Property and what’s an Edge?</a:t>
+                </a:r>
+              </a:p>
+              <a:p>
+                <a:pPr lvl="1"/>
+                <a:r>
+                  <a:rPr/>
+                  <a:t>Should the graph enforce some kind of schema? E.g. metamodel</a:t>
+                </a:r>
+              </a:p>
+              <a:p>
+                <a:pPr lvl="1"/>
+                <a:r>
+                  <a:rPr/>
+                  <a:t>If not, Do I have to check wether a FIWARE key-value pair links to a node?</a:t>
+                </a:r>
+              </a:p>
+              <a:p>
+                <a:pPr lvl="2"/>
+                <a:r>
+                  <a:rPr/>
+                  <a:t>But then, I have to check all properties, understand if its an edge or a property, remove it from the entity if it’s an edge, check if the edge destination already exists and if it does not, create it and link it to the source node-</a:t>
+                </a:r>
+              </a:p>
+              <a:p>
+                <a:pPr lvl="1"/>
+                <a:r>
+                  <a:rPr/>
+                  <a:t>What about device composition? e.g. moisture grid</a:t>
+                </a:r>
+              </a:p>
+              <a:p>
+                <a:pPr lvl="0"/>
+                <a:r>
+                  <a:rPr/>
+                  <a:t>What about Ids? Apache AGE uses its own custom IDs that  cannot  be disabled</a:t>
+                </a:r>
+              </a:p>
+              <a:p>
+                <a:pPr lvl="0"/>
+                <a:r>
+                  <a:rPr/>
+                  <a:t> What happens when a new measurements comes by?</a:t>
+                </a:r>
+              </a:p>
+              <a:p>
+                <a:pPr lvl="1"/>
+                <a:r>
+                  <a:rPr/>
+                  <a:t>I have to check if such node exists, if not, it’s a new edge, if it is</a:t>
+                </a:r>
+              </a:p>
+              <a:p>
+                <a:pPr lvl="0"/>
+                <a:r>
+                  <a:rPr/>
+                  <a:t>An entity comes in: there’s already a node with such id; is it an update? Is it a measurement?</a:t>
                 </a:r>
               </a:p>
               <a:p>
                 <a:pPr lvl="0" indent="0" marL="0">
+                  <a:spcBef>
+                    <a:spcPts val="3000"/>
+                  </a:spcBef>
                   <a:buNone/>
                 </a:pPr>
                 <a:r>
-                  <a:rPr/>
-                  <a:t>### Modellazioni Measurement</a:t>
+                  <a:rPr b="1"/>
+                  <a:t>Modellazioni Measurement</a:t>
                 </a:r>
               </a:p>
               <a:p>
@@ -8404,11 +8473,14 @@
               </a:p>
               <a:p>
                 <a:pPr lvl="0" indent="0" marL="0">
+                  <a:spcBef>
+                    <a:spcPts val="3000"/>
+                  </a:spcBef>
                   <a:buNone/>
                 </a:pPr>
                 <a:r>
-                  <a:rPr/>
-                  <a:t>## Problemi sui dati</a:t>
+                  <a:rPr b="1"/>
+                  <a:t>Problemi sui dati</a:t>
                 </a:r>
               </a:p>
               <a:p>

</xml_diff>

<commit_message>
Deploying to gh-pages from @ ManuelePasini/slides-markdown@cdd6c970c2bcbe24833c3b53a4e0a47bb5fd6711 🚀
</commit_message>
<xml_diff>
--- a/digital_twins.pptx
+++ b/digital_twins.pptx
@@ -41,6 +41,7 @@
     <p:sldId id="289" r:id="rId35"/>
     <p:sldId id="290" r:id="rId36"/>
     <p:sldId id="291" r:id="rId37"/>
+    <p:sldId id="292" r:id="rId38"/>
   </p:sldIdLst>
   <p:sldSz cx="9144000" cy="5143500" type="screen16x9"/>
   <p:notesSz cx="6858000" cy="9144000"/>
@@ -8177,6 +8178,547 @@
           </a:p>
         </p:txBody>
       </p:sp>
+      <p:sp>
+        <p:nvSpPr>
+          <p:cNvPr id="3" name="Content Placeholder 2"/>
+          <p:cNvSpPr>
+            <a:spLocks noGrp="1"/>
+          </p:cNvSpPr>
+          <p:nvPr>
+            <p:ph idx="1"/>
+          </p:nvPr>
+        </p:nvSpPr>
+        <p:spPr/>
+        <p:txBody>
+          <a:bodyPr/>
+          <a:lstStyle/>
+          <a:p>
+            <a:pPr lvl="0"/>
+            <a:r>
+              <a:rPr/>
+              <a:t>GeoMesa linearizes the keyspace by transforming multi-dimensional data (location, timestamp) into 1D keys using space-filling curves.</a:t>
+            </a:r>
+          </a:p>
+          <a:p>
+            <a:pPr lvl="0"/>
+            <a:r>
+              <a:rPr/>
+              <a:t>JUST incorporates leverages HBase, GeoMesa, and Spark. Introduces two new indexing techniques, Z2T and XZ2T and efficient compression mechanism that improves the query performance significantly.</a:t>
+            </a:r>
+          </a:p>
+          <a:p>
+            <a:pPr lvl="0"/>
+            <a:r>
+              <a:rPr/>
+              <a:t>TrajMesa, horizontal storage schema (H-Store) is proposed. Allowing to store an entire trajectory in one-row with compression.</a:t>
+            </a:r>
+          </a:p>
+          <a:p>
+            <a:pPr lvl="0" indent="0" marL="0">
+              <a:spcBef>
+                <a:spcPts val="3000"/>
+              </a:spcBef>
+              <a:buNone/>
+            </a:pPr>
+            <a:r>
+              <a:rPr b="1"/>
+              <a:t>Recent literature</a:t>
+            </a:r>
+          </a:p>
+          <a:p>
+            <a:pPr lvl="0"/>
+            <a:r>
+              <a:rPr/>
+              <a:t>SpaceTimeDB (commercial, (?))</a:t>
+            </a:r>
+          </a:p>
+          <a:p>
+            <a:pPr lvl="0"/>
+            <a:r>
+              <a:rPr/>
+              <a:t>Springbok, ICDE 2024</a:t>
+            </a:r>
+          </a:p>
+          <a:p>
+            <a:pPr lvl="0"/>
+            <a:r>
+              <a:rPr/>
+              <a:t>CUPID, Future Generation Computer Systems 2024</a:t>
+            </a:r>
+          </a:p>
+          <a:p>
+            <a:pPr lvl="0"/>
+            <a:r>
+              <a:rPr/>
+              <a:t>TMan, ICDE 2024</a:t>
+            </a:r>
+          </a:p>
+          <a:p>
+            <a:pPr lvl="0" indent="0" marL="0">
+              <a:spcBef>
+                <a:spcPts val="3000"/>
+              </a:spcBef>
+              <a:buNone/>
+            </a:pPr>
+            <a:r>
+              <a:rPr b="1"/>
+              <a:t>Other Research Trends</a:t>
+            </a:r>
+          </a:p>
+          <a:p>
+            <a:pPr lvl="0" indent="0" marL="0">
+              <a:spcBef>
+                <a:spcPts val="3000"/>
+              </a:spcBef>
+              <a:buNone/>
+            </a:pPr>
+            <a:r>
+              <a:rPr b="1"/>
+              <a:t>ML for query optimization</a:t>
+            </a:r>
+          </a:p>
+          <a:p>
+            <a:pPr lvl="0"/>
+            <a:r>
+              <a:rPr/>
+              <a:t>Spatial Query Optimization With Learning, VLDB 2024</a:t>
+            </a:r>
+          </a:p>
+          <a:p>
+            <a:pPr lvl="0" indent="0" marL="0">
+              <a:spcBef>
+                <a:spcPts val="3000"/>
+              </a:spcBef>
+              <a:buNone/>
+            </a:pPr>
+            <a:r>
+              <a:rPr b="1"/>
+              <a:t>Indexing</a:t>
+            </a:r>
+          </a:p>
+          <a:p>
+            <a:pPr lvl="0"/>
+            <a:r>
+              <a:rPr/>
+              <a:t>A Time-Identified R-Tree: A Workload-Controllable Dynamic Spatio-Temporal Index Scheme for Streaming Processing, International Journal of Geo-Information 2024</a:t>
+            </a:r>
+          </a:p>
+          <a:p>
+            <a:pPr lvl="0" indent="0" marL="0">
+              <a:spcBef>
+                <a:spcPts val="3000"/>
+              </a:spcBef>
+              <a:buNone/>
+            </a:pPr>
+            <a:r>
+              <a:rPr b="1"/>
+              <a:t>A case study for Digital Twins</a:t>
+            </a:r>
+          </a:p>
+          <a:p>
+            <a:pPr lvl="0"/>
+            <a:r>
+              <a:rPr/>
+              <a:t>Graph + TimeSeries (Apache AGE + PostgreSQL + PostGIS + Timescale)</a:t>
+            </a:r>
+          </a:p>
+          <a:p>
+            <a:pPr lvl="0"/>
+            <a:r>
+              <a:rPr/>
+              <a:t>MobilityDB (PostgreSQL + PostGIS + trajectory data support)</a:t>
+            </a:r>
+          </a:p>
+          <a:p>
+            <a:pPr lvl="0"/>
+            <a:r>
+              <a:rPr/>
+              <a:t>Beast</a:t>
+            </a:r>
+          </a:p>
+          <a:p>
+            <a:pPr lvl="0"/>
+            <a:r>
+              <a:rPr/>
+              <a:t>CUPID</a:t>
+            </a:r>
+          </a:p>
+          <a:p>
+            <a:pPr lvl="0"/>
+            <a:r>
+              <a:rPr/>
+              <a:t>Springbok</a:t>
+            </a:r>
+          </a:p>
+          <a:p>
+            <a:pPr lvl="0" indent="0" marL="0">
+              <a:spcBef>
+                <a:spcPts val="3000"/>
+              </a:spcBef>
+              <a:buNone/>
+            </a:pPr>
+            <a:r>
+              <a:rPr b="1"/>
+              <a:t>Case study 0 - Apache Age + TimescaleDB + PostGIS</a:t>
+            </a:r>
+          </a:p>
+          <a:p>
+            <a:pPr lvl="0" indent="0" marL="0">
+              <a:spcBef>
+                <a:spcPts val="3000"/>
+              </a:spcBef>
+              <a:buNone/>
+            </a:pPr>
+            <a:r>
+              <a:rPr b="1"/>
+              <a:t>Emerged considerations</a:t>
+            </a:r>
+          </a:p>
+          <a:p>
+            <a:pPr lvl="0"/>
+            <a:r>
+              <a:rPr/>
+              <a:t>Given a FIWARE document, what’s a Property and what’s an Edge? - It’s an edge if it links to an NGSI URN</a:t>
+            </a:r>
+          </a:p>
+          <a:p>
+            <a:pPr lvl="1"/>
+            <a:r>
+              <a:rPr/>
+              <a:t>Should the graph enforce some kind of schema? E.g. metamodel - I beleve so but dunno</a:t>
+            </a:r>
+          </a:p>
+          <a:p>
+            <a:pPr lvl="1"/>
+            <a:r>
+              <a:rPr/>
+              <a:t>If not, Do I have to check wether a FIWARE key-value pair links to a node?</a:t>
+            </a:r>
+          </a:p>
+          <a:p>
+            <a:pPr lvl="2"/>
+            <a:r>
+              <a:rPr/>
+              <a:t>But then, I have to check all properties, understand if its an edge or a property, remove it from the entity if it’s an edge, check if the edge destination already exists and if it does not, create it and link it to the source node-</a:t>
+            </a:r>
+          </a:p>
+          <a:p>
+            <a:pPr lvl="1"/>
+            <a:r>
+              <a:rPr/>
+              <a:t>What about device composition? e.g. moisture grid</a:t>
+            </a:r>
+          </a:p>
+          <a:p>
+            <a:pPr lvl="0"/>
+            <a:r>
+              <a:rPr/>
+              <a:t>What about Ids? Apache AGE uses its own custom IDs that  cannot  be disabled</a:t>
+            </a:r>
+          </a:p>
+          <a:p>
+            <a:pPr lvl="0"/>
+            <a:r>
+              <a:rPr/>
+              <a:t> What happens when a new measurements comes by?</a:t>
+            </a:r>
+          </a:p>
+          <a:p>
+            <a:pPr lvl="1"/>
+            <a:r>
+              <a:rPr/>
+              <a:t>I have to check if such node exists, if not, it’s a new edge, if it is</a:t>
+            </a:r>
+          </a:p>
+          <a:p>
+            <a:pPr lvl="0"/>
+            <a:r>
+              <a:rPr/>
+              <a:t>An entity comes in: there’s already a node with such id; is it an update? Is it a measurement?</a:t>
+            </a:r>
+          </a:p>
+          <a:p>
+            <a:pPr lvl="0" indent="0" marL="0">
+              <a:spcBef>
+                <a:spcPts val="3000"/>
+              </a:spcBef>
+              <a:buNone/>
+            </a:pPr>
+            <a:r>
+              <a:rPr b="1"/>
+              <a:t>Modellazioni Measurement</a:t>
+            </a:r>
+          </a:p>
+          <a:p>
+            <a:pPr lvl="0"/>
+            <a:r>
+              <a:rPr/>
+              <a:t>AgriRobot non è un device, come capisco se qualcosa ha dei measurement da storicizzare?</a:t>
+            </a:r>
+          </a:p>
+          <a:p>
+            <a:pPr lvl="0"/>
+            <a:r>
+              <a:rPr/>
+              <a:t>Agri robot non storicizza le controlled property, come faccio a capire cosa devo storicizzare?</a:t>
+            </a:r>
+          </a:p>
+          <a:p>
+            <a:pPr lvl="0"/>
+            <a:r>
+              <a:rPr/>
+              <a:t>Cosa succede sul grafo se il nodo esiste già? Lo aggiorno, ma in che modo? Sovrascrivo il vecchio? Aggiungo le diff? E le diff in negativo vanno tolte? Cosa succede ai suoi archi? Se nella nuova versione non vedo un arco?</a:t>
+            </a:r>
+          </a:p>
+          <a:p>
+            <a:pPr lvl="0" indent="0" marL="0">
+              <a:spcBef>
+                <a:spcPts val="3000"/>
+              </a:spcBef>
+              <a:buNone/>
+            </a:pPr>
+            <a:r>
+              <a:rPr b="1"/>
+              <a:t>Problemi sui dati</a:t>
+            </a:r>
+          </a:p>
+          <a:p>
+            <a:pPr lvl="0"/>
+            <a:r>
+              <a:rPr/>
+              <a:t>I dati dei pinotech hanno il dateObserved sbagliato (“Z” alla fine della data)</a:t>
+            </a:r>
+          </a:p>
+          <a:p>
+            <a:pPr lvl="0"/>
+            <a:r>
+              <a:rPr/>
+              <a:t>Per creare un arco, devo prima avere entrambi i nodi altrimenti non funzia</a:t>
+            </a:r>
+          </a:p>
+          <a:p>
+            <a:pPr lvl="0" indent="0" marL="0">
+              <a:spcBef>
+                <a:spcPts val="3000"/>
+              </a:spcBef>
+              <a:buNone/>
+            </a:pPr>
+            <a:r>
+              <a:rPr b="1"/>
+              <a:t>Age Middleware</a:t>
+            </a:r>
+          </a:p>
+          <a:p>
+            <a:pPr lvl="0"/>
+            <a:r>
+              <a:rPr/>
+              <a:t>Builds a connection to a Apache Age + PostGIS + Timescale DBMSs.</a:t>
+            </a:r>
+          </a:p>
+          <a:p>
+            <a:pPr lvl="0"/>
+            <a:r>
+              <a:rPr/>
+              <a:t>Processes JSON entities following the NGSI schema.</a:t>
+            </a:r>
+          </a:p>
+          <a:p>
+            <a:pPr lvl="0" indent="0" marL="0">
+              <a:spcBef>
+                <a:spcPts val="3000"/>
+              </a:spcBef>
+              <a:buNone/>
+            </a:pPr>
+            <a:r>
+              <a:rPr b="1"/>
+              <a:t>Entity required schema</a:t>
+            </a:r>
+          </a:p>
+          <a:p>
+            <a:pPr lvl="1"/>
+            <a:r>
+              <a:rPr/>
+              <a:t>“id”: follows the NGSI standard (urn-ngsi-[…]) and define the existence of an entity in the graph</a:t>
+            </a:r>
+          </a:p>
+          <a:p>
+            <a:pPr lvl="1"/>
+            <a:r>
+              <a:rPr/>
+              <a:t>“type”: defines the label of the node in the graph.</a:t>
+            </a:r>
+          </a:p>
+          <a:p>
+            <a:pPr lvl="0" indent="0" marL="0">
+              <a:spcBef>
+                <a:spcPts val="3000"/>
+              </a:spcBef>
+              <a:buNone/>
+            </a:pPr>
+            <a:r>
+              <a:rPr b="1"/>
+              <a:t>Entity optional schema</a:t>
+            </a:r>
+          </a:p>
+          <a:p>
+            <a:pPr lvl="1"/>
+            <a:r>
+              <a:rPr/>
+              <a:t>“hasDevice”: defines device composition. Each value of this key needs to be a json representing an entity.</a:t>
+            </a:r>
+          </a:p>
+          <a:p>
+            <a:pPr lvl="0" indent="0" marL="0">
+              <a:spcBef>
+                <a:spcPts val="3000"/>
+              </a:spcBef>
+              <a:buNone/>
+            </a:pPr>
+            <a:r>
+              <a:rPr b="1"/>
+              <a:t>Building the graph</a:t>
+            </a:r>
+          </a:p>
+          <a:p>
+            <a:pPr lvl="0"/>
+            <a:r>
+              <a:rPr/>
+              <a:t>Each distinct entity (unique “id”) gets mapped into the graph as a node.</a:t>
+            </a:r>
+          </a:p>
+          <a:p>
+            <a:pPr lvl="0"/>
+            <a:r>
+              <a:rPr/>
+              <a:t>Each entity key that has an ID as a value becomes an edge.</a:t>
+            </a:r>
+          </a:p>
+          <a:p>
+            <a:pPr lvl="0"/>
+            <a:r>
+              <a:rPr/>
+              <a:t>If an entity with the given “id” exists, update such entity in the graph</a:t>
+            </a:r>
+          </a:p>
+          <a:p>
+            <a:pPr lvl="0" indent="0" marL="0">
+              <a:spcBef>
+                <a:spcPts val="3000"/>
+              </a:spcBef>
+              <a:buNone/>
+            </a:pPr>
+            <a:r>
+              <a:rPr b="1"/>
+              <a:t>Parsing into measurement</a:t>
+            </a:r>
+          </a:p>
+          <a:p>
+            <a:pPr lvl="0" indent="0" marL="0">
+              <a:buNone/>
+            </a:pPr>
+            <a:r>
+              <a:rPr/>
+              <a:t>Measurement = TimescaleTable(timestamp, device_id, controlledProperty, value, raw_value)</a:t>
+            </a:r>
+          </a:p>
+          <a:p>
+            <a:pPr lvl="0"/>
+            <a:r>
+              <a:rPr/>
+              <a:t>A mapping can defined for each entity “type”: it’s a Python functions that extracts the measurements from a JSON entity with the Measurement table structure</a:t>
+            </a:r>
+          </a:p>
+          <a:p>
+            <a:pPr lvl="0" indent="0" marL="0">
+              <a:spcBef>
+                <a:spcPts val="3000"/>
+              </a:spcBef>
+              <a:buNone/>
+            </a:pPr>
+            <a:r>
+              <a:rPr b="1"/>
+              <a:t>Environment setup</a:t>
+            </a:r>
+          </a:p>
+          <a:p>
+            <a:pPr lvl="0" indent="0" marL="0">
+              <a:buNone/>
+            </a:pPr>
+            <a:r>
+              <a:rPr/>
+              <a:t>CREATE EXTENSION IF NOT EXISTS age; CREATE EXTENSION IF NOT EXISTS postgis; LOAD ‘age’; SET search_path = ag_catalog, “$user”, public; SELECT create_hypertable(‘measurements’, ‘timestamp’);</a:t>
+            </a:r>
+          </a:p>
+          <a:p>
+            <a:pPr lvl="0" indent="0" marL="0">
+              <a:buNone/>
+            </a:pPr>
+            <a:r>
+              <a:rPr/>
+              <a:t>CREATE INDEX location_index ON measurements USING GIST (timestamp);</a:t>
+            </a:r>
+          </a:p>
+          <a:p>
+            <a:pPr lvl="0" indent="0" marL="0">
+              <a:spcBef>
+                <a:spcPts val="3000"/>
+              </a:spcBef>
+              <a:buNone/>
+            </a:pPr>
+            <a:r>
+              <a:rPr b="1"/>
+              <a:t>Random considerations</a:t>
+            </a:r>
+          </a:p>
+        </p:txBody>
+      </p:sp>
+    </p:spTree>
+  </p:cSld>
+</p:sld>
+</file>
+
+<file path=ppt/slides/slide37.xml><?xml version="1.0" encoding="utf-8"?>
+<p:sld xmlns:a="http://schemas.openxmlformats.org/drawingml/2006/main" xmlns:r="http://schemas.openxmlformats.org/officeDocument/2006/relationships" xmlns:p="http://schemas.openxmlformats.org/presentationml/2006/main">
+  <p:cSld>
+    <p:spTree>
+      <p:nvGrpSpPr>
+        <p:cNvPr id="1" name=""/>
+        <p:cNvGrpSpPr/>
+        <p:nvPr/>
+      </p:nvGrpSpPr>
+      <p:grpSpPr>
+        <a:xfrm>
+          <a:off x="0" y="0"/>
+          <a:ext cx="0" cy="0"/>
+          <a:chOff x="0" y="0"/>
+          <a:chExt cx="0" cy="0"/>
+        </a:xfrm>
+      </p:grpSpPr>
+      <p:sp>
+        <p:nvSpPr>
+          <p:cNvPr id="2" name="Title 1"/>
+          <p:cNvSpPr>
+            <a:spLocks noGrp="1"/>
+          </p:cNvSpPr>
+          <p:nvPr>
+            <p:ph type="title"/>
+          </p:nvPr>
+        </p:nvSpPr>
+        <p:spPr/>
+        <p:txBody>
+          <a:bodyPr/>
+          <a:lstStyle/>
+          <a:p>
+            <a:pPr lvl="0" indent="0" marL="0">
+              <a:buNone/>
+            </a:pPr>
+            <a:r>
+              <a:rPr/>
+              <a:t>Random considerations (constantly updated)</a:t>
+            </a:r>
+          </a:p>
+        </p:txBody>
+      </p:sp>
       <mc:AlternateContent xmlns:mc="http://schemas.openxmlformats.org/markup-compatibility/2006">
         <mc:Choice xmlns:a14="http://schemas.microsoft.com/office/drawing/2010/main" Requires="a14">
           <p:sp>
@@ -8193,454 +8735,6 @@
             <p:txBody>
               <a:bodyPr/>
               <a:lstStyle/>
-              <a:p>
-                <a:pPr lvl="0"/>
-                <a:r>
-                  <a:rPr/>
-                  <a:t>GeoMesa linearizes the keyspace by transforming multi-dimensional data (location, timestamp) into 1D keys using space-filling curves.</a:t>
-                </a:r>
-              </a:p>
-              <a:p>
-                <a:pPr lvl="0"/>
-                <a:r>
-                  <a:rPr/>
-                  <a:t>JUST incorporates leverages HBase, GeoMesa, and Spark. Introduces two new indexing techniques, Z2T and XZ2T and efficient compression mechanism that improves the query performance significantly.</a:t>
-                </a:r>
-              </a:p>
-              <a:p>
-                <a:pPr lvl="0"/>
-                <a:r>
-                  <a:rPr/>
-                  <a:t>TrajMesa, horizontal storage schema (H-Store) is proposed. Allowing to store an entire trajectory in one-row with compression.</a:t>
-                </a:r>
-              </a:p>
-              <a:p>
-                <a:pPr lvl="0" indent="0" marL="0">
-                  <a:spcBef>
-                    <a:spcPts val="3000"/>
-                  </a:spcBef>
-                  <a:buNone/>
-                </a:pPr>
-                <a:r>
-                  <a:rPr b="1"/>
-                  <a:t>Recent literature</a:t>
-                </a:r>
-              </a:p>
-              <a:p>
-                <a:pPr lvl="0"/>
-                <a:r>
-                  <a:rPr/>
-                  <a:t>SpaceTimeDB (commercial, (?))</a:t>
-                </a:r>
-              </a:p>
-              <a:p>
-                <a:pPr lvl="0"/>
-                <a:r>
-                  <a:rPr/>
-                  <a:t>Springbok, ICDE 2024</a:t>
-                </a:r>
-              </a:p>
-              <a:p>
-                <a:pPr lvl="0"/>
-                <a:r>
-                  <a:rPr/>
-                  <a:t>CUPID, Future Generation Computer Systems 2024</a:t>
-                </a:r>
-              </a:p>
-              <a:p>
-                <a:pPr lvl="0"/>
-                <a:r>
-                  <a:rPr/>
-                  <a:t>TMan, ICDE 2024</a:t>
-                </a:r>
-              </a:p>
-              <a:p>
-                <a:pPr lvl="0" indent="0" marL="0">
-                  <a:spcBef>
-                    <a:spcPts val="3000"/>
-                  </a:spcBef>
-                  <a:buNone/>
-                </a:pPr>
-                <a:r>
-                  <a:rPr b="1"/>
-                  <a:t>Other Research Trends</a:t>
-                </a:r>
-              </a:p>
-              <a:p>
-                <a:pPr lvl="0" indent="0" marL="0">
-                  <a:spcBef>
-                    <a:spcPts val="3000"/>
-                  </a:spcBef>
-                  <a:buNone/>
-                </a:pPr>
-                <a:r>
-                  <a:rPr b="1"/>
-                  <a:t>ML for query optimization</a:t>
-                </a:r>
-              </a:p>
-              <a:p>
-                <a:pPr lvl="0"/>
-                <a:r>
-                  <a:rPr/>
-                  <a:t>Spatial Query Optimization With Learning, VLDB 2024</a:t>
-                </a:r>
-              </a:p>
-              <a:p>
-                <a:pPr lvl="0" indent="0" marL="0">
-                  <a:spcBef>
-                    <a:spcPts val="3000"/>
-                  </a:spcBef>
-                  <a:buNone/>
-                </a:pPr>
-                <a:r>
-                  <a:rPr b="1"/>
-                  <a:t>Indexing</a:t>
-                </a:r>
-              </a:p>
-              <a:p>
-                <a:pPr lvl="0"/>
-                <a:r>
-                  <a:rPr/>
-                  <a:t>A Time-Identified R-Tree: A Workload-Controllable Dynamic Spatio-Temporal Index Scheme for Streaming Processing, International Journal of Geo-Information 2024</a:t>
-                </a:r>
-              </a:p>
-              <a:p>
-                <a:pPr lvl="0" indent="0" marL="0">
-                  <a:spcBef>
-                    <a:spcPts val="3000"/>
-                  </a:spcBef>
-                  <a:buNone/>
-                </a:pPr>
-                <a:r>
-                  <a:rPr b="1"/>
-                  <a:t>A case study for Digital Twins</a:t>
-                </a:r>
-              </a:p>
-              <a:p>
-                <a:pPr lvl="0"/>
-                <a:r>
-                  <a:rPr/>
-                  <a:t>Graph + TimeSeries (Apache AGE + PostgreSQL + PostGIS + Timescale)</a:t>
-                </a:r>
-              </a:p>
-              <a:p>
-                <a:pPr lvl="0"/>
-                <a:r>
-                  <a:rPr/>
-                  <a:t>MobilityDB (PostgreSQL + PostGIS + trajectory data support)</a:t>
-                </a:r>
-              </a:p>
-              <a:p>
-                <a:pPr lvl="0"/>
-                <a:r>
-                  <a:rPr/>
-                  <a:t>Beast</a:t>
-                </a:r>
-              </a:p>
-              <a:p>
-                <a:pPr lvl="0"/>
-                <a:r>
-                  <a:rPr/>
-                  <a:t>CUPID</a:t>
-                </a:r>
-              </a:p>
-              <a:p>
-                <a:pPr lvl="0"/>
-                <a:r>
-                  <a:rPr/>
-                  <a:t>Springbok</a:t>
-                </a:r>
-              </a:p>
-              <a:p>
-                <a:pPr lvl="0" indent="0" marL="0">
-                  <a:spcBef>
-                    <a:spcPts val="3000"/>
-                  </a:spcBef>
-                  <a:buNone/>
-                </a:pPr>
-                <a:r>
-                  <a:rPr b="1"/>
-                  <a:t>Case study 0 - Apache Age + TimescaleDB + PostGIS</a:t>
-                </a:r>
-              </a:p>
-              <a:p>
-                <a:pPr lvl="0" indent="0" marL="0">
-                  <a:spcBef>
-                    <a:spcPts val="3000"/>
-                  </a:spcBef>
-                  <a:buNone/>
-                </a:pPr>
-                <a:r>
-                  <a:rPr b="1"/>
-                  <a:t>Emerged considerations</a:t>
-                </a:r>
-              </a:p>
-              <a:p>
-                <a:pPr lvl="0"/>
-                <a:r>
-                  <a:rPr/>
-                  <a:t>Given a FIWARE document, what’s a Property and what’s an Edge?</a:t>
-                </a:r>
-              </a:p>
-              <a:p>
-                <a:pPr lvl="1"/>
-                <a:r>
-                  <a:rPr/>
-                  <a:t>Should the graph enforce some kind of schema? E.g. metamodel</a:t>
-                </a:r>
-              </a:p>
-              <a:p>
-                <a:pPr lvl="1"/>
-                <a:r>
-                  <a:rPr/>
-                  <a:t>If not, Do I have to check wether a FIWARE key-value pair links to a node?</a:t>
-                </a:r>
-              </a:p>
-              <a:p>
-                <a:pPr lvl="2"/>
-                <a:r>
-                  <a:rPr/>
-                  <a:t>But then, I have to check all properties, understand if its an edge or a property, remove it from the entity if it’s an edge, check if the edge destination already exists and if it does not, create it and link it to the source node-</a:t>
-                </a:r>
-              </a:p>
-              <a:p>
-                <a:pPr lvl="1"/>
-                <a:r>
-                  <a:rPr/>
-                  <a:t>What about device composition? e.g. moisture grid</a:t>
-                </a:r>
-              </a:p>
-              <a:p>
-                <a:pPr lvl="0"/>
-                <a:r>
-                  <a:rPr/>
-                  <a:t>What about Ids? Apache AGE uses its own custom IDs that  cannot  be disabled</a:t>
-                </a:r>
-              </a:p>
-              <a:p>
-                <a:pPr lvl="0"/>
-                <a:r>
-                  <a:rPr/>
-                  <a:t> What happens when a new measurements comes by?</a:t>
-                </a:r>
-              </a:p>
-              <a:p>
-                <a:pPr lvl="1"/>
-                <a:r>
-                  <a:rPr/>
-                  <a:t>I have to check if such node exists, if not, it’s a new edge, if it is</a:t>
-                </a:r>
-              </a:p>
-              <a:p>
-                <a:pPr lvl="0"/>
-                <a:r>
-                  <a:rPr/>
-                  <a:t>An entity comes in: there’s already a node with such id; is it an update? Is it a measurement?</a:t>
-                </a:r>
-              </a:p>
-              <a:p>
-                <a:pPr lvl="0" indent="0" marL="0">
-                  <a:spcBef>
-                    <a:spcPts val="3000"/>
-                  </a:spcBef>
-                  <a:buNone/>
-                </a:pPr>
-                <a:r>
-                  <a:rPr b="1"/>
-                  <a:t>Modellazioni Measurement</a:t>
-                </a:r>
-              </a:p>
-              <a:p>
-                <a:pPr lvl="0"/>
-                <a:r>
-                  <a:rPr/>
-                  <a:t>AgriRobot non è un device, come capisco se qualcosa ha dei measurement da storicizzare?</a:t>
-                </a:r>
-              </a:p>
-              <a:p>
-                <a:pPr lvl="0"/>
-                <a:r>
-                  <a:rPr/>
-                  <a:t>Agri robot non storicizza le controlled property, come faccio a capire cosa devo storicizzare?</a:t>
-                </a:r>
-              </a:p>
-              <a:p>
-                <a:pPr lvl="0"/>
-                <a:r>
-                  <a:rPr/>
-                  <a:t>Cosa succede sul grafo se il nodo esiste già? Lo aggiorno, ma in che modo? Sovrascrivo il vecchio? Aggiungo le diff? E le diff in negativo vanno tolte? Cosa succede ai suoi archi? Se nella nuova versione non vedo un arco?</a:t>
-                </a:r>
-              </a:p>
-              <a:p>
-                <a:pPr lvl="0" indent="0" marL="0">
-                  <a:spcBef>
-                    <a:spcPts val="3000"/>
-                  </a:spcBef>
-                  <a:buNone/>
-                </a:pPr>
-                <a:r>
-                  <a:rPr b="1"/>
-                  <a:t>Problemi sui dati</a:t>
-                </a:r>
-              </a:p>
-              <a:p>
-                <a:pPr lvl="0"/>
-                <a:r>
-                  <a:rPr/>
-                  <a:t>I dati dei pinotech hanno il dateObserved sbagliato (“Z” alla fine della data)</a:t>
-                </a:r>
-              </a:p>
-              <a:p>
-                <a:pPr lvl="0"/>
-                <a:r>
-                  <a:rPr/>
-                  <a:t>Per creare un arco, devo prima avere entrambi i nodi altrimenti non funzia</a:t>
-                </a:r>
-              </a:p>
-              <a:p>
-                <a:pPr lvl="0" indent="0" marL="0">
-                  <a:spcBef>
-                    <a:spcPts val="3000"/>
-                  </a:spcBef>
-                  <a:buNone/>
-                </a:pPr>
-                <a:r>
-                  <a:rPr b="1"/>
-                  <a:t>Age Middleware</a:t>
-                </a:r>
-              </a:p>
-              <a:p>
-                <a:pPr lvl="0"/>
-                <a:r>
-                  <a:rPr/>
-                  <a:t>Builds a connection to a Apache Age + PostGIS + Timescale DBMSs.</a:t>
-                </a:r>
-              </a:p>
-              <a:p>
-                <a:pPr lvl="0"/>
-                <a:r>
-                  <a:rPr/>
-                  <a:t>Processes JSON entities following the NGSI schema.</a:t>
-                </a:r>
-              </a:p>
-              <a:p>
-                <a:pPr lvl="0" indent="0" marL="0">
-                  <a:spcBef>
-                    <a:spcPts val="3000"/>
-                  </a:spcBef>
-                  <a:buNone/>
-                </a:pPr>
-                <a:r>
-                  <a:rPr b="1"/>
-                  <a:t>Entity required schema</a:t>
-                </a:r>
-              </a:p>
-              <a:p>
-                <a:pPr lvl="1"/>
-                <a:r>
-                  <a:rPr/>
-                  <a:t>“id”: follows the NGSI standard (urn-ngsi-[…]) and define the existence of an entity in the graph</a:t>
-                </a:r>
-              </a:p>
-              <a:p>
-                <a:pPr lvl="1"/>
-                <a:r>
-                  <a:rPr/>
-                  <a:t>“type”: defines the label of the node in the graph.</a:t>
-                </a:r>
-              </a:p>
-              <a:p>
-                <a:pPr lvl="0" indent="0" marL="0">
-                  <a:spcBef>
-                    <a:spcPts val="3000"/>
-                  </a:spcBef>
-                  <a:buNone/>
-                </a:pPr>
-                <a:r>
-                  <a:rPr b="1"/>
-                  <a:t>Entity optional schema</a:t>
-                </a:r>
-              </a:p>
-              <a:p>
-                <a:pPr lvl="1"/>
-                <a:r>
-                  <a:rPr/>
-                  <a:t>“hasDevice”: defines device composition. Each value of this key needs to be a json representing an entity.</a:t>
-                </a:r>
-              </a:p>
-              <a:p>
-                <a:pPr lvl="0" indent="0" marL="0">
-                  <a:spcBef>
-                    <a:spcPts val="3000"/>
-                  </a:spcBef>
-                  <a:buNone/>
-                </a:pPr>
-                <a:r>
-                  <a:rPr b="1"/>
-                  <a:t>Building the graph</a:t>
-                </a:r>
-              </a:p>
-              <a:p>
-                <a:pPr lvl="0"/>
-                <a:r>
-                  <a:rPr/>
-                  <a:t>Each distinct entity (unique “id”) gets mapped into the graph as a node.</a:t>
-                </a:r>
-              </a:p>
-              <a:p>
-                <a:pPr lvl="0"/>
-                <a:r>
-                  <a:rPr/>
-                  <a:t>Each entity key that has an ID as a value becomes an edge.</a:t>
-                </a:r>
-              </a:p>
-              <a:p>
-                <a:pPr lvl="0"/>
-                <a:r>
-                  <a:rPr/>
-                  <a:t>If an entity with the given “id” exists, update such entity in the graph</a:t>
-                </a:r>
-              </a:p>
-              <a:p>
-                <a:pPr lvl="0" indent="0" marL="0">
-                  <a:spcBef>
-                    <a:spcPts val="3000"/>
-                  </a:spcBef>
-                  <a:buNone/>
-                </a:pPr>
-                <a:r>
-                  <a:rPr b="1"/>
-                  <a:t>Parsing into measurement</a:t>
-                </a:r>
-              </a:p>
-              <a:p>
-                <a:pPr lvl="0" indent="0" marL="0">
-                  <a:buNone/>
-                </a:pPr>
-                <a:r>
-                  <a:rPr/>
-                  <a:t>Measurement = TimescaleTable(timestamp, device_id, controlledProperty, value, raw_value)</a:t>
-                </a:r>
-              </a:p>
-              <a:p>
-                <a:pPr lvl="0"/>
-                <a:r>
-                  <a:rPr/>
-                  <a:t>A mapping can defined for each entity “type”: it’s a Python functions that extracts the measurements from a JSON entity with the Measurement table structure</a:t>
-                </a:r>
-              </a:p>
-              <a:p>
-                <a:pPr lvl="0" indent="0" marL="0">
-                  <a:spcBef>
-                    <a:spcPts val="3000"/>
-                  </a:spcBef>
-                  <a:buNone/>
-                </a:pPr>
-                <a:r>
-                  <a:rPr b="1"/>
-                  <a:t>Random considerations (constantly updated)</a:t>
-                </a:r>
-              </a:p>
               <a:p>
                 <a:pPr lvl="0" indent="0" marL="0">
                   <a:buNone/>

</xml_diff>

<commit_message>
Deploying to gh-pages from @ ManuelePasini/slides-markdown@689da8487b35d07def8652eb6553f439191a4978 🚀
</commit_message>
<xml_diff>
--- a/digital_twins.pptx
+++ b/digital_twins.pptx
@@ -8646,7 +8646,25 @@
             </a:pPr>
             <a:r>
               <a:rPr/>
-              <a:t>CREATE EXTENSION IF NOT EXISTS age; CREATE EXTENSION IF NOT EXISTS postgis; LOAD ‘age’; SET search_path = ag_catalog, “$user”, public; SELECT create_hypertable(‘measurements’, ‘timestamp’);</a:t>
+              <a:t>CREATE EXTENSION IF NOT EXISTS age; CREATE EXTENSION IF NOT EXISTS postgis; LOAD ‘age’; SET search_path = ag_catalog, “$user”, public;</a:t>
+            </a:r>
+          </a:p>
+          <a:p>
+            <a:pPr lvl="0" indent="0" marL="0">
+              <a:buNone/>
+            </a:pPr>
+            <a:r>
+              <a:rPr/>
+              <a:t>CREATE TABLE measurements( timestamp timestamp, device_id text, controlled_property text, location geometry, value float, raw_value text ) SELECT create_hypertable(‘measurements’, ‘timestamp’);</a:t>
+            </a:r>
+          </a:p>
+          <a:p>
+            <a:pPr lvl="0" indent="0" marL="0">
+              <a:buNone/>
+            </a:pPr>
+            <a:r>
+              <a:rPr/>
+              <a:t>ALTER TABLE measurement ADD PRIMARY KEY(timestamp, device_id, controlled_property)</a:t>
             </a:r>
           </a:p>
           <a:p>

</xml_diff>

<commit_message>
Deploying to gh-pages from @ ManuelePasini/slides-markdown@247bad2d38772bc4bb2560e8bb65eff92506ee41 🚀
</commit_message>
<xml_diff>
--- a/digital_twins.pptx
+++ b/digital_twins.pptx
@@ -8688,6 +8688,41 @@
               <a:t>Random considerations</a:t>
             </a:r>
           </a:p>
+          <a:p>
+            <a:pPr lvl="0"/>
+            <a:r>
+              <a:rPr/>
+              <a:t>Si Cypher dentro SQL, no SQL dentro Cypher</a:t>
+            </a:r>
+          </a:p>
+          <a:p>
+            <a:pPr lvl="0"/>
+            <a:r>
+              <a:rPr/>
+              <a:t>Comunque, Cypher lavora con json/agtype, SQL con relazionale -&gt; mismatch!</a:t>
+            </a:r>
+          </a:p>
+          <a:p>
+            <a:pPr lvl="0"/>
+            <a:r>
+              <a:rPr/>
+              <a:t>Devi sempre sapere cosa è sopra e cosa è sotto</a:t>
+            </a:r>
+          </a:p>
+          <a:p>
+            <a:pPr lvl="0"/>
+            <a:r>
+              <a:rPr/>
+              <a:t>La modellazione non è uniforme, ogni interazione tra i due modelli è ad-hoc: data una query, devo sempre capire se devo entrare dai meas o dal grafo e trovare il punto d’incontro (che è un join solitamente).</a:t>
+            </a:r>
+          </a:p>
+          <a:p>
+            <a:pPr lvl="0"/>
+            <a:r>
+              <a:rPr/>
+              <a:t>Se parti dal grafo arrivi ad un punto in cui joini sul relazionale, va fatta attenzione alla query su grafo in quanto è molto facile ritorni un insieme di valori ridondanti che fanno esplodere il tempo computazionale</a:t>
+            </a:r>
+          </a:p>
         </p:txBody>
       </p:sp>
     </p:spTree>

</xml_diff>

<commit_message>
Deploying to gh-pages from @ ManuelePasini/slides-markdown@8fc3fee66d31515985a6dc4cdf2fe2d64a7db171 🚀
</commit_message>
<xml_diff>
--- a/digital_twins.pptx
+++ b/digital_twins.pptx
@@ -41,7 +41,6 @@
     <p:sldId id="289" r:id="rId35"/>
     <p:sldId id="290" r:id="rId36"/>
     <p:sldId id="291" r:id="rId37"/>
-    <p:sldId id="292" r:id="rId38"/>
   </p:sldIdLst>
   <p:sldSz cx="9144000" cy="5143500" type="screen16x9"/>
   <p:notesSz cx="6858000" cy="9144000"/>
@@ -8464,13 +8463,6 @@
             </a:r>
           </a:p>
           <a:p>
-            <a:pPr lvl="0"/>
-            <a:r>
-              <a:rPr/>
-              <a:t>Cosa succede sul grafo se il nodo esiste già? Lo aggiorno, ma in che modo? Sovrascrivo il vecchio? Aggiungo le diff? E le diff in negativo vanno tolte? Cosa succede ai suoi archi? Se nella nuova versione non vedo un arco?</a:t>
-            </a:r>
-          </a:p>
-          <a:p>
             <a:pPr lvl="0" indent="0" marL="0">
               <a:spcBef>
                 <a:spcPts val="3000"/>
@@ -8545,7 +8537,7 @@
             <a:pPr lvl="1"/>
             <a:r>
               <a:rPr/>
-              <a:t>“type”: defines the label of the node in the graph.</a:t>
+              <a:t>“type”: defines the label of the node/edge in the graph.</a:t>
             </a:r>
           </a:p>
           <a:p>
@@ -8590,7 +8582,7 @@
             <a:pPr lvl="0"/>
             <a:r>
               <a:rPr/>
-              <a:t>Each entity key that has an ID as a value becomes an edge.</a:t>
+              <a:t>Each entity key that has an ID as a value becomes an edge with the key as the edge label.</a:t>
             </a:r>
           </a:p>
           <a:p>
@@ -8685,35 +8677,54 @@
             </a:pPr>
             <a:r>
               <a:rPr b="1"/>
-              <a:t>Random considerations</a:t>
-            </a:r>
-          </a:p>
-          <a:p>
-            <a:pPr lvl="0"/>
-            <a:r>
-              <a:rPr/>
-              <a:t>Si Cypher dentro SQL, no SQL dentro Cypher</a:t>
-            </a:r>
-          </a:p>
-          <a:p>
-            <a:pPr lvl="0"/>
-            <a:r>
-              <a:rPr/>
-              <a:t>Comunque, Cypher lavora con json/agtype, SQL con relazionale -&gt; mismatch!</a:t>
-            </a:r>
-          </a:p>
-          <a:p>
-            <a:pPr lvl="0"/>
-            <a:r>
-              <a:rPr/>
-              <a:t>Devi sempre sapere cosa è sopra e cosa è sotto</a:t>
-            </a:r>
-          </a:p>
-          <a:p>
-            <a:pPr lvl="0"/>
-            <a:r>
-              <a:rPr/>
-              <a:t>La modellazione non è uniforme, ogni interazione tra i due modelli è ad-hoc: data una query, devo sempre capire se devo entrare dai meas o dal grafo e trovare il punto d’incontro (che è un join solitamente).</a:t>
+              <a:t>Problematiche</a:t>
+            </a:r>
+          </a:p>
+          <a:p>
+            <a:pPr lvl="0" indent="0" marL="0">
+              <a:buNone/>
+            </a:pPr>
+            <a:r>
+              <a:rPr/>
+              <a:t>Tre cause delle problematiche: - Modellazione concettuale (e.g. no tipo di device in measurements) - Architetturale (Apache Age) - Ottimizzazione query (e.g. no tabella location ausiliaria)</a:t>
+            </a:r>
+          </a:p>
+          <a:p>
+            <a:pPr lvl="0" indent="0" marL="0">
+              <a:spcBef>
+                <a:spcPts val="3000"/>
+              </a:spcBef>
+              <a:buNone/>
+            </a:pPr>
+            <a:r>
+              <a:rPr b="1"/>
+              <a:t>Espressività</a:t>
+            </a:r>
+          </a:p>
+          <a:p>
+            <a:pPr lvl="0"/>
+            <a:r>
+              <a:rPr/>
+              <a:t>Mancanza di un’interfaccia uniforme sul modello, devi interfacciarti e integrare due tipologie di modelli dati diversi</a:t>
+            </a:r>
+          </a:p>
+          <a:p>
+            <a:pPr lvl="0"/>
+            <a:r>
+              <a:rPr/>
+              <a:t>No storicizzazione di ciò che non è measurement</a:t>
+            </a:r>
+          </a:p>
+          <a:p>
+            <a:pPr lvl="0" indent="0" marL="0">
+              <a:spcBef>
+                <a:spcPts val="3000"/>
+              </a:spcBef>
+              <a:buNone/>
+            </a:pPr>
+            <a:r>
+              <a:rPr b="1"/>
+              <a:t>Modellazione</a:t>
             </a:r>
           </a:p>
           <a:p>
@@ -8723,996 +8734,107 @@
               <a:t>Se parti dal grafo arrivi ad un punto in cui joini sul relazionale, va fatta attenzione alla query su grafo in quanto è molto facile ritorni un insieme di valori ridondanti che fanno esplodere il tempo computazionale</a:t>
             </a:r>
           </a:p>
-        </p:txBody>
-      </p:sp>
-    </p:spTree>
-  </p:cSld>
-</p:sld>
-</file>
-
-<file path=ppt/slides/slide37.xml><?xml version="1.0" encoding="utf-8"?>
-<p:sld xmlns:a="http://schemas.openxmlformats.org/drawingml/2006/main" xmlns:r="http://schemas.openxmlformats.org/officeDocument/2006/relationships" xmlns:p="http://schemas.openxmlformats.org/presentationml/2006/main">
-  <p:cSld>
-    <p:spTree>
-      <p:nvGrpSpPr>
-        <p:cNvPr id="1" name=""/>
-        <p:cNvGrpSpPr/>
-        <p:nvPr/>
-      </p:nvGrpSpPr>
-      <p:grpSpPr>
-        <a:xfrm>
-          <a:off x="0" y="0"/>
-          <a:ext cx="0" cy="0"/>
-          <a:chOff x="0" y="0"/>
-          <a:chExt cx="0" cy="0"/>
-        </a:xfrm>
-      </p:grpSpPr>
-      <p:sp>
-        <p:nvSpPr>
-          <p:cNvPr id="2" name="Title 1"/>
-          <p:cNvSpPr>
-            <a:spLocks noGrp="1"/>
-          </p:cNvSpPr>
-          <p:nvPr>
-            <p:ph type="title"/>
-          </p:nvPr>
-        </p:nvSpPr>
-        <p:spPr/>
-        <p:txBody>
-          <a:bodyPr/>
-          <a:lstStyle/>
+          <a:p>
+            <a:pPr lvl="0"/>
+            <a:r>
+              <a:rPr/>
+              <a:t>Cosa succede sul grafo se il nodo esiste già? Lo aggiorno, ma in che modo? Sovrascrivo il vecchio? Aggiungo le diff? E le diff in negativo vanno tolte? Cosa succede ai suoi archi? Se nella nuova versione non vedo un arco?</a:t>
+            </a:r>
+          </a:p>
           <a:p>
             <a:pPr lvl="0" indent="0" marL="0">
-              <a:buNone/>
-            </a:pPr>
-            <a:r>
-              <a:rPr/>
+              <a:spcBef>
+                <a:spcPts val="3000"/>
+              </a:spcBef>
+              <a:buNone/>
+            </a:pPr>
+            <a:r>
+              <a:rPr b="1"/>
               <a:t>Random considerations (constantly updated)</a:t>
             </a:r>
           </a:p>
-        </p:txBody>
-      </p:sp>
-      <mc:AlternateContent xmlns:mc="http://schemas.openxmlformats.org/markup-compatibility/2006">
-        <mc:Choice xmlns:a14="http://schemas.microsoft.com/office/drawing/2010/main" Requires="a14">
-          <p:sp>
-            <p:nvSpPr>
-              <p:cNvPr id="3" name="Content Placeholder 2"/>
-              <p:cNvSpPr>
-                <a:spLocks noGrp="1"/>
-              </p:cNvSpPr>
-              <p:nvPr>
-                <p:ph idx="1"/>
-              </p:nvPr>
-            </p:nvSpPr>
-            <p:spPr/>
-            <p:txBody>
-              <a:bodyPr/>
-              <a:lstStyle/>
-              <a:p>
-                <a:pPr lvl="0" indent="0" marL="0">
-                  <a:buNone/>
-                </a:pPr>
-                <a:r>
-                  <a:rPr/>
-                  <a:t>Se la property è una e ha un array di valori, come la storicizzo? e.g. status del robot, la mia chiave è timestamp,device,property…</a:t>
-                </a:r>
-              </a:p>
-              <a:p>
-                <a:pPr lvl="0" indent="0" marL="0">
-                  <a:buNone/>
-                </a:pPr>
-                <a:r>
-                  <a:rPr/>
-                  <a:t>Il protocollo per estrarre i measurement di un device, vale anche per i suoi subdevice?</a:t>
-                </a:r>
-              </a:p>
-              <a:p>
-                <a:pPr lvl="0" indent="0" marL="0">
-                  <a:buNone/>
-                </a:pPr>
-                <a:r>
-                  <a:rPr/>
-                  <a:t>CREATE EXTENSION IF NOT EXISTS age; CREATE EXTENSION IF NOT EXISTS postgis; LOAD ‘age’;</a:t>
-                </a:r>
-              </a:p>
-              <a:p>
-                <a:pPr lvl="0" indent="0" marL="0">
-                  <a:buNone/>
-                </a:pPr>
-                <a:r>
-                  <a:rPr/>
-                  <a:t>SET search_path = ag_catalog, “$user”, public;</a:t>
-                </a:r>
-              </a:p>
-              <a:p>
-                <a:pPr lvl="0" indent="0" marL="0">
-                  <a:buNone/>
-                </a:pPr>
-                <a:r>
-                  <a:rPr/>
-                  <a:t>SELECT postgis_full_version();</a:t>
-                </a:r>
-              </a:p>
-              <a:p>
-                <a:pPr lvl="0" indent="0" marL="0">
-                  <a:buNone/>
-                </a:pPr>
-                <a:r>
-                  <a:rPr/>
-                  <a:t>SELECT * FROM cypher(‘watering_adf_graph’,</a:t>
-                </a:r>
-              </a:p>
-              <a:p>
-                <a:pPr lvl="0" indent="0" marL="0">
-                  <a:buNone/>
-                </a:pPr>
-                <a14:m>
-                  <m:oMathPara xmlns:m="http://schemas.openxmlformats.org/officeDocument/2006/math">
-                    <m:oMathParaPr>
-                      <m:jc m:val="center"/>
-                    </m:oMathParaPr>
-                    <m:oMath>
-                      <m:r>
-                        <m:t>M</m:t>
-                      </m:r>
-                      <m:r>
-                        <m:t>A</m:t>
-                      </m:r>
-                      <m:r>
-                        <m:t>T</m:t>
-                      </m:r>
-                      <m:r>
-                        <m:t>C</m:t>
-                      </m:r>
-                      <m:r>
-                        <m:t>H</m:t>
-                      </m:r>
-                      <m:d>
-                        <m:dPr>
-                          <m:begChr m:val="("/>
-                          <m:endChr m:val=")"/>
-                          <m:sepChr m:val=""/>
-                          <m:grow/>
-                        </m:dPr>
-                        <m:e>
-                          <m:r>
-                            <m:t>v</m:t>
-                          </m:r>
-                          <m:r>
-                            <m:rPr>
-                              <m:sty m:val="p"/>
-                            </m:rPr>
-                            <m:t>:</m:t>
-                          </m:r>
-                          <m:r>
-                            <m:t>t</m:t>
-                          </m:r>
-                          <m:r>
-                            <m:t>e</m:t>
-                          </m:r>
-                          <m:r>
-                            <m:t>s</m:t>
-                          </m:r>
-                          <m:sSub>
-                            <m:e>
-                              <m:r>
-                                <m:t>t</m:t>
-                              </m:r>
-                            </m:e>
-                            <m:sub>
-                              <m:r>
-                                <m:t>n</m:t>
-                              </m:r>
-                            </m:sub>
-                          </m:sSub>
-                          <m:r>
-                            <m:t>o</m:t>
-                          </m:r>
-                          <m:r>
-                            <m:t>d</m:t>
-                          </m:r>
-                          <m:r>
-                            <m:t>e</m:t>
-                          </m:r>
-                        </m:e>
-                      </m:d>
-                      <m:r>
-                        <m:t>D</m:t>
-                      </m:r>
-                      <m:r>
-                        <m:t>E</m:t>
-                      </m:r>
-                      <m:r>
-                        <m:t>L</m:t>
-                      </m:r>
-                      <m:r>
-                        <m:t>E</m:t>
-                      </m:r>
-                      <m:r>
-                        <m:t>T</m:t>
-                      </m:r>
-                      <m:r>
-                        <m:t>E</m:t>
-                      </m:r>
-                      <m:r>
-                        <m:t>v</m:t>
-                      </m:r>
-                    </m:oMath>
-                  </m:oMathPara>
-                </a14:m>
-              </a:p>
-              <a:p>
-                <a:pPr lvl="0" indent="0" marL="0">
-                  <a:buNone/>
-                </a:pPr>
-                <a:r>
-                  <a:rPr/>
-                  <a:t>) as (v agtype);</a:t>
-                </a:r>
-              </a:p>
-              <a:p>
-                <a:pPr lvl="0" indent="0" marL="0">
-                  <a:buNone/>
-                </a:pPr>
-                <a:r>
-                  <a:rPr/>
-                  <a:t>SELECT * FROM cypher(‘watering_adf_graph’,</a:t>
-                </a:r>
-              </a:p>
-              <a:p>
-                <a:pPr lvl="0" indent="0" marL="0">
-                  <a:buNone/>
-                </a:pPr>
-                <a14:m>
-                  <m:oMathPara xmlns:m="http://schemas.openxmlformats.org/officeDocument/2006/math">
-                    <m:oMathParaPr>
-                      <m:jc m:val="center"/>
-                    </m:oMathParaPr>
-                    <m:oMath>
-                      <m:r>
-                        <m:t>M</m:t>
-                      </m:r>
-                      <m:r>
-                        <m:t>A</m:t>
-                      </m:r>
-                      <m:r>
-                        <m:t>T</m:t>
-                      </m:r>
-                      <m:r>
-                        <m:t>C</m:t>
-                      </m:r>
-                      <m:r>
-                        <m:t>H</m:t>
-                      </m:r>
-                      <m:d>
-                        <m:dPr>
-                          <m:begChr m:val="("/>
-                          <m:endChr m:val=")"/>
-                          <m:sepChr m:val=""/>
-                          <m:grow/>
-                        </m:dPr>
-                        <m:e>
-                          <m:r>
-                            <m:t>v</m:t>
-                          </m:r>
-                        </m:e>
-                      </m:d>
-                      <m:r>
-                        <m:t>D</m:t>
-                      </m:r>
-                      <m:r>
-                        <m:t>E</m:t>
-                      </m:r>
-                      <m:r>
-                        <m:t>T</m:t>
-                      </m:r>
-                      <m:r>
-                        <m:t>A</m:t>
-                      </m:r>
-                      <m:r>
-                        <m:t>C</m:t>
-                      </m:r>
-                      <m:r>
-                        <m:t>H</m:t>
-                      </m:r>
-                      <m:r>
-                        <m:t>D</m:t>
-                      </m:r>
-                      <m:r>
-                        <m:t>E</m:t>
-                      </m:r>
-                      <m:r>
-                        <m:t>L</m:t>
-                      </m:r>
-                      <m:r>
-                        <m:t>E</m:t>
-                      </m:r>
-                      <m:r>
-                        <m:t>T</m:t>
-                      </m:r>
-                      <m:r>
-                        <m:t>E</m:t>
-                      </m:r>
-                      <m:r>
-                        <m:t>v</m:t>
-                      </m:r>
-                    </m:oMath>
-                  </m:oMathPara>
-                </a14:m>
-              </a:p>
-              <a:p>
-                <a:pPr lvl="0" indent="0" marL="0">
-                  <a:buNone/>
-                </a:pPr>
-                <a:r>
-                  <a:rPr/>
-                  <a:t>) as (v agtype);</a:t>
-                </a:r>
-              </a:p>
-              <a:p>
-                <a:pPr lvl="0" indent="0" marL="0">
-                  <a:buNone/>
-                </a:pPr>
-                <a:r>
-                  <a:rPr/>
-                  <a:t>SELECT * FROM ag_catalog.drop_graph(‘watering_adf_graph’, cascade := true);</a:t>
-                </a:r>
-              </a:p>
-              <a:p>
-                <a:pPr lvl="0" indent="0" marL="0">
-                  <a:buNone/>
-                </a:pPr>
-                <a:r>
-                  <a:rPr/>
-                  <a:t>CREATE TABLE Measurements( timestamp timestamp NOT NULL, device_id text NOT NULL, controlledProperty text NOT NULL, location geometry, value float NOT NULL )</a:t>
-                </a:r>
-              </a:p>
-              <a:p>
-                <a:pPr lvl="0" indent="0" marL="0">
-                  <a:buNone/>
-                </a:pPr>
-                <a:r>
-                  <a:rPr/>
-                  <a:t>SELECT create_hypertable(‘Measurements’, ‘timestamp’); SELECT * from measurements INSERT INTO ag_catalog.measurements VALUES (to_timestamp(1717541105.0), ‘urn:ngsi-ld:Device:unibo:f7b82d1d75e79188f5efc73c7a6d34f6’, ‘wind_gust_max’, ST_GeomFromGeoJSON(‘{“type”: “Point”, “coordinates”: [11.798998, 44.235024]}’), 0)</a:t>
-                </a:r>
-              </a:p>
-              <a:p>
-                <a:pPr lvl="0" indent="0" marL="0">
-                  <a:buNone/>
-                </a:pPr>
-                <a:r>
-                  <a:rPr/>
-                  <a:t>SELECT * FROM cypher(‘watering_adf_graph’,</a:t>
-                </a:r>
-              </a:p>
-              <a:p>
-                <a:pPr lvl="0" indent="0" marL="0">
-                  <a:buNone/>
-                </a:pPr>
-                <a14:m>
-                  <m:oMathPara xmlns:m="http://schemas.openxmlformats.org/officeDocument/2006/math">
-                    <m:oMathParaPr>
-                      <m:jc m:val="center"/>
-                    </m:oMathParaPr>
-                    <m:oMath>
-                      <m:r>
-                        <m:t>M</m:t>
-                      </m:r>
-                      <m:r>
-                        <m:t>A</m:t>
-                      </m:r>
-                      <m:r>
-                        <m:t>T</m:t>
-                      </m:r>
-                      <m:r>
-                        <m:t>C</m:t>
-                      </m:r>
-                      <m:r>
-                        <m:t>H</m:t>
-                      </m:r>
-                      <m:d>
-                        <m:dPr>
-                          <m:begChr m:val="("/>
-                          <m:endChr m:val=")"/>
-                          <m:sepChr m:val=""/>
-                          <m:grow/>
-                        </m:dPr>
-                        <m:e>
-                          <m:r>
-                            <m:t>n</m:t>
-                          </m:r>
-                        </m:e>
-                      </m:d>
-                      <m:r>
-                        <m:t>W</m:t>
-                      </m:r>
-                      <m:r>
-                        <m:t>H</m:t>
-                      </m:r>
-                      <m:r>
-                        <m:t>E</m:t>
-                      </m:r>
-                      <m:r>
-                        <m:t>R</m:t>
-                      </m:r>
-                      <m:r>
-                        <m:t>E</m:t>
-                      </m:r>
-                      <m:r>
-                        <m:t>n</m:t>
-                      </m:r>
-                      <m:r>
-                        <m:rPr>
-                          <m:sty m:val="p"/>
-                        </m:rPr>
-                        <m:t>.</m:t>
-                      </m:r>
-                      <m:r>
-                        <m:t>i</m:t>
-                      </m:r>
-                      <m:r>
-                        <m:t>d</m:t>
-                      </m:r>
-                      <m:r>
-                        <m:rPr>
-                          <m:sty m:val="p"/>
-                        </m:rPr>
-                        <m:t>=</m:t>
-                      </m:r>
-                      <m:r>
-                        <m:rPr>
-                          <m:sty m:val="p"/>
-                        </m:rPr>
-                        <m:t>′</m:t>
-                      </m:r>
-                      <m:r>
-                        <m:t>u</m:t>
-                      </m:r>
-                      <m:r>
-                        <m:t>r</m:t>
-                      </m:r>
-                      <m:r>
-                        <m:t>n</m:t>
-                      </m:r>
-                      <m:r>
-                        <m:rPr>
-                          <m:sty m:val="p"/>
-                        </m:rPr>
-                        <m:t>:</m:t>
-                      </m:r>
-                      <m:r>
-                        <m:t>n</m:t>
-                      </m:r>
-                      <m:r>
-                        <m:t>g</m:t>
-                      </m:r>
-                      <m:r>
-                        <m:t>s</m:t>
-                      </m:r>
-                      <m:r>
-                        <m:t>i</m:t>
-                      </m:r>
-                      <m:r>
-                        <m:rPr>
-                          <m:sty m:val="p"/>
-                        </m:rPr>
-                        <m:t>−</m:t>
-                      </m:r>
-                      <m:r>
-                        <m:t>l</m:t>
-                      </m:r>
-                      <m:r>
-                        <m:t>d</m:t>
-                      </m:r>
-                      <m:r>
-                        <m:rPr>
-                          <m:sty m:val="p"/>
-                        </m:rPr>
-                        <m:t>:</m:t>
-                      </m:r>
-                      <m:r>
-                        <m:t>D</m:t>
-                      </m:r>
-                      <m:r>
-                        <m:t>e</m:t>
-                      </m:r>
-                      <m:r>
-                        <m:t>v</m:t>
-                      </m:r>
-                      <m:r>
-                        <m:t>i</m:t>
-                      </m:r>
-                      <m:r>
-                        <m:t>c</m:t>
-                      </m:r>
-                      <m:r>
-                        <m:t>e</m:t>
-                      </m:r>
-                      <m:r>
-                        <m:rPr>
-                          <m:sty m:val="p"/>
-                        </m:rPr>
-                        <m:t>:</m:t>
-                      </m:r>
-                      <m:r>
-                        <m:t>u</m:t>
-                      </m:r>
-                      <m:r>
-                        <m:t>n</m:t>
-                      </m:r>
-                      <m:r>
-                        <m:t>i</m:t>
-                      </m:r>
-                      <m:r>
-                        <m:t>b</m:t>
-                      </m:r>
-                      <m:r>
-                        <m:t>o</m:t>
-                      </m:r>
-                      <m:r>
-                        <m:rPr>
-                          <m:sty m:val="p"/>
-                        </m:rPr>
-                        <m:t>:</m:t>
-                      </m:r>
-                      <m:r>
-                        <m:t>a</m:t>
-                      </m:r>
-                      <m:r>
-                        <m:t>c</m:t>
-                      </m:r>
-                      <m:r>
-                        <m:t>e</m:t>
-                      </m:r>
-                      <m:r>
-                        <m:t>4</m:t>
-                      </m:r>
-                      <m:r>
-                        <m:t>b</m:t>
-                      </m:r>
-                      <m:r>
-                        <m:t>1</m:t>
-                      </m:r>
-                      <m:r>
-                        <m:t>a</m:t>
-                      </m:r>
-                      <m:r>
-                        <m:t>d</m:t>
-                      </m:r>
-                      <m:r>
-                        <m:t>b</m:t>
-                      </m:r>
-                      <m:r>
-                        <m:t>69</m:t>
-                      </m:r>
-                      <m:r>
-                        <m:t>d</m:t>
-                      </m:r>
-                      <m:r>
-                        <m:t>a</m:t>
-                      </m:r>
-                      <m:r>
-                        <m:t>4</m:t>
-                      </m:r>
-                      <m:r>
-                        <m:t>c</m:t>
-                      </m:r>
-                      <m:r>
-                        <m:t>71</m:t>
-                      </m:r>
-                      <m:r>
-                        <m:t>c</m:t>
-                      </m:r>
-                      <m:r>
-                        <m:t>3</m:t>
-                      </m:r>
-                      <m:r>
-                        <m:t>e</m:t>
-                      </m:r>
-                      <m:r>
-                        <m:t>02</m:t>
-                      </m:r>
-                      <m:r>
-                        <m:t>e</m:t>
-                      </m:r>
-                      <m:r>
-                        <m:t>6509</m:t>
-                      </m:r>
-                      <m:r>
-                        <m:t>e</m:t>
-                      </m:r>
-                      <m:r>
-                        <m:t>859</m:t>
-                      </m:r>
-                      <m:r>
-                        <m:t>e</m:t>
-                      </m:r>
-                      <m:r>
-                        <m:rPr>
-                          <m:sty m:val="p"/>
-                        </m:rPr>
-                        <m:t>′</m:t>
-                      </m:r>
-                      <m:r>
-                        <m:t>D</m:t>
-                      </m:r>
-                      <m:r>
-                        <m:t>E</m:t>
-                      </m:r>
-                      <m:r>
-                        <m:t>T</m:t>
-                      </m:r>
-                      <m:r>
-                        <m:t>A</m:t>
-                      </m:r>
-                      <m:r>
-                        <m:t>C</m:t>
-                      </m:r>
-                      <m:r>
-                        <m:t>H</m:t>
-                      </m:r>
-                      <m:r>
-                        <m:t>D</m:t>
-                      </m:r>
-                      <m:r>
-                        <m:t>E</m:t>
-                      </m:r>
-                      <m:r>
-                        <m:t>L</m:t>
-                      </m:r>
-                      <m:r>
-                        <m:t>E</m:t>
-                      </m:r>
-                      <m:r>
-                        <m:t>T</m:t>
-                      </m:r>
-                      <m:r>
-                        <m:t>E</m:t>
-                      </m:r>
-                      <m:r>
-                        <m:t>n</m:t>
-                      </m:r>
-                    </m:oMath>
-                  </m:oMathPara>
-                </a14:m>
-              </a:p>
-              <a:p>
-                <a:pPr lvl="0" indent="0" marL="0">
-                  <a:buNone/>
-                </a:pPr>
-                <a:r>
-                  <a:rPr/>
-                  <a:t>) AS (n agtype);</a:t>
-                </a:r>
-              </a:p>
-              <a:p>
-                <a:pPr lvl="0" indent="0" marL="0">
-                  <a:buNone/>
-                </a:pPr>
-                <a:r>
-                  <a:rPr/>
-                  <a:t>SELECT * FROM cypher(‘watering_adf_graph’,</a:t>
-                </a:r>
-              </a:p>
-              <a:p>
-                <a:pPr lvl="0" indent="0" marL="0">
-                  <a:buNone/>
-                </a:pPr>
-                <a14:m>
-                  <m:oMathPara xmlns:m="http://schemas.openxmlformats.org/officeDocument/2006/math">
-                    <m:oMathParaPr>
-                      <m:jc m:val="center"/>
-                    </m:oMathParaPr>
-                    <m:oMath>
-                      <m:r>
-                        <m:t>M</m:t>
-                      </m:r>
-                      <m:r>
-                        <m:t>A</m:t>
-                      </m:r>
-                      <m:r>
-                        <m:t>T</m:t>
-                      </m:r>
-                      <m:r>
-                        <m:t>C</m:t>
-                      </m:r>
-                      <m:r>
-                        <m:t>H</m:t>
-                      </m:r>
-                      <m:d>
-                        <m:dPr>
-                          <m:begChr m:val="("/>
-                          <m:endChr m:val=")"/>
-                          <m:sepChr m:val=""/>
-                          <m:grow/>
-                        </m:dPr>
-                        <m:e>
-                          <m:r>
-                            <m:t>n</m:t>
-                          </m:r>
-                          <m:r>
-                            <m:rPr>
-                              <m:sty m:val="p"/>
-                            </m:rPr>
-                            <m:t>:</m:t>
-                          </m:r>
-                          <m:r>
-                            <m:t>D</m:t>
-                          </m:r>
-                          <m:r>
-                            <m:t>e</m:t>
-                          </m:r>
-                          <m:r>
-                            <m:t>v</m:t>
-                          </m:r>
-                          <m:r>
-                            <m:t>i</m:t>
-                          </m:r>
-                          <m:r>
-                            <m:t>c</m:t>
-                          </m:r>
-                          <m:r>
-                            <m:t>e</m:t>
-                          </m:r>
-                        </m:e>
-                      </m:d>
-                      <m:r>
-                        <m:t>R</m:t>
-                      </m:r>
-                      <m:r>
-                        <m:t>E</m:t>
-                      </m:r>
-                      <m:r>
-                        <m:t>T</m:t>
-                      </m:r>
-                      <m:r>
-                        <m:t>U</m:t>
-                      </m:r>
-                      <m:r>
-                        <m:t>R</m:t>
-                      </m:r>
-                      <m:r>
-                        <m:t>N</m:t>
-                      </m:r>
-                      <m:r>
-                        <m:t>n</m:t>
-                      </m:r>
-                      <m:r>
-                        <m:rPr>
-                          <m:sty m:val="p"/>
-                        </m:rPr>
-                        <m:t>.</m:t>
-                      </m:r>
-                      <m:r>
-                        <m:t>l</m:t>
-                      </m:r>
-                      <m:r>
-                        <m:t>o</m:t>
-                      </m:r>
-                      <m:r>
-                        <m:t>c</m:t>
-                      </m:r>
-                      <m:r>
-                        <m:t>a</m:t>
-                      </m:r>
-                      <m:r>
-                        <m:t>t</m:t>
-                      </m:r>
-                      <m:r>
-                        <m:t>i</m:t>
-                      </m:r>
-                      <m:r>
-                        <m:t>o</m:t>
-                      </m:r>
-                      <m:r>
-                        <m:t>n</m:t>
-                      </m:r>
-                      <m:r>
-                        <m:rPr>
-                          <m:sty m:val="p"/>
-                        </m:rPr>
-                        <m:t>.</m:t>
-                      </m:r>
-                      <m:r>
-                        <m:t>c</m:t>
-                      </m:r>
-                      <m:r>
-                        <m:t>o</m:t>
-                      </m:r>
-                      <m:r>
-                        <m:t>o</m:t>
-                      </m:r>
-                      <m:r>
-                        <m:t>r</m:t>
-                      </m:r>
-                      <m:r>
-                        <m:t>d</m:t>
-                      </m:r>
-                      <m:r>
-                        <m:t>i</m:t>
-                      </m:r>
-                      <m:r>
-                        <m:t>n</m:t>
-                      </m:r>
-                      <m:r>
-                        <m:t>a</m:t>
-                      </m:r>
-                      <m:r>
-                        <m:t>t</m:t>
-                      </m:r>
-                      <m:r>
-                        <m:t>e</m:t>
-                      </m:r>
-                      <m:r>
-                        <m:t>s</m:t>
-                      </m:r>
-                      <m:d>
-                        <m:dPr>
-                          <m:begChr m:val="["/>
-                          <m:endChr m:val="]"/>
-                          <m:sepChr m:val=""/>
-                          <m:grow/>
-                        </m:dPr>
-                        <m:e>
-                          <m:r>
-                            <m:t>0</m:t>
-                          </m:r>
-                        </m:e>
-                      </m:d>
-                    </m:oMath>
-                  </m:oMathPara>
-                </a14:m>
-              </a:p>
-              <a:p>
-                <a:pPr lvl="0" indent="0" marL="0">
-                  <a:buNone/>
-                </a:pPr>
-                <a:r>
-                  <a:rPr/>
-                  <a:t>) AS (n agtype);</a:t>
-                </a:r>
-              </a:p>
-              <a:p>
-                <a:pPr lvl="0" indent="0" marL="0">
-                  <a:buNone/>
-                </a:pPr>
-                <a:r>
-                  <a:rPr/>
-                  <a:t>create table spatial_measurements ( timestamp timestamp DEFAULT CURRENT_TIMESTAMP, device_id text, controlled_property text, location geometry, value float );</a:t>
-                </a:r>
-              </a:p>
-              <a:p>
-                <a:pPr lvl="0" indent="0" marL="0">
-                  <a:buNone/>
-                </a:pPr>
-                <a:r>
-                  <a:rPr/>
-                  <a:t>CREATE INDEX geom_index ON spatial_measurements USING GIST (location);</a:t>
-                </a:r>
-              </a:p>
-              <a:p>
-                <a:pPr lvl="0" indent="0" marL="0">
-                  <a:buNone/>
-                </a:pPr>
-                <a:r>
-                  <a:rPr/>
-                  <a:t>SELECT * FROM cypher(‘watering_adf_graph’,</a:t>
-                </a:r>
-              </a:p>
-              <a:p>
-                <a:pPr lvl="0" indent="0" marL="0">
-                  <a:buNone/>
-                </a:pPr>
-                <a:r>
-                  <a:rPr/>
-                  <a:t>$$
-                MATCH (n:Device {id: 'urn:ngsi-ld:Device:unibo:a316ef4f55a925842cca39af7280f4d8'})
-                SET n.location = st_geomfromgeojson('{"type": "Point", "coordinates": [11.45345, 44.235024]}')
-                RETURN n
-                $$</a:t>
-                </a:r>
-              </a:p>
-              <a:p>
-                <a:pPr lvl="0" indent="0" marL="0">
-                  <a:buNone/>
-                </a:pPr>
-                <a:r>
-                  <a:rPr/>
-                  <a:t>) AS (ne agtype);</a:t>
-                </a:r>
-              </a:p>
-              <a:p>
-                <a:pPr lvl="0" indent="0" marL="0">
-                  <a:buNone/>
-                </a:pPr>
-                <a:r>
-                  <a:rPr/>
-                  <a:t>SELECT * FROM cypher(‘watering_adf_graph’,</a:t>
-                </a:r>
-              </a:p>
-              <a:p>
-                <a:pPr lvl="0" indent="0" marL="0">
-                  <a:buNone/>
-                </a:pPr>
-                <a:r>
-                  <a:rPr/>
-                  <a:t>$$
-                CREATE (n:Device {id: 'urn:ngsi-ld:Device:unibo:a316ef4f55a925842cca39af7280f4d8',
-                type: 'Device',
-                belongsTo: 'urn:ngsi-ld:AgriParcel:unibo:647c399b2188ff484f7416389f94885c',
-                controlledProperty: ['dripper'],
-                dateCreated: '2024-10-17T07:00:02',
-                dateObserved: '2024-10-15T12:45:09',
-                deviceCategory: ['sensor'],
-                domain: 'unibo',
-                location: st_geomfromtext('{"type": "Point", "coordinates": [11.798998, 44.235024]}'),
-                name: 'Dripper Fondo Errano 2024 T0 T0',
-                namespace: 'unibo.watering.',
-                unixtimestampCreated: 1729141203,
-                unixtimestampModified: 1728989109,
-                value: [0]})
-                RETURN n
-                $$</a:t>
-                </a:r>
-              </a:p>
-              <a:p>
-                <a:pPr lvl="0" indent="0" marL="0">
-                  <a:buNone/>
-                </a:pPr>
-                <a:r>
-                  <a:rPr/>
-                  <a:t>) AS (ne agtype);</a:t>
-                </a:r>
-              </a:p>
-              <a:p>
-                <a:pPr lvl="0" indent="0" marL="0">
-                  <a:buNone/>
-                </a:pPr>
-                <a:r>
-                  <a:rPr/>
-                  <a:t>INSERT INTO ag_catalog.measurements VALUES (to_timestamp(1728989109.0), ‘urn:ngsi-ld:Device:unibo:a316ef4f55a925842cca39af7280f4d8’, ‘dripper’, st_geomfromtext(‘POINT(11.798998 44.235024)’), 0)</a:t>
-                </a:r>
-              </a:p>
-              <a:p>
-                <a:pPr lvl="0" indent="0" marL="0">
-                  <a:buNone/>
-                </a:pPr>
-                <a:r>
-                  <a:rPr/>
-                  <a:t>SELECT * FROM cypher(‘watering_adf_graph’,</a:t>
-                </a:r>
-              </a:p>
-              <a:p>
-                <a:pPr lvl="0" indent="0" marL="0">
-                  <a:buNone/>
-                </a:pPr>
-                <a:r>
-                  <a:rPr/>
-                  <a:t>$$  
-MATCH (n:Device {id: 'urn:ngsi-ld:Device:unibo:a316ef4f55a925842cca39af7280f4d8'})
-SET n.id = 'urn:ngsi-ld:Device:unibo:a316ef4f55a925842cca39af7280f4d8',
-n.type = 'Device', n.belongsTo = 'urn:ngsi-ld:AgriParcel:unibo:647c399b2188ff484f7416389f94885c',
-n.controlledProperty = ['dripper'],
-n.dateCreated = '2024-10-17T07:00:02',
-n.dateObserved = '2024-10-15T12:45:09',
-n.deviceCategory = ['sensor'],
-n.domain = 'unibo',
-n.location = st_geomfromgeojson('{"type": "Point", "coordinates": [11.798998, 44.235024]}')::geometry, n.name = 'Dripper Fondo Errano 2024 T0 T0', n.namespace = 'unibo.watering.', n.unixtimestampCreated = 1729141203, n.unixtimestampModified = 1728989109, n.value = [0]                 RETURN n                 $$</a:t>
-                </a:r>
-              </a:p>
-              <a:p>
-                <a:pPr lvl="0" indent="0" marL="0">
-                  <a:buNone/>
-                </a:pPr>
-                <a:r>
-                  <a:rPr/>
-                  <a:t>) AS (n agtype);</a:t>
-                </a:r>
-              </a:p>
-            </p:txBody>
-          </p:sp>
-        </mc:Choice>
-      </mc:AlternateContent>
+          <a:p>
+            <a:pPr lvl="0" indent="0" marL="0">
+              <a:spcBef>
+                <a:spcPts val="3000"/>
+              </a:spcBef>
+              <a:buNone/>
+            </a:pPr>
+            <a:r>
+              <a:rPr b="1"/>
+              <a:t>Timescale DB</a:t>
+            </a:r>
+          </a:p>
+          <a:p>
+            <a:pPr lvl="0"/>
+            <a:r>
+              <a:rPr/>
+              <a:t>Based on hypertables</a:t>
+            </a:r>
+          </a:p>
+          <a:p>
+            <a:pPr lvl="1"/>
+            <a:r>
+              <a:rPr/>
+              <a:t>Logical table</a:t>
+            </a:r>
+          </a:p>
+          <a:p>
+            <a:pPr lvl="1"/>
+            <a:r>
+              <a:rPr/>
+              <a:t>Organizes the data in chunks (of a predefined time range) based on some column of the table</a:t>
+            </a:r>
+          </a:p>
+          <a:p>
+            <a:pPr lvl="0" indent="0" marL="0">
+              <a:spcBef>
+                <a:spcPts val="3000"/>
+              </a:spcBef>
+              <a:buNone/>
+            </a:pPr>
+            <a:r>
+              <a:rPr b="1"/>
+              <a:t>Query language</a:t>
+            </a:r>
+          </a:p>
+          <a:p>
+            <a:pPr lvl="0" indent="0" marL="0">
+              <a:buNone/>
+            </a:pPr>
+            <a:r>
+              <a:rPr/>
+              <a:t>Uses standard SQL with a few more operators:</a:t>
+            </a:r>
+          </a:p>
+          <a:p>
+            <a:pPr lvl="0"/>
+            <a:r>
+              <a:rPr/>
+              <a:t>time_bucket(‘1 hour’, column_name): same as date_trunc in postgres</a:t>
+            </a:r>
+          </a:p>
+          <a:p>
+            <a:pPr lvl="0" indent="0" marL="0">
+              <a:spcBef>
+                <a:spcPts val="3000"/>
+              </a:spcBef>
+              <a:buNone/>
+            </a:pPr>
+            <a:r>
+              <a:rPr b="1"/>
+              <a:t>Further functionalities</a:t>
+            </a:r>
+          </a:p>
+          <a:p>
+            <a:pPr lvl="0"/>
+            <a:r>
+              <a:rPr/>
+              <a:t>Hybrid row-column oriented data model + segmentby, orderby Timescale Hybrid model</a:t>
+            </a:r>
+          </a:p>
+        </p:txBody>
+      </p:sp>
     </p:spTree>
   </p:cSld>
 </p:sld>

</xml_diff>

<commit_message>
Deploying to gh-pages from @ ManuelePasini/slides-markdown@b9abac7496da9aff32c4281b861dd8e6dfde4015 🚀
</commit_message>
<xml_diff>
--- a/digital_twins.pptx
+++ b/digital_twins.pptx
@@ -8830,7 +8830,40 @@
             <a:pPr lvl="0"/>
             <a:r>
               <a:rPr/>
-              <a:t>Hybrid row-column oriented data model + segmentby, orderby Timescale Hybrid model</a:t>
+              <a:t>Hybrid row-column oriented data model: define a retention period where data older will be stored as column-oriented data Timescale Hybrid model</a:t>
+            </a:r>
+          </a:p>
+          <a:p>
+            <a:pPr lvl="0" indent="0" marL="0">
+              <a:spcBef>
+                <a:spcPts val="3000"/>
+              </a:spcBef>
+              <a:buNone/>
+            </a:pPr>
+            <a:r>
+              <a:rPr b="1"/>
+              <a:t>Hybrid model optimizations:</a:t>
+            </a:r>
+          </a:p>
+          <a:p>
+            <a:pPr lvl="0"/>
+            <a:r>
+              <a:rPr/>
+              <a:t>segmentby: partions data in a chunk based on [column1, …] Timescale Hybrid model</a:t>
+            </a:r>
+          </a:p>
+          <a:p>
+            <a:pPr lvl="0"/>
+            <a:r>
+              <a:rPr/>
+              <a:t>orderby: orders data within a chunk based on time and stores metadata w.r.t min/max values in the chunk (similar to Databricks data-skipping)</a:t>
+            </a:r>
+          </a:p>
+          <a:p>
+            <a:pPr lvl="0"/>
+            <a:r>
+              <a:rPr/>
+              <a:t>Together: data is first grouped by the segmentby column, then ordered based on the orderby parameter, and finally divided into smaller, timestamp-ordered “mini-batches,” each containing up to 1,000 rows.</a:t>
             </a:r>
           </a:p>
         </p:txBody>

</xml_diff>

<commit_message>
Deploying to gh-pages from @ ManuelePasini/slides-markdown@6e138f8ab84586637f2c06398d6f97a645b8db1c 🚀
</commit_message>
<xml_diff>
--- a/digital_twins.pptx
+++ b/digital_twins.pptx
@@ -41,6 +41,8 @@
     <p:sldId id="289" r:id="rId35"/>
     <p:sldId id="290" r:id="rId36"/>
     <p:sldId id="291" r:id="rId37"/>
+    <p:sldId id="292" r:id="rId38"/>
+    <p:sldId id="293" r:id="rId39"/>
   </p:sldIdLst>
   <p:sldSz cx="9144000" cy="5143500" type="screen16x9"/>
   <p:notesSz cx="6858000" cy="9144000"/>
@@ -8783,7 +8785,7 @@
             <a:pPr lvl="1"/>
             <a:r>
               <a:rPr/>
-              <a:t>Organizes the data in chunks (of a predefined time range) based on some column of the table</a:t>
+              <a:t>Organizes the data in chunks (of a predefined time range) based on some time/bigint column of the table</a:t>
             </a:r>
           </a:p>
           <a:p>
@@ -8826,13 +8828,133 @@
               <a:t>Further functionalities</a:t>
             </a:r>
           </a:p>
-          <a:p>
-            <a:pPr lvl="0"/>
-            <a:r>
-              <a:rPr/>
-              <a:t>Hybrid row-column oriented data model: define a retention period where data older will be stored as column-oriented data Timescale Hybrid model</a:t>
-            </a:r>
-          </a:p>
+        </p:txBody>
+      </p:sp>
+    </p:spTree>
+  </p:cSld>
+</p:sld>
+</file>
+
+<file path=ppt/slides/slide37.xml><?xml version="1.0" encoding="utf-8"?>
+<p:sld xmlns:a="http://schemas.openxmlformats.org/drawingml/2006/main" xmlns:r="http://schemas.openxmlformats.org/officeDocument/2006/relationships" xmlns:p="http://schemas.openxmlformats.org/presentationml/2006/main">
+  <p:cSld>
+    <p:spTree>
+      <p:nvGrpSpPr>
+        <p:cNvPr id="1" name=""/>
+        <p:cNvGrpSpPr/>
+        <p:nvPr/>
+      </p:nvGrpSpPr>
+      <p:grpSpPr>
+        <a:xfrm>
+          <a:off x="0" y="0"/>
+          <a:ext cx="0" cy="0"/>
+          <a:chOff x="0" y="0"/>
+          <a:chExt cx="0" cy="0"/>
+        </a:xfrm>
+      </p:grpSpPr>
+      <p:sp>
+        <p:nvSpPr>
+          <p:cNvPr id="3" name="Content Placeholder 2"/>
+          <p:cNvSpPr>
+            <a:spLocks noGrp="1"/>
+          </p:cNvSpPr>
+          <p:nvPr>
+            <p:ph idx="1" sz="half"/>
+          </p:nvPr>
+        </p:nvSpPr>
+        <p:spPr/>
+        <p:txBody>
+          <a:bodyPr/>
+          <a:lstStyle/>
+          <a:p>
+            <a:pPr lvl="0"/>
+            <a:r>
+              <a:rPr/>
+              <a:t>Hybrid row-column oriented data model: define a retention period where data older will be stored as column-oriented data.</a:t>
+            </a:r>
+          </a:p>
+          <a:p>
+            <a:pPr lvl="0"/>
+            <a:r>
+              <a:rPr/>
+              <a:t>Column-Oriented data can still be performed DML/DDL operations upon. Timescale Hybrid model</a:t>
+            </a:r>
+          </a:p>
+        </p:txBody>
+      </p:sp>
+      <p:sp>
+        <p:nvSpPr>
+          <p:cNvPr id="4" name="Content Placeholder 3"/>
+          <p:cNvSpPr>
+            <a:spLocks noGrp="1"/>
+          </p:cNvSpPr>
+          <p:nvPr>
+            <p:ph idx="2" sz="half"/>
+          </p:nvPr>
+        </p:nvSpPr>
+        <p:spPr/>
+        <p:txBody>
+          <a:bodyPr/>
+          <a:lstStyle/>
+          <a:p>
+            <a:pPr lvl="0"/>
+            <a:r>
+              <a:rPr/>
+              <a:t>segmentby: partions data in a chunk based on [column1, …] Timescale Hybrid model</a:t>
+            </a:r>
+          </a:p>
+          <a:p>
+            <a:pPr lvl="0"/>
+            <a:r>
+              <a:rPr/>
+              <a:t>orderby: orders data within a chunk based on time and stores metadata w.r.t min/max values in the chunk (similar to Databricks data-skipping)</a:t>
+            </a:r>
+          </a:p>
+          <a:p>
+            <a:pPr lvl="0"/>
+            <a:r>
+              <a:rPr/>
+              <a:t>Together: data is first grouped by the segmentby column, then ordered based on the orderby parameter, and finally divided into smaller, timestamp-ordered “mini-batches,” each containing up to 1,000 rows.</a:t>
+            </a:r>
+          </a:p>
+        </p:txBody>
+      </p:sp>
+    </p:spTree>
+  </p:cSld>
+</p:sld>
+</file>
+
+<file path=ppt/slides/slide38.xml><?xml version="1.0" encoding="utf-8"?>
+<p:sld xmlns:a="http://schemas.openxmlformats.org/drawingml/2006/main" xmlns:r="http://schemas.openxmlformats.org/officeDocument/2006/relationships" xmlns:p="http://schemas.openxmlformats.org/presentationml/2006/main">
+  <p:cSld>
+    <p:spTree>
+      <p:nvGrpSpPr>
+        <p:cNvPr id="1" name=""/>
+        <p:cNvGrpSpPr/>
+        <p:nvPr/>
+      </p:nvGrpSpPr>
+      <p:grpSpPr>
+        <a:xfrm>
+          <a:off x="0" y="0"/>
+          <a:ext cx="0" cy="0"/>
+          <a:chOff x="0" y="0"/>
+          <a:chExt cx="0" cy="0"/>
+        </a:xfrm>
+      </p:grpSpPr>
+      <p:sp>
+        <p:nvSpPr>
+          <p:cNvPr id="3" name="Content Placeholder 2"/>
+          <p:cNvSpPr>
+            <a:spLocks noGrp="1"/>
+          </p:cNvSpPr>
+          <p:nvPr>
+            <p:ph idx="1"/>
+          </p:nvPr>
+        </p:nvSpPr>
+        <p:spPr/>
+        <p:txBody>
+          <a:bodyPr/>
+          <a:lstStyle/>
           <a:p>
             <a:pPr lvl="0" indent="0" marL="0">
               <a:spcBef>
@@ -8843,27 +8965,6 @@
             <a:r>
               <a:rPr b="1"/>
               <a:t>Hybrid model optimizations:</a:t>
-            </a:r>
-          </a:p>
-          <a:p>
-            <a:pPr lvl="0"/>
-            <a:r>
-              <a:rPr/>
-              <a:t>segmentby: partions data in a chunk based on [column1, …] Timescale Hybrid model</a:t>
-            </a:r>
-          </a:p>
-          <a:p>
-            <a:pPr lvl="0"/>
-            <a:r>
-              <a:rPr/>
-              <a:t>orderby: orders data within a chunk based on time and stores metadata w.r.t min/max values in the chunk (similar to Databricks data-skipping)</a:t>
-            </a:r>
-          </a:p>
-          <a:p>
-            <a:pPr lvl="0"/>
-            <a:r>
-              <a:rPr/>
-              <a:t>Together: data is first grouped by the segmentby column, then ordered based on the orderby parameter, and finally divided into smaller, timestamp-ordered “mini-batches,” each containing up to 1,000 rows.</a:t>
             </a:r>
           </a:p>
         </p:txBody>

</xml_diff>

<commit_message>
Deploying to gh-pages from @ ManuelePasini/slides-markdown@01a5f562d006ad5308ac7baae605c4224e759d9e 🚀
</commit_message>
<xml_diff>
--- a/digital_twins.pptx
+++ b/digital_twins.pptx
@@ -8897,21 +8897,35 @@
           <a:bodyPr/>
           <a:lstStyle/>
           <a:p>
-            <a:pPr lvl="0"/>
-            <a:r>
-              <a:rPr/>
-              <a:t>segmentby: partions data in a chunk based on [column1, …] Timescale Hybrid model</a:t>
-            </a:r>
-          </a:p>
-          <a:p>
-            <a:pPr lvl="0"/>
-            <a:r>
-              <a:rPr/>
-              <a:t>orderby: orders data within a chunk based on time and stores metadata w.r.t min/max values in the chunk (similar to Databricks data-skipping)</a:t>
-            </a:r>
-          </a:p>
-          <a:p>
-            <a:pPr lvl="0"/>
+            <a:pPr lvl="0" indent="0" marL="0">
+              <a:spcBef>
+                <a:spcPts val="3000"/>
+              </a:spcBef>
+              <a:buNone/>
+            </a:pPr>
+            <a:r>
+              <a:rPr b="1"/>
+              <a:t>Hybrid model optimizations:</a:t>
+            </a:r>
+          </a:p>
+          <a:p>
+            <a:pPr lvl="0"/>
+            <a:r>
+              <a:rPr/>
+              <a:t>segmentby&lt;: partions data in a chunk based on [column1, …] Segmeny-by example</a:t>
+            </a:r>
+          </a:p>
+          <a:p>
+            <a:pPr lvl="0"/>
+            <a:r>
+              <a:rPr/>
+              <a:t>orderby&lt;: orders data within a chunk based on time and stores metadata w.r.t min/max values in the chunk (similar to Databricks data-skipping)</a:t>
+            </a:r>
+          </a:p>
+          <a:p>
+            <a:pPr lvl="0" indent="0" marL="0">
+              <a:buNone/>
+            </a:pPr>
             <a:r>
               <a:rPr/>
               <a:t>Together: data is first grouped by the segmentby column, then ordered based on the orderby parameter, and finally divided into smaller, timestamp-ordered “mini-batches,” each containing up to 1,000 rows.</a:t>
@@ -8964,7 +8978,99 @@
             </a:pPr>
             <a:r>
               <a:rPr b="1"/>
-              <a:t>Hybrid model optimizations:</a:t>
+              <a:t>Further functionalities</a:t>
+            </a:r>
+          </a:p>
+          <a:p>
+            <a:pPr lvl="0" indent="0" marL="0">
+              <a:spcBef>
+                <a:spcPts val="3000"/>
+              </a:spcBef>
+              <a:buNone/>
+            </a:pPr>
+            <a:r>
+              <a:rPr b="1"/>
+              <a:t>Continuous aggregates</a:t>
+            </a:r>
+          </a:p>
+          <a:p>
+            <a:pPr lvl="0"/>
+            <a:r>
+              <a:rPr/>
+              <a:t>Automatically (in background) maintain the results from the query.</a:t>
+            </a:r>
+          </a:p>
+          <a:p>
+            <a:pPr lvl="0"/>
+            <a:r>
+              <a:rPr/>
+              <a:t>TRefreshed automatically in the background as new data is added, or old data is modified.</a:t>
+            </a:r>
+          </a:p>
+        </p:txBody>
+      </p:sp>
+      <p:pic>
+        <p:nvPicPr>
+          <p:cNvPr descr="https://github.com/ManuelePasini/slides-markdown/blob/master/slides/images/dt/timescale/segmentby.png?raw=true" id="0" name="Picture 1"/>
+          <p:cNvPicPr>
+            <a:picLocks noGrp="1" noChangeAspect="1"/>
+          </p:cNvPicPr>
+          <p:nvPr/>
+        </p:nvPicPr>
+        <p:blipFill>
+          <a:blip r:embed="rId2"/>
+          <a:stretch>
+            <a:fillRect/>
+          </a:stretch>
+        </p:blipFill>
+        <p:spPr bwMode="auto">
+          <a:xfrm>
+            <a:off x="457200" y="1981200"/>
+            <a:ext cx="8229600" cy="1308100"/>
+          </a:xfrm>
+          <a:prstGeom prst="rect">
+            <a:avLst/>
+          </a:prstGeom>
+          <a:noFill/>
+          <a:ln w="9525">
+            <a:noFill/>
+            <a:headEnd/>
+            <a:tailEnd/>
+          </a:ln>
+        </p:spPr>
+      </p:pic>
+      <p:sp>
+        <p:nvSpPr>
+          <p:cNvPr id="1" name="TextBox 3"/>
+          <p:cNvSpPr txBox="1"/>
+          <p:nvPr/>
+        </p:nvSpPr>
+        <p:spPr>
+          <a:xfrm>
+            <a:off x="457200" y="4076700"/>
+            <a:ext cx="8229600" cy="508000"/>
+          </a:xfrm>
+          <a:prstGeom prst="rect">
+            <a:avLst/>
+          </a:prstGeom>
+          <a:noFill/>
+        </p:spPr>
+        <p:txBody>
+          <a:bodyPr/>
+          <a:lstStyle/>
+          <a:p>
+            <a:pPr lvl="0" indent="0" marL="0" algn="ctr">
+              <a:buNone/>
+            </a:pPr>
+            <a:r>
+              <a:rPr/>
+              <a:t>Creating a continuous view </a:t>
+            </a:r>
+            <a:r>
+              <a:rPr>
+                <a:hlinkClick r:id="rId3"/>
+              </a:rPr>
+              <a:t>doc</a:t>
             </a:r>
           </a:p>
         </p:txBody>

</xml_diff>

<commit_message>
Deploying to gh-pages from @ ManuelePasini/slides-markdown@ed7d8150046f1907f123f85b8f2024d418bd606f 🚀
</commit_message>
<xml_diff>
--- a/digital_twins.pptx
+++ b/digital_twins.pptx
@@ -8817,6 +8817,33 @@
             </a:r>
           </a:p>
           <a:p>
+            <a:pPr lvl="0"/>
+            <a:r>
+              <a:rPr>
+                <a:hlinkClick r:id="rId3"/>
+              </a:rPr>
+              <a:t>Hyperfunctions</a:t>
+            </a:r>
+            <a:r>
+              <a:rPr/>
+              <a:t>:</a:t>
+            </a:r>
+          </a:p>
+          <a:p>
+            <a:pPr lvl="1"/>
+            <a:r>
+              <a:rPr/>
+              <a:t>Time-weighted averages;</a:t>
+            </a:r>
+          </a:p>
+          <a:p>
+            <a:pPr lvl="1"/>
+            <a:r>
+              <a:rPr/>
+              <a:t>Percentile approximation;</a:t>
+            </a:r>
+          </a:p>
+          <a:p>
             <a:pPr lvl="0" indent="0" marL="0">
               <a:spcBef>
                 <a:spcPts val="3000"/>

</xml_diff>

<commit_message>
Deploying to gh-pages from @ ManuelePasini/slides-markdown@48414737e2e24f3f50bb5fd983d2616af83434e3 🚀
</commit_message>
<xml_diff>
--- a/digital_twins.pptx
+++ b/digital_twins.pptx
@@ -8789,6 +8789,13 @@
             </a:r>
           </a:p>
           <a:p>
+            <a:pPr lvl="1"/>
+            <a:r>
+              <a:rPr/>
+              <a:t>Support for distributed hypertables</a:t>
+            </a:r>
+          </a:p>
+          <a:p>
             <a:pPr lvl="0" indent="0" marL="0">
               <a:spcBef>
                 <a:spcPts val="3000"/>
@@ -8843,6 +8850,82 @@
               <a:t>Percentile approximation;</a:t>
             </a:r>
           </a:p>
+        </p:txBody>
+      </p:sp>
+      <p:pic>
+        <p:nvPicPr>
+          <p:cNvPr descr="https://github.com/ManuelePasini/slides-markdown/blob/master/slides/images/dt/timescale/hypertables.png?raw=true" id="0" name="Picture 1"/>
+          <p:cNvPicPr>
+            <a:picLocks noGrp="1" noChangeAspect="1"/>
+          </p:cNvPicPr>
+          <p:nvPr/>
+        </p:nvPicPr>
+        <p:blipFill>
+          <a:blip r:embed="rId4"/>
+          <a:stretch>
+            <a:fillRect/>
+          </a:stretch>
+        </p:blipFill>
+        <p:spPr bwMode="auto">
+          <a:xfrm>
+            <a:off x="4025900" y="1193800"/>
+            <a:ext cx="1092200" cy="2882900"/>
+          </a:xfrm>
+          <a:prstGeom prst="rect">
+            <a:avLst/>
+          </a:prstGeom>
+          <a:noFill/>
+          <a:ln w="9525">
+            <a:noFill/>
+            <a:headEnd/>
+            <a:tailEnd/>
+          </a:ln>
+        </p:spPr>
+      </p:pic>
+      <p:sp>
+        <p:nvSpPr>
+          <p:cNvPr id="1" name="TextBox 3"/>
+          <p:cNvSpPr txBox="1"/>
+          <p:nvPr/>
+        </p:nvSpPr>
+        <p:spPr>
+          <a:xfrm>
+            <a:off x="457200" y="4076700"/>
+            <a:ext cx="8229600" cy="508000"/>
+          </a:xfrm>
+          <a:prstGeom prst="rect">
+            <a:avLst/>
+          </a:prstGeom>
+          <a:noFill/>
+        </p:spPr>
+        <p:txBody>
+          <a:bodyPr/>
+          <a:lstStyle/>
+          <a:p>
+            <a:pPr lvl="0" indent="0" marL="0" algn="ctr">
+              <a:buNone/>
+            </a:pPr>
+            <a:r>
+              <a:rPr/>
+              <a:t>Timescale Hybrid model</a:t>
+            </a:r>
+          </a:p>
+        </p:txBody>
+      </p:sp>
+      <p:sp>
+        <p:nvSpPr>
+          <p:cNvPr id="3" name="Content Placeholder 2"/>
+          <p:cNvSpPr>
+            <a:spLocks noGrp="1"/>
+          </p:cNvSpPr>
+          <p:nvPr>
+            <p:ph idx="1"/>
+          </p:nvPr>
+        </p:nvSpPr>
+        <p:spPr/>
+        <p:txBody>
+          <a:bodyPr/>
+          <a:lstStyle/>
           <a:p>
             <a:pPr lvl="0" indent="0" marL="0">
               <a:spcBef>
@@ -9091,13 +9174,7 @@
             </a:pPr>
             <a:r>
               <a:rPr/>
-              <a:t>Creating a continuous view </a:t>
-            </a:r>
-            <a:r>
-              <a:rPr>
-                <a:hlinkClick r:id="rId3"/>
-              </a:rPr>
-              <a:t>doc</a:t>
+              <a:t>Creating a continuous view</a:t>
             </a:r>
           </a:p>
         </p:txBody>

</xml_diff>

<commit_message>
Deploying to gh-pages from @ ManuelePasini/slides-markdown@86d5cdc1962c229ab8aa19c3c685c72e4d02599d 🚀
</commit_message>
<xml_diff>
--- a/digital_twins.pptx
+++ b/digital_twins.pptx
@@ -8764,7 +8764,13 @@
             </a:pPr>
             <a:r>
               <a:rPr b="1"/>
-              <a:t>Timescale DB</a:t>
+              <a:t>Timescale DB </a:t>
+            </a:r>
+            <a:r>
+              <a:rPr b="1">
+                <a:hlinkClick r:id="rId3"/>
+              </a:rPr>
+              <a:t>doc</a:t>
             </a:r>
           </a:p>
           <a:p>
@@ -8793,6 +8799,13 @@
             <a:r>
               <a:rPr/>
               <a:t>Support for distributed hypertables</a:t>
+            </a:r>
+          </a:p>
+          <a:p>
+            <a:pPr lvl="1"/>
+            <a:r>
+              <a:rPr/>
+              <a:t>Supports a large set of PostgreSQL extensions (e.g. PostGIS, PostGIS_Raster)</a:t>
             </a:r>
           </a:p>
           <a:p>
@@ -8813,7 +8826,48 @@
             </a:pPr>
             <a:r>
               <a:rPr/>
-              <a:t>Uses standard SQL with a few more operators:</a:t>
+              <a:t>Uses standard SQL with a few more operators: :::: {.columns}</a:t>
+            </a:r>
+          </a:p>
+          <a:p>
+            <a:pPr lvl="0"/>
+            <a:r>
+              <a:rPr/>
+              <a:t>Hybrid row-column oriented data model: define a retention period where data older will be stored as column-oriented data.</a:t>
+            </a:r>
+          </a:p>
+          <a:p>
+            <a:pPr lvl="0"/>
+            <a:r>
+              <a:rPr/>
+              <a:t>Column-Oriented data can still be performed DML/DDL operations upon.</a:t>
+            </a:r>
+          </a:p>
+          <a:p>
+            <a:pPr lvl="0" indent="0" marL="0">
+              <a:buNone/>
+            </a:pPr>
+            <a:r>
+              <a:rPr/>
+              <a:t>Timescale Hybrid model</a:t>
+            </a:r>
+          </a:p>
+          <a:p>
+            <a:pPr lvl="0" indent="0" marL="0">
+              <a:buNone/>
+            </a:pPr>
+            <a:r>
+              <a:rPr/>
+              <a:t>Timescale Hybrid model</a:t>
+            </a:r>
+          </a:p>
+          <a:p>
+            <a:pPr lvl="0" indent="0" marL="0">
+              <a:buNone/>
+            </a:pPr>
+            <a:r>
+              <a:rPr/>
+              <a:t>::::</a:t>
             </a:r>
           </a:p>
           <a:p>
@@ -8827,7 +8881,7 @@
             <a:pPr lvl="0"/>
             <a:r>
               <a:rPr>
-                <a:hlinkClick r:id="rId3"/>
+                <a:hlinkClick r:id="rId4"/>
               </a:rPr>
               <a:t>Hyperfunctions</a:t>
             </a:r>
@@ -8854,14 +8908,14 @@
       </p:sp>
       <p:pic>
         <p:nvPicPr>
-          <p:cNvPr descr="https://github.com/ManuelePasini/slides-markdown/blob/master/slides/images/dt/timescale/hypertables.png?raw=true" id="0" name="Picture 1"/>
+          <p:cNvPr descr="https://github.com/ManuelePasini/slides-markdown/blob/master/slides/images/dt/timescale/hyperfunctions.png?raw=true" id="0" name="Picture 1"/>
           <p:cNvPicPr>
             <a:picLocks noGrp="1" noChangeAspect="1"/>
           </p:cNvPicPr>
           <p:nvPr/>
         </p:nvPicPr>
         <p:blipFill>
-          <a:blip r:embed="rId4"/>
+          <a:blip r:embed="rId5"/>
           <a:stretch>
             <a:fillRect/>
           </a:stretch>
@@ -8987,7 +9041,67 @@
             <a:pPr lvl="0"/>
             <a:r>
               <a:rPr/>
-              <a:t>Column-Oriented data can still be performed DML/DDL operations upon. Timescale Hybrid model</a:t>
+              <a:t>Column-Oriented data can still be performed DML/DDL operations upon.</a:t>
+            </a:r>
+          </a:p>
+        </p:txBody>
+      </p:sp>
+      <p:pic>
+        <p:nvPicPr>
+          <p:cNvPr descr="https://github.com/ManuelePasini/slides-markdown/blob/master/slides/images/dt/timescale/hybrid_model.png?raw=true" id="0" name="Picture 1"/>
+          <p:cNvPicPr>
+            <a:picLocks noGrp="1" noChangeAspect="1"/>
+          </p:cNvPicPr>
+          <p:nvPr/>
+        </p:nvPicPr>
+        <p:blipFill>
+          <a:blip r:embed="rId2"/>
+          <a:stretch>
+            <a:fillRect/>
+          </a:stretch>
+        </p:blipFill>
+        <p:spPr bwMode="auto">
+          <a:xfrm>
+            <a:off x="457200" y="1409700"/>
+            <a:ext cx="4038600" cy="2451100"/>
+          </a:xfrm>
+          <a:prstGeom prst="rect">
+            <a:avLst/>
+          </a:prstGeom>
+          <a:noFill/>
+          <a:ln w="9525">
+            <a:noFill/>
+            <a:headEnd/>
+            <a:tailEnd/>
+          </a:ln>
+        </p:spPr>
+      </p:pic>
+      <p:sp>
+        <p:nvSpPr>
+          <p:cNvPr id="1" name="TextBox 3"/>
+          <p:cNvSpPr txBox="1"/>
+          <p:nvPr/>
+        </p:nvSpPr>
+        <p:spPr>
+          <a:xfrm>
+            <a:off x="457200" y="4076700"/>
+            <a:ext cx="4038600" cy="508000"/>
+          </a:xfrm>
+          <a:prstGeom prst="rect">
+            <a:avLst/>
+          </a:prstGeom>
+          <a:noFill/>
+        </p:spPr>
+        <p:txBody>
+          <a:bodyPr/>
+          <a:lstStyle/>
+          <a:p>
+            <a:pPr lvl="0" indent="0" marL="0" algn="ctr">
+              <a:buNone/>
+            </a:pPr>
+            <a:r>
+              <a:rPr/>
+              <a:t>Timescale Hybrid model</a:t>
             </a:r>
           </a:p>
         </p:txBody>

</xml_diff>

<commit_message>
Deploying to gh-pages from @ ManuelePasini/slides-markdown@f5690f32ae1fc03648e9e29f0fb32d43cf75ff17 🚀
</commit_message>
<xml_diff>
--- a/digital_twins.pptx
+++ b/digital_twins.pptx
@@ -43,6 +43,8 @@
     <p:sldId id="291" r:id="rId37"/>
     <p:sldId id="292" r:id="rId38"/>
     <p:sldId id="293" r:id="rId39"/>
+    <p:sldId id="294" r:id="rId40"/>
+    <p:sldId id="295" r:id="rId41"/>
   </p:sldIdLst>
   <p:sldSz cx="9144000" cy="5143500" type="screen16x9"/>
   <p:notesSz cx="6858000" cy="9144000"/>
@@ -8821,175 +8823,10 @@
             </a:r>
           </a:p>
           <a:p>
-            <a:pPr lvl="0" indent="0" marL="0">
-              <a:buNone/>
-            </a:pPr>
-            <a:r>
-              <a:rPr/>
-              <a:t>Uses standard SQL with a few more operators: :::: {.columns}</a:t>
-            </a:r>
-          </a:p>
-          <a:p>
-            <a:pPr lvl="0"/>
-            <a:r>
-              <a:rPr/>
-              <a:t>Hybrid row-column oriented data model: define a retention period where data older will be stored as column-oriented data.</a:t>
-            </a:r>
-          </a:p>
-          <a:p>
-            <a:pPr lvl="0"/>
-            <a:r>
-              <a:rPr/>
-              <a:t>Column-Oriented data can still be performed DML/DDL operations upon.</a:t>
-            </a:r>
-          </a:p>
-          <a:p>
-            <a:pPr lvl="0" indent="0" marL="0">
-              <a:buNone/>
-            </a:pPr>
-            <a:r>
-              <a:rPr/>
-              <a:t>Timescale Hybrid model</a:t>
-            </a:r>
-          </a:p>
-          <a:p>
-            <a:pPr lvl="0" indent="0" marL="0">
-              <a:buNone/>
-            </a:pPr>
-            <a:r>
-              <a:rPr/>
-              <a:t>Timescale Hybrid model</a:t>
-            </a:r>
-          </a:p>
-          <a:p>
-            <a:pPr lvl="0" indent="0" marL="0">
-              <a:buNone/>
-            </a:pPr>
-            <a:r>
-              <a:rPr/>
-              <a:t>::::</a:t>
-            </a:r>
-          </a:p>
-          <a:p>
-            <a:pPr lvl="0"/>
-            <a:r>
-              <a:rPr/>
-              <a:t>time_bucket(‘1 hour’, column_name): same as date_trunc in postgres</a:t>
-            </a:r>
-          </a:p>
-          <a:p>
-            <a:pPr lvl="0"/>
-            <a:r>
-              <a:rPr>
-                <a:hlinkClick r:id="rId4"/>
-              </a:rPr>
-              <a:t>Hyperfunctions</a:t>
-            </a:r>
-            <a:r>
-              <a:rPr/>
-              <a:t>:</a:t>
-            </a:r>
-          </a:p>
-          <a:p>
-            <a:pPr lvl="1"/>
-            <a:r>
-              <a:rPr/>
-              <a:t>Time-weighted averages;</a:t>
-            </a:r>
-          </a:p>
-          <a:p>
-            <a:pPr lvl="1"/>
-            <a:r>
-              <a:rPr/>
-              <a:t>Percentile approximation;</a:t>
-            </a:r>
-          </a:p>
-        </p:txBody>
-      </p:sp>
-      <p:pic>
-        <p:nvPicPr>
-          <p:cNvPr descr="https://github.com/ManuelePasini/slides-markdown/blob/master/slides/images/dt/timescale/hyperfunctions.png?raw=true" id="0" name="Picture 1"/>
-          <p:cNvPicPr>
-            <a:picLocks noGrp="1" noChangeAspect="1"/>
-          </p:cNvPicPr>
-          <p:nvPr/>
-        </p:nvPicPr>
-        <p:blipFill>
-          <a:blip r:embed="rId5"/>
-          <a:stretch>
-            <a:fillRect/>
-          </a:stretch>
-        </p:blipFill>
-        <p:spPr bwMode="auto">
-          <a:xfrm>
-            <a:off x="4025900" y="1193800"/>
-            <a:ext cx="1092200" cy="2882900"/>
-          </a:xfrm>
-          <a:prstGeom prst="rect">
-            <a:avLst/>
-          </a:prstGeom>
-          <a:noFill/>
-          <a:ln w="9525">
-            <a:noFill/>
-            <a:headEnd/>
-            <a:tailEnd/>
-          </a:ln>
-        </p:spPr>
-      </p:pic>
-      <p:sp>
-        <p:nvSpPr>
-          <p:cNvPr id="1" name="TextBox 3"/>
-          <p:cNvSpPr txBox="1"/>
-          <p:nvPr/>
-        </p:nvSpPr>
-        <p:spPr>
-          <a:xfrm>
-            <a:off x="457200" y="4076700"/>
-            <a:ext cx="8229600" cy="508000"/>
-          </a:xfrm>
-          <a:prstGeom prst="rect">
-            <a:avLst/>
-          </a:prstGeom>
-          <a:noFill/>
-        </p:spPr>
-        <p:txBody>
-          <a:bodyPr/>
-          <a:lstStyle/>
-          <a:p>
-            <a:pPr lvl="0" indent="0" marL="0" algn="ctr">
-              <a:buNone/>
-            </a:pPr>
-            <a:r>
-              <a:rPr/>
-              <a:t>Timescale Hybrid model</a:t>
-            </a:r>
-          </a:p>
-        </p:txBody>
-      </p:sp>
-      <p:sp>
-        <p:nvSpPr>
-          <p:cNvPr id="3" name="Content Placeholder 2"/>
-          <p:cNvSpPr>
-            <a:spLocks noGrp="1"/>
-          </p:cNvSpPr>
-          <p:nvPr>
-            <p:ph idx="1"/>
-          </p:nvPr>
-        </p:nvSpPr>
-        <p:spPr/>
-        <p:txBody>
-          <a:bodyPr/>
-          <a:lstStyle/>
-          <a:p>
-            <a:pPr lvl="0" indent="0" marL="0">
-              <a:spcBef>
-                <a:spcPts val="3000"/>
-              </a:spcBef>
-              <a:buNone/>
-            </a:pPr>
-            <a:r>
-              <a:rPr b="1"/>
-              <a:t>Further functionalities</a:t>
+            <a:pPr lvl="0"/>
+            <a:r>
+              <a:rPr/>
+              <a:t>Uses standard SQL with a few more operators:</a:t>
             </a:r>
           </a:p>
         </p:txBody>
@@ -9062,7 +8899,7 @@
         </p:blipFill>
         <p:spPr bwMode="auto">
           <a:xfrm>
-            <a:off x="457200" y="1409700"/>
+            <a:off x="4648200" y="1409700"/>
             <a:ext cx="4038600" cy="2451100"/>
           </a:xfrm>
           <a:prstGeom prst="rect">
@@ -9084,7 +8921,7 @@
         </p:nvSpPr>
         <p:spPr>
           <a:xfrm>
-            <a:off x="457200" y="4076700"/>
+            <a:off x="4648200" y="4076700"/>
             <a:ext cx="4038600" cy="508000"/>
           </a:xfrm>
           <a:prstGeom prst="rect">
@@ -9102,57 +8939,6 @@
             <a:r>
               <a:rPr/>
               <a:t>Timescale Hybrid model</a:t>
-            </a:r>
-          </a:p>
-        </p:txBody>
-      </p:sp>
-      <p:sp>
-        <p:nvSpPr>
-          <p:cNvPr id="4" name="Content Placeholder 3"/>
-          <p:cNvSpPr>
-            <a:spLocks noGrp="1"/>
-          </p:cNvSpPr>
-          <p:nvPr>
-            <p:ph idx="2" sz="half"/>
-          </p:nvPr>
-        </p:nvSpPr>
-        <p:spPr/>
-        <p:txBody>
-          <a:bodyPr/>
-          <a:lstStyle/>
-          <a:p>
-            <a:pPr lvl="0" indent="0" marL="0">
-              <a:spcBef>
-                <a:spcPts val="3000"/>
-              </a:spcBef>
-              <a:buNone/>
-            </a:pPr>
-            <a:r>
-              <a:rPr b="1"/>
-              <a:t>Hybrid model optimizations:</a:t>
-            </a:r>
-          </a:p>
-          <a:p>
-            <a:pPr lvl="0"/>
-            <a:r>
-              <a:rPr/>
-              <a:t>segmentby&lt;: partions data in a chunk based on [column1, …] Segmeny-by example</a:t>
-            </a:r>
-          </a:p>
-          <a:p>
-            <a:pPr lvl="0"/>
-            <a:r>
-              <a:rPr/>
-              <a:t>orderby&lt;: orders data within a chunk based on time and stores metadata w.r.t min/max values in the chunk (similar to Databricks data-skipping)</a:t>
-            </a:r>
-          </a:p>
-          <a:p>
-            <a:pPr lvl="0" indent="0" marL="0">
-              <a:buNone/>
-            </a:pPr>
-            <a:r>
-              <a:rPr/>
-              <a:t>Together: data is first grouped by the segmentby column, then ordered based on the orderby parameter, and finally divided into smaller, timestamp-ordered “mini-batches,” each containing up to 1,000 rows.</a:t>
             </a:r>
           </a:p>
         </p:txBody>
@@ -9194,6 +8980,116 @@
           <a:bodyPr/>
           <a:lstStyle/>
           <a:p>
+            <a:pPr lvl="0"/>
+            <a:r>
+              <a:rPr/>
+              <a:t>time_bucket(‘1 hour’, column_name): same as date_trunc in postgres</a:t>
+            </a:r>
+          </a:p>
+          <a:p>
+            <a:pPr lvl="0"/>
+            <a:r>
+              <a:rPr>
+                <a:hlinkClick r:id="rId2"/>
+              </a:rPr>
+              <a:t>Hyperfunctions</a:t>
+            </a:r>
+            <a:r>
+              <a:rPr/>
+              <a:t>:</a:t>
+            </a:r>
+          </a:p>
+          <a:p>
+            <a:pPr lvl="1"/>
+            <a:r>
+              <a:rPr/>
+              <a:t>Time-weighted averages;</a:t>
+            </a:r>
+          </a:p>
+          <a:p>
+            <a:pPr lvl="1"/>
+            <a:r>
+              <a:rPr/>
+              <a:t>Percentile approximation;</a:t>
+            </a:r>
+          </a:p>
+        </p:txBody>
+      </p:sp>
+      <p:pic>
+        <p:nvPicPr>
+          <p:cNvPr descr="https://github.com/ManuelePasini/slides-markdown/blob/master/slides/images/dt/timescale/hypertables.png?raw=true" id="0" name="Picture 1"/>
+          <p:cNvPicPr>
+            <a:picLocks noGrp="1" noChangeAspect="1"/>
+          </p:cNvPicPr>
+          <p:nvPr/>
+        </p:nvPicPr>
+        <p:blipFill>
+          <a:blip r:embed="rId3"/>
+          <a:stretch>
+            <a:fillRect/>
+          </a:stretch>
+        </p:blipFill>
+        <p:spPr bwMode="auto">
+          <a:xfrm>
+            <a:off x="2413000" y="1193800"/>
+            <a:ext cx="4318000" cy="2882900"/>
+          </a:xfrm>
+          <a:prstGeom prst="rect">
+            <a:avLst/>
+          </a:prstGeom>
+          <a:noFill/>
+          <a:ln w="9525">
+            <a:noFill/>
+            <a:headEnd/>
+            <a:tailEnd/>
+          </a:ln>
+        </p:spPr>
+      </p:pic>
+      <p:sp>
+        <p:nvSpPr>
+          <p:cNvPr id="1" name="TextBox 3"/>
+          <p:cNvSpPr txBox="1"/>
+          <p:nvPr/>
+        </p:nvSpPr>
+        <p:spPr>
+          <a:xfrm>
+            <a:off x="457200" y="4076700"/>
+            <a:ext cx="8229600" cy="508000"/>
+          </a:xfrm>
+          <a:prstGeom prst="rect">
+            <a:avLst/>
+          </a:prstGeom>
+          <a:noFill/>
+        </p:spPr>
+        <p:txBody>
+          <a:bodyPr/>
+          <a:lstStyle/>
+          <a:p>
+            <a:pPr lvl="0" indent="0" marL="0" algn="ctr">
+              <a:buNone/>
+            </a:pPr>
+            <a:r>
+              <a:rPr/>
+              <a:t>Hyperfunctions</a:t>
+            </a:r>
+          </a:p>
+        </p:txBody>
+      </p:sp>
+      <p:sp>
+        <p:nvSpPr>
+          <p:cNvPr id="3" name="Content Placeholder 2"/>
+          <p:cNvSpPr>
+            <a:spLocks noGrp="1"/>
+          </p:cNvSpPr>
+          <p:nvPr>
+            <p:ph idx="1"/>
+          </p:nvPr>
+        </p:nvSpPr>
+        <p:spPr/>
+        <p:txBody>
+          <a:bodyPr/>
+          <a:lstStyle/>
+          <a:p>
             <a:pPr lvl="0" indent="0" marL="0">
               <a:spcBef>
                 <a:spcPts val="3000"/>
@@ -9203,6 +9099,241 @@
             <a:r>
               <a:rPr b="1"/>
               <a:t>Further functionalities</a:t>
+            </a:r>
+          </a:p>
+        </p:txBody>
+      </p:sp>
+    </p:spTree>
+  </p:cSld>
+</p:sld>
+</file>
+
+<file path=ppt/slides/slide39.xml><?xml version="1.0" encoding="utf-8"?>
+<p:sld xmlns:a="http://schemas.openxmlformats.org/drawingml/2006/main" xmlns:r="http://schemas.openxmlformats.org/officeDocument/2006/relationships" xmlns:p="http://schemas.openxmlformats.org/presentationml/2006/main">
+  <p:cSld>
+    <p:spTree>
+      <p:nvGrpSpPr>
+        <p:cNvPr id="1" name=""/>
+        <p:cNvGrpSpPr/>
+        <p:nvPr/>
+      </p:nvGrpSpPr>
+      <p:grpSpPr>
+        <a:xfrm>
+          <a:off x="0" y="0"/>
+          <a:ext cx="0" cy="0"/>
+          <a:chOff x="0" y="0"/>
+          <a:chExt cx="0" cy="0"/>
+        </a:xfrm>
+      </p:grpSpPr>
+      <p:sp>
+        <p:nvSpPr>
+          <p:cNvPr id="3" name="Content Placeholder 2"/>
+          <p:cNvSpPr>
+            <a:spLocks noGrp="1"/>
+          </p:cNvSpPr>
+          <p:nvPr>
+            <p:ph idx="1" sz="half"/>
+          </p:nvPr>
+        </p:nvSpPr>
+        <p:spPr/>
+        <p:txBody>
+          <a:bodyPr/>
+          <a:lstStyle/>
+          <a:p>
+            <a:pPr lvl="0"/>
+            <a:r>
+              <a:rPr/>
+              <a:t>Hybrid row-column oriented data model: define a retention period where data older will be stored as column-oriented data.</a:t>
+            </a:r>
+          </a:p>
+          <a:p>
+            <a:pPr lvl="0"/>
+            <a:r>
+              <a:rPr/>
+              <a:t>Column-Oriented data can still be performed DML/DDL operations upon.</a:t>
+            </a:r>
+          </a:p>
+        </p:txBody>
+      </p:sp>
+      <p:pic>
+        <p:nvPicPr>
+          <p:cNvPr descr="https://github.com/ManuelePasini/slides-markdown/blob/master/slides/images/dt/timescale/hyperfunctions.png?raw=true" id="0" name="Picture 1"/>
+          <p:cNvPicPr>
+            <a:picLocks noGrp="1" noChangeAspect="1"/>
+          </p:cNvPicPr>
+          <p:nvPr/>
+        </p:nvPicPr>
+        <p:blipFill>
+          <a:blip r:embed="rId2"/>
+          <a:stretch>
+            <a:fillRect/>
+          </a:stretch>
+        </p:blipFill>
+        <p:spPr bwMode="auto">
+          <a:xfrm>
+            <a:off x="1930400" y="1193800"/>
+            <a:ext cx="1092200" cy="2882900"/>
+          </a:xfrm>
+          <a:prstGeom prst="rect">
+            <a:avLst/>
+          </a:prstGeom>
+          <a:noFill/>
+          <a:ln w="9525">
+            <a:noFill/>
+            <a:headEnd/>
+            <a:tailEnd/>
+          </a:ln>
+        </p:spPr>
+      </p:pic>
+      <p:sp>
+        <p:nvSpPr>
+          <p:cNvPr id="1" name="TextBox 3"/>
+          <p:cNvSpPr txBox="1"/>
+          <p:nvPr/>
+        </p:nvSpPr>
+        <p:spPr>
+          <a:xfrm>
+            <a:off x="457200" y="4076700"/>
+            <a:ext cx="4038600" cy="508000"/>
+          </a:xfrm>
+          <a:prstGeom prst="rect">
+            <a:avLst/>
+          </a:prstGeom>
+          <a:noFill/>
+        </p:spPr>
+        <p:txBody>
+          <a:bodyPr/>
+          <a:lstStyle/>
+          <a:p>
+            <a:pPr lvl="0" indent="0" marL="0" algn="ctr">
+              <a:buNone/>
+            </a:pPr>
+            <a:r>
+              <a:rPr/>
+              <a:t>Timescale Hybrid model</a:t>
+            </a:r>
+          </a:p>
+        </p:txBody>
+      </p:sp>
+      <p:sp>
+        <p:nvSpPr>
+          <p:cNvPr id="4" name="Content Placeholder 3"/>
+          <p:cNvSpPr>
+            <a:spLocks noGrp="1"/>
+          </p:cNvSpPr>
+          <p:nvPr>
+            <p:ph idx="2" sz="half"/>
+          </p:nvPr>
+        </p:nvSpPr>
+        <p:spPr/>
+        <p:txBody>
+          <a:bodyPr/>
+          <a:lstStyle/>
+          <a:p>
+            <a:pPr lvl="0" indent="0" marL="0">
+              <a:spcBef>
+                <a:spcPts val="3000"/>
+              </a:spcBef>
+              <a:buNone/>
+            </a:pPr>
+            <a:r>
+              <a:rPr b="1"/>
+              <a:t>Hybrid model optimizations:</a:t>
+            </a:r>
+          </a:p>
+          <a:p>
+            <a:pPr lvl="0"/>
+            <a:r>
+              <a:rPr/>
+              <a:t>segmentby&lt;: partions data in a chunk based on [column1, …] Segmeny-by example</a:t>
+            </a:r>
+          </a:p>
+          <a:p>
+            <a:pPr lvl="0"/>
+            <a:r>
+              <a:rPr/>
+              <a:t>orderby&lt;: orders data within a chunk based on time and stores metadata w.r.t min/max values in the chunk (similar to Databricks data-skipping)</a:t>
+            </a:r>
+          </a:p>
+          <a:p>
+            <a:pPr lvl="0" indent="0" marL="0">
+              <a:buNone/>
+            </a:pPr>
+            <a:r>
+              <a:rPr/>
+              <a:t>Together: data is first grouped by the segmentby column, then ordered based on the orderby parameter, and finally divided into smaller, timestamp-ordered “mini-batches,” each containing up to 1,000 rows.</a:t>
+            </a:r>
+          </a:p>
+        </p:txBody>
+      </p:sp>
+    </p:spTree>
+  </p:cSld>
+</p:sld>
+</file>
+
+<file path=ppt/slides/slide4.xml><?xml version="1.0" encoding="utf-8"?>
+<p:sld xmlns:a="http://schemas.openxmlformats.org/drawingml/2006/main" xmlns:r="http://schemas.openxmlformats.org/officeDocument/2006/relationships" xmlns:p="http://schemas.openxmlformats.org/presentationml/2006/main">
+  <p:cSld>
+    <p:spTree>
+      <p:nvGrpSpPr>
+        <p:cNvPr id="1" name=""/>
+        <p:cNvGrpSpPr/>
+        <p:nvPr/>
+      </p:nvGrpSpPr>
+      <p:grpSpPr>
+        <a:xfrm>
+          <a:off x="0" y="0"/>
+          <a:ext cx="0" cy="0"/>
+          <a:chOff x="0" y="0"/>
+          <a:chExt cx="0" cy="0"/>
+        </a:xfrm>
+      </p:grpSpPr>
+    </p:spTree>
+  </p:cSld>
+</p:sld>
+</file>
+
+<file path=ppt/slides/slide40.xml><?xml version="1.0" encoding="utf-8"?>
+<p:sld xmlns:a="http://schemas.openxmlformats.org/drawingml/2006/main" xmlns:r="http://schemas.openxmlformats.org/officeDocument/2006/relationships" xmlns:p="http://schemas.openxmlformats.org/presentationml/2006/main">
+  <p:cSld>
+    <p:spTree>
+      <p:nvGrpSpPr>
+        <p:cNvPr id="1" name=""/>
+        <p:cNvGrpSpPr/>
+        <p:nvPr/>
+      </p:nvGrpSpPr>
+      <p:grpSpPr>
+        <a:xfrm>
+          <a:off x="0" y="0"/>
+          <a:ext cx="0" cy="0"/>
+          <a:chOff x="0" y="0"/>
+          <a:chExt cx="0" cy="0"/>
+        </a:xfrm>
+      </p:grpSpPr>
+      <p:sp>
+        <p:nvSpPr>
+          <p:cNvPr id="3" name="Content Placeholder 2"/>
+          <p:cNvSpPr>
+            <a:spLocks noGrp="1"/>
+          </p:cNvSpPr>
+          <p:nvPr>
+            <p:ph idx="1"/>
+          </p:nvPr>
+        </p:nvSpPr>
+        <p:spPr/>
+        <p:txBody>
+          <a:bodyPr/>
+          <a:lstStyle/>
+          <a:p>
+            <a:pPr lvl="0" indent="0" marL="0">
+              <a:spcBef>
+                <a:spcPts val="3000"/>
+              </a:spcBef>
+              <a:buNone/>
+            </a:pPr>
+            <a:r>
+              <a:rPr b="1"/>
+              <a:t>Further functionalities .2</a:t>
             </a:r>
           </a:p>
           <a:p>
@@ -9288,33 +9419,17 @@
             </a:pPr>
             <a:r>
               <a:rPr/>
-              <a:t>Creating a continuous view</a:t>
-            </a:r>
-          </a:p>
-        </p:txBody>
-      </p:sp>
-    </p:spTree>
-  </p:cSld>
-</p:sld>
-</file>
-
-<file path=ppt/slides/slide4.xml><?xml version="1.0" encoding="utf-8"?>
-<p:sld xmlns:a="http://schemas.openxmlformats.org/drawingml/2006/main" xmlns:r="http://schemas.openxmlformats.org/officeDocument/2006/relationships" xmlns:p="http://schemas.openxmlformats.org/presentationml/2006/main">
-  <p:cSld>
-    <p:spTree>
-      <p:nvGrpSpPr>
-        <p:cNvPr id="1" name=""/>
-        <p:cNvGrpSpPr/>
-        <p:nvPr/>
-      </p:nvGrpSpPr>
-      <p:grpSpPr>
-        <a:xfrm>
-          <a:off x="0" y="0"/>
-          <a:ext cx="0" cy="0"/>
-          <a:chOff x="0" y="0"/>
-          <a:chExt cx="0" cy="0"/>
-        </a:xfrm>
-      </p:grpSpPr>
+              <a:t>Creating a continuous view </a:t>
+            </a:r>
+            <a:r>
+              <a:rPr>
+                <a:hlinkClick r:id="rId3"/>
+              </a:rPr>
+              <a:t>doc</a:t>
+            </a:r>
+          </a:p>
+        </p:txBody>
+      </p:sp>
     </p:spTree>
   </p:cSld>
 </p:sld>

</xml_diff>

<commit_message>
Deploying to gh-pages from @ ManuelePasini/slides-markdown@97524fed7beba4de46b9926462b505ffaa13789d 🚀
</commit_message>
<xml_diff>
--- a/digital_twins.pptx
+++ b/digital_twins.pptx
@@ -8829,6 +8829,100 @@
               <a:t>Uses standard SQL with a few more operators:</a:t>
             </a:r>
           </a:p>
+          <a:p>
+            <a:pPr lvl="0"/>
+            <a:r>
+              <a:rPr/>
+              <a:t>time_bucket(‘1 hour’, column_name): same as date_trunc in postgres</a:t>
+            </a:r>
+          </a:p>
+          <a:p>
+            <a:pPr lvl="0"/>
+            <a:r>
+              <a:rPr>
+                <a:hlinkClick r:id="rId4"/>
+              </a:rPr>
+              <a:t>Hyperfunctions</a:t>
+            </a:r>
+            <a:r>
+              <a:rPr/>
+              <a:t>:</a:t>
+            </a:r>
+          </a:p>
+          <a:p>
+            <a:pPr lvl="1"/>
+            <a:r>
+              <a:rPr/>
+              <a:t>Time-weighted averages;</a:t>
+            </a:r>
+          </a:p>
+          <a:p>
+            <a:pPr lvl="1"/>
+            <a:r>
+              <a:rPr/>
+              <a:t>Percentile approximation;</a:t>
+            </a:r>
+          </a:p>
+        </p:txBody>
+      </p:sp>
+      <p:pic>
+        <p:nvPicPr>
+          <p:cNvPr descr="https://github.com/ManuelePasini/slides-markdown/blob/master/slides/images/dt/timescale/hyperfunctions.png?raw=true" id="0" name="Picture 1"/>
+          <p:cNvPicPr>
+            <a:picLocks noGrp="1" noChangeAspect="1"/>
+          </p:cNvPicPr>
+          <p:nvPr/>
+        </p:nvPicPr>
+        <p:blipFill>
+          <a:blip r:embed="rId5"/>
+          <a:stretch>
+            <a:fillRect/>
+          </a:stretch>
+        </p:blipFill>
+        <p:spPr bwMode="auto">
+          <a:xfrm>
+            <a:off x="4025900" y="1193800"/>
+            <a:ext cx="1092200" cy="2882900"/>
+          </a:xfrm>
+          <a:prstGeom prst="rect">
+            <a:avLst/>
+          </a:prstGeom>
+          <a:noFill/>
+          <a:ln w="9525">
+            <a:noFill/>
+            <a:headEnd/>
+            <a:tailEnd/>
+          </a:ln>
+        </p:spPr>
+      </p:pic>
+      <p:sp>
+        <p:nvSpPr>
+          <p:cNvPr id="1" name="TextBox 3"/>
+          <p:cNvSpPr txBox="1"/>
+          <p:nvPr/>
+        </p:nvSpPr>
+        <p:spPr>
+          <a:xfrm>
+            <a:off x="457200" y="4076700"/>
+            <a:ext cx="8229600" cy="508000"/>
+          </a:xfrm>
+          <a:prstGeom prst="rect">
+            <a:avLst/>
+          </a:prstGeom>
+          <a:noFill/>
+        </p:spPr>
+        <p:txBody>
+          <a:bodyPr/>
+          <a:lstStyle/>
+          <a:p>
+            <a:pPr lvl="0" indent="0" marL="0" algn="ctr">
+              <a:buNone/>
+            </a:pPr>
+            <a:r>
+              <a:rPr/>
+              <a:t>Hyperfunctions</a:t>
+            </a:r>
+          </a:p>
         </p:txBody>
       </p:sp>
     </p:spTree>
@@ -8980,116 +9074,6 @@
           <a:bodyPr/>
           <a:lstStyle/>
           <a:p>
-            <a:pPr lvl="0"/>
-            <a:r>
-              <a:rPr/>
-              <a:t>time_bucket(‘1 hour’, column_name): same as date_trunc in postgres</a:t>
-            </a:r>
-          </a:p>
-          <a:p>
-            <a:pPr lvl="0"/>
-            <a:r>
-              <a:rPr>
-                <a:hlinkClick r:id="rId2"/>
-              </a:rPr>
-              <a:t>Hyperfunctions</a:t>
-            </a:r>
-            <a:r>
-              <a:rPr/>
-              <a:t>:</a:t>
-            </a:r>
-          </a:p>
-          <a:p>
-            <a:pPr lvl="1"/>
-            <a:r>
-              <a:rPr/>
-              <a:t>Time-weighted averages;</a:t>
-            </a:r>
-          </a:p>
-          <a:p>
-            <a:pPr lvl="1"/>
-            <a:r>
-              <a:rPr/>
-              <a:t>Percentile approximation;</a:t>
-            </a:r>
-          </a:p>
-        </p:txBody>
-      </p:sp>
-      <p:pic>
-        <p:nvPicPr>
-          <p:cNvPr descr="https://github.com/ManuelePasini/slides-markdown/blob/master/slides/images/dt/timescale/hypertables.png?raw=true" id="0" name="Picture 1"/>
-          <p:cNvPicPr>
-            <a:picLocks noGrp="1" noChangeAspect="1"/>
-          </p:cNvPicPr>
-          <p:nvPr/>
-        </p:nvPicPr>
-        <p:blipFill>
-          <a:blip r:embed="rId3"/>
-          <a:stretch>
-            <a:fillRect/>
-          </a:stretch>
-        </p:blipFill>
-        <p:spPr bwMode="auto">
-          <a:xfrm>
-            <a:off x="2413000" y="1193800"/>
-            <a:ext cx="4318000" cy="2882900"/>
-          </a:xfrm>
-          <a:prstGeom prst="rect">
-            <a:avLst/>
-          </a:prstGeom>
-          <a:noFill/>
-          <a:ln w="9525">
-            <a:noFill/>
-            <a:headEnd/>
-            <a:tailEnd/>
-          </a:ln>
-        </p:spPr>
-      </p:pic>
-      <p:sp>
-        <p:nvSpPr>
-          <p:cNvPr id="1" name="TextBox 3"/>
-          <p:cNvSpPr txBox="1"/>
-          <p:nvPr/>
-        </p:nvSpPr>
-        <p:spPr>
-          <a:xfrm>
-            <a:off x="457200" y="4076700"/>
-            <a:ext cx="8229600" cy="508000"/>
-          </a:xfrm>
-          <a:prstGeom prst="rect">
-            <a:avLst/>
-          </a:prstGeom>
-          <a:noFill/>
-        </p:spPr>
-        <p:txBody>
-          <a:bodyPr/>
-          <a:lstStyle/>
-          <a:p>
-            <a:pPr lvl="0" indent="0" marL="0" algn="ctr">
-              <a:buNone/>
-            </a:pPr>
-            <a:r>
-              <a:rPr/>
-              <a:t>Hyperfunctions</a:t>
-            </a:r>
-          </a:p>
-        </p:txBody>
-      </p:sp>
-      <p:sp>
-        <p:nvSpPr>
-          <p:cNvPr id="3" name="Content Placeholder 2"/>
-          <p:cNvSpPr>
-            <a:spLocks noGrp="1"/>
-          </p:cNvSpPr>
-          <p:nvPr>
-            <p:ph idx="1"/>
-          </p:nvPr>
-        </p:nvSpPr>
-        <p:spPr/>
-        <p:txBody>
-          <a:bodyPr/>
-          <a:lstStyle/>
-          <a:p>
             <a:pPr lvl="0" indent="0" marL="0">
               <a:spcBef>
                 <a:spcPts val="3000"/>
@@ -9151,66 +9135,6 @@
             <a:r>
               <a:rPr/>
               <a:t>Column-Oriented data can still be performed DML/DDL operations upon.</a:t>
-            </a:r>
-          </a:p>
-        </p:txBody>
-      </p:sp>
-      <p:pic>
-        <p:nvPicPr>
-          <p:cNvPr descr="https://github.com/ManuelePasini/slides-markdown/blob/master/slides/images/dt/timescale/hyperfunctions.png?raw=true" id="0" name="Picture 1"/>
-          <p:cNvPicPr>
-            <a:picLocks noGrp="1" noChangeAspect="1"/>
-          </p:cNvPicPr>
-          <p:nvPr/>
-        </p:nvPicPr>
-        <p:blipFill>
-          <a:blip r:embed="rId2"/>
-          <a:stretch>
-            <a:fillRect/>
-          </a:stretch>
-        </p:blipFill>
-        <p:spPr bwMode="auto">
-          <a:xfrm>
-            <a:off x="1930400" y="1193800"/>
-            <a:ext cx="1092200" cy="2882900"/>
-          </a:xfrm>
-          <a:prstGeom prst="rect">
-            <a:avLst/>
-          </a:prstGeom>
-          <a:noFill/>
-          <a:ln w="9525">
-            <a:noFill/>
-            <a:headEnd/>
-            <a:tailEnd/>
-          </a:ln>
-        </p:spPr>
-      </p:pic>
-      <p:sp>
-        <p:nvSpPr>
-          <p:cNvPr id="1" name="TextBox 3"/>
-          <p:cNvSpPr txBox="1"/>
-          <p:nvPr/>
-        </p:nvSpPr>
-        <p:spPr>
-          <a:xfrm>
-            <a:off x="457200" y="4076700"/>
-            <a:ext cx="4038600" cy="508000"/>
-          </a:xfrm>
-          <a:prstGeom prst="rect">
-            <a:avLst/>
-          </a:prstGeom>
-          <a:noFill/>
-        </p:spPr>
-        <p:txBody>
-          <a:bodyPr/>
-          <a:lstStyle/>
-          <a:p>
-            <a:pPr lvl="0" indent="0" marL="0" algn="ctr">
-              <a:buNone/>
-            </a:pPr>
-            <a:r>
-              <a:rPr/>
-              <a:t>Timescale Hybrid model</a:t>
             </a:r>
           </a:p>
         </p:txBody>

</xml_diff>

<commit_message>
Deploying to gh-pages from @ ManuelePasini/slides-markdown@7a59d90e5a9945b9c1bb25f144116594b67cd984 🚀
</commit_message>
<xml_diff>
--- a/digital_twins.pptx
+++ b/digital_twins.pptx
@@ -43,8 +43,6 @@
     <p:sldId id="291" r:id="rId37"/>
     <p:sldId id="292" r:id="rId38"/>
     <p:sldId id="293" r:id="rId39"/>
-    <p:sldId id="294" r:id="rId40"/>
-    <p:sldId id="295" r:id="rId41"/>
   </p:sldIdLst>
   <p:sldSz cx="9144000" cy="5143500" type="screen16x9"/>
   <p:notesSz cx="6858000" cy="9144000"/>
@@ -8826,14 +8824,14 @@
             <a:pPr lvl="0"/>
             <a:r>
               <a:rPr/>
-              <a:t>Uses standard SQL with a few more operators:</a:t>
-            </a:r>
-          </a:p>
-          <a:p>
-            <a:pPr lvl="0"/>
-            <a:r>
-              <a:rPr/>
-              <a:t>time_bucket(‘1 hour’, column_name): same as date_trunc in postgres</a:t>
+              <a:t>Uses standard SQL with a more operators/functions:</a:t>
+            </a:r>
+          </a:p>
+          <a:p>
+            <a:pPr lvl="0"/>
+            <a:r>
+              <a:rPr/>
+              <a:t>time_bucket(‘1 hour’, column_name): same as date_trunc in PostgreSQL</a:t>
             </a:r>
           </a:p>
           <a:p>
@@ -8920,7 +8918,35 @@
             </a:pPr>
             <a:r>
               <a:rPr/>
-              <a:t>Hyperfunctions</a:t>
+              <a:t>Hyperfunctions list</a:t>
+            </a:r>
+          </a:p>
+        </p:txBody>
+      </p:sp>
+      <p:sp>
+        <p:nvSpPr>
+          <p:cNvPr id="3" name="Content Placeholder 2"/>
+          <p:cNvSpPr>
+            <a:spLocks noGrp="1"/>
+          </p:cNvSpPr>
+          <p:nvPr>
+            <p:ph idx="1"/>
+          </p:nvPr>
+        </p:nvSpPr>
+        <p:spPr/>
+        <p:txBody>
+          <a:bodyPr/>
+          <a:lstStyle/>
+          <a:p>
+            <a:pPr lvl="0" indent="0" marL="0">
+              <a:spcBef>
+                <a:spcPts val="3000"/>
+              </a:spcBef>
+              <a:buNone/>
+            </a:pPr>
+            <a:r>
+              <a:rPr b="1"/>
+              <a:t>Further functionalities</a:t>
             </a:r>
           </a:p>
         </p:txBody>
@@ -8977,62 +9003,53 @@
           </a:p>
         </p:txBody>
       </p:sp>
-      <p:pic>
-        <p:nvPicPr>
-          <p:cNvPr descr="https://github.com/ManuelePasini/slides-markdown/blob/master/slides/images/dt/timescale/hybrid_model.png?raw=true" id="0" name="Picture 1"/>
-          <p:cNvPicPr>
-            <a:picLocks noGrp="1" noChangeAspect="1"/>
-          </p:cNvPicPr>
-          <p:nvPr/>
-        </p:nvPicPr>
-        <p:blipFill>
-          <a:blip r:embed="rId2"/>
-          <a:stretch>
-            <a:fillRect/>
-          </a:stretch>
-        </p:blipFill>
-        <p:spPr bwMode="auto">
-          <a:xfrm>
-            <a:off x="4648200" y="1409700"/>
-            <a:ext cx="4038600" cy="2451100"/>
-          </a:xfrm>
-          <a:prstGeom prst="rect">
-            <a:avLst/>
-          </a:prstGeom>
-          <a:noFill/>
-          <a:ln w="9525">
-            <a:noFill/>
-            <a:headEnd/>
-            <a:tailEnd/>
-          </a:ln>
-        </p:spPr>
-      </p:pic>
-      <p:sp>
-        <p:nvSpPr>
-          <p:cNvPr id="1" name="TextBox 3"/>
-          <p:cNvSpPr txBox="1"/>
-          <p:nvPr/>
-        </p:nvSpPr>
-        <p:spPr>
-          <a:xfrm>
-            <a:off x="4648200" y="4076700"/>
-            <a:ext cx="4038600" cy="508000"/>
-          </a:xfrm>
-          <a:prstGeom prst="rect">
-            <a:avLst/>
-          </a:prstGeom>
-          <a:noFill/>
-        </p:spPr>
-        <p:txBody>
-          <a:bodyPr/>
-          <a:lstStyle/>
-          <a:p>
-            <a:pPr lvl="0" indent="0" marL="0" algn="ctr">
-              <a:buNone/>
-            </a:pPr>
-            <a:r>
-              <a:rPr/>
-              <a:t>Timescale Hybrid model</a:t>
+      <p:sp>
+        <p:nvSpPr>
+          <p:cNvPr id="4" name="Content Placeholder 3"/>
+          <p:cNvSpPr>
+            <a:spLocks noGrp="1"/>
+          </p:cNvSpPr>
+          <p:nvPr>
+            <p:ph idx="2" sz="half"/>
+          </p:nvPr>
+        </p:nvSpPr>
+        <p:spPr/>
+        <p:txBody>
+          <a:bodyPr/>
+          <a:lstStyle/>
+          <a:p>
+            <a:pPr lvl="0" indent="0" marL="0">
+              <a:spcBef>
+                <a:spcPts val="3000"/>
+              </a:spcBef>
+              <a:buNone/>
+            </a:pPr>
+            <a:r>
+              <a:rPr b="1"/>
+              <a:t>Hybrid model optimizations:</a:t>
+            </a:r>
+          </a:p>
+          <a:p>
+            <a:pPr lvl="0"/>
+            <a:r>
+              <a:rPr/>
+              <a:t>segmentby&lt;: partions data in a chunk based on [column1, …] Segmeny-by example</a:t>
+            </a:r>
+          </a:p>
+          <a:p>
+            <a:pPr lvl="0"/>
+            <a:r>
+              <a:rPr/>
+              <a:t>orderby&lt;: orders data within a chunk based on time and stores metadata w.r.t min/max values in the chunk (similar to Databricks data-skipping)</a:t>
+            </a:r>
+          </a:p>
+          <a:p>
+            <a:pPr lvl="0" indent="0" marL="0">
+              <a:buNone/>
+            </a:pPr>
+            <a:r>
+              <a:rPr/>
+              <a:t>Together: data is first grouped by the segmentby column, then ordered based on the orderby parameter, and finally divided into smaller, timestamp-ordered “mini-batches,” each containing up to 1,000 rows.</a:t>
             </a:r>
           </a:p>
         </p:txBody>
@@ -9043,181 +9060,6 @@
 </file>
 
 <file path=ppt/slides/slide38.xml><?xml version="1.0" encoding="utf-8"?>
-<p:sld xmlns:a="http://schemas.openxmlformats.org/drawingml/2006/main" xmlns:r="http://schemas.openxmlformats.org/officeDocument/2006/relationships" xmlns:p="http://schemas.openxmlformats.org/presentationml/2006/main">
-  <p:cSld>
-    <p:spTree>
-      <p:nvGrpSpPr>
-        <p:cNvPr id="1" name=""/>
-        <p:cNvGrpSpPr/>
-        <p:nvPr/>
-      </p:nvGrpSpPr>
-      <p:grpSpPr>
-        <a:xfrm>
-          <a:off x="0" y="0"/>
-          <a:ext cx="0" cy="0"/>
-          <a:chOff x="0" y="0"/>
-          <a:chExt cx="0" cy="0"/>
-        </a:xfrm>
-      </p:grpSpPr>
-      <p:sp>
-        <p:nvSpPr>
-          <p:cNvPr id="3" name="Content Placeholder 2"/>
-          <p:cNvSpPr>
-            <a:spLocks noGrp="1"/>
-          </p:cNvSpPr>
-          <p:nvPr>
-            <p:ph idx="1"/>
-          </p:nvPr>
-        </p:nvSpPr>
-        <p:spPr/>
-        <p:txBody>
-          <a:bodyPr/>
-          <a:lstStyle/>
-          <a:p>
-            <a:pPr lvl="0" indent="0" marL="0">
-              <a:spcBef>
-                <a:spcPts val="3000"/>
-              </a:spcBef>
-              <a:buNone/>
-            </a:pPr>
-            <a:r>
-              <a:rPr b="1"/>
-              <a:t>Further functionalities</a:t>
-            </a:r>
-          </a:p>
-        </p:txBody>
-      </p:sp>
-    </p:spTree>
-  </p:cSld>
-</p:sld>
-</file>
-
-<file path=ppt/slides/slide39.xml><?xml version="1.0" encoding="utf-8"?>
-<p:sld xmlns:a="http://schemas.openxmlformats.org/drawingml/2006/main" xmlns:r="http://schemas.openxmlformats.org/officeDocument/2006/relationships" xmlns:p="http://schemas.openxmlformats.org/presentationml/2006/main">
-  <p:cSld>
-    <p:spTree>
-      <p:nvGrpSpPr>
-        <p:cNvPr id="1" name=""/>
-        <p:cNvGrpSpPr/>
-        <p:nvPr/>
-      </p:nvGrpSpPr>
-      <p:grpSpPr>
-        <a:xfrm>
-          <a:off x="0" y="0"/>
-          <a:ext cx="0" cy="0"/>
-          <a:chOff x="0" y="0"/>
-          <a:chExt cx="0" cy="0"/>
-        </a:xfrm>
-      </p:grpSpPr>
-      <p:sp>
-        <p:nvSpPr>
-          <p:cNvPr id="3" name="Content Placeholder 2"/>
-          <p:cNvSpPr>
-            <a:spLocks noGrp="1"/>
-          </p:cNvSpPr>
-          <p:nvPr>
-            <p:ph idx="1" sz="half"/>
-          </p:nvPr>
-        </p:nvSpPr>
-        <p:spPr/>
-        <p:txBody>
-          <a:bodyPr/>
-          <a:lstStyle/>
-          <a:p>
-            <a:pPr lvl="0"/>
-            <a:r>
-              <a:rPr/>
-              <a:t>Hybrid row-column oriented data model: define a retention period where data older will be stored as column-oriented data.</a:t>
-            </a:r>
-          </a:p>
-          <a:p>
-            <a:pPr lvl="0"/>
-            <a:r>
-              <a:rPr/>
-              <a:t>Column-Oriented data can still be performed DML/DDL operations upon.</a:t>
-            </a:r>
-          </a:p>
-        </p:txBody>
-      </p:sp>
-      <p:sp>
-        <p:nvSpPr>
-          <p:cNvPr id="4" name="Content Placeholder 3"/>
-          <p:cNvSpPr>
-            <a:spLocks noGrp="1"/>
-          </p:cNvSpPr>
-          <p:nvPr>
-            <p:ph idx="2" sz="half"/>
-          </p:nvPr>
-        </p:nvSpPr>
-        <p:spPr/>
-        <p:txBody>
-          <a:bodyPr/>
-          <a:lstStyle/>
-          <a:p>
-            <a:pPr lvl="0" indent="0" marL="0">
-              <a:spcBef>
-                <a:spcPts val="3000"/>
-              </a:spcBef>
-              <a:buNone/>
-            </a:pPr>
-            <a:r>
-              <a:rPr b="1"/>
-              <a:t>Hybrid model optimizations:</a:t>
-            </a:r>
-          </a:p>
-          <a:p>
-            <a:pPr lvl="0"/>
-            <a:r>
-              <a:rPr/>
-              <a:t>segmentby&lt;: partions data in a chunk based on [column1, …] Segmeny-by example</a:t>
-            </a:r>
-          </a:p>
-          <a:p>
-            <a:pPr lvl="0"/>
-            <a:r>
-              <a:rPr/>
-              <a:t>orderby&lt;: orders data within a chunk based on time and stores metadata w.r.t min/max values in the chunk (similar to Databricks data-skipping)</a:t>
-            </a:r>
-          </a:p>
-          <a:p>
-            <a:pPr lvl="0" indent="0" marL="0">
-              <a:buNone/>
-            </a:pPr>
-            <a:r>
-              <a:rPr/>
-              <a:t>Together: data is first grouped by the segmentby column, then ordered based on the orderby parameter, and finally divided into smaller, timestamp-ordered “mini-batches,” each containing up to 1,000 rows.</a:t>
-            </a:r>
-          </a:p>
-        </p:txBody>
-      </p:sp>
-    </p:spTree>
-  </p:cSld>
-</p:sld>
-</file>
-
-<file path=ppt/slides/slide4.xml><?xml version="1.0" encoding="utf-8"?>
-<p:sld xmlns:a="http://schemas.openxmlformats.org/drawingml/2006/main" xmlns:r="http://schemas.openxmlformats.org/officeDocument/2006/relationships" xmlns:p="http://schemas.openxmlformats.org/presentationml/2006/main">
-  <p:cSld>
-    <p:spTree>
-      <p:nvGrpSpPr>
-        <p:cNvPr id="1" name=""/>
-        <p:cNvGrpSpPr/>
-        <p:nvPr/>
-      </p:nvGrpSpPr>
-      <p:grpSpPr>
-        <a:xfrm>
-          <a:off x="0" y="0"/>
-          <a:ext cx="0" cy="0"/>
-          <a:chOff x="0" y="0"/>
-          <a:chExt cx="0" cy="0"/>
-        </a:xfrm>
-      </p:grpSpPr>
-    </p:spTree>
-  </p:cSld>
-</p:sld>
-</file>
-
-<file path=ppt/slides/slide40.xml><?xml version="1.0" encoding="utf-8"?>
 <p:sld xmlns:a="http://schemas.openxmlformats.org/drawingml/2006/main" xmlns:r="http://schemas.openxmlformats.org/officeDocument/2006/relationships" xmlns:p="http://schemas.openxmlformats.org/presentationml/2006/main">
   <p:cSld>
     <p:spTree>
@@ -9354,6 +9196,28 @@
           </a:p>
         </p:txBody>
       </p:sp>
+    </p:spTree>
+  </p:cSld>
+</p:sld>
+</file>
+
+<file path=ppt/slides/slide4.xml><?xml version="1.0" encoding="utf-8"?>
+<p:sld xmlns:a="http://schemas.openxmlformats.org/drawingml/2006/main" xmlns:r="http://schemas.openxmlformats.org/officeDocument/2006/relationships" xmlns:p="http://schemas.openxmlformats.org/presentationml/2006/main">
+  <p:cSld>
+    <p:spTree>
+      <p:nvGrpSpPr>
+        <p:cNvPr id="1" name=""/>
+        <p:cNvGrpSpPr/>
+        <p:nvPr/>
+      </p:nvGrpSpPr>
+      <p:grpSpPr>
+        <a:xfrm>
+          <a:off x="0" y="0"/>
+          <a:ext cx="0" cy="0"/>
+          <a:chOff x="0" y="0"/>
+          <a:chExt cx="0" cy="0"/>
+        </a:xfrm>
+      </p:grpSpPr>
     </p:spTree>
   </p:cSld>
 </p:sld>

</xml_diff>

<commit_message>
Deploying to gh-pages from @ ManuelePasini/slides-markdown@3df0f329481383d5606fbcde77f9ef1638bf68e3 🚀
</commit_message>
<xml_diff>
--- a/digital_twins.pptx
+++ b/digital_twins.pptx
@@ -43,6 +43,8 @@
     <p:sldId id="291" r:id="rId37"/>
     <p:sldId id="292" r:id="rId38"/>
     <p:sldId id="293" r:id="rId39"/>
+    <p:sldId id="294" r:id="rId40"/>
+    <p:sldId id="295" r:id="rId41"/>
   </p:sldIdLst>
   <p:sldSz cx="9144000" cy="5143500" type="screen16x9"/>
   <p:notesSz cx="6858000" cy="9144000"/>
@@ -8763,14 +8765,10 @@
               <a:buNone/>
             </a:pPr>
             <a:r>
-              <a:rPr b="1"/>
-              <a:t>Timescale DB </a:t>
-            </a:r>
-            <a:r>
               <a:rPr b="1">
                 <a:hlinkClick r:id="rId3"/>
               </a:rPr>
-              <a:t>doc</a:t>
+              <a:t>Timescale DB</a:t>
             </a:r>
           </a:p>
           <a:p>
@@ -8818,135 +8816,6 @@
             <a:r>
               <a:rPr b="1"/>
               <a:t>Query language</a:t>
-            </a:r>
-          </a:p>
-          <a:p>
-            <a:pPr lvl="0"/>
-            <a:r>
-              <a:rPr/>
-              <a:t>Uses standard SQL with a more operators/functions:</a:t>
-            </a:r>
-          </a:p>
-          <a:p>
-            <a:pPr lvl="0"/>
-            <a:r>
-              <a:rPr/>
-              <a:t>time_bucket(‘1 hour’, column_name): same as date_trunc in PostgreSQL</a:t>
-            </a:r>
-          </a:p>
-          <a:p>
-            <a:pPr lvl="0"/>
-            <a:r>
-              <a:rPr>
-                <a:hlinkClick r:id="rId4"/>
-              </a:rPr>
-              <a:t>Hyperfunctions</a:t>
-            </a:r>
-            <a:r>
-              <a:rPr/>
-              <a:t>:</a:t>
-            </a:r>
-          </a:p>
-          <a:p>
-            <a:pPr lvl="1"/>
-            <a:r>
-              <a:rPr/>
-              <a:t>Time-weighted averages;</a:t>
-            </a:r>
-          </a:p>
-          <a:p>
-            <a:pPr lvl="1"/>
-            <a:r>
-              <a:rPr/>
-              <a:t>Percentile approximation;</a:t>
-            </a:r>
-          </a:p>
-        </p:txBody>
-      </p:sp>
-      <p:pic>
-        <p:nvPicPr>
-          <p:cNvPr descr="https://github.com/ManuelePasini/slides-markdown/blob/master/slides/images/dt/timescale/hyperfunctions.png?raw=true" id="0" name="Picture 1"/>
-          <p:cNvPicPr>
-            <a:picLocks noGrp="1" noChangeAspect="1"/>
-          </p:cNvPicPr>
-          <p:nvPr/>
-        </p:nvPicPr>
-        <p:blipFill>
-          <a:blip r:embed="rId5"/>
-          <a:stretch>
-            <a:fillRect/>
-          </a:stretch>
-        </p:blipFill>
-        <p:spPr bwMode="auto">
-          <a:xfrm>
-            <a:off x="4025900" y="1193800"/>
-            <a:ext cx="1092200" cy="2882900"/>
-          </a:xfrm>
-          <a:prstGeom prst="rect">
-            <a:avLst/>
-          </a:prstGeom>
-          <a:noFill/>
-          <a:ln w="9525">
-            <a:noFill/>
-            <a:headEnd/>
-            <a:tailEnd/>
-          </a:ln>
-        </p:spPr>
-      </p:pic>
-      <p:sp>
-        <p:nvSpPr>
-          <p:cNvPr id="1" name="TextBox 3"/>
-          <p:cNvSpPr txBox="1"/>
-          <p:nvPr/>
-        </p:nvSpPr>
-        <p:spPr>
-          <a:xfrm>
-            <a:off x="457200" y="4076700"/>
-            <a:ext cx="8229600" cy="508000"/>
-          </a:xfrm>
-          <a:prstGeom prst="rect">
-            <a:avLst/>
-          </a:prstGeom>
-          <a:noFill/>
-        </p:spPr>
-        <p:txBody>
-          <a:bodyPr/>
-          <a:lstStyle/>
-          <a:p>
-            <a:pPr lvl="0" indent="0" marL="0" algn="ctr">
-              <a:buNone/>
-            </a:pPr>
-            <a:r>
-              <a:rPr/>
-              <a:t>Hyperfunctions list</a:t>
-            </a:r>
-          </a:p>
-        </p:txBody>
-      </p:sp>
-      <p:sp>
-        <p:nvSpPr>
-          <p:cNvPr id="3" name="Content Placeholder 2"/>
-          <p:cNvSpPr>
-            <a:spLocks noGrp="1"/>
-          </p:cNvSpPr>
-          <p:nvPr>
-            <p:ph idx="1"/>
-          </p:nvPr>
-        </p:nvSpPr>
-        <p:spPr/>
-        <p:txBody>
-          <a:bodyPr/>
-          <a:lstStyle/>
-          <a:p>
-            <a:pPr lvl="0" indent="0" marL="0">
-              <a:spcBef>
-                <a:spcPts val="3000"/>
-              </a:spcBef>
-              <a:buNone/>
-            </a:pPr>
-            <a:r>
-              <a:rPr b="1"/>
-              <a:t>Further functionalities</a:t>
             </a:r>
           </a:p>
         </p:txBody>
@@ -8991,65 +8860,101 @@
             <a:pPr lvl="0"/>
             <a:r>
               <a:rPr/>
-              <a:t>Hybrid row-column oriented data model: define a retention period where data older will be stored as column-oriented data.</a:t>
-            </a:r>
-          </a:p>
-          <a:p>
-            <a:pPr lvl="0"/>
-            <a:r>
-              <a:rPr/>
-              <a:t>Column-Oriented data can still be performed DML/DDL operations upon.</a:t>
-            </a:r>
-          </a:p>
-        </p:txBody>
-      </p:sp>
-      <p:sp>
-        <p:nvSpPr>
-          <p:cNvPr id="4" name="Content Placeholder 3"/>
-          <p:cNvSpPr>
-            <a:spLocks noGrp="1"/>
-          </p:cNvSpPr>
-          <p:nvPr>
-            <p:ph idx="2" sz="half"/>
-          </p:nvPr>
-        </p:nvSpPr>
-        <p:spPr/>
-        <p:txBody>
-          <a:bodyPr/>
-          <a:lstStyle/>
-          <a:p>
-            <a:pPr lvl="0" indent="0" marL="0">
-              <a:spcBef>
-                <a:spcPts val="3000"/>
-              </a:spcBef>
-              <a:buNone/>
-            </a:pPr>
-            <a:r>
-              <a:rPr b="1"/>
-              <a:t>Hybrid model optimizations:</a:t>
-            </a:r>
-          </a:p>
-          <a:p>
-            <a:pPr lvl="0"/>
-            <a:r>
-              <a:rPr/>
-              <a:t>segmentby&lt;: partions data in a chunk based on [column1, …] Segmeny-by example</a:t>
-            </a:r>
-          </a:p>
-          <a:p>
-            <a:pPr lvl="0"/>
-            <a:r>
-              <a:rPr/>
-              <a:t>orderby&lt;: orders data within a chunk based on time and stores metadata w.r.t min/max values in the chunk (similar to Databricks data-skipping)</a:t>
-            </a:r>
-          </a:p>
-          <a:p>
-            <a:pPr lvl="0" indent="0" marL="0">
-              <a:buNone/>
-            </a:pPr>
-            <a:r>
-              <a:rPr/>
-              <a:t>Together: data is first grouped by the segmentby column, then ordered based on the orderby parameter, and finally divided into smaller, timestamp-ordered “mini-batches,” each containing up to 1,000 rows.</a:t>
+              <a:t>Uses standard SQL with a more operators/functions:</a:t>
+            </a:r>
+          </a:p>
+          <a:p>
+            <a:pPr lvl="1"/>
+            <a:r>
+              <a:rPr/>
+              <a:t>time_bucket(‘1 hour’, column_name): same as date_trunc in PostgreSQL</a:t>
+            </a:r>
+          </a:p>
+          <a:p>
+            <a:pPr lvl="1"/>
+            <a:r>
+              <a:rPr>
+                <a:hlinkClick r:id="rId2"/>
+              </a:rPr>
+              <a:t>Hyperfunctions</a:t>
+            </a:r>
+            <a:r>
+              <a:rPr/>
+              <a:t>:</a:t>
+            </a:r>
+          </a:p>
+          <a:p>
+            <a:pPr lvl="2"/>
+            <a:r>
+              <a:rPr/>
+              <a:t>Time-weighted averages;</a:t>
+            </a:r>
+          </a:p>
+          <a:p>
+            <a:pPr lvl="2"/>
+            <a:r>
+              <a:rPr/>
+              <a:t>Percentile approximation;</a:t>
+            </a:r>
+          </a:p>
+        </p:txBody>
+      </p:sp>
+      <p:pic>
+        <p:nvPicPr>
+          <p:cNvPr descr="https://github.com/ManuelePasini/slides-markdown/blob/master/slides/images/dt/timescale/hyperfunctions.png?raw=true" id="0" name="Picture 1"/>
+          <p:cNvPicPr>
+            <a:picLocks noGrp="1" noChangeAspect="1"/>
+          </p:cNvPicPr>
+          <p:nvPr/>
+        </p:nvPicPr>
+        <p:blipFill>
+          <a:blip r:embed="rId3"/>
+          <a:stretch>
+            <a:fillRect/>
+          </a:stretch>
+        </p:blipFill>
+        <p:spPr bwMode="auto">
+          <a:xfrm>
+            <a:off x="6121400" y="1193800"/>
+            <a:ext cx="1092200" cy="2882900"/>
+          </a:xfrm>
+          <a:prstGeom prst="rect">
+            <a:avLst/>
+          </a:prstGeom>
+          <a:noFill/>
+          <a:ln w="9525">
+            <a:noFill/>
+            <a:headEnd/>
+            <a:tailEnd/>
+          </a:ln>
+        </p:spPr>
+      </p:pic>
+      <p:sp>
+        <p:nvSpPr>
+          <p:cNvPr id="1" name="TextBox 3"/>
+          <p:cNvSpPr txBox="1"/>
+          <p:nvPr/>
+        </p:nvSpPr>
+        <p:spPr>
+          <a:xfrm>
+            <a:off x="4648200" y="4076700"/>
+            <a:ext cx="4038600" cy="508000"/>
+          </a:xfrm>
+          <a:prstGeom prst="rect">
+            <a:avLst/>
+          </a:prstGeom>
+          <a:noFill/>
+        </p:spPr>
+        <p:txBody>
+          <a:bodyPr/>
+          <a:lstStyle/>
+          <a:p>
+            <a:pPr lvl="0" indent="0" marL="0" algn="ctr">
+              <a:buNone/>
+            </a:pPr>
+            <a:r>
+              <a:rPr/>
+              <a:t>Hyperfunctions list</a:t>
             </a:r>
           </a:p>
         </p:txBody>
@@ -9099,33 +9004,59 @@
             </a:pPr>
             <a:r>
               <a:rPr b="1"/>
-              <a:t>Further functionalities .2</a:t>
-            </a:r>
-          </a:p>
-          <a:p>
-            <a:pPr lvl="0" indent="0" marL="0">
-              <a:spcBef>
-                <a:spcPts val="3000"/>
-              </a:spcBef>
-              <a:buNone/>
-            </a:pPr>
-            <a:r>
-              <a:rPr b="1"/>
-              <a:t>Continuous aggregates</a:t>
-            </a:r>
-          </a:p>
-          <a:p>
-            <a:pPr lvl="0"/>
-            <a:r>
-              <a:rPr/>
-              <a:t>Automatically (in background) maintain the results from the query.</a:t>
-            </a:r>
-          </a:p>
-          <a:p>
-            <a:pPr lvl="0"/>
-            <a:r>
-              <a:rPr/>
-              <a:t>TRefreshed automatically in the background as new data is added, or old data is modified.</a:t>
+              <a:t>Further functionalities</a:t>
+            </a:r>
+          </a:p>
+        </p:txBody>
+      </p:sp>
+    </p:spTree>
+  </p:cSld>
+</p:sld>
+</file>
+
+<file path=ppt/slides/slide39.xml><?xml version="1.0" encoding="utf-8"?>
+<p:sld xmlns:a="http://schemas.openxmlformats.org/drawingml/2006/main" xmlns:r="http://schemas.openxmlformats.org/officeDocument/2006/relationships" xmlns:p="http://schemas.openxmlformats.org/presentationml/2006/main">
+  <p:cSld>
+    <p:spTree>
+      <p:nvGrpSpPr>
+        <p:cNvPr id="1" name=""/>
+        <p:cNvGrpSpPr/>
+        <p:nvPr/>
+      </p:nvGrpSpPr>
+      <p:grpSpPr>
+        <a:xfrm>
+          <a:off x="0" y="0"/>
+          <a:ext cx="0" cy="0"/>
+          <a:chOff x="0" y="0"/>
+          <a:chExt cx="0" cy="0"/>
+        </a:xfrm>
+      </p:grpSpPr>
+      <p:sp>
+        <p:nvSpPr>
+          <p:cNvPr id="3" name="Content Placeholder 2"/>
+          <p:cNvSpPr>
+            <a:spLocks noGrp="1"/>
+          </p:cNvSpPr>
+          <p:nvPr>
+            <p:ph idx="1" sz="half"/>
+          </p:nvPr>
+        </p:nvSpPr>
+        <p:spPr/>
+        <p:txBody>
+          <a:bodyPr/>
+          <a:lstStyle/>
+          <a:p>
+            <a:pPr lvl="0"/>
+            <a:r>
+              <a:rPr/>
+              <a:t>Hybrid row-column oriented data model: define a retention period where data older will be stored as column-oriented data.</a:t>
+            </a:r>
+          </a:p>
+          <a:p>
+            <a:pPr lvl="1"/>
+            <a:r>
+              <a:rPr/>
+              <a:t>Column-Oriented data can still be performed DML/DDL operations upon.</a:t>
             </a:r>
           </a:p>
         </p:txBody>
@@ -9146,8 +9077,8 @@
         </p:blipFill>
         <p:spPr bwMode="auto">
           <a:xfrm>
-            <a:off x="457200" y="1981200"/>
-            <a:ext cx="8229600" cy="1308100"/>
+            <a:off x="457200" y="2311400"/>
+            <a:ext cx="4038600" cy="635000"/>
           </a:xfrm>
           <a:prstGeom prst="rect">
             <a:avLst/>
@@ -9169,7 +9100,7 @@
         <p:spPr>
           <a:xfrm>
             <a:off x="457200" y="4076700"/>
-            <a:ext cx="8229600" cy="508000"/>
+            <a:ext cx="4038600" cy="508000"/>
           </a:xfrm>
           <a:prstGeom prst="rect">
             <a:avLst/>
@@ -9185,13 +9116,134 @@
             </a:pPr>
             <a:r>
               <a:rPr/>
-              <a:t>Creating a continuous view </a:t>
-            </a:r>
-            <a:r>
-              <a:rPr>
-                <a:hlinkClick r:id="rId3"/>
-              </a:rPr>
-              <a:t>doc</a:t>
+              <a:t>Segmeny-by example</a:t>
+            </a:r>
+          </a:p>
+        </p:txBody>
+      </p:sp>
+      <p:sp>
+        <p:nvSpPr>
+          <p:cNvPr id="4" name="Content Placeholder 3"/>
+          <p:cNvSpPr>
+            <a:spLocks noGrp="1"/>
+          </p:cNvSpPr>
+          <p:nvPr>
+            <p:ph idx="2" sz="half"/>
+          </p:nvPr>
+        </p:nvSpPr>
+        <p:spPr/>
+        <p:txBody>
+          <a:bodyPr/>
+          <a:lstStyle/>
+          <a:p>
+            <a:pPr lvl="0" indent="0" marL="0">
+              <a:spcBef>
+                <a:spcPts val="3000"/>
+              </a:spcBef>
+              <a:buNone/>
+            </a:pPr>
+            <a:r>
+              <a:rPr b="1"/>
+              <a:t>Hybrid model optimizations:</a:t>
+            </a:r>
+          </a:p>
+          <a:p>
+            <a:pPr lvl="0"/>
+            <a:r>
+              <a:rPr/>
+              <a:t>segmentby: partions data in a chunk based on [column1, …]</a:t>
+            </a:r>
+          </a:p>
+        </p:txBody>
+      </p:sp>
+      <p:pic>
+        <p:nvPicPr>
+          <p:cNvPr descr="https://github.com/ManuelePasini/slides-markdown/blob/master/slides/images/dt/timescale/hybrid_model.png?raw=true" id="0" name="Picture 1"/>
+          <p:cNvPicPr>
+            <a:picLocks noGrp="1" noChangeAspect="1"/>
+          </p:cNvPicPr>
+          <p:nvPr/>
+        </p:nvPicPr>
+        <p:blipFill>
+          <a:blip r:embed="rId3"/>
+          <a:stretch>
+            <a:fillRect/>
+          </a:stretch>
+        </p:blipFill>
+        <p:spPr bwMode="auto">
+          <a:xfrm>
+            <a:off x="4648200" y="1409700"/>
+            <a:ext cx="4038600" cy="2451100"/>
+          </a:xfrm>
+          <a:prstGeom prst="rect">
+            <a:avLst/>
+          </a:prstGeom>
+          <a:noFill/>
+          <a:ln w="9525">
+            <a:noFill/>
+            <a:headEnd/>
+            <a:tailEnd/>
+          </a:ln>
+        </p:spPr>
+      </p:pic>
+      <p:sp>
+        <p:nvSpPr>
+          <p:cNvPr id="1" name="TextBox 3"/>
+          <p:cNvSpPr txBox="1"/>
+          <p:nvPr/>
+        </p:nvSpPr>
+        <p:spPr>
+          <a:xfrm>
+            <a:off x="4648200" y="4076700"/>
+            <a:ext cx="4038600" cy="508000"/>
+          </a:xfrm>
+          <a:prstGeom prst="rect">
+            <a:avLst/>
+          </a:prstGeom>
+          <a:noFill/>
+        </p:spPr>
+        <p:txBody>
+          <a:bodyPr/>
+          <a:lstStyle/>
+          <a:p>
+            <a:pPr lvl="0" indent="0" marL="0" algn="ctr">
+              <a:buNone/>
+            </a:pPr>
+            <a:r>
+              <a:rPr/>
+              <a:t>Segmeny-by example</a:t>
+            </a:r>
+          </a:p>
+        </p:txBody>
+      </p:sp>
+      <p:sp>
+        <p:nvSpPr>
+          <p:cNvPr id="4" name="Content Placeholder 3"/>
+          <p:cNvSpPr>
+            <a:spLocks noGrp="1"/>
+          </p:cNvSpPr>
+          <p:nvPr>
+            <p:ph idx="2" sz="half"/>
+          </p:nvPr>
+        </p:nvSpPr>
+        <p:spPr/>
+        <p:txBody>
+          <a:bodyPr/>
+          <a:lstStyle/>
+          <a:p>
+            <a:pPr lvl="0"/>
+            <a:r>
+              <a:rPr/>
+              <a:t>orderby: orders data within a chunk based on time and stores metadata w.r.t min/max values in the chunk (similar to Databricks data-skipping)</a:t>
+            </a:r>
+          </a:p>
+          <a:p>
+            <a:pPr lvl="0" indent="0" marL="0">
+              <a:buNone/>
+            </a:pPr>
+            <a:r>
+              <a:rPr/>
+              <a:t>Together: data is first grouped by the segmentby column, then ordered based on the orderby parameter, and finally divided into smaller, timestamp-ordered “mini-batches,” each containing up to 1,000 rows.</a:t>
             </a:r>
           </a:p>
         </p:txBody>
@@ -9218,6 +9270,82 @@
           <a:chExt cx="0" cy="0"/>
         </a:xfrm>
       </p:grpSpPr>
+    </p:spTree>
+  </p:cSld>
+</p:sld>
+</file>
+
+<file path=ppt/slides/slide40.xml><?xml version="1.0" encoding="utf-8"?>
+<p:sld xmlns:a="http://schemas.openxmlformats.org/drawingml/2006/main" xmlns:r="http://schemas.openxmlformats.org/officeDocument/2006/relationships" xmlns:p="http://schemas.openxmlformats.org/presentationml/2006/main">
+  <p:cSld>
+    <p:spTree>
+      <p:nvGrpSpPr>
+        <p:cNvPr id="1" name=""/>
+        <p:cNvGrpSpPr/>
+        <p:nvPr/>
+      </p:nvGrpSpPr>
+      <p:grpSpPr>
+        <a:xfrm>
+          <a:off x="0" y="0"/>
+          <a:ext cx="0" cy="0"/>
+          <a:chOff x="0" y="0"/>
+          <a:chExt cx="0" cy="0"/>
+        </a:xfrm>
+      </p:grpSpPr>
+      <p:sp>
+        <p:nvSpPr>
+          <p:cNvPr id="3" name="Content Placeholder 2"/>
+          <p:cNvSpPr>
+            <a:spLocks noGrp="1"/>
+          </p:cNvSpPr>
+          <p:nvPr>
+            <p:ph idx="1"/>
+          </p:nvPr>
+        </p:nvSpPr>
+        <p:spPr/>
+        <p:txBody>
+          <a:bodyPr/>
+          <a:lstStyle/>
+          <a:p>
+            <a:pPr lvl="0" indent="0" marL="0">
+              <a:spcBef>
+                <a:spcPts val="3000"/>
+              </a:spcBef>
+              <a:buNone/>
+            </a:pPr>
+            <a:r>
+              <a:rPr b="1"/>
+              <a:t>Further functionalities .2</a:t>
+            </a:r>
+          </a:p>
+          <a:p>
+            <a:pPr lvl="0" indent="0" marL="0">
+              <a:spcBef>
+                <a:spcPts val="3000"/>
+              </a:spcBef>
+              <a:buNone/>
+            </a:pPr>
+            <a:r>
+              <a:rPr b="1"/>
+              <a:t>Continuous aggregates</a:t>
+            </a:r>
+          </a:p>
+          <a:p>
+            <a:pPr lvl="0"/>
+            <a:r>
+              <a:rPr/>
+              <a:t>Automatically (in background) maintain the results from the query.</a:t>
+            </a:r>
+          </a:p>
+          <a:p>
+            <a:pPr lvl="0"/>
+            <a:r>
+              <a:rPr/>
+              <a:t>Refreshed automatically in the background as new data is added, or old data is modified.</a:t>
+            </a:r>
+          </a:p>
+        </p:txBody>
+      </p:sp>
     </p:spTree>
   </p:cSld>
 </p:sld>

</xml_diff>

<commit_message>
Deploying to gh-pages from @ ManuelePasini/slides-markdown@9dd264846b6c9a8d69d1dba52ac616d089d31a0a 🚀
</commit_message>
<xml_diff>
--- a/digital_twins.pptx
+++ b/digital_twins.pptx
@@ -8775,7 +8775,7 @@
             <a:pPr lvl="0"/>
             <a:r>
               <a:rPr/>
-              <a:t>Based on hypertables</a:t>
+              <a:t>Based on hypertables:</a:t>
             </a:r>
           </a:p>
           <a:p>
@@ -9033,12 +9033,12 @@
       </p:grpSpPr>
       <p:sp>
         <p:nvSpPr>
-          <p:cNvPr id="3" name="Content Placeholder 2"/>
-          <p:cNvSpPr>
-            <a:spLocks noGrp="1"/>
-          </p:cNvSpPr>
-          <p:nvPr>
-            <p:ph idx="1" sz="half"/>
+          <p:cNvPr id="3" name="Text Placeholder 2"/>
+          <p:cNvSpPr>
+            <a:spLocks noGrp="1"/>
+          </p:cNvSpPr>
+          <p:nvPr>
+            <p:ph idx="1" type="body"/>
           </p:nvPr>
         </p:nvSpPr>
         <p:spPr/>
@@ -9063,7 +9063,7 @@
       </p:sp>
       <p:pic>
         <p:nvPicPr>
-          <p:cNvPr descr="https://github.com/ManuelePasini/slides-markdown/blob/master/slides/images/dt/timescale/segmentby.png?raw=true" id="0" name="Picture 1"/>
+          <p:cNvPr descr="https://github.com/ManuelePasini/slides-markdown/blob/master/slides/images/dt/timescale/hybrid_model.png?raw=true" id="0" name="Picture 1"/>
           <p:cNvPicPr>
             <a:picLocks noGrp="1" noChangeAspect="1"/>
           </p:cNvPicPr>
@@ -9077,7 +9077,102 @@
         </p:blipFill>
         <p:spPr bwMode="auto">
           <a:xfrm>
-            <a:off x="457200" y="2311400"/>
+            <a:off x="457200" y="1625600"/>
+            <a:ext cx="4038600" cy="2451100"/>
+          </a:xfrm>
+          <a:prstGeom prst="rect">
+            <a:avLst/>
+          </a:prstGeom>
+          <a:noFill/>
+          <a:ln w="9525">
+            <a:noFill/>
+            <a:headEnd/>
+            <a:tailEnd/>
+          </a:ln>
+        </p:spPr>
+      </p:pic>
+      <p:sp>
+        <p:nvSpPr>
+          <p:cNvPr id="1" name="TextBox 3"/>
+          <p:cNvSpPr txBox="1"/>
+          <p:nvPr/>
+        </p:nvSpPr>
+        <p:spPr>
+          <a:xfrm>
+            <a:off x="457200" y="4076700"/>
+            <a:ext cx="4038600" cy="508000"/>
+          </a:xfrm>
+          <a:prstGeom prst="rect">
+            <a:avLst/>
+          </a:prstGeom>
+          <a:noFill/>
+        </p:spPr>
+        <p:txBody>
+          <a:bodyPr/>
+          <a:lstStyle/>
+          <a:p>
+            <a:pPr lvl="0" indent="0" marL="0" algn="ctr">
+              <a:buNone/>
+            </a:pPr>
+            <a:r>
+              <a:rPr/>
+              <a:t>Timescale hybrid model</a:t>
+            </a:r>
+          </a:p>
+        </p:txBody>
+      </p:sp>
+      <p:sp>
+        <p:nvSpPr>
+          <p:cNvPr id="5" name="Text Placeholder 4"/>
+          <p:cNvSpPr>
+            <a:spLocks noGrp="1"/>
+          </p:cNvSpPr>
+          <p:nvPr>
+            <p:ph idx="3" sz="quarter" type="body"/>
+          </p:nvPr>
+        </p:nvSpPr>
+        <p:spPr/>
+        <p:txBody>
+          <a:bodyPr/>
+          <a:lstStyle/>
+          <a:p>
+            <a:pPr lvl="0" indent="0" marL="0">
+              <a:spcBef>
+                <a:spcPts val="3000"/>
+              </a:spcBef>
+              <a:buNone/>
+            </a:pPr>
+            <a:r>
+              <a:rPr b="1"/>
+              <a:t>Hybrid model optimizations:</a:t>
+            </a:r>
+          </a:p>
+          <a:p>
+            <a:pPr lvl="0"/>
+            <a:r>
+              <a:rPr/>
+              <a:t>segmentby: partions data in a chunk based on [column1, …]</a:t>
+            </a:r>
+          </a:p>
+        </p:txBody>
+      </p:sp>
+      <p:pic>
+        <p:nvPicPr>
+          <p:cNvPr descr="https://github.com/ManuelePasini/slides-markdown/blob/master/slides/images/dt/timescale/segmentby.png?raw=true" id="0" name="Picture 1"/>
+          <p:cNvPicPr>
+            <a:picLocks noGrp="1" noChangeAspect="1"/>
+          </p:cNvPicPr>
+          <p:nvPr/>
+        </p:nvPicPr>
+        <p:blipFill>
+          <a:blip r:embed="rId3"/>
+          <a:stretch>
+            <a:fillRect/>
+          </a:stretch>
+        </p:blipFill>
+        <p:spPr bwMode="auto">
+          <a:xfrm>
+            <a:off x="4635500" y="800100"/>
             <a:ext cx="4038600" cy="635000"/>
           </a:xfrm>
           <a:prstGeom prst="rect">
@@ -9099,7 +9194,7 @@
         </p:nvSpPr>
         <p:spPr>
           <a:xfrm>
-            <a:off x="457200" y="4076700"/>
+            <a:off x="4635500" y="1104900"/>
             <a:ext cx="4038600" cy="508000"/>
           </a:xfrm>
           <a:prstGeom prst="rect">
@@ -9123,107 +9218,12 @@
       </p:sp>
       <p:sp>
         <p:nvSpPr>
-          <p:cNvPr id="4" name="Content Placeholder 3"/>
-          <p:cNvSpPr>
-            <a:spLocks noGrp="1"/>
-          </p:cNvSpPr>
-          <p:nvPr>
-            <p:ph idx="2" sz="half"/>
-          </p:nvPr>
-        </p:nvSpPr>
-        <p:spPr/>
-        <p:txBody>
-          <a:bodyPr/>
-          <a:lstStyle/>
-          <a:p>
-            <a:pPr lvl="0" indent="0" marL="0">
-              <a:spcBef>
-                <a:spcPts val="3000"/>
-              </a:spcBef>
-              <a:buNone/>
-            </a:pPr>
-            <a:r>
-              <a:rPr b="1"/>
-              <a:t>Hybrid model optimizations:</a:t>
-            </a:r>
-          </a:p>
-          <a:p>
-            <a:pPr lvl="0"/>
-            <a:r>
-              <a:rPr/>
-              <a:t>segmentby: partions data in a chunk based on [column1, …]</a:t>
-            </a:r>
-          </a:p>
-        </p:txBody>
-      </p:sp>
-      <p:pic>
-        <p:nvPicPr>
-          <p:cNvPr descr="https://github.com/ManuelePasini/slides-markdown/blob/master/slides/images/dt/timescale/hybrid_model.png?raw=true" id="0" name="Picture 1"/>
-          <p:cNvPicPr>
-            <a:picLocks noGrp="1" noChangeAspect="1"/>
-          </p:cNvPicPr>
-          <p:nvPr/>
-        </p:nvPicPr>
-        <p:blipFill>
-          <a:blip r:embed="rId3"/>
-          <a:stretch>
-            <a:fillRect/>
-          </a:stretch>
-        </p:blipFill>
-        <p:spPr bwMode="auto">
-          <a:xfrm>
-            <a:off x="4648200" y="1409700"/>
-            <a:ext cx="4038600" cy="2451100"/>
-          </a:xfrm>
-          <a:prstGeom prst="rect">
-            <a:avLst/>
-          </a:prstGeom>
-          <a:noFill/>
-          <a:ln w="9525">
-            <a:noFill/>
-            <a:headEnd/>
-            <a:tailEnd/>
-          </a:ln>
-        </p:spPr>
-      </p:pic>
-      <p:sp>
-        <p:nvSpPr>
-          <p:cNvPr id="1" name="TextBox 3"/>
-          <p:cNvSpPr txBox="1"/>
-          <p:nvPr/>
-        </p:nvSpPr>
-        <p:spPr>
-          <a:xfrm>
-            <a:off x="4648200" y="4076700"/>
-            <a:ext cx="4038600" cy="508000"/>
-          </a:xfrm>
-          <a:prstGeom prst="rect">
-            <a:avLst/>
-          </a:prstGeom>
-          <a:noFill/>
-        </p:spPr>
-        <p:txBody>
-          <a:bodyPr/>
-          <a:lstStyle/>
-          <a:p>
-            <a:pPr lvl="0" indent="0" marL="0" algn="ctr">
-              <a:buNone/>
-            </a:pPr>
-            <a:r>
-              <a:rPr/>
-              <a:t>Segmeny-by example</a:t>
-            </a:r>
-          </a:p>
-        </p:txBody>
-      </p:sp>
-      <p:sp>
-        <p:nvSpPr>
-          <p:cNvPr id="4" name="Content Placeholder 3"/>
-          <p:cNvSpPr>
-            <a:spLocks noGrp="1"/>
-          </p:cNvSpPr>
-          <p:nvPr>
-            <p:ph idx="2" sz="half"/>
+          <p:cNvPr id="5" name="Text Placeholder 4"/>
+          <p:cNvSpPr>
+            <a:spLocks noGrp="1"/>
+          </p:cNvSpPr>
+          <p:nvPr>
+            <p:ph idx="3" sz="quarter" type="body"/>
           </p:nvPr>
         </p:nvSpPr>
         <p:spPr/>

</xml_diff>

<commit_message>
Deploying to gh-pages from @ ManuelePasini/slides-markdown@5ab2e0b22e67114160aa2f7c26f12f1667c63b96 🚀
</commit_message>
<xml_diff>
--- a/digital_twins.pptx
+++ b/digital_twins.pptx
@@ -9033,12 +9033,12 @@
       </p:grpSpPr>
       <p:sp>
         <p:nvSpPr>
-          <p:cNvPr id="3" name="Text Placeholder 2"/>
-          <p:cNvSpPr>
-            <a:spLocks noGrp="1"/>
-          </p:cNvSpPr>
-          <p:nvPr>
-            <p:ph idx="1" type="body"/>
+          <p:cNvPr id="3" name="Content Placeholder 2"/>
+          <p:cNvSpPr>
+            <a:spLocks noGrp="1"/>
+          </p:cNvSpPr>
+          <p:nvPr>
+            <p:ph idx="1" sz="half"/>
           </p:nvPr>
         </p:nvSpPr>
         <p:spPr/>
@@ -9077,7 +9077,7 @@
         </p:blipFill>
         <p:spPr bwMode="auto">
           <a:xfrm>
-            <a:off x="457200" y="1625600"/>
+            <a:off x="457200" y="1409700"/>
             <a:ext cx="4038600" cy="2451100"/>
           </a:xfrm>
           <a:prstGeom prst="rect">
@@ -9123,12 +9123,12 @@
       </p:sp>
       <p:sp>
         <p:nvSpPr>
-          <p:cNvPr id="5" name="Text Placeholder 4"/>
-          <p:cNvSpPr>
-            <a:spLocks noGrp="1"/>
-          </p:cNvSpPr>
-          <p:nvPr>
-            <p:ph idx="3" sz="quarter" type="body"/>
+          <p:cNvPr id="4" name="Content Placeholder 3"/>
+          <p:cNvSpPr>
+            <a:spLocks noGrp="1"/>
+          </p:cNvSpPr>
+          <p:nvPr>
+            <p:ph idx="2" sz="half"/>
           </p:nvPr>
         </p:nvSpPr>
         <p:spPr/>
@@ -9144,14 +9144,14 @@
             </a:pPr>
             <a:r>
               <a:rPr b="1"/>
-              <a:t>Hybrid model optimizations:</a:t>
-            </a:r>
-          </a:p>
-          <a:p>
-            <a:pPr lvl="0"/>
-            <a:r>
-              <a:rPr/>
-              <a:t>segmentby: partions data in a chunk based on [column1, …]</a:t>
+              <a:t>Hybrid model optimizations</a:t>
+            </a:r>
+          </a:p>
+          <a:p>
+            <a:pPr lvl="0"/>
+            <a:r>
+              <a:rPr/>
+              <a:t>segmentby: partion data inside chunk on [column1, …]</a:t>
             </a:r>
           </a:p>
         </p:txBody>
@@ -9172,7 +9172,7 @@
         </p:blipFill>
         <p:spPr bwMode="auto">
           <a:xfrm>
-            <a:off x="4635500" y="800100"/>
+            <a:off x="4648200" y="2311400"/>
             <a:ext cx="4038600" cy="635000"/>
           </a:xfrm>
           <a:prstGeom prst="rect">
@@ -9194,7 +9194,7 @@
         </p:nvSpPr>
         <p:spPr>
           <a:xfrm>
-            <a:off x="4635500" y="1104900"/>
+            <a:off x="4648200" y="4076700"/>
             <a:ext cx="4038600" cy="508000"/>
           </a:xfrm>
           <a:prstGeom prst="rect">
@@ -9218,12 +9218,12 @@
       </p:sp>
       <p:sp>
         <p:nvSpPr>
-          <p:cNvPr id="5" name="Text Placeholder 4"/>
-          <p:cNvSpPr>
-            <a:spLocks noGrp="1"/>
-          </p:cNvSpPr>
-          <p:nvPr>
-            <p:ph idx="3" sz="quarter" type="body"/>
+          <p:cNvPr id="4" name="Content Placeholder 3"/>
+          <p:cNvSpPr>
+            <a:spLocks noGrp="1"/>
+          </p:cNvSpPr>
+          <p:nvPr>
+            <p:ph idx="2" sz="half"/>
           </p:nvPr>
         </p:nvSpPr>
         <p:spPr/>

</xml_diff>

<commit_message>
Deploying to gh-pages from @ ManuelePasini/slides-markdown@a1a6955f1cb5f9fa5c4ab5b64d1ef81a651edfe0 🚀
</commit_message>
<xml_diff>
--- a/digital_twins.pptx
+++ b/digital_twins.pptx
@@ -8796,6 +8796,13 @@
             <a:pPr lvl="1"/>
             <a:r>
               <a:rPr/>
+              <a:t>Other columns can be added in partitioning columns</a:t>
+            </a:r>
+          </a:p>
+          <a:p>
+            <a:pPr lvl="1"/>
+            <a:r>
+              <a:rPr/>
               <a:t>Support for distributed hypertables</a:t>
             </a:r>
           </a:p>
@@ -9211,7 +9218,7 @@
             </a:pPr>
             <a:r>
               <a:rPr/>
-              <a:t>Segmeny-by example</a:t>
+              <a:t>Segmentby example</a:t>
             </a:r>
           </a:p>
         </p:txBody>

</xml_diff>

<commit_message>
Deploying to gh-pages from @ ManuelePasini/slides-markdown@71b08cca493e146e6369db5001898f30198d7f8c 🚀
</commit_message>
<xml_diff>
--- a/digital_twins.pptx
+++ b/digital_twins.pptx
@@ -8813,6 +8813,82 @@
               <a:t>Supports a large set of PostgreSQL extensions (e.g. PostGIS, PostGIS_Raster)</a:t>
             </a:r>
           </a:p>
+        </p:txBody>
+      </p:sp>
+      <p:pic>
+        <p:nvPicPr>
+          <p:cNvPr descr="https://github.com/ManuelePasini/slides-markdown/blob/master/slides/images/dt/timescale/chunks.png?raw=true" id="0" name="Picture 1"/>
+          <p:cNvPicPr>
+            <a:picLocks noGrp="1" noChangeAspect="1"/>
+          </p:cNvPicPr>
+          <p:nvPr/>
+        </p:nvPicPr>
+        <p:blipFill>
+          <a:blip r:embed="rId4"/>
+          <a:stretch>
+            <a:fillRect/>
+          </a:stretch>
+        </p:blipFill>
+        <p:spPr bwMode="auto">
+          <a:xfrm>
+            <a:off x="2006600" y="1193800"/>
+            <a:ext cx="5130800" cy="2882900"/>
+          </a:xfrm>
+          <a:prstGeom prst="rect">
+            <a:avLst/>
+          </a:prstGeom>
+          <a:noFill/>
+          <a:ln w="9525">
+            <a:noFill/>
+            <a:headEnd/>
+            <a:tailEnd/>
+          </a:ln>
+        </p:spPr>
+      </p:pic>
+      <p:sp>
+        <p:nvSpPr>
+          <p:cNvPr id="1" name="TextBox 3"/>
+          <p:cNvSpPr txBox="1"/>
+          <p:nvPr/>
+        </p:nvSpPr>
+        <p:spPr>
+          <a:xfrm>
+            <a:off x="457200" y="4076700"/>
+            <a:ext cx="8229600" cy="508000"/>
+          </a:xfrm>
+          <a:prstGeom prst="rect">
+            <a:avLst/>
+          </a:prstGeom>
+          <a:noFill/>
+        </p:spPr>
+        <p:txBody>
+          <a:bodyPr/>
+          <a:lstStyle/>
+          <a:p>
+            <a:pPr lvl="0" indent="0" marL="0" algn="ctr">
+              <a:buNone/>
+            </a:pPr>
+            <a:r>
+              <a:rPr/>
+              <a:t>Table organization in chunks</a:t>
+            </a:r>
+          </a:p>
+        </p:txBody>
+      </p:sp>
+      <p:sp>
+        <p:nvSpPr>
+          <p:cNvPr id="3" name="Content Placeholder 2"/>
+          <p:cNvSpPr>
+            <a:spLocks noGrp="1"/>
+          </p:cNvSpPr>
+          <p:nvPr>
+            <p:ph idx="1"/>
+          </p:nvPr>
+        </p:nvSpPr>
+        <p:spPr/>
+        <p:txBody>
+          <a:bodyPr/>
+          <a:lstStyle/>
           <a:p>
             <a:pPr lvl="0" indent="0" marL="0">
               <a:spcBef>

</xml_diff>

<commit_message>
Deploying to gh-pages from @ ManuelePasini/slides-markdown@5bd0bd93c3071227eacd424ffd2c5dd30b7abe71 🚀
</commit_message>
<xml_diff>
--- a/digital_twins.pptx
+++ b/digital_twins.pptx
@@ -8950,7 +8950,14 @@
             <a:pPr lvl="1"/>
             <a:r>
               <a:rPr/>
-              <a:t>time_bucket(‘1 hour’, column_name): same as date_trunc in PostgreSQL</a:t>
+              <a:t>time_bucket(‘1 hour’, column_name): same as date_trunc in PostgreSQL but with custom granularity</a:t>
+            </a:r>
+          </a:p>
+          <a:p>
+            <a:pPr lvl="1"/>
+            <a:r>
+              <a:rPr/>
+              <a:t>…</a:t>
             </a:r>
           </a:p>
           <a:p>

</xml_diff>

<commit_message>
Deploying to gh-pages from @ ManuelePasini/slides-markdown@862154bedcbf2a9f174f7a0e48f514907da12f21 🚀
</commit_message>
<xml_diff>
--- a/digital_twins.pptx
+++ b/digital_twins.pptx
@@ -9301,7 +9301,7 @@
             </a:pPr>
             <a:r>
               <a:rPr/>
-              <a:t>Segmentby example</a:t>
+              <a:t>Segmentby example - partition by device id</a:t>
             </a:r>
           </a:p>
         </p:txBody>
@@ -9405,7 +9405,7 @@
             </a:pPr>
             <a:r>
               <a:rPr b="1"/>
-              <a:t>Further functionalities .2</a:t>
+              <a:t>Further functionalities</a:t>
             </a:r>
           </a:p>
           <a:p>

</xml_diff>